<commit_message>
Audio flow good now. Checking server id handling for multiple clients"
</commit_message>
<xml_diff>
--- a/design notes.pptx
+++ b/design notes.pptx
@@ -12,10 +12,11 @@
     <p:sldId id="265" r:id="rId6"/>
     <p:sldId id="266" r:id="rId7"/>
     <p:sldId id="260" r:id="rId8"/>
-    <p:sldId id="261" r:id="rId9"/>
-    <p:sldId id="262" r:id="rId10"/>
-    <p:sldId id="263" r:id="rId11"/>
-    <p:sldId id="264" r:id="rId12"/>
+    <p:sldId id="267" r:id="rId9"/>
+    <p:sldId id="261" r:id="rId10"/>
+    <p:sldId id="262" r:id="rId11"/>
+    <p:sldId id="263" r:id="rId12"/>
+    <p:sldId id="264" r:id="rId13"/>
   </p:sldIdLst>
   <p:sldSz cx="12192000" cy="6858000"/>
   <p:notesSz cx="6858000" cy="9144000"/>
@@ -114,6 +115,11 @@
       </a:defRPr>
     </a:lvl9pPr>
   </p:defaultTextStyle>
+  <p:extLst>
+    <p:ext uri="{EFAFB233-063F-42B5-8137-9DF3F51BA10A}">
+      <p15:sldGuideLst xmlns:p15="http://schemas.microsoft.com/office/powerpoint/2012/main"/>
+    </p:ext>
+  </p:extLst>
 </p:presentation>
 </file>
 
@@ -248,7 +254,7 @@
           <a:p>
             <a:fld id="{BC0ED75D-8292-496A-995E-908E2AB58EFB}" type="datetimeFigureOut">
               <a:rPr lang="en-US" smtClean="0"/>
-              <a:t>2/9/2021</a:t>
+              <a:t>2/10/2021</a:t>
             </a:fld>
             <a:endParaRPr lang="en-US"/>
           </a:p>
@@ -418,7 +424,7 @@
           <a:p>
             <a:fld id="{BC0ED75D-8292-496A-995E-908E2AB58EFB}" type="datetimeFigureOut">
               <a:rPr lang="en-US" smtClean="0"/>
-              <a:t>2/9/2021</a:t>
+              <a:t>2/10/2021</a:t>
             </a:fld>
             <a:endParaRPr lang="en-US"/>
           </a:p>
@@ -598,7 +604,7 @@
           <a:p>
             <a:fld id="{BC0ED75D-8292-496A-995E-908E2AB58EFB}" type="datetimeFigureOut">
               <a:rPr lang="en-US" smtClean="0"/>
-              <a:t>2/9/2021</a:t>
+              <a:t>2/10/2021</a:t>
             </a:fld>
             <a:endParaRPr lang="en-US"/>
           </a:p>
@@ -768,7 +774,7 @@
           <a:p>
             <a:fld id="{BC0ED75D-8292-496A-995E-908E2AB58EFB}" type="datetimeFigureOut">
               <a:rPr lang="en-US" smtClean="0"/>
-              <a:t>2/9/2021</a:t>
+              <a:t>2/10/2021</a:t>
             </a:fld>
             <a:endParaRPr lang="en-US"/>
           </a:p>
@@ -1014,7 +1020,7 @@
           <a:p>
             <a:fld id="{BC0ED75D-8292-496A-995E-908E2AB58EFB}" type="datetimeFigureOut">
               <a:rPr lang="en-US" smtClean="0"/>
-              <a:t>2/9/2021</a:t>
+              <a:t>2/10/2021</a:t>
             </a:fld>
             <a:endParaRPr lang="en-US"/>
           </a:p>
@@ -1246,7 +1252,7 @@
           <a:p>
             <a:fld id="{BC0ED75D-8292-496A-995E-908E2AB58EFB}" type="datetimeFigureOut">
               <a:rPr lang="en-US" smtClean="0"/>
-              <a:t>2/9/2021</a:t>
+              <a:t>2/10/2021</a:t>
             </a:fld>
             <a:endParaRPr lang="en-US"/>
           </a:p>
@@ -1613,7 +1619,7 @@
           <a:p>
             <a:fld id="{BC0ED75D-8292-496A-995E-908E2AB58EFB}" type="datetimeFigureOut">
               <a:rPr lang="en-US" smtClean="0"/>
-              <a:t>2/9/2021</a:t>
+              <a:t>2/10/2021</a:t>
             </a:fld>
             <a:endParaRPr lang="en-US"/>
           </a:p>
@@ -1731,7 +1737,7 @@
           <a:p>
             <a:fld id="{BC0ED75D-8292-496A-995E-908E2AB58EFB}" type="datetimeFigureOut">
               <a:rPr lang="en-US" smtClean="0"/>
-              <a:t>2/9/2021</a:t>
+              <a:t>2/10/2021</a:t>
             </a:fld>
             <a:endParaRPr lang="en-US"/>
           </a:p>
@@ -1826,7 +1832,7 @@
           <a:p>
             <a:fld id="{BC0ED75D-8292-496A-995E-908E2AB58EFB}" type="datetimeFigureOut">
               <a:rPr lang="en-US" smtClean="0"/>
-              <a:t>2/9/2021</a:t>
+              <a:t>2/10/2021</a:t>
             </a:fld>
             <a:endParaRPr lang="en-US"/>
           </a:p>
@@ -2103,7 +2109,7 @@
           <a:p>
             <a:fld id="{BC0ED75D-8292-496A-995E-908E2AB58EFB}" type="datetimeFigureOut">
               <a:rPr lang="en-US" smtClean="0"/>
-              <a:t>2/9/2021</a:t>
+              <a:t>2/10/2021</a:t>
             </a:fld>
             <a:endParaRPr lang="en-US"/>
           </a:p>
@@ -2360,7 +2366,7 @@
           <a:p>
             <a:fld id="{BC0ED75D-8292-496A-995E-908E2AB58EFB}" type="datetimeFigureOut">
               <a:rPr lang="en-US" smtClean="0"/>
-              <a:t>2/9/2021</a:t>
+              <a:t>2/10/2021</a:t>
             </a:fld>
             <a:endParaRPr lang="en-US"/>
           </a:p>
@@ -2573,7 +2579,7 @@
           <a:p>
             <a:fld id="{BC0ED75D-8292-496A-995E-908E2AB58EFB}" type="datetimeFigureOut">
               <a:rPr lang="en-US" smtClean="0"/>
-              <a:t>2/9/2021</a:t>
+              <a:t>2/10/2021</a:t>
             </a:fld>
             <a:endParaRPr lang="en-US"/>
           </a:p>
@@ -3070,6 +3076,92 @@
           <p:cNvPr id="2" name="Título 1">
             <a:extLst>
               <a:ext uri="{FF2B5EF4-FFF2-40B4-BE49-F238E27FC236}">
+                <a16:creationId xmlns:a16="http://schemas.microsoft.com/office/drawing/2014/main" id="{D9E1D5BF-F753-4E2D-9F5A-81F4AB1649D6}"/>
+              </a:ext>
+            </a:extLst>
+          </p:cNvPr>
+          <p:cNvSpPr>
+            <a:spLocks noGrp="1"/>
+          </p:cNvSpPr>
+          <p:nvPr>
+            <p:ph type="title"/>
+          </p:nvPr>
+        </p:nvSpPr>
+        <p:spPr/>
+        <p:txBody>
+          <a:bodyPr/>
+          <a:lstStyle/>
+          <a:p>
+            <a:r>
+              <a:rPr lang="en-US" dirty="0"/>
+              <a:t>V0.3</a:t>
+            </a:r>
+          </a:p>
+        </p:txBody>
+      </p:sp>
+      <p:sp>
+        <p:nvSpPr>
+          <p:cNvPr id="3" name="Marcador de contenido 2">
+            <a:extLst>
+              <a:ext uri="{FF2B5EF4-FFF2-40B4-BE49-F238E27FC236}">
+                <a16:creationId xmlns:a16="http://schemas.microsoft.com/office/drawing/2014/main" id="{C8F0254D-A54B-4051-9AF6-6C32AC5E8138}"/>
+              </a:ext>
+            </a:extLst>
+          </p:cNvPr>
+          <p:cNvSpPr>
+            <a:spLocks noGrp="1"/>
+          </p:cNvSpPr>
+          <p:nvPr>
+            <p:ph idx="1"/>
+          </p:nvPr>
+        </p:nvSpPr>
+        <p:spPr/>
+        <p:txBody>
+          <a:bodyPr/>
+          <a:lstStyle/>
+          <a:p>
+            <a:r>
+              <a:rPr lang="en-US" dirty="0"/>
+              <a:t>Save MP3 to OneDrive</a:t>
+            </a:r>
+          </a:p>
+        </p:txBody>
+      </p:sp>
+    </p:spTree>
+    <p:extLst>
+      <p:ext uri="{BB962C8B-B14F-4D97-AF65-F5344CB8AC3E}">
+        <p14:creationId xmlns:p14="http://schemas.microsoft.com/office/powerpoint/2010/main" val="604657913"/>
+      </p:ext>
+    </p:extLst>
+  </p:cSld>
+  <p:clrMapOvr>
+    <a:masterClrMapping/>
+  </p:clrMapOvr>
+</p:sld>
+</file>
+
+<file path=ppt/slides/slide11.xml><?xml version="1.0" encoding="utf-8"?>
+<p:sld xmlns:a="http://schemas.openxmlformats.org/drawingml/2006/main" xmlns:r="http://schemas.openxmlformats.org/officeDocument/2006/relationships" xmlns:p="http://schemas.openxmlformats.org/presentationml/2006/main">
+  <p:cSld>
+    <p:spTree>
+      <p:nvGrpSpPr>
+        <p:cNvPr id="1" name=""/>
+        <p:cNvGrpSpPr/>
+        <p:nvPr/>
+      </p:nvGrpSpPr>
+      <p:grpSpPr>
+        <a:xfrm>
+          <a:off x="0" y="0"/>
+          <a:ext cx="0" cy="0"/>
+          <a:chOff x="0" y="0"/>
+          <a:chExt cx="0" cy="0"/>
+        </a:xfrm>
+      </p:grpSpPr>
+      <p:sp>
+        <p:nvSpPr>
+          <p:cNvPr id="2" name="Título 1">
+            <a:extLst>
+              <a:ext uri="{FF2B5EF4-FFF2-40B4-BE49-F238E27FC236}">
                 <a16:creationId xmlns:a16="http://schemas.microsoft.com/office/drawing/2014/main" id="{34195A85-C34D-49CA-8DFE-70DEBEF61732}"/>
               </a:ext>
             </a:extLst>
@@ -3134,7 +3226,7 @@
 </p:sld>
 </file>
 
-<file path=ppt/slides/slide11.xml><?xml version="1.0" encoding="utf-8"?>
+<file path=ppt/slides/slide12.xml><?xml version="1.0" encoding="utf-8"?>
 <p:sld xmlns:a="http://schemas.openxmlformats.org/drawingml/2006/main" xmlns:r="http://schemas.openxmlformats.org/officeDocument/2006/relationships" xmlns:p="http://schemas.openxmlformats.org/presentationml/2006/main">
   <p:cSld>
     <p:spTree>
@@ -7530,7 +7622,7 @@
           <p:cNvPr id="2" name="Título 1">
             <a:extLst>
               <a:ext uri="{FF2B5EF4-FFF2-40B4-BE49-F238E27FC236}">
-                <a16:creationId xmlns:a16="http://schemas.microsoft.com/office/drawing/2014/main" id="{9B857464-CF20-415C-AE0A-65AB0B47BBFE}"/>
+                <a16:creationId xmlns:a16="http://schemas.microsoft.com/office/drawing/2014/main" id="{F46E4DC1-B0C7-457B-9238-DD8FA443D8CD}"/>
               </a:ext>
             </a:extLst>
           </p:cNvPr>
@@ -7548,7 +7640,7 @@
           <a:p>
             <a:r>
               <a:rPr lang="en-US" dirty="0"/>
-              <a:t>V0.2</a:t>
+              <a:t>notes</a:t>
             </a:r>
           </a:p>
         </p:txBody>
@@ -7558,7 +7650,7 @@
           <p:cNvPr id="3" name="Marcador de contenido 2">
             <a:extLst>
               <a:ext uri="{FF2B5EF4-FFF2-40B4-BE49-F238E27FC236}">
-                <a16:creationId xmlns:a16="http://schemas.microsoft.com/office/drawing/2014/main" id="{AB188BD0-B1A1-486C-B191-738D4CC45641}"/>
+                <a16:creationId xmlns:a16="http://schemas.microsoft.com/office/drawing/2014/main" id="{343E4A79-A375-464B-B195-55AF06C9AD0F}"/>
               </a:ext>
             </a:extLst>
           </p:cNvPr>
@@ -7576,15 +7668,78 @@
           <a:p>
             <a:r>
               <a:rPr lang="en-US" dirty="0"/>
-              <a:t>Load and run guide</a:t>
-            </a:r>
+              <a:t>Client connects socket.io and sends “hi” with </a:t>
+            </a:r>
+            <a:r>
+              <a:rPr lang="en-US" dirty="0" err="1"/>
+              <a:t>dir</a:t>
+            </a:r>
+            <a:r>
+              <a:rPr lang="en-US" dirty="0"/>
+              <a:t> name</a:t>
+            </a:r>
+          </a:p>
+          <a:p>
+            <a:r>
+              <a:rPr lang="en-US" dirty="0"/>
+              <a:t>Check </a:t>
+            </a:r>
+            <a:r>
+              <a:rPr lang="en-US" dirty="0" err="1"/>
+              <a:t>dir</a:t>
+            </a:r>
+            <a:r>
+              <a:rPr lang="en-US" dirty="0"/>
+              <a:t> name again using same code as URL param check</a:t>
+            </a:r>
+          </a:p>
+          <a:p>
+            <a:r>
+              <a:rPr lang="en-US" dirty="0" err="1"/>
+              <a:t>dir</a:t>
+            </a:r>
+            <a:r>
+              <a:rPr lang="en-US" dirty="0"/>
+              <a:t> name is held in connection state</a:t>
+            </a:r>
+          </a:p>
+          <a:p>
+            <a:r>
+              <a:rPr lang="en-US" dirty="0"/>
+              <a:t>When audio is to be saved this </a:t>
+            </a:r>
+            <a:r>
+              <a:rPr lang="en-US" dirty="0" err="1"/>
+              <a:t>dir</a:t>
+            </a:r>
+            <a:r>
+              <a:rPr lang="en-US" dirty="0"/>
+              <a:t> name is used.</a:t>
+            </a:r>
+          </a:p>
+          <a:p>
+            <a:r>
+              <a:rPr lang="en-US" dirty="0"/>
+              <a:t>Packet{audio, sequence}</a:t>
+            </a:r>
+          </a:p>
+          <a:p>
+            <a:r>
+              <a:rPr lang="en-US" dirty="0"/>
+              <a:t>Audio monitor on screen for mic output and </a:t>
+            </a:r>
+            <a:r>
+              <a:rPr lang="en-US"/>
+              <a:t>server return</a:t>
+            </a:r>
+            <a:endParaRPr lang="en-US" dirty="0"/>
           </a:p>
         </p:txBody>
       </p:sp>
     </p:spTree>
     <p:extLst>
       <p:ext uri="{BB962C8B-B14F-4D97-AF65-F5344CB8AC3E}">
-        <p14:creationId xmlns:p14="http://schemas.microsoft.com/office/powerpoint/2010/main" val="819479007"/>
+        <p14:creationId xmlns:p14="http://schemas.microsoft.com/office/powerpoint/2010/main" val="1189864434"/>
       </p:ext>
     </p:extLst>
   </p:cSld>
@@ -7616,7 +7771,7 @@
           <p:cNvPr id="2" name="Título 1">
             <a:extLst>
               <a:ext uri="{FF2B5EF4-FFF2-40B4-BE49-F238E27FC236}">
-                <a16:creationId xmlns:a16="http://schemas.microsoft.com/office/drawing/2014/main" id="{D9E1D5BF-F753-4E2D-9F5A-81F4AB1649D6}"/>
+                <a16:creationId xmlns:a16="http://schemas.microsoft.com/office/drawing/2014/main" id="{9B857464-CF20-415C-AE0A-65AB0B47BBFE}"/>
               </a:ext>
             </a:extLst>
           </p:cNvPr>
@@ -7634,7 +7789,7 @@
           <a:p>
             <a:r>
               <a:rPr lang="en-US" dirty="0"/>
-              <a:t>V0.3</a:t>
+              <a:t>V0.2</a:t>
             </a:r>
           </a:p>
         </p:txBody>
@@ -7644,7 +7799,7 @@
           <p:cNvPr id="3" name="Marcador de contenido 2">
             <a:extLst>
               <a:ext uri="{FF2B5EF4-FFF2-40B4-BE49-F238E27FC236}">
-                <a16:creationId xmlns:a16="http://schemas.microsoft.com/office/drawing/2014/main" id="{C8F0254D-A54B-4051-9AF6-6C32AC5E8138}"/>
+                <a16:creationId xmlns:a16="http://schemas.microsoft.com/office/drawing/2014/main" id="{AB188BD0-B1A1-486C-B191-738D4CC45641}"/>
               </a:ext>
             </a:extLst>
           </p:cNvPr>
@@ -7662,7 +7817,7 @@
           <a:p>
             <a:r>
               <a:rPr lang="en-US" dirty="0"/>
-              <a:t>Save MP3 to OneDrive</a:t>
+              <a:t>Load and run guide</a:t>
             </a:r>
           </a:p>
         </p:txBody>
@@ -7670,7 +7825,7 @@
     </p:spTree>
     <p:extLst>
       <p:ext uri="{BB962C8B-B14F-4D97-AF65-F5344CB8AC3E}">
-        <p14:creationId xmlns:p14="http://schemas.microsoft.com/office/powerpoint/2010/main" val="604657913"/>
+        <p14:creationId xmlns:p14="http://schemas.microsoft.com/office/powerpoint/2010/main" val="819479007"/>
       </p:ext>
     </p:extLst>
   </p:cSld>

</xml_diff>

<commit_message>
UI basics complete. Audio loop solid. ID param handling correct"
</commit_message>
<xml_diff>
--- a/design notes.pptx
+++ b/design notes.pptx
@@ -17,6 +17,7 @@
     <p:sldId id="262" r:id="rId11"/>
     <p:sldId id="263" r:id="rId12"/>
     <p:sldId id="264" r:id="rId13"/>
+    <p:sldId id="268" r:id="rId14"/>
   </p:sldIdLst>
   <p:sldSz cx="12192000" cy="6858000"/>
   <p:notesSz cx="6858000" cy="9144000"/>
@@ -3312,6 +3313,561 @@
 </p:sld>
 </file>
 
+<file path=ppt/slides/slide13.xml><?xml version="1.0" encoding="utf-8"?>
+<p:sld xmlns:a="http://schemas.openxmlformats.org/drawingml/2006/main" xmlns:r="http://schemas.openxmlformats.org/officeDocument/2006/relationships" xmlns:p="http://schemas.openxmlformats.org/presentationml/2006/main">
+  <p:cSld>
+    <p:spTree>
+      <p:nvGrpSpPr>
+        <p:cNvPr id="1" name=""/>
+        <p:cNvGrpSpPr/>
+        <p:nvPr/>
+      </p:nvGrpSpPr>
+      <p:grpSpPr>
+        <a:xfrm>
+          <a:off x="0" y="0"/>
+          <a:ext cx="0" cy="0"/>
+          <a:chOff x="0" y="0"/>
+          <a:chExt cx="0" cy="0"/>
+        </a:xfrm>
+      </p:grpSpPr>
+      <p:sp>
+        <p:nvSpPr>
+          <p:cNvPr id="33" name="Círculo: vacío 32">
+            <a:extLst>
+              <a:ext uri="{FF2B5EF4-FFF2-40B4-BE49-F238E27FC236}">
+                <a16:creationId xmlns:a16="http://schemas.microsoft.com/office/drawing/2014/main" id="{C9291C5E-15F5-478C-A35C-A6E570F83231}"/>
+              </a:ext>
+            </a:extLst>
+          </p:cNvPr>
+          <p:cNvSpPr/>
+          <p:nvPr/>
+        </p:nvSpPr>
+        <p:spPr>
+          <a:xfrm>
+            <a:off x="6062464" y="1033856"/>
+            <a:ext cx="3960000" cy="3959999"/>
+          </a:xfrm>
+          <a:prstGeom prst="donut">
+            <a:avLst>
+              <a:gd name="adj" fmla="val 7006"/>
+            </a:avLst>
+          </a:prstGeom>
+          <a:gradFill flip="none" rotWithShape="1">
+            <a:gsLst>
+              <a:gs pos="0">
+                <a:schemeClr val="tx1">
+                  <a:lumMod val="65000"/>
+                  <a:lumOff val="35000"/>
+                </a:schemeClr>
+              </a:gs>
+              <a:gs pos="19000">
+                <a:schemeClr val="bg1">
+                  <a:lumMod val="75000"/>
+                  <a:lumOff val="25000"/>
+                </a:schemeClr>
+              </a:gs>
+              <a:gs pos="94690">
+                <a:schemeClr val="tx1">
+                  <a:lumMod val="50000"/>
+                  <a:lumOff val="50000"/>
+                </a:schemeClr>
+              </a:gs>
+              <a:gs pos="82000">
+                <a:schemeClr val="bg1">
+                  <a:lumMod val="50000"/>
+                </a:schemeClr>
+              </a:gs>
+              <a:gs pos="55000">
+                <a:schemeClr val="bg1">
+                  <a:lumMod val="95000"/>
+                </a:schemeClr>
+              </a:gs>
+            </a:gsLst>
+            <a:lin ang="2700000" scaled="1"/>
+            <a:tileRect/>
+          </a:gradFill>
+          <a:ln>
+            <a:noFill/>
+          </a:ln>
+        </p:spPr>
+        <p:style>
+          <a:lnRef idx="2">
+            <a:schemeClr val="accent1">
+              <a:shade val="50000"/>
+            </a:schemeClr>
+          </a:lnRef>
+          <a:fillRef idx="1">
+            <a:schemeClr val="accent1"/>
+          </a:fillRef>
+          <a:effectRef idx="0">
+            <a:schemeClr val="accent1"/>
+          </a:effectRef>
+          <a:fontRef idx="minor">
+            <a:schemeClr val="lt1"/>
+          </a:fontRef>
+        </p:style>
+        <p:txBody>
+          <a:bodyPr rtlCol="0" anchor="ctr"/>
+          <a:lstStyle/>
+          <a:p>
+            <a:pPr algn="ctr"/>
+            <a:endParaRPr lang="en-US"/>
+          </a:p>
+        </p:txBody>
+      </p:sp>
+      <p:sp>
+        <p:nvSpPr>
+          <p:cNvPr id="34" name="Elipse 33">
+            <a:extLst>
+              <a:ext uri="{FF2B5EF4-FFF2-40B4-BE49-F238E27FC236}">
+                <a16:creationId xmlns:a16="http://schemas.microsoft.com/office/drawing/2014/main" id="{89D8E857-03EA-4070-8050-9D86EC8BA2C4}"/>
+              </a:ext>
+            </a:extLst>
+          </p:cNvPr>
+          <p:cNvSpPr/>
+          <p:nvPr/>
+        </p:nvSpPr>
+        <p:spPr>
+          <a:xfrm>
+            <a:off x="6338411" y="1279657"/>
+            <a:ext cx="3416968" cy="3421204"/>
+          </a:xfrm>
+          <a:prstGeom prst="ellipse">
+            <a:avLst/>
+          </a:prstGeom>
+          <a:solidFill>
+            <a:srgbClr val="66FF33"/>
+          </a:solidFill>
+          <a:ln>
+            <a:noFill/>
+          </a:ln>
+        </p:spPr>
+        <p:style>
+          <a:lnRef idx="2">
+            <a:schemeClr val="accent1">
+              <a:shade val="50000"/>
+            </a:schemeClr>
+          </a:lnRef>
+          <a:fillRef idx="1">
+            <a:schemeClr val="accent1"/>
+          </a:fillRef>
+          <a:effectRef idx="0">
+            <a:schemeClr val="accent1"/>
+          </a:effectRef>
+          <a:fontRef idx="minor">
+            <a:schemeClr val="lt1"/>
+          </a:fontRef>
+        </p:style>
+        <p:txBody>
+          <a:bodyPr rtlCol="0" anchor="ctr"/>
+          <a:lstStyle/>
+          <a:p>
+            <a:pPr algn="ctr"/>
+            <a:endParaRPr lang="en-US"/>
+          </a:p>
+        </p:txBody>
+      </p:sp>
+      <p:sp>
+        <p:nvSpPr>
+          <p:cNvPr id="35" name="Círculo: vacío 34">
+            <a:extLst>
+              <a:ext uri="{FF2B5EF4-FFF2-40B4-BE49-F238E27FC236}">
+                <a16:creationId xmlns:a16="http://schemas.microsoft.com/office/drawing/2014/main" id="{877ED213-CA1C-4F61-B254-FB95E7334BD7}"/>
+              </a:ext>
+            </a:extLst>
+          </p:cNvPr>
+          <p:cNvSpPr/>
+          <p:nvPr/>
+        </p:nvSpPr>
+        <p:spPr>
+          <a:xfrm>
+            <a:off x="7340043" y="2051403"/>
+            <a:ext cx="3960000" cy="3959999"/>
+          </a:xfrm>
+          <a:prstGeom prst="donut">
+            <a:avLst>
+              <a:gd name="adj" fmla="val 7006"/>
+            </a:avLst>
+          </a:prstGeom>
+          <a:gradFill flip="none" rotWithShape="1">
+            <a:gsLst>
+              <a:gs pos="0">
+                <a:schemeClr val="bg1">
+                  <a:lumMod val="65000"/>
+                  <a:lumOff val="35000"/>
+                </a:schemeClr>
+              </a:gs>
+              <a:gs pos="19000">
+                <a:schemeClr val="tx1">
+                  <a:lumMod val="50000"/>
+                </a:schemeClr>
+              </a:gs>
+              <a:gs pos="94690">
+                <a:schemeClr val="bg1">
+                  <a:lumMod val="50000"/>
+                  <a:lumOff val="50000"/>
+                </a:schemeClr>
+              </a:gs>
+              <a:gs pos="82000">
+                <a:schemeClr val="tx1">
+                  <a:lumMod val="50000"/>
+                </a:schemeClr>
+              </a:gs>
+              <a:gs pos="55000">
+                <a:schemeClr val="tx1">
+                  <a:lumMod val="95000"/>
+                </a:schemeClr>
+              </a:gs>
+            </a:gsLst>
+            <a:lin ang="2700000" scaled="1"/>
+            <a:tileRect/>
+          </a:gradFill>
+          <a:ln>
+            <a:noFill/>
+          </a:ln>
+        </p:spPr>
+        <p:style>
+          <a:lnRef idx="2">
+            <a:schemeClr val="accent1">
+              <a:shade val="50000"/>
+            </a:schemeClr>
+          </a:lnRef>
+          <a:fillRef idx="1">
+            <a:schemeClr val="accent1"/>
+          </a:fillRef>
+          <a:effectRef idx="0">
+            <a:schemeClr val="accent1"/>
+          </a:effectRef>
+          <a:fontRef idx="minor">
+            <a:schemeClr val="lt1"/>
+          </a:fontRef>
+        </p:style>
+        <p:txBody>
+          <a:bodyPr rtlCol="0" anchor="ctr"/>
+          <a:lstStyle/>
+          <a:p>
+            <a:pPr algn="ctr"/>
+            <a:endParaRPr lang="en-US"/>
+          </a:p>
+        </p:txBody>
+      </p:sp>
+      <p:sp>
+        <p:nvSpPr>
+          <p:cNvPr id="38" name="Rectángulo: esquinas redondeadas 37">
+            <a:extLst>
+              <a:ext uri="{FF2B5EF4-FFF2-40B4-BE49-F238E27FC236}">
+                <a16:creationId xmlns:a16="http://schemas.microsoft.com/office/drawing/2014/main" id="{031AAA7E-4EDA-4B25-AE3A-862BA024CD20}"/>
+              </a:ext>
+            </a:extLst>
+          </p:cNvPr>
+          <p:cNvSpPr/>
+          <p:nvPr/>
+        </p:nvSpPr>
+        <p:spPr>
+          <a:xfrm>
+            <a:off x="1442760" y="1472719"/>
+            <a:ext cx="1786243" cy="4487779"/>
+          </a:xfrm>
+          <a:prstGeom prst="roundRect">
+            <a:avLst>
+              <a:gd name="adj" fmla="val 9258"/>
+            </a:avLst>
+          </a:prstGeom>
+          <a:gradFill flip="none" rotWithShape="1">
+            <a:gsLst>
+              <a:gs pos="0">
+                <a:schemeClr val="bg1">
+                  <a:lumMod val="65000"/>
+                  <a:lumOff val="35000"/>
+                </a:schemeClr>
+              </a:gs>
+              <a:gs pos="19000">
+                <a:schemeClr val="tx1">
+                  <a:lumMod val="50000"/>
+                </a:schemeClr>
+              </a:gs>
+              <a:gs pos="94690">
+                <a:schemeClr val="bg1">
+                  <a:lumMod val="50000"/>
+                  <a:lumOff val="50000"/>
+                </a:schemeClr>
+              </a:gs>
+              <a:gs pos="82000">
+                <a:schemeClr val="tx1">
+                  <a:lumMod val="50000"/>
+                </a:schemeClr>
+              </a:gs>
+              <a:gs pos="55000">
+                <a:schemeClr val="tx1">
+                  <a:lumMod val="95000"/>
+                </a:schemeClr>
+              </a:gs>
+            </a:gsLst>
+            <a:lin ang="2700000" scaled="1"/>
+            <a:tileRect/>
+          </a:gradFill>
+          <a:ln>
+            <a:noFill/>
+          </a:ln>
+        </p:spPr>
+        <p:style>
+          <a:lnRef idx="2">
+            <a:schemeClr val="accent1">
+              <a:shade val="50000"/>
+            </a:schemeClr>
+          </a:lnRef>
+          <a:fillRef idx="1">
+            <a:schemeClr val="accent1"/>
+          </a:fillRef>
+          <a:effectRef idx="0">
+            <a:schemeClr val="accent1"/>
+          </a:effectRef>
+          <a:fontRef idx="minor">
+            <a:schemeClr val="lt1"/>
+          </a:fontRef>
+        </p:style>
+        <p:txBody>
+          <a:bodyPr rtlCol="0" anchor="ctr"/>
+          <a:lstStyle/>
+          <a:p>
+            <a:pPr algn="ctr"/>
+            <a:endParaRPr lang="en-US"/>
+          </a:p>
+        </p:txBody>
+      </p:sp>
+      <p:sp>
+        <p:nvSpPr>
+          <p:cNvPr id="39" name="Rectángulo: esquinas redondeadas 38">
+            <a:extLst>
+              <a:ext uri="{FF2B5EF4-FFF2-40B4-BE49-F238E27FC236}">
+                <a16:creationId xmlns:a16="http://schemas.microsoft.com/office/drawing/2014/main" id="{68BEB031-C6BB-4E04-9A0D-129061E9DF37}"/>
+              </a:ext>
+            </a:extLst>
+          </p:cNvPr>
+          <p:cNvSpPr/>
+          <p:nvPr/>
+        </p:nvSpPr>
+        <p:spPr>
+          <a:xfrm>
+            <a:off x="1604687" y="1627746"/>
+            <a:ext cx="1462388" cy="4177724"/>
+          </a:xfrm>
+          <a:prstGeom prst="roundRect">
+            <a:avLst>
+              <a:gd name="adj" fmla="val 5149"/>
+            </a:avLst>
+          </a:prstGeom>
+          <a:solidFill>
+            <a:schemeClr val="bg1"/>
+          </a:solidFill>
+          <a:ln w="38100">
+            <a:noFill/>
+          </a:ln>
+        </p:spPr>
+        <p:style>
+          <a:lnRef idx="2">
+            <a:schemeClr val="accent1">
+              <a:shade val="50000"/>
+            </a:schemeClr>
+          </a:lnRef>
+          <a:fillRef idx="1">
+            <a:schemeClr val="accent1"/>
+          </a:fillRef>
+          <a:effectRef idx="0">
+            <a:schemeClr val="accent1"/>
+          </a:effectRef>
+          <a:fontRef idx="minor">
+            <a:schemeClr val="lt1"/>
+          </a:fontRef>
+        </p:style>
+        <p:txBody>
+          <a:bodyPr rtlCol="0" anchor="ctr"/>
+          <a:lstStyle/>
+          <a:p>
+            <a:pPr algn="ctr"/>
+            <a:endParaRPr lang="en-US"/>
+          </a:p>
+        </p:txBody>
+      </p:sp>
+      <p:sp>
+        <p:nvSpPr>
+          <p:cNvPr id="40" name="Rectángulo: biselado 39">
+            <a:extLst>
+              <a:ext uri="{FF2B5EF4-FFF2-40B4-BE49-F238E27FC236}">
+                <a16:creationId xmlns:a16="http://schemas.microsoft.com/office/drawing/2014/main" id="{417EBAEB-6C2F-4B31-A72B-084E5D07E580}"/>
+              </a:ext>
+            </a:extLst>
+          </p:cNvPr>
+          <p:cNvSpPr/>
+          <p:nvPr/>
+        </p:nvSpPr>
+        <p:spPr>
+          <a:xfrm>
+            <a:off x="4114800" y="1472719"/>
+            <a:ext cx="1311442" cy="2690207"/>
+          </a:xfrm>
+          <a:prstGeom prst="bevel">
+            <a:avLst/>
+          </a:prstGeom>
+          <a:gradFill flip="none" rotWithShape="1">
+            <a:gsLst>
+              <a:gs pos="0">
+                <a:schemeClr val="bg1">
+                  <a:lumMod val="65000"/>
+                  <a:lumOff val="35000"/>
+                </a:schemeClr>
+              </a:gs>
+              <a:gs pos="19000">
+                <a:schemeClr val="tx1">
+                  <a:lumMod val="50000"/>
+                </a:schemeClr>
+              </a:gs>
+              <a:gs pos="94690">
+                <a:schemeClr val="bg1">
+                  <a:lumMod val="50000"/>
+                  <a:lumOff val="50000"/>
+                </a:schemeClr>
+              </a:gs>
+              <a:gs pos="82000">
+                <a:schemeClr val="tx1">
+                  <a:lumMod val="50000"/>
+                </a:schemeClr>
+              </a:gs>
+              <a:gs pos="55000">
+                <a:schemeClr val="tx1">
+                  <a:lumMod val="95000"/>
+                </a:schemeClr>
+              </a:gs>
+            </a:gsLst>
+            <a:lin ang="2700000" scaled="1"/>
+            <a:tileRect/>
+          </a:gradFill>
+          <a:ln>
+            <a:noFill/>
+          </a:ln>
+        </p:spPr>
+        <p:style>
+          <a:lnRef idx="2">
+            <a:schemeClr val="accent1">
+              <a:shade val="50000"/>
+            </a:schemeClr>
+          </a:lnRef>
+          <a:fillRef idx="1">
+            <a:schemeClr val="accent1"/>
+          </a:fillRef>
+          <a:effectRef idx="0">
+            <a:schemeClr val="accent1"/>
+          </a:effectRef>
+          <a:fontRef idx="minor">
+            <a:schemeClr val="lt1"/>
+          </a:fontRef>
+        </p:style>
+        <p:txBody>
+          <a:bodyPr rtlCol="0" anchor="ctr"/>
+          <a:lstStyle/>
+          <a:p>
+            <a:pPr algn="ctr"/>
+            <a:endParaRPr lang="en-US"/>
+          </a:p>
+        </p:txBody>
+      </p:sp>
+      <p:sp>
+        <p:nvSpPr>
+          <p:cNvPr id="41" name="Marco 40">
+            <a:extLst>
+              <a:ext uri="{FF2B5EF4-FFF2-40B4-BE49-F238E27FC236}">
+                <a16:creationId xmlns:a16="http://schemas.microsoft.com/office/drawing/2014/main" id="{3E4A2A10-EE45-415C-94EA-1E8BBDA508DC}"/>
+              </a:ext>
+            </a:extLst>
+          </p:cNvPr>
+          <p:cNvSpPr/>
+          <p:nvPr/>
+        </p:nvSpPr>
+        <p:spPr>
+          <a:xfrm>
+            <a:off x="24063" y="1472719"/>
+            <a:ext cx="1311442" cy="4487778"/>
+          </a:xfrm>
+          <a:prstGeom prst="frame">
+            <a:avLst>
+              <a:gd name="adj1" fmla="val 7913"/>
+            </a:avLst>
+          </a:prstGeom>
+          <a:gradFill flip="none" rotWithShape="1">
+            <a:gsLst>
+              <a:gs pos="0">
+                <a:schemeClr val="bg1">
+                  <a:lumMod val="65000"/>
+                  <a:lumOff val="35000"/>
+                </a:schemeClr>
+              </a:gs>
+              <a:gs pos="19000">
+                <a:schemeClr val="tx1">
+                  <a:lumMod val="50000"/>
+                </a:schemeClr>
+              </a:gs>
+              <a:gs pos="94690">
+                <a:schemeClr val="bg1">
+                  <a:lumMod val="50000"/>
+                  <a:lumOff val="50000"/>
+                </a:schemeClr>
+              </a:gs>
+              <a:gs pos="82000">
+                <a:schemeClr val="tx1">
+                  <a:lumMod val="50000"/>
+                </a:schemeClr>
+              </a:gs>
+              <a:gs pos="55000">
+                <a:schemeClr val="tx1">
+                  <a:lumMod val="95000"/>
+                </a:schemeClr>
+              </a:gs>
+            </a:gsLst>
+            <a:lin ang="2700000" scaled="1"/>
+            <a:tileRect/>
+          </a:gradFill>
+          <a:ln>
+            <a:noFill/>
+          </a:ln>
+        </p:spPr>
+        <p:style>
+          <a:lnRef idx="2">
+            <a:schemeClr val="accent1">
+              <a:shade val="50000"/>
+            </a:schemeClr>
+          </a:lnRef>
+          <a:fillRef idx="1">
+            <a:schemeClr val="accent1"/>
+          </a:fillRef>
+          <a:effectRef idx="0">
+            <a:schemeClr val="accent1"/>
+          </a:effectRef>
+          <a:fontRef idx="minor">
+            <a:schemeClr val="lt1"/>
+          </a:fontRef>
+        </p:style>
+        <p:txBody>
+          <a:bodyPr rtlCol="0" anchor="ctr"/>
+          <a:lstStyle/>
+          <a:p>
+            <a:pPr algn="ctr"/>
+            <a:endParaRPr lang="en-US"/>
+          </a:p>
+        </p:txBody>
+      </p:sp>
+    </p:spTree>
+    <p:extLst>
+      <p:ext uri="{BB962C8B-B14F-4D97-AF65-F5344CB8AC3E}">
+        <p14:creationId xmlns:p14="http://schemas.microsoft.com/office/powerpoint/2010/main" val="3328482745"/>
+      </p:ext>
+    </p:extLst>
+  </p:cSld>
+  <p:clrMapOvr>
+    <a:masterClrMapping/>
+  </p:clrMapOvr>
+</p:sld>
+</file>
+
 <file path=ppt/slides/slide2.xml><?xml version="1.0" encoding="utf-8"?>
 <p:sld xmlns:a="http://schemas.openxmlformats.org/drawingml/2006/main" xmlns:r="http://schemas.openxmlformats.org/officeDocument/2006/relationships" xmlns:p="http://schemas.openxmlformats.org/presentationml/2006/main">
   <p:cSld>
@@ -7676,7 +8232,7 @@
             </a:r>
             <a:r>
               <a:rPr lang="en-US" dirty="0"/>
-              <a:t> name</a:t>
+              <a:t> name as “id”</a:t>
             </a:r>
           </a:p>
           <a:p>
@@ -7700,7 +8256,15 @@
             </a:r>
             <a:r>
               <a:rPr lang="en-US" dirty="0"/>
-              <a:t> name is held in connection state</a:t>
+              <a:t> name is held in connection state as “</a:t>
+            </a:r>
+            <a:r>
+              <a:rPr lang="en-US" dirty="0" err="1"/>
+              <a:t>client_id</a:t>
+            </a:r>
+            <a:r>
+              <a:rPr lang="en-US" dirty="0"/>
+              <a:t>”</a:t>
             </a:r>
           </a:p>
           <a:p>
@@ -7726,13 +8290,8 @@
           <a:p>
             <a:r>
               <a:rPr lang="en-US" dirty="0"/>
-              <a:t>Audio monitor on screen for mic output and </a:t>
-            </a:r>
-            <a:r>
-              <a:rPr lang="en-US"/>
-              <a:t>server return</a:t>
-            </a:r>
-            <a:endParaRPr lang="en-US" dirty="0"/>
+              <a:t>Audio monitor on screen for mic output and server return</a:t>
+            </a:r>
           </a:p>
         </p:txBody>
       </p:sp>

</xml_diff>

<commit_message>
testing heroku domain retrieval
</commit_message>
<xml_diff>
--- a/design notes.pptx
+++ b/design notes.pptx
@@ -24,10 +24,13 @@
     <p:sldId id="268" r:id="rId18"/>
     <p:sldId id="271" r:id="rId19"/>
     <p:sldId id="278" r:id="rId20"/>
-    <p:sldId id="269" r:id="rId21"/>
-    <p:sldId id="277" r:id="rId22"/>
-    <p:sldId id="270" r:id="rId23"/>
-    <p:sldId id="273" r:id="rId24"/>
+    <p:sldId id="279" r:id="rId21"/>
+    <p:sldId id="280" r:id="rId22"/>
+    <p:sldId id="269" r:id="rId23"/>
+    <p:sldId id="277" r:id="rId24"/>
+    <p:sldId id="270" r:id="rId25"/>
+    <p:sldId id="281" r:id="rId26"/>
+    <p:sldId id="273" r:id="rId27"/>
   </p:sldIdLst>
   <p:sldSz cx="12192000" cy="6858000"/>
   <p:notesSz cx="6858000" cy="9144000"/>
@@ -5177,8 +5180,2243 @@
           <a:p>
             <a:r>
               <a:rPr lang="en-US" dirty="0"/>
-              <a:t>Save MP3 to OneDrive</a:t>
+              <a:t>Commands to</a:t>
             </a:r>
+          </a:p>
+          <a:p>
+            <a:pPr lvl="1"/>
+            <a:r>
+              <a:rPr lang="en-US" dirty="0"/>
+              <a:t>Record</a:t>
+            </a:r>
+          </a:p>
+          <a:p>
+            <a:pPr lvl="1"/>
+            <a:r>
+              <a:rPr lang="en-US" dirty="0"/>
+              <a:t>Play</a:t>
+            </a:r>
+          </a:p>
+          <a:p>
+            <a:pPr lvl="1"/>
+            <a:r>
+              <a:rPr lang="en-US" dirty="0"/>
+              <a:t>Stop</a:t>
+            </a:r>
+          </a:p>
+          <a:p>
+            <a:r>
+              <a:rPr lang="en-US" dirty="0"/>
+              <a:t>Save MP3 to file</a:t>
+            </a:r>
+          </a:p>
+          <a:p>
+            <a:r>
+              <a:rPr lang="en-US" dirty="0"/>
+              <a:t>Test file</a:t>
+            </a:r>
+          </a:p>
+        </p:txBody>
+      </p:sp>
+      <p:sp>
+        <p:nvSpPr>
+          <p:cNvPr id="4" name="Elipse 3">
+            <a:extLst>
+              <a:ext uri="{FF2B5EF4-FFF2-40B4-BE49-F238E27FC236}">
+                <a16:creationId xmlns:a16="http://schemas.microsoft.com/office/drawing/2014/main" id="{E5A2465E-138D-4482-9838-CABF1C56C804}"/>
+              </a:ext>
+            </a:extLst>
+          </p:cNvPr>
+          <p:cNvSpPr/>
+          <p:nvPr/>
+        </p:nvSpPr>
+        <p:spPr>
+          <a:xfrm>
+            <a:off x="5042405" y="4913532"/>
+            <a:ext cx="323385" cy="323385"/>
+          </a:xfrm>
+          <a:prstGeom prst="ellipse">
+            <a:avLst/>
+          </a:prstGeom>
+          <a:noFill/>
+          <a:ln w="38100">
+            <a:solidFill>
+              <a:srgbClr val="FFC000"/>
+            </a:solidFill>
+          </a:ln>
+        </p:spPr>
+        <p:style>
+          <a:lnRef idx="2">
+            <a:schemeClr val="accent1">
+              <a:shade val="50000"/>
+            </a:schemeClr>
+          </a:lnRef>
+          <a:fillRef idx="1">
+            <a:schemeClr val="accent1"/>
+          </a:fillRef>
+          <a:effectRef idx="0">
+            <a:schemeClr val="accent1"/>
+          </a:effectRef>
+          <a:fontRef idx="minor">
+            <a:schemeClr val="lt1"/>
+          </a:fontRef>
+        </p:style>
+        <p:txBody>
+          <a:bodyPr rtlCol="0" anchor="ctr"/>
+          <a:lstStyle/>
+          <a:p>
+            <a:pPr algn="ctr"/>
+            <a:endParaRPr lang="en-US"/>
+          </a:p>
+        </p:txBody>
+      </p:sp>
+      <p:cxnSp>
+        <p:nvCxnSpPr>
+          <p:cNvPr id="5" name="Conector recto 4">
+            <a:extLst>
+              <a:ext uri="{FF2B5EF4-FFF2-40B4-BE49-F238E27FC236}">
+                <a16:creationId xmlns:a16="http://schemas.microsoft.com/office/drawing/2014/main" id="{5E0610BE-C0DE-4251-A444-821EC7B2366C}"/>
+              </a:ext>
+            </a:extLst>
+          </p:cNvPr>
+          <p:cNvCxnSpPr>
+            <a:cxnSpLocks/>
+          </p:cNvCxnSpPr>
+          <p:nvPr/>
+        </p:nvCxnSpPr>
+        <p:spPr>
+          <a:xfrm>
+            <a:off x="5042405" y="4895224"/>
+            <a:ext cx="0" cy="360000"/>
+          </a:xfrm>
+          <a:prstGeom prst="line">
+            <a:avLst/>
+          </a:prstGeom>
+          <a:noFill/>
+          <a:ln w="38100">
+            <a:solidFill>
+              <a:srgbClr val="FFC000"/>
+            </a:solidFill>
+          </a:ln>
+        </p:spPr>
+        <p:style>
+          <a:lnRef idx="2">
+            <a:schemeClr val="accent1">
+              <a:shade val="50000"/>
+            </a:schemeClr>
+          </a:lnRef>
+          <a:fillRef idx="1">
+            <a:schemeClr val="accent1"/>
+          </a:fillRef>
+          <a:effectRef idx="0">
+            <a:schemeClr val="accent1"/>
+          </a:effectRef>
+          <a:fontRef idx="minor">
+            <a:schemeClr val="lt1"/>
+          </a:fontRef>
+        </p:style>
+      </p:cxnSp>
+      <p:sp>
+        <p:nvSpPr>
+          <p:cNvPr id="6" name="Rectángulo 5">
+            <a:extLst>
+              <a:ext uri="{FF2B5EF4-FFF2-40B4-BE49-F238E27FC236}">
+                <a16:creationId xmlns:a16="http://schemas.microsoft.com/office/drawing/2014/main" id="{9916E791-C4F0-4FF8-A9C4-9315450DADFF}"/>
+              </a:ext>
+            </a:extLst>
+          </p:cNvPr>
+          <p:cNvSpPr/>
+          <p:nvPr/>
+        </p:nvSpPr>
+        <p:spPr>
+          <a:xfrm>
+            <a:off x="5142766" y="5734357"/>
+            <a:ext cx="223024" cy="468351"/>
+          </a:xfrm>
+          <a:prstGeom prst="rect">
+            <a:avLst/>
+          </a:prstGeom>
+          <a:noFill/>
+          <a:ln w="38100">
+            <a:solidFill>
+              <a:srgbClr val="FFC000"/>
+            </a:solidFill>
+          </a:ln>
+        </p:spPr>
+        <p:style>
+          <a:lnRef idx="2">
+            <a:schemeClr val="accent1">
+              <a:shade val="50000"/>
+            </a:schemeClr>
+          </a:lnRef>
+          <a:fillRef idx="1">
+            <a:schemeClr val="accent1"/>
+          </a:fillRef>
+          <a:effectRef idx="0">
+            <a:schemeClr val="accent1"/>
+          </a:effectRef>
+          <a:fontRef idx="minor">
+            <a:schemeClr val="lt1"/>
+          </a:fontRef>
+        </p:style>
+        <p:txBody>
+          <a:bodyPr rtlCol="0" anchor="ctr"/>
+          <a:lstStyle/>
+          <a:p>
+            <a:pPr algn="ctr"/>
+            <a:endParaRPr lang="en-US"/>
+          </a:p>
+        </p:txBody>
+      </p:sp>
+      <p:sp>
+        <p:nvSpPr>
+          <p:cNvPr id="7" name="Trapecio 6">
+            <a:extLst>
+              <a:ext uri="{FF2B5EF4-FFF2-40B4-BE49-F238E27FC236}">
+                <a16:creationId xmlns:a16="http://schemas.microsoft.com/office/drawing/2014/main" id="{A5DC1E13-7406-4558-8DAF-CB05053CDB14}"/>
+              </a:ext>
+            </a:extLst>
+          </p:cNvPr>
+          <p:cNvSpPr/>
+          <p:nvPr/>
+        </p:nvSpPr>
+        <p:spPr>
+          <a:xfrm rot="5400000">
+            <a:off x="4710657" y="5857020"/>
+            <a:ext cx="641190" cy="223025"/>
+          </a:xfrm>
+          <a:prstGeom prst="trapezoid">
+            <a:avLst>
+              <a:gd name="adj" fmla="val 83855"/>
+            </a:avLst>
+          </a:prstGeom>
+          <a:noFill/>
+          <a:ln w="38100">
+            <a:solidFill>
+              <a:srgbClr val="FFC000"/>
+            </a:solidFill>
+          </a:ln>
+        </p:spPr>
+        <p:style>
+          <a:lnRef idx="2">
+            <a:schemeClr val="accent1">
+              <a:shade val="50000"/>
+            </a:schemeClr>
+          </a:lnRef>
+          <a:fillRef idx="1">
+            <a:schemeClr val="accent1"/>
+          </a:fillRef>
+          <a:effectRef idx="0">
+            <a:schemeClr val="accent1"/>
+          </a:effectRef>
+          <a:fontRef idx="minor">
+            <a:schemeClr val="lt1"/>
+          </a:fontRef>
+        </p:style>
+        <p:txBody>
+          <a:bodyPr rtlCol="0" anchor="ctr"/>
+          <a:lstStyle/>
+          <a:p>
+            <a:pPr algn="ctr"/>
+            <a:endParaRPr lang="en-US"/>
+          </a:p>
+        </p:txBody>
+      </p:sp>
+      <p:grpSp>
+        <p:nvGrpSpPr>
+          <p:cNvPr id="8" name="Grupo 7">
+            <a:extLst>
+              <a:ext uri="{FF2B5EF4-FFF2-40B4-BE49-F238E27FC236}">
+                <a16:creationId xmlns:a16="http://schemas.microsoft.com/office/drawing/2014/main" id="{FCC9E076-535A-42C1-B00C-E57858EEEFB6}"/>
+              </a:ext>
+            </a:extLst>
+          </p:cNvPr>
+          <p:cNvGrpSpPr/>
+          <p:nvPr/>
+        </p:nvGrpSpPr>
+        <p:grpSpPr>
+          <a:xfrm>
+            <a:off x="6947851" y="5222188"/>
+            <a:ext cx="323386" cy="613317"/>
+            <a:chOff x="4036741" y="2832410"/>
+            <a:chExt cx="1014761" cy="2018370"/>
+          </a:xfrm>
+        </p:grpSpPr>
+        <p:sp>
+          <p:nvSpPr>
+            <p:cNvPr id="9" name="Forma libre: forma 8">
+              <a:extLst>
+                <a:ext uri="{FF2B5EF4-FFF2-40B4-BE49-F238E27FC236}">
+                  <a16:creationId xmlns:a16="http://schemas.microsoft.com/office/drawing/2014/main" id="{7CE048B2-3A02-41A2-BAC2-D0E3F59D4984}"/>
+                </a:ext>
+              </a:extLst>
+            </p:cNvPr>
+            <p:cNvSpPr/>
+            <p:nvPr/>
+          </p:nvSpPr>
+          <p:spPr>
+            <a:xfrm>
+              <a:off x="4036741" y="2832410"/>
+              <a:ext cx="1014761" cy="1416206"/>
+            </a:xfrm>
+            <a:custGeom>
+              <a:avLst/>
+              <a:gdLst>
+                <a:gd name="connsiteX0" fmla="*/ 0 w 1014761"/>
+                <a:gd name="connsiteY0" fmla="*/ 0 h 1483113"/>
+                <a:gd name="connsiteX1" fmla="*/ 22303 w 1014761"/>
+                <a:gd name="connsiteY1" fmla="*/ 1483113 h 1483113"/>
+                <a:gd name="connsiteX2" fmla="*/ 1014761 w 1014761"/>
+                <a:gd name="connsiteY2" fmla="*/ 1483113 h 1483113"/>
+                <a:gd name="connsiteX3" fmla="*/ 981308 w 1014761"/>
+                <a:gd name="connsiteY3" fmla="*/ 44605 h 1483113"/>
+                <a:gd name="connsiteX0" fmla="*/ 0 w 1014761"/>
+                <a:gd name="connsiteY0" fmla="*/ 33454 h 1438508"/>
+                <a:gd name="connsiteX1" fmla="*/ 22303 w 1014761"/>
+                <a:gd name="connsiteY1" fmla="*/ 1438508 h 1438508"/>
+                <a:gd name="connsiteX2" fmla="*/ 1014761 w 1014761"/>
+                <a:gd name="connsiteY2" fmla="*/ 1438508 h 1438508"/>
+                <a:gd name="connsiteX3" fmla="*/ 981308 w 1014761"/>
+                <a:gd name="connsiteY3" fmla="*/ 0 h 1438508"/>
+                <a:gd name="connsiteX0" fmla="*/ 0 w 1014761"/>
+                <a:gd name="connsiteY0" fmla="*/ 11152 h 1416206"/>
+                <a:gd name="connsiteX1" fmla="*/ 22303 w 1014761"/>
+                <a:gd name="connsiteY1" fmla="*/ 1416206 h 1416206"/>
+                <a:gd name="connsiteX2" fmla="*/ 1014761 w 1014761"/>
+                <a:gd name="connsiteY2" fmla="*/ 1416206 h 1416206"/>
+                <a:gd name="connsiteX3" fmla="*/ 981308 w 1014761"/>
+                <a:gd name="connsiteY3" fmla="*/ 0 h 1416206"/>
+              </a:gdLst>
+              <a:ahLst/>
+              <a:cxnLst>
+                <a:cxn ang="0">
+                  <a:pos x="connsiteX0" y="connsiteY0"/>
+                </a:cxn>
+                <a:cxn ang="0">
+                  <a:pos x="connsiteX1" y="connsiteY1"/>
+                </a:cxn>
+                <a:cxn ang="0">
+                  <a:pos x="connsiteX2" y="connsiteY2"/>
+                </a:cxn>
+                <a:cxn ang="0">
+                  <a:pos x="connsiteX3" y="connsiteY3"/>
+                </a:cxn>
+              </a:cxnLst>
+              <a:rect l="l" t="t" r="r" b="b"/>
+              <a:pathLst>
+                <a:path w="1014761" h="1416206">
+                  <a:moveTo>
+                    <a:pt x="0" y="11152"/>
+                  </a:moveTo>
+                  <a:lnTo>
+                    <a:pt x="22303" y="1416206"/>
+                  </a:lnTo>
+                  <a:lnTo>
+                    <a:pt x="1014761" y="1416206"/>
+                  </a:lnTo>
+                  <a:lnTo>
+                    <a:pt x="981308" y="0"/>
+                  </a:lnTo>
+                </a:path>
+              </a:pathLst>
+            </a:custGeom>
+            <a:noFill/>
+            <a:ln w="38100">
+              <a:solidFill>
+                <a:srgbClr val="FFC000"/>
+              </a:solidFill>
+            </a:ln>
+          </p:spPr>
+          <p:style>
+            <a:lnRef idx="2">
+              <a:schemeClr val="accent1">
+                <a:shade val="50000"/>
+              </a:schemeClr>
+            </a:lnRef>
+            <a:fillRef idx="1">
+              <a:schemeClr val="accent1"/>
+            </a:fillRef>
+            <a:effectRef idx="0">
+              <a:schemeClr val="accent1"/>
+            </a:effectRef>
+            <a:fontRef idx="minor">
+              <a:schemeClr val="lt1"/>
+            </a:fontRef>
+          </p:style>
+          <p:txBody>
+            <a:bodyPr rtlCol="0" anchor="ctr"/>
+            <a:lstStyle/>
+            <a:p>
+              <a:pPr algn="ctr"/>
+              <a:endParaRPr lang="en-US"/>
+            </a:p>
+          </p:txBody>
+        </p:sp>
+        <p:cxnSp>
+          <p:nvCxnSpPr>
+            <p:cNvPr id="10" name="Conector recto 9">
+              <a:extLst>
+                <a:ext uri="{FF2B5EF4-FFF2-40B4-BE49-F238E27FC236}">
+                  <a16:creationId xmlns:a16="http://schemas.microsoft.com/office/drawing/2014/main" id="{DBAD9EEA-5977-4D12-9CB9-BDC24ABA23C0}"/>
+                </a:ext>
+              </a:extLst>
+            </p:cNvPr>
+            <p:cNvCxnSpPr/>
+            <p:nvPr/>
+          </p:nvCxnSpPr>
+          <p:spPr>
+            <a:xfrm>
+              <a:off x="4572000" y="4248615"/>
+              <a:ext cx="0" cy="602165"/>
+            </a:xfrm>
+            <a:prstGeom prst="line">
+              <a:avLst/>
+            </a:prstGeom>
+            <a:noFill/>
+            <a:ln w="38100">
+              <a:solidFill>
+                <a:srgbClr val="FFC000"/>
+              </a:solidFill>
+            </a:ln>
+          </p:spPr>
+          <p:style>
+            <a:lnRef idx="2">
+              <a:schemeClr val="accent1">
+                <a:shade val="50000"/>
+              </a:schemeClr>
+            </a:lnRef>
+            <a:fillRef idx="1">
+              <a:schemeClr val="accent1"/>
+            </a:fillRef>
+            <a:effectRef idx="0">
+              <a:schemeClr val="accent1"/>
+            </a:effectRef>
+            <a:fontRef idx="minor">
+              <a:schemeClr val="lt1"/>
+            </a:fontRef>
+          </p:style>
+        </p:cxnSp>
+      </p:grpSp>
+      <p:sp>
+        <p:nvSpPr>
+          <p:cNvPr id="11" name="Forma libre: forma 10">
+            <a:extLst>
+              <a:ext uri="{FF2B5EF4-FFF2-40B4-BE49-F238E27FC236}">
+                <a16:creationId xmlns:a16="http://schemas.microsoft.com/office/drawing/2014/main" id="{F7D97C7E-2049-44B4-A4EE-CC6ABB544C9E}"/>
+              </a:ext>
+            </a:extLst>
+          </p:cNvPr>
+          <p:cNvSpPr/>
+          <p:nvPr/>
+        </p:nvSpPr>
+        <p:spPr>
+          <a:xfrm>
+            <a:off x="5365790" y="5952496"/>
+            <a:ext cx="1754905" cy="540379"/>
+          </a:xfrm>
+          <a:custGeom>
+            <a:avLst/>
+            <a:gdLst>
+              <a:gd name="connsiteX0" fmla="*/ 1750741 w 1814822"/>
+              <a:gd name="connsiteY0" fmla="*/ 0 h 345688"/>
+              <a:gd name="connsiteX1" fmla="*/ 1717288 w 1814822"/>
+              <a:gd name="connsiteY1" fmla="*/ 167268 h 345688"/>
+              <a:gd name="connsiteX2" fmla="*/ 825190 w 1814822"/>
+              <a:gd name="connsiteY2" fmla="*/ 345688 h 345688"/>
+              <a:gd name="connsiteX3" fmla="*/ 0 w 1814822"/>
+              <a:gd name="connsiteY3" fmla="*/ 167268 h 345688"/>
+              <a:gd name="connsiteX0" fmla="*/ 1750741 w 1767884"/>
+              <a:gd name="connsiteY0" fmla="*/ 0 h 345688"/>
+              <a:gd name="connsiteX1" fmla="*/ 1550020 w 1767884"/>
+              <a:gd name="connsiteY1" fmla="*/ 245327 h 345688"/>
+              <a:gd name="connsiteX2" fmla="*/ 825190 w 1767884"/>
+              <a:gd name="connsiteY2" fmla="*/ 345688 h 345688"/>
+              <a:gd name="connsiteX3" fmla="*/ 0 w 1767884"/>
+              <a:gd name="connsiteY3" fmla="*/ 167268 h 345688"/>
+              <a:gd name="connsiteX0" fmla="*/ 1750741 w 1750741"/>
+              <a:gd name="connsiteY0" fmla="*/ 0 h 345688"/>
+              <a:gd name="connsiteX1" fmla="*/ 825190 w 1750741"/>
+              <a:gd name="connsiteY1" fmla="*/ 345688 h 345688"/>
+              <a:gd name="connsiteX2" fmla="*/ 0 w 1750741"/>
+              <a:gd name="connsiteY2" fmla="*/ 167268 h 345688"/>
+              <a:gd name="connsiteX0" fmla="*/ 1750741 w 1750741"/>
+              <a:gd name="connsiteY0" fmla="*/ 0 h 345688"/>
+              <a:gd name="connsiteX1" fmla="*/ 825190 w 1750741"/>
+              <a:gd name="connsiteY1" fmla="*/ 345688 h 345688"/>
+              <a:gd name="connsiteX2" fmla="*/ 0 w 1750741"/>
+              <a:gd name="connsiteY2" fmla="*/ 167268 h 345688"/>
+              <a:gd name="connsiteX0" fmla="*/ 1750741 w 1750741"/>
+              <a:gd name="connsiteY0" fmla="*/ 0 h 167268"/>
+              <a:gd name="connsiteX1" fmla="*/ 0 w 1750741"/>
+              <a:gd name="connsiteY1" fmla="*/ 167268 h 167268"/>
+              <a:gd name="connsiteX0" fmla="*/ 1750741 w 1754905"/>
+              <a:gd name="connsiteY0" fmla="*/ 0 h 371453"/>
+              <a:gd name="connsiteX1" fmla="*/ 0 w 1754905"/>
+              <a:gd name="connsiteY1" fmla="*/ 167268 h 371453"/>
+              <a:gd name="connsiteX0" fmla="*/ 1750741 w 1754905"/>
+              <a:gd name="connsiteY0" fmla="*/ 158450 h 449372"/>
+              <a:gd name="connsiteX1" fmla="*/ 0 w 1754905"/>
+              <a:gd name="connsiteY1" fmla="*/ 2332 h 449372"/>
+              <a:gd name="connsiteX0" fmla="*/ 1750741 w 1754905"/>
+              <a:gd name="connsiteY0" fmla="*/ 269726 h 540379"/>
+              <a:gd name="connsiteX1" fmla="*/ 0 w 1754905"/>
+              <a:gd name="connsiteY1" fmla="*/ 2096 h 540379"/>
+            </a:gdLst>
+            <a:ahLst/>
+            <a:cxnLst>
+              <a:cxn ang="0">
+                <a:pos x="connsiteX0" y="connsiteY0"/>
+              </a:cxn>
+              <a:cxn ang="0">
+                <a:pos x="connsiteX1" y="connsiteY1"/>
+              </a:cxn>
+            </a:cxnLst>
+            <a:rect l="l" t="t" r="r" b="b"/>
+            <a:pathLst>
+              <a:path w="1754905" h="540379">
+                <a:moveTo>
+                  <a:pt x="1750741" y="269726"/>
+                </a:moveTo>
+                <a:cubicBezTo>
+                  <a:pt x="1836235" y="1028008"/>
+                  <a:pt x="583580" y="-53660"/>
+                  <a:pt x="0" y="2096"/>
+                </a:cubicBezTo>
+              </a:path>
+            </a:pathLst>
+          </a:custGeom>
+          <a:noFill/>
+          <a:ln w="38100">
+            <a:solidFill>
+              <a:srgbClr val="FFC000"/>
+            </a:solidFill>
+          </a:ln>
+        </p:spPr>
+        <p:style>
+          <a:lnRef idx="2">
+            <a:schemeClr val="accent1">
+              <a:shade val="50000"/>
+            </a:schemeClr>
+          </a:lnRef>
+          <a:fillRef idx="1">
+            <a:schemeClr val="accent1"/>
+          </a:fillRef>
+          <a:effectRef idx="0">
+            <a:schemeClr val="accent1"/>
+          </a:effectRef>
+          <a:fontRef idx="minor">
+            <a:schemeClr val="lt1"/>
+          </a:fontRef>
+        </p:style>
+        <p:txBody>
+          <a:bodyPr rtlCol="0" anchor="ctr"/>
+          <a:lstStyle/>
+          <a:p>
+            <a:pPr algn="ctr"/>
+            <a:endParaRPr lang="en-US"/>
+          </a:p>
+        </p:txBody>
+      </p:sp>
+      <p:sp>
+        <p:nvSpPr>
+          <p:cNvPr id="12" name="Rectángulo 11">
+            <a:extLst>
+              <a:ext uri="{FF2B5EF4-FFF2-40B4-BE49-F238E27FC236}">
+                <a16:creationId xmlns:a16="http://schemas.microsoft.com/office/drawing/2014/main" id="{C9CBC9E0-77FC-496F-AA06-69FA19D49DF8}"/>
+              </a:ext>
+            </a:extLst>
+          </p:cNvPr>
+          <p:cNvSpPr/>
+          <p:nvPr/>
+        </p:nvSpPr>
+        <p:spPr>
+          <a:xfrm>
+            <a:off x="5432456" y="4535224"/>
+            <a:ext cx="1137661" cy="360000"/>
+          </a:xfrm>
+          <a:prstGeom prst="rect">
+            <a:avLst/>
+          </a:prstGeom>
+          <a:noFill/>
+          <a:ln w="38100">
+            <a:solidFill>
+              <a:srgbClr val="FFC000"/>
+            </a:solidFill>
+          </a:ln>
+        </p:spPr>
+        <p:style>
+          <a:lnRef idx="2">
+            <a:schemeClr val="accent1">
+              <a:shade val="50000"/>
+            </a:schemeClr>
+          </a:lnRef>
+          <a:fillRef idx="1">
+            <a:schemeClr val="accent1"/>
+          </a:fillRef>
+          <a:effectRef idx="0">
+            <a:schemeClr val="accent1"/>
+          </a:effectRef>
+          <a:fontRef idx="minor">
+            <a:schemeClr val="lt1"/>
+          </a:fontRef>
+        </p:style>
+        <p:txBody>
+          <a:bodyPr rtlCol="0" anchor="ctr"/>
+          <a:lstStyle/>
+          <a:p>
+            <a:pPr algn="ctr"/>
+            <a:endParaRPr lang="en-US" dirty="0"/>
+          </a:p>
+        </p:txBody>
+      </p:sp>
+      <p:sp>
+        <p:nvSpPr>
+          <p:cNvPr id="13" name="Forma libre: forma 12">
+            <a:extLst>
+              <a:ext uri="{FF2B5EF4-FFF2-40B4-BE49-F238E27FC236}">
+                <a16:creationId xmlns:a16="http://schemas.microsoft.com/office/drawing/2014/main" id="{9D48F0B5-B346-46DC-80FC-F8872E51591A}"/>
+              </a:ext>
+            </a:extLst>
+          </p:cNvPr>
+          <p:cNvSpPr/>
+          <p:nvPr/>
+        </p:nvSpPr>
+        <p:spPr>
+          <a:xfrm>
+            <a:off x="5376941" y="4906377"/>
+            <a:ext cx="671024" cy="350666"/>
+          </a:xfrm>
+          <a:custGeom>
+            <a:avLst/>
+            <a:gdLst>
+              <a:gd name="connsiteX0" fmla="*/ 0 w 729920"/>
+              <a:gd name="connsiteY0" fmla="*/ 156117 h 437816"/>
+              <a:gd name="connsiteX1" fmla="*/ 669074 w 729920"/>
+              <a:gd name="connsiteY1" fmla="*/ 434897 h 437816"/>
+              <a:gd name="connsiteX2" fmla="*/ 657922 w 729920"/>
+              <a:gd name="connsiteY2" fmla="*/ 0 h 437816"/>
+              <a:gd name="connsiteX0" fmla="*/ 0 w 657922"/>
+              <a:gd name="connsiteY0" fmla="*/ 156117 h 156117"/>
+              <a:gd name="connsiteX1" fmla="*/ 657922 w 657922"/>
+              <a:gd name="connsiteY1" fmla="*/ 0 h 156117"/>
+              <a:gd name="connsiteX0" fmla="*/ 0 w 657922"/>
+              <a:gd name="connsiteY0" fmla="*/ 156117 h 272809"/>
+              <a:gd name="connsiteX1" fmla="*/ 657922 w 657922"/>
+              <a:gd name="connsiteY1" fmla="*/ 0 h 272809"/>
+              <a:gd name="connsiteX0" fmla="*/ 0 w 659107"/>
+              <a:gd name="connsiteY0" fmla="*/ 156117 h 310011"/>
+              <a:gd name="connsiteX1" fmla="*/ 657922 w 659107"/>
+              <a:gd name="connsiteY1" fmla="*/ 0 h 310011"/>
+              <a:gd name="connsiteX0" fmla="*/ 0 w 657922"/>
+              <a:gd name="connsiteY0" fmla="*/ 156117 h 314959"/>
+              <a:gd name="connsiteX1" fmla="*/ 657922 w 657922"/>
+              <a:gd name="connsiteY1" fmla="*/ 0 h 314959"/>
+              <a:gd name="connsiteX0" fmla="*/ 0 w 671024"/>
+              <a:gd name="connsiteY0" fmla="*/ 156117 h 350666"/>
+              <a:gd name="connsiteX1" fmla="*/ 657922 w 671024"/>
+              <a:gd name="connsiteY1" fmla="*/ 0 h 350666"/>
+            </a:gdLst>
+            <a:ahLst/>
+            <a:cxnLst>
+              <a:cxn ang="0">
+                <a:pos x="connsiteX0" y="connsiteY0"/>
+              </a:cxn>
+              <a:cxn ang="0">
+                <a:pos x="connsiteX1" y="connsiteY1"/>
+              </a:cxn>
+            </a:cxnLst>
+            <a:rect l="l" t="t" r="r" b="b"/>
+            <a:pathLst>
+              <a:path w="671024" h="350666">
+                <a:moveTo>
+                  <a:pt x="0" y="156117"/>
+                </a:moveTo>
+                <a:cubicBezTo>
+                  <a:pt x="587297" y="483219"/>
+                  <a:pt x="717396" y="375425"/>
+                  <a:pt x="657922" y="0"/>
+                </a:cubicBezTo>
+              </a:path>
+            </a:pathLst>
+          </a:custGeom>
+          <a:noFill/>
+          <a:ln w="38100">
+            <a:solidFill>
+              <a:srgbClr val="FFC000"/>
+            </a:solidFill>
+          </a:ln>
+        </p:spPr>
+        <p:style>
+          <a:lnRef idx="2">
+            <a:schemeClr val="accent1">
+              <a:shade val="50000"/>
+            </a:schemeClr>
+          </a:lnRef>
+          <a:fillRef idx="1">
+            <a:schemeClr val="accent1"/>
+          </a:fillRef>
+          <a:effectRef idx="0">
+            <a:schemeClr val="accent1"/>
+          </a:effectRef>
+          <a:fontRef idx="minor">
+            <a:schemeClr val="lt1"/>
+          </a:fontRef>
+        </p:style>
+        <p:txBody>
+          <a:bodyPr rtlCol="0" anchor="ctr"/>
+          <a:lstStyle/>
+          <a:p>
+            <a:pPr algn="ctr"/>
+            <a:endParaRPr lang="en-US"/>
+          </a:p>
+        </p:txBody>
+      </p:sp>
+      <p:cxnSp>
+        <p:nvCxnSpPr>
+          <p:cNvPr id="14" name="Conector recto de flecha 13">
+            <a:extLst>
+              <a:ext uri="{FF2B5EF4-FFF2-40B4-BE49-F238E27FC236}">
+                <a16:creationId xmlns:a16="http://schemas.microsoft.com/office/drawing/2014/main" id="{80632064-2765-47D6-B439-0BD9F80544F6}"/>
+              </a:ext>
+            </a:extLst>
+          </p:cNvPr>
+          <p:cNvCxnSpPr>
+            <a:cxnSpLocks/>
+          </p:cNvCxnSpPr>
+          <p:nvPr/>
+        </p:nvCxnSpPr>
+        <p:spPr>
+          <a:xfrm flipH="1" flipV="1">
+            <a:off x="6016928" y="3586988"/>
+            <a:ext cx="4594" cy="948236"/>
+          </a:xfrm>
+          <a:prstGeom prst="straightConnector1">
+            <a:avLst/>
+          </a:prstGeom>
+          <a:noFill/>
+          <a:ln w="38100">
+            <a:solidFill>
+              <a:srgbClr val="FFC000"/>
+            </a:solidFill>
+            <a:headEnd type="none" w="med" len="med"/>
+            <a:tailEnd type="triangle" w="med" len="med"/>
+          </a:ln>
+        </p:spPr>
+        <p:style>
+          <a:lnRef idx="2">
+            <a:schemeClr val="accent1">
+              <a:shade val="50000"/>
+            </a:schemeClr>
+          </a:lnRef>
+          <a:fillRef idx="1">
+            <a:schemeClr val="accent1"/>
+          </a:fillRef>
+          <a:effectRef idx="0">
+            <a:schemeClr val="accent1"/>
+          </a:effectRef>
+          <a:fontRef idx="minor">
+            <a:schemeClr val="lt1"/>
+          </a:fontRef>
+        </p:style>
+      </p:cxnSp>
+      <p:grpSp>
+        <p:nvGrpSpPr>
+          <p:cNvPr id="15" name="Grupo 14">
+            <a:extLst>
+              <a:ext uri="{FF2B5EF4-FFF2-40B4-BE49-F238E27FC236}">
+                <a16:creationId xmlns:a16="http://schemas.microsoft.com/office/drawing/2014/main" id="{9D04C3A5-9A57-44FE-9B7F-5E9FB0AAA17B}"/>
+              </a:ext>
+            </a:extLst>
+          </p:cNvPr>
+          <p:cNvGrpSpPr/>
+          <p:nvPr/>
+        </p:nvGrpSpPr>
+        <p:grpSpPr>
+          <a:xfrm rot="10800000">
+            <a:off x="5835000" y="2930461"/>
+            <a:ext cx="323386" cy="613317"/>
+            <a:chOff x="4036741" y="2832410"/>
+            <a:chExt cx="1014761" cy="2018370"/>
+          </a:xfrm>
+        </p:grpSpPr>
+        <p:sp>
+          <p:nvSpPr>
+            <p:cNvPr id="16" name="Forma libre: forma 15">
+              <a:extLst>
+                <a:ext uri="{FF2B5EF4-FFF2-40B4-BE49-F238E27FC236}">
+                  <a16:creationId xmlns:a16="http://schemas.microsoft.com/office/drawing/2014/main" id="{F9BF23E3-C90F-470C-8F21-2D11E44736B0}"/>
+                </a:ext>
+              </a:extLst>
+            </p:cNvPr>
+            <p:cNvSpPr/>
+            <p:nvPr/>
+          </p:nvSpPr>
+          <p:spPr>
+            <a:xfrm>
+              <a:off x="4036741" y="2832410"/>
+              <a:ext cx="1014761" cy="1416206"/>
+            </a:xfrm>
+            <a:custGeom>
+              <a:avLst/>
+              <a:gdLst>
+                <a:gd name="connsiteX0" fmla="*/ 0 w 1014761"/>
+                <a:gd name="connsiteY0" fmla="*/ 0 h 1483113"/>
+                <a:gd name="connsiteX1" fmla="*/ 22303 w 1014761"/>
+                <a:gd name="connsiteY1" fmla="*/ 1483113 h 1483113"/>
+                <a:gd name="connsiteX2" fmla="*/ 1014761 w 1014761"/>
+                <a:gd name="connsiteY2" fmla="*/ 1483113 h 1483113"/>
+                <a:gd name="connsiteX3" fmla="*/ 981308 w 1014761"/>
+                <a:gd name="connsiteY3" fmla="*/ 44605 h 1483113"/>
+                <a:gd name="connsiteX0" fmla="*/ 0 w 1014761"/>
+                <a:gd name="connsiteY0" fmla="*/ 33454 h 1438508"/>
+                <a:gd name="connsiteX1" fmla="*/ 22303 w 1014761"/>
+                <a:gd name="connsiteY1" fmla="*/ 1438508 h 1438508"/>
+                <a:gd name="connsiteX2" fmla="*/ 1014761 w 1014761"/>
+                <a:gd name="connsiteY2" fmla="*/ 1438508 h 1438508"/>
+                <a:gd name="connsiteX3" fmla="*/ 981308 w 1014761"/>
+                <a:gd name="connsiteY3" fmla="*/ 0 h 1438508"/>
+                <a:gd name="connsiteX0" fmla="*/ 0 w 1014761"/>
+                <a:gd name="connsiteY0" fmla="*/ 11152 h 1416206"/>
+                <a:gd name="connsiteX1" fmla="*/ 22303 w 1014761"/>
+                <a:gd name="connsiteY1" fmla="*/ 1416206 h 1416206"/>
+                <a:gd name="connsiteX2" fmla="*/ 1014761 w 1014761"/>
+                <a:gd name="connsiteY2" fmla="*/ 1416206 h 1416206"/>
+                <a:gd name="connsiteX3" fmla="*/ 981308 w 1014761"/>
+                <a:gd name="connsiteY3" fmla="*/ 0 h 1416206"/>
+              </a:gdLst>
+              <a:ahLst/>
+              <a:cxnLst>
+                <a:cxn ang="0">
+                  <a:pos x="connsiteX0" y="connsiteY0"/>
+                </a:cxn>
+                <a:cxn ang="0">
+                  <a:pos x="connsiteX1" y="connsiteY1"/>
+                </a:cxn>
+                <a:cxn ang="0">
+                  <a:pos x="connsiteX2" y="connsiteY2"/>
+                </a:cxn>
+                <a:cxn ang="0">
+                  <a:pos x="connsiteX3" y="connsiteY3"/>
+                </a:cxn>
+              </a:cxnLst>
+              <a:rect l="l" t="t" r="r" b="b"/>
+              <a:pathLst>
+                <a:path w="1014761" h="1416206">
+                  <a:moveTo>
+                    <a:pt x="0" y="11152"/>
+                  </a:moveTo>
+                  <a:lnTo>
+                    <a:pt x="22303" y="1416206"/>
+                  </a:lnTo>
+                  <a:lnTo>
+                    <a:pt x="1014761" y="1416206"/>
+                  </a:lnTo>
+                  <a:lnTo>
+                    <a:pt x="981308" y="0"/>
+                  </a:lnTo>
+                </a:path>
+              </a:pathLst>
+            </a:custGeom>
+            <a:noFill/>
+            <a:ln w="38100">
+              <a:solidFill>
+                <a:srgbClr val="92D050"/>
+              </a:solidFill>
+            </a:ln>
+          </p:spPr>
+          <p:style>
+            <a:lnRef idx="2">
+              <a:schemeClr val="accent1">
+                <a:shade val="50000"/>
+              </a:schemeClr>
+            </a:lnRef>
+            <a:fillRef idx="1">
+              <a:schemeClr val="accent1"/>
+            </a:fillRef>
+            <a:effectRef idx="0">
+              <a:schemeClr val="accent1"/>
+            </a:effectRef>
+            <a:fontRef idx="minor">
+              <a:schemeClr val="lt1"/>
+            </a:fontRef>
+          </p:style>
+          <p:txBody>
+            <a:bodyPr rtlCol="0" anchor="ctr"/>
+            <a:lstStyle/>
+            <a:p>
+              <a:pPr algn="ctr"/>
+              <a:endParaRPr lang="en-US"/>
+            </a:p>
+          </p:txBody>
+        </p:sp>
+        <p:cxnSp>
+          <p:nvCxnSpPr>
+            <p:cNvPr id="17" name="Conector recto 16">
+              <a:extLst>
+                <a:ext uri="{FF2B5EF4-FFF2-40B4-BE49-F238E27FC236}">
+                  <a16:creationId xmlns:a16="http://schemas.microsoft.com/office/drawing/2014/main" id="{CB9F51F4-9EE3-4FB1-84C0-096829F5DDEC}"/>
+                </a:ext>
+              </a:extLst>
+            </p:cNvPr>
+            <p:cNvCxnSpPr/>
+            <p:nvPr/>
+          </p:nvCxnSpPr>
+          <p:spPr>
+            <a:xfrm>
+              <a:off x="4572000" y="4248615"/>
+              <a:ext cx="0" cy="602165"/>
+            </a:xfrm>
+            <a:prstGeom prst="line">
+              <a:avLst/>
+            </a:prstGeom>
+            <a:noFill/>
+            <a:ln w="38100">
+              <a:solidFill>
+                <a:srgbClr val="92D050"/>
+              </a:solidFill>
+            </a:ln>
+          </p:spPr>
+          <p:style>
+            <a:lnRef idx="2">
+              <a:schemeClr val="accent1">
+                <a:shade val="50000"/>
+              </a:schemeClr>
+            </a:lnRef>
+            <a:fillRef idx="1">
+              <a:schemeClr val="accent1"/>
+            </a:fillRef>
+            <a:effectRef idx="0">
+              <a:schemeClr val="accent1"/>
+            </a:effectRef>
+            <a:fontRef idx="minor">
+              <a:schemeClr val="lt1"/>
+            </a:fontRef>
+          </p:style>
+        </p:cxnSp>
+      </p:grpSp>
+      <p:sp>
+        <p:nvSpPr>
+          <p:cNvPr id="18" name="Forma libre: forma 17">
+            <a:extLst>
+              <a:ext uri="{FF2B5EF4-FFF2-40B4-BE49-F238E27FC236}">
+                <a16:creationId xmlns:a16="http://schemas.microsoft.com/office/drawing/2014/main" id="{F36A038D-07D0-4A19-A9DF-D8D57F7C9814}"/>
+              </a:ext>
+            </a:extLst>
+          </p:cNvPr>
+          <p:cNvSpPr/>
+          <p:nvPr/>
+        </p:nvSpPr>
+        <p:spPr>
+          <a:xfrm>
+            <a:off x="5990259" y="2394876"/>
+            <a:ext cx="2541196" cy="961736"/>
+          </a:xfrm>
+          <a:custGeom>
+            <a:avLst/>
+            <a:gdLst>
+              <a:gd name="connsiteX0" fmla="*/ 0 w 1157572"/>
+              <a:gd name="connsiteY0" fmla="*/ 274022 h 2292393"/>
+              <a:gd name="connsiteX1" fmla="*/ 1014761 w 1157572"/>
+              <a:gd name="connsiteY1" fmla="*/ 173661 h 2292393"/>
+              <a:gd name="connsiteX2" fmla="*/ 1126273 w 1157572"/>
+              <a:gd name="connsiteY2" fmla="*/ 2292393 h 2292393"/>
+              <a:gd name="connsiteX0" fmla="*/ 396 w 1157968"/>
+              <a:gd name="connsiteY0" fmla="*/ 418168 h 2436539"/>
+              <a:gd name="connsiteX1" fmla="*/ 1015157 w 1157968"/>
+              <a:gd name="connsiteY1" fmla="*/ 317807 h 2436539"/>
+              <a:gd name="connsiteX2" fmla="*/ 1126669 w 1157968"/>
+              <a:gd name="connsiteY2" fmla="*/ 2436539 h 2436539"/>
+              <a:gd name="connsiteX0" fmla="*/ 386 w 1180260"/>
+              <a:gd name="connsiteY0" fmla="*/ 428624 h 2424692"/>
+              <a:gd name="connsiteX1" fmla="*/ 1037449 w 1180260"/>
+              <a:gd name="connsiteY1" fmla="*/ 305960 h 2424692"/>
+              <a:gd name="connsiteX2" fmla="*/ 1148961 w 1180260"/>
+              <a:gd name="connsiteY2" fmla="*/ 2424692 h 2424692"/>
+              <a:gd name="connsiteX0" fmla="*/ 391 w 1180265"/>
+              <a:gd name="connsiteY0" fmla="*/ 496314 h 2492382"/>
+              <a:gd name="connsiteX1" fmla="*/ 1037454 w 1180265"/>
+              <a:gd name="connsiteY1" fmla="*/ 373650 h 2492382"/>
+              <a:gd name="connsiteX2" fmla="*/ 1148966 w 1180265"/>
+              <a:gd name="connsiteY2" fmla="*/ 2492382 h 2492382"/>
+              <a:gd name="connsiteX0" fmla="*/ 391 w 1161617"/>
+              <a:gd name="connsiteY0" fmla="*/ 496314 h 2492382"/>
+              <a:gd name="connsiteX1" fmla="*/ 1037454 w 1161617"/>
+              <a:gd name="connsiteY1" fmla="*/ 373650 h 2492382"/>
+              <a:gd name="connsiteX2" fmla="*/ 1148966 w 1161617"/>
+              <a:gd name="connsiteY2" fmla="*/ 2492382 h 2492382"/>
+              <a:gd name="connsiteX0" fmla="*/ 391 w 1155609"/>
+              <a:gd name="connsiteY0" fmla="*/ 496314 h 2693104"/>
+              <a:gd name="connsiteX1" fmla="*/ 1037454 w 1155609"/>
+              <a:gd name="connsiteY1" fmla="*/ 373650 h 2693104"/>
+              <a:gd name="connsiteX2" fmla="*/ 1137815 w 1155609"/>
+              <a:gd name="connsiteY2" fmla="*/ 2693104 h 2693104"/>
+              <a:gd name="connsiteX0" fmla="*/ 391 w 2520566"/>
+              <a:gd name="connsiteY0" fmla="*/ 936549 h 936549"/>
+              <a:gd name="connsiteX1" fmla="*/ 1037454 w 2520566"/>
+              <a:gd name="connsiteY1" fmla="*/ 813885 h 936549"/>
+              <a:gd name="connsiteX2" fmla="*/ 2520566 w 2520566"/>
+              <a:gd name="connsiteY2" fmla="*/ 256324 h 936549"/>
+              <a:gd name="connsiteX0" fmla="*/ 387 w 2520562"/>
+              <a:gd name="connsiteY0" fmla="*/ 1053694 h 1053694"/>
+              <a:gd name="connsiteX1" fmla="*/ 1048601 w 2520562"/>
+              <a:gd name="connsiteY1" fmla="*/ 195050 h 1053694"/>
+              <a:gd name="connsiteX2" fmla="*/ 2520562 w 2520562"/>
+              <a:gd name="connsiteY2" fmla="*/ 373469 h 1053694"/>
+              <a:gd name="connsiteX0" fmla="*/ 702 w 2520877"/>
+              <a:gd name="connsiteY0" fmla="*/ 1055645 h 1055645"/>
+              <a:gd name="connsiteX1" fmla="*/ 1048916 w 2520877"/>
+              <a:gd name="connsiteY1" fmla="*/ 197001 h 1055645"/>
+              <a:gd name="connsiteX2" fmla="*/ 2520877 w 2520877"/>
+              <a:gd name="connsiteY2" fmla="*/ 375420 h 1055645"/>
+              <a:gd name="connsiteX0" fmla="*/ 0 w 2520175"/>
+              <a:gd name="connsiteY0" fmla="*/ 680225 h 680225"/>
+              <a:gd name="connsiteX1" fmla="*/ 2520175 w 2520175"/>
+              <a:gd name="connsiteY1" fmla="*/ 0 h 680225"/>
+              <a:gd name="connsiteX0" fmla="*/ 0 w 2520175"/>
+              <a:gd name="connsiteY0" fmla="*/ 680225 h 680225"/>
+              <a:gd name="connsiteX1" fmla="*/ 2520175 w 2520175"/>
+              <a:gd name="connsiteY1" fmla="*/ 0 h 680225"/>
+              <a:gd name="connsiteX0" fmla="*/ 0 w 2520175"/>
+              <a:gd name="connsiteY0" fmla="*/ 734163 h 734163"/>
+              <a:gd name="connsiteX1" fmla="*/ 2520175 w 2520175"/>
+              <a:gd name="connsiteY1" fmla="*/ 53938 h 734163"/>
+              <a:gd name="connsiteX0" fmla="*/ 0 w 2520175"/>
+              <a:gd name="connsiteY0" fmla="*/ 705227 h 705227"/>
+              <a:gd name="connsiteX1" fmla="*/ 2520175 w 2520175"/>
+              <a:gd name="connsiteY1" fmla="*/ 25002 h 705227"/>
+              <a:gd name="connsiteX0" fmla="*/ 0 w 2793444"/>
+              <a:gd name="connsiteY0" fmla="*/ 352217 h 766821"/>
+              <a:gd name="connsiteX1" fmla="*/ 2793444 w 2793444"/>
+              <a:gd name="connsiteY1" fmla="*/ 765068 h 766821"/>
+              <a:gd name="connsiteX0" fmla="*/ 0 w 2793444"/>
+              <a:gd name="connsiteY0" fmla="*/ 615951 h 1028802"/>
+              <a:gd name="connsiteX1" fmla="*/ 2793444 w 2793444"/>
+              <a:gd name="connsiteY1" fmla="*/ 1028802 h 1028802"/>
+              <a:gd name="connsiteX0" fmla="*/ 0 w 2541196"/>
+              <a:gd name="connsiteY0" fmla="*/ 615951 h 1028802"/>
+              <a:gd name="connsiteX1" fmla="*/ 2541196 w 2541196"/>
+              <a:gd name="connsiteY1" fmla="*/ 1028802 h 1028802"/>
+              <a:gd name="connsiteX0" fmla="*/ 0 w 2541196"/>
+              <a:gd name="connsiteY0" fmla="*/ 548885 h 961736"/>
+              <a:gd name="connsiteX1" fmla="*/ 2541196 w 2541196"/>
+              <a:gd name="connsiteY1" fmla="*/ 961736 h 961736"/>
+            </a:gdLst>
+            <a:ahLst/>
+            <a:cxnLst>
+              <a:cxn ang="0">
+                <a:pos x="connsiteX0" y="connsiteY0"/>
+              </a:cxn>
+              <a:cxn ang="0">
+                <a:pos x="connsiteX1" y="connsiteY1"/>
+              </a:cxn>
+            </a:cxnLst>
+            <a:rect l="l" t="t" r="r" b="b"/>
+            <a:pathLst>
+              <a:path w="2541196" h="961736">
+                <a:moveTo>
+                  <a:pt x="0" y="548885"/>
+                </a:moveTo>
+                <a:cubicBezTo>
+                  <a:pt x="14868" y="-458442"/>
+                  <a:pt x="1467602" y="64767"/>
+                  <a:pt x="2541196" y="961736"/>
+                </a:cubicBezTo>
+              </a:path>
+            </a:pathLst>
+          </a:custGeom>
+          <a:noFill/>
+          <a:ln w="38100">
+            <a:solidFill>
+              <a:srgbClr val="92D050"/>
+            </a:solidFill>
+            <a:headEnd type="none" w="med" len="med"/>
+            <a:tailEnd type="triangle" w="med" len="med"/>
+          </a:ln>
+        </p:spPr>
+        <p:style>
+          <a:lnRef idx="2">
+            <a:schemeClr val="accent1">
+              <a:shade val="50000"/>
+            </a:schemeClr>
+          </a:lnRef>
+          <a:fillRef idx="1">
+            <a:schemeClr val="accent1"/>
+          </a:fillRef>
+          <a:effectRef idx="0">
+            <a:schemeClr val="accent1"/>
+          </a:effectRef>
+          <a:fontRef idx="minor">
+            <a:schemeClr val="lt1"/>
+          </a:fontRef>
+        </p:style>
+        <p:txBody>
+          <a:bodyPr rtlCol="0" anchor="ctr"/>
+          <a:lstStyle/>
+          <a:p>
+            <a:pPr algn="ctr"/>
+            <a:endParaRPr lang="en-US"/>
+          </a:p>
+        </p:txBody>
+      </p:sp>
+      <p:sp>
+        <p:nvSpPr>
+          <p:cNvPr id="19" name="Forma libre: forma 18">
+            <a:extLst>
+              <a:ext uri="{FF2B5EF4-FFF2-40B4-BE49-F238E27FC236}">
+                <a16:creationId xmlns:a16="http://schemas.microsoft.com/office/drawing/2014/main" id="{B44C555E-139C-4CE8-A8EB-A38E87F5CD66}"/>
+              </a:ext>
+            </a:extLst>
+          </p:cNvPr>
+          <p:cNvSpPr/>
+          <p:nvPr/>
+        </p:nvSpPr>
+        <p:spPr>
+          <a:xfrm>
+            <a:off x="5996020" y="2443735"/>
+            <a:ext cx="1155609" cy="2693104"/>
+          </a:xfrm>
+          <a:custGeom>
+            <a:avLst/>
+            <a:gdLst>
+              <a:gd name="connsiteX0" fmla="*/ 0 w 1157572"/>
+              <a:gd name="connsiteY0" fmla="*/ 274022 h 2292393"/>
+              <a:gd name="connsiteX1" fmla="*/ 1014761 w 1157572"/>
+              <a:gd name="connsiteY1" fmla="*/ 173661 h 2292393"/>
+              <a:gd name="connsiteX2" fmla="*/ 1126273 w 1157572"/>
+              <a:gd name="connsiteY2" fmla="*/ 2292393 h 2292393"/>
+              <a:gd name="connsiteX0" fmla="*/ 396 w 1157968"/>
+              <a:gd name="connsiteY0" fmla="*/ 418168 h 2436539"/>
+              <a:gd name="connsiteX1" fmla="*/ 1015157 w 1157968"/>
+              <a:gd name="connsiteY1" fmla="*/ 317807 h 2436539"/>
+              <a:gd name="connsiteX2" fmla="*/ 1126669 w 1157968"/>
+              <a:gd name="connsiteY2" fmla="*/ 2436539 h 2436539"/>
+              <a:gd name="connsiteX0" fmla="*/ 386 w 1180260"/>
+              <a:gd name="connsiteY0" fmla="*/ 428624 h 2424692"/>
+              <a:gd name="connsiteX1" fmla="*/ 1037449 w 1180260"/>
+              <a:gd name="connsiteY1" fmla="*/ 305960 h 2424692"/>
+              <a:gd name="connsiteX2" fmla="*/ 1148961 w 1180260"/>
+              <a:gd name="connsiteY2" fmla="*/ 2424692 h 2424692"/>
+              <a:gd name="connsiteX0" fmla="*/ 391 w 1180265"/>
+              <a:gd name="connsiteY0" fmla="*/ 496314 h 2492382"/>
+              <a:gd name="connsiteX1" fmla="*/ 1037454 w 1180265"/>
+              <a:gd name="connsiteY1" fmla="*/ 373650 h 2492382"/>
+              <a:gd name="connsiteX2" fmla="*/ 1148966 w 1180265"/>
+              <a:gd name="connsiteY2" fmla="*/ 2492382 h 2492382"/>
+              <a:gd name="connsiteX0" fmla="*/ 391 w 1161617"/>
+              <a:gd name="connsiteY0" fmla="*/ 496314 h 2492382"/>
+              <a:gd name="connsiteX1" fmla="*/ 1037454 w 1161617"/>
+              <a:gd name="connsiteY1" fmla="*/ 373650 h 2492382"/>
+              <a:gd name="connsiteX2" fmla="*/ 1148966 w 1161617"/>
+              <a:gd name="connsiteY2" fmla="*/ 2492382 h 2492382"/>
+              <a:gd name="connsiteX0" fmla="*/ 391 w 1155609"/>
+              <a:gd name="connsiteY0" fmla="*/ 496314 h 2693104"/>
+              <a:gd name="connsiteX1" fmla="*/ 1037454 w 1155609"/>
+              <a:gd name="connsiteY1" fmla="*/ 373650 h 2693104"/>
+              <a:gd name="connsiteX2" fmla="*/ 1137815 w 1155609"/>
+              <a:gd name="connsiteY2" fmla="*/ 2693104 h 2693104"/>
+            </a:gdLst>
+            <a:ahLst/>
+            <a:cxnLst>
+              <a:cxn ang="0">
+                <a:pos x="connsiteX0" y="connsiteY0"/>
+              </a:cxn>
+              <a:cxn ang="0">
+                <a:pos x="connsiteX1" y="connsiteY1"/>
+              </a:cxn>
+              <a:cxn ang="0">
+                <a:pos x="connsiteX2" y="connsiteY2"/>
+              </a:cxn>
+            </a:cxnLst>
+            <a:rect l="l" t="t" r="r" b="b"/>
+            <a:pathLst>
+              <a:path w="1155609" h="2693104">
+                <a:moveTo>
+                  <a:pt x="391" y="496314"/>
+                </a:moveTo>
+                <a:cubicBezTo>
+                  <a:pt x="-20983" y="-145810"/>
+                  <a:pt x="838591" y="-141164"/>
+                  <a:pt x="1037454" y="373650"/>
+                </a:cubicBezTo>
+                <a:cubicBezTo>
+                  <a:pt x="1225166" y="710045"/>
+                  <a:pt x="1131310" y="1790783"/>
+                  <a:pt x="1137815" y="2693104"/>
+                </a:cubicBezTo>
+              </a:path>
+            </a:pathLst>
+          </a:custGeom>
+          <a:noFill/>
+          <a:ln w="38100">
+            <a:solidFill>
+              <a:srgbClr val="92D050"/>
+            </a:solidFill>
+            <a:headEnd type="none" w="med" len="med"/>
+            <a:tailEnd type="triangle" w="med" len="med"/>
+          </a:ln>
+        </p:spPr>
+        <p:style>
+          <a:lnRef idx="2">
+            <a:schemeClr val="accent1">
+              <a:shade val="50000"/>
+            </a:schemeClr>
+          </a:lnRef>
+          <a:fillRef idx="1">
+            <a:schemeClr val="accent1"/>
+          </a:fillRef>
+          <a:effectRef idx="0">
+            <a:schemeClr val="accent1"/>
+          </a:effectRef>
+          <a:fontRef idx="minor">
+            <a:schemeClr val="lt1"/>
+          </a:fontRef>
+        </p:style>
+        <p:txBody>
+          <a:bodyPr rtlCol="0" anchor="ctr"/>
+          <a:lstStyle/>
+          <a:p>
+            <a:pPr algn="ctr"/>
+            <a:endParaRPr lang="en-US"/>
+          </a:p>
+        </p:txBody>
+      </p:sp>
+      <p:sp>
+        <p:nvSpPr>
+          <p:cNvPr id="20" name="Rectángulo 19">
+            <a:extLst>
+              <a:ext uri="{FF2B5EF4-FFF2-40B4-BE49-F238E27FC236}">
+                <a16:creationId xmlns:a16="http://schemas.microsoft.com/office/drawing/2014/main" id="{C500891C-7CD0-4401-9E66-7818CE43EB9E}"/>
+              </a:ext>
+            </a:extLst>
+          </p:cNvPr>
+          <p:cNvSpPr/>
+          <p:nvPr/>
+        </p:nvSpPr>
+        <p:spPr>
+          <a:xfrm>
+            <a:off x="7412938" y="3353734"/>
+            <a:ext cx="2965878" cy="360000"/>
+          </a:xfrm>
+          <a:prstGeom prst="rect">
+            <a:avLst/>
+          </a:prstGeom>
+          <a:noFill/>
+          <a:ln w="38100">
+            <a:solidFill>
+              <a:srgbClr val="92D050"/>
+            </a:solidFill>
+          </a:ln>
+        </p:spPr>
+        <p:style>
+          <a:lnRef idx="2">
+            <a:schemeClr val="accent1">
+              <a:shade val="50000"/>
+            </a:schemeClr>
+          </a:lnRef>
+          <a:fillRef idx="1">
+            <a:schemeClr val="accent1"/>
+          </a:fillRef>
+          <a:effectRef idx="0">
+            <a:schemeClr val="accent1"/>
+          </a:effectRef>
+          <a:fontRef idx="minor">
+            <a:schemeClr val="lt1"/>
+          </a:fontRef>
+        </p:style>
+        <p:txBody>
+          <a:bodyPr rtlCol="0" anchor="ctr"/>
+          <a:lstStyle/>
+          <a:p>
+            <a:pPr algn="ctr"/>
+            <a:endParaRPr lang="en-US" dirty="0"/>
+          </a:p>
+        </p:txBody>
+      </p:sp>
+      <p:cxnSp>
+        <p:nvCxnSpPr>
+          <p:cNvPr id="21" name="Conector recto de flecha 20">
+            <a:extLst>
+              <a:ext uri="{FF2B5EF4-FFF2-40B4-BE49-F238E27FC236}">
+                <a16:creationId xmlns:a16="http://schemas.microsoft.com/office/drawing/2014/main" id="{549C9E78-0040-48B5-9EF6-740D57CAAAB0}"/>
+              </a:ext>
+            </a:extLst>
+          </p:cNvPr>
+          <p:cNvCxnSpPr>
+            <a:cxnSpLocks/>
+            <a:stCxn id="28" idx="0"/>
+          </p:cNvCxnSpPr>
+          <p:nvPr/>
+        </p:nvCxnSpPr>
+        <p:spPr>
+          <a:xfrm flipV="1">
+            <a:off x="4553729" y="3113440"/>
+            <a:ext cx="700549" cy="1128670"/>
+          </a:xfrm>
+          <a:prstGeom prst="straightConnector1">
+            <a:avLst/>
+          </a:prstGeom>
+          <a:noFill/>
+          <a:ln w="38100">
+            <a:solidFill>
+              <a:srgbClr val="FFC000"/>
+            </a:solidFill>
+            <a:headEnd type="none" w="med" len="med"/>
+            <a:tailEnd type="triangle" w="med" len="med"/>
+          </a:ln>
+        </p:spPr>
+        <p:style>
+          <a:lnRef idx="2">
+            <a:schemeClr val="accent1">
+              <a:shade val="50000"/>
+            </a:schemeClr>
+          </a:lnRef>
+          <a:fillRef idx="1">
+            <a:schemeClr val="accent1"/>
+          </a:fillRef>
+          <a:effectRef idx="0">
+            <a:schemeClr val="accent1"/>
+          </a:effectRef>
+          <a:fontRef idx="minor">
+            <a:schemeClr val="lt1"/>
+          </a:fontRef>
+        </p:style>
+      </p:cxnSp>
+      <p:cxnSp>
+        <p:nvCxnSpPr>
+          <p:cNvPr id="22" name="Conector recto de flecha 21">
+            <a:extLst>
+              <a:ext uri="{FF2B5EF4-FFF2-40B4-BE49-F238E27FC236}">
+                <a16:creationId xmlns:a16="http://schemas.microsoft.com/office/drawing/2014/main" id="{BDC2DFED-DD18-47EC-AC4B-7F7F41E71F8E}"/>
+              </a:ext>
+            </a:extLst>
+          </p:cNvPr>
+          <p:cNvCxnSpPr>
+            <a:cxnSpLocks/>
+          </p:cNvCxnSpPr>
+          <p:nvPr/>
+        </p:nvCxnSpPr>
+        <p:spPr>
+          <a:xfrm flipV="1">
+            <a:off x="5254278" y="1773072"/>
+            <a:ext cx="1137661" cy="1297158"/>
+          </a:xfrm>
+          <a:prstGeom prst="straightConnector1">
+            <a:avLst/>
+          </a:prstGeom>
+          <a:noFill/>
+          <a:ln w="38100">
+            <a:solidFill>
+              <a:srgbClr val="92D050"/>
+            </a:solidFill>
+            <a:headEnd type="none" w="med" len="med"/>
+            <a:tailEnd type="triangle" w="med" len="med"/>
+          </a:ln>
+        </p:spPr>
+        <p:style>
+          <a:lnRef idx="2">
+            <a:schemeClr val="accent1">
+              <a:shade val="50000"/>
+            </a:schemeClr>
+          </a:lnRef>
+          <a:fillRef idx="1">
+            <a:schemeClr val="accent1"/>
+          </a:fillRef>
+          <a:effectRef idx="0">
+            <a:schemeClr val="accent1"/>
+          </a:effectRef>
+          <a:fontRef idx="minor">
+            <a:schemeClr val="lt1"/>
+          </a:fontRef>
+        </p:style>
+      </p:cxnSp>
+      <p:sp>
+        <p:nvSpPr>
+          <p:cNvPr id="23" name="CuadroTexto 22">
+            <a:extLst>
+              <a:ext uri="{FF2B5EF4-FFF2-40B4-BE49-F238E27FC236}">
+                <a16:creationId xmlns:a16="http://schemas.microsoft.com/office/drawing/2014/main" id="{F686ACFE-460D-46D2-B33B-7DA4ECD203B4}"/>
+              </a:ext>
+            </a:extLst>
+          </p:cNvPr>
+          <p:cNvSpPr txBox="1"/>
+          <p:nvPr/>
+        </p:nvSpPr>
+        <p:spPr>
+          <a:xfrm>
+            <a:off x="6433279" y="1595687"/>
+            <a:ext cx="2035814" cy="369332"/>
+          </a:xfrm>
+          <a:prstGeom prst="rect">
+            <a:avLst/>
+          </a:prstGeom>
+          <a:noFill/>
+        </p:spPr>
+        <p:txBody>
+          <a:bodyPr wrap="none" rtlCol="0">
+            <a:spAutoFit/>
+          </a:bodyPr>
+          <a:lstStyle/>
+          <a:p>
+            <a:r>
+              <a:rPr lang="en-US" dirty="0">
+                <a:solidFill>
+                  <a:srgbClr val="92D050"/>
+                </a:solidFill>
+              </a:rPr>
+              <a:t>Command manager</a:t>
+            </a:r>
+          </a:p>
+        </p:txBody>
+      </p:sp>
+      <p:sp>
+        <p:nvSpPr>
+          <p:cNvPr id="24" name="CuadroTexto 23">
+            <a:extLst>
+              <a:ext uri="{FF2B5EF4-FFF2-40B4-BE49-F238E27FC236}">
+                <a16:creationId xmlns:a16="http://schemas.microsoft.com/office/drawing/2014/main" id="{93EFD546-20C6-4474-BE0D-74873F0FB9DD}"/>
+              </a:ext>
+            </a:extLst>
+          </p:cNvPr>
+          <p:cNvSpPr txBox="1"/>
+          <p:nvPr/>
+        </p:nvSpPr>
+        <p:spPr>
+          <a:xfrm>
+            <a:off x="3373161" y="5662236"/>
+            <a:ext cx="1546577" cy="646331"/>
+          </a:xfrm>
+          <a:prstGeom prst="rect">
+            <a:avLst/>
+          </a:prstGeom>
+          <a:noFill/>
+        </p:spPr>
+        <p:txBody>
+          <a:bodyPr wrap="none" rtlCol="0">
+            <a:spAutoFit/>
+          </a:bodyPr>
+          <a:lstStyle/>
+          <a:p>
+            <a:r>
+              <a:rPr lang="en-US" dirty="0">
+                <a:solidFill>
+                  <a:srgbClr val="FFC000"/>
+                </a:solidFill>
+              </a:rPr>
+              <a:t>Audio monitor</a:t>
+            </a:r>
+          </a:p>
+          <a:p>
+            <a:r>
+              <a:rPr lang="en-US" dirty="0">
+                <a:solidFill>
+                  <a:srgbClr val="FFC000"/>
+                </a:solidFill>
+              </a:rPr>
+              <a:t>and display</a:t>
+            </a:r>
+          </a:p>
+        </p:txBody>
+      </p:sp>
+      <p:sp>
+        <p:nvSpPr>
+          <p:cNvPr id="25" name="CuadroTexto 24">
+            <a:extLst>
+              <a:ext uri="{FF2B5EF4-FFF2-40B4-BE49-F238E27FC236}">
+                <a16:creationId xmlns:a16="http://schemas.microsoft.com/office/drawing/2014/main" id="{26A9415C-C9E6-4ABD-9FFB-3C754C7C6F3E}"/>
+              </a:ext>
+            </a:extLst>
+          </p:cNvPr>
+          <p:cNvSpPr txBox="1"/>
+          <p:nvPr/>
+        </p:nvSpPr>
+        <p:spPr>
+          <a:xfrm>
+            <a:off x="7473776" y="3350607"/>
+            <a:ext cx="2965877" cy="369332"/>
+          </a:xfrm>
+          <a:prstGeom prst="rect">
+            <a:avLst/>
+          </a:prstGeom>
+          <a:noFill/>
+        </p:spPr>
+        <p:txBody>
+          <a:bodyPr wrap="none" rtlCol="0">
+            <a:spAutoFit/>
+          </a:bodyPr>
+          <a:lstStyle/>
+          <a:p>
+            <a:r>
+              <a:rPr lang="en-US" dirty="0">
+                <a:solidFill>
+                  <a:srgbClr val="92D050"/>
+                </a:solidFill>
+              </a:rPr>
+              <a:t>Unpack, unzip, MP3 &amp; upload</a:t>
+            </a:r>
+          </a:p>
+        </p:txBody>
+      </p:sp>
+      <p:sp>
+        <p:nvSpPr>
+          <p:cNvPr id="26" name="Rectángulo 25">
+            <a:extLst>
+              <a:ext uri="{FF2B5EF4-FFF2-40B4-BE49-F238E27FC236}">
+                <a16:creationId xmlns:a16="http://schemas.microsoft.com/office/drawing/2014/main" id="{150CF1FB-A92B-4578-AF03-2421E3136BC2}"/>
+              </a:ext>
+            </a:extLst>
+          </p:cNvPr>
+          <p:cNvSpPr/>
+          <p:nvPr/>
+        </p:nvSpPr>
+        <p:spPr>
+          <a:xfrm>
+            <a:off x="6422188" y="1592434"/>
+            <a:ext cx="2114640" cy="360000"/>
+          </a:xfrm>
+          <a:prstGeom prst="rect">
+            <a:avLst/>
+          </a:prstGeom>
+          <a:noFill/>
+          <a:ln w="38100">
+            <a:solidFill>
+              <a:srgbClr val="92D050"/>
+            </a:solidFill>
+          </a:ln>
+        </p:spPr>
+        <p:style>
+          <a:lnRef idx="2">
+            <a:schemeClr val="accent1">
+              <a:shade val="50000"/>
+            </a:schemeClr>
+          </a:lnRef>
+          <a:fillRef idx="1">
+            <a:schemeClr val="accent1"/>
+          </a:fillRef>
+          <a:effectRef idx="0">
+            <a:schemeClr val="accent1"/>
+          </a:effectRef>
+          <a:fontRef idx="minor">
+            <a:schemeClr val="lt1"/>
+          </a:fontRef>
+        </p:style>
+        <p:txBody>
+          <a:bodyPr rtlCol="0" anchor="ctr"/>
+          <a:lstStyle/>
+          <a:p>
+            <a:pPr algn="ctr"/>
+            <a:endParaRPr lang="en-US" dirty="0"/>
+          </a:p>
+        </p:txBody>
+      </p:sp>
+      <p:sp>
+        <p:nvSpPr>
+          <p:cNvPr id="27" name="CuadroTexto 26">
+            <a:extLst>
+              <a:ext uri="{FF2B5EF4-FFF2-40B4-BE49-F238E27FC236}">
+                <a16:creationId xmlns:a16="http://schemas.microsoft.com/office/drawing/2014/main" id="{8AC04276-AEE1-4EC8-94F8-4E5893363C1F}"/>
+              </a:ext>
+            </a:extLst>
+          </p:cNvPr>
+          <p:cNvSpPr txBox="1"/>
+          <p:nvPr/>
+        </p:nvSpPr>
+        <p:spPr>
+          <a:xfrm>
+            <a:off x="5454758" y="4531388"/>
+            <a:ext cx="1330672" cy="369332"/>
+          </a:xfrm>
+          <a:prstGeom prst="rect">
+            <a:avLst/>
+          </a:prstGeom>
+          <a:noFill/>
+        </p:spPr>
+        <p:txBody>
+          <a:bodyPr wrap="square" rtlCol="0">
+            <a:spAutoFit/>
+          </a:bodyPr>
+          <a:lstStyle/>
+          <a:p>
+            <a:r>
+              <a:rPr lang="en-US" dirty="0">
+                <a:solidFill>
+                  <a:srgbClr val="FFC000"/>
+                </a:solidFill>
+              </a:rPr>
+              <a:t>Pack &amp; zip</a:t>
+            </a:r>
+          </a:p>
+        </p:txBody>
+      </p:sp>
+      <p:sp>
+        <p:nvSpPr>
+          <p:cNvPr id="28" name="Rectángulo 27">
+            <a:extLst>
+              <a:ext uri="{FF2B5EF4-FFF2-40B4-BE49-F238E27FC236}">
+                <a16:creationId xmlns:a16="http://schemas.microsoft.com/office/drawing/2014/main" id="{65B212F7-909B-4A00-9D01-0006C7F8509A}"/>
+              </a:ext>
+            </a:extLst>
+          </p:cNvPr>
+          <p:cNvSpPr/>
+          <p:nvPr/>
+        </p:nvSpPr>
+        <p:spPr>
+          <a:xfrm>
+            <a:off x="3984898" y="4242110"/>
+            <a:ext cx="1137661" cy="360000"/>
+          </a:xfrm>
+          <a:prstGeom prst="rect">
+            <a:avLst/>
+          </a:prstGeom>
+          <a:noFill/>
+          <a:ln w="38100">
+            <a:solidFill>
+              <a:srgbClr val="FFC000"/>
+            </a:solidFill>
+          </a:ln>
+        </p:spPr>
+        <p:style>
+          <a:lnRef idx="2">
+            <a:schemeClr val="accent1">
+              <a:shade val="50000"/>
+            </a:schemeClr>
+          </a:lnRef>
+          <a:fillRef idx="1">
+            <a:schemeClr val="accent1"/>
+          </a:fillRef>
+          <a:effectRef idx="0">
+            <a:schemeClr val="accent1"/>
+          </a:effectRef>
+          <a:fontRef idx="minor">
+            <a:schemeClr val="lt1"/>
+          </a:fontRef>
+        </p:style>
+        <p:txBody>
+          <a:bodyPr rtlCol="0" anchor="ctr"/>
+          <a:lstStyle/>
+          <a:p>
+            <a:pPr algn="ctr"/>
+            <a:endParaRPr lang="en-US" dirty="0"/>
+          </a:p>
+        </p:txBody>
+      </p:sp>
+      <p:sp>
+        <p:nvSpPr>
+          <p:cNvPr id="29" name="CuadroTexto 28">
+            <a:extLst>
+              <a:ext uri="{FF2B5EF4-FFF2-40B4-BE49-F238E27FC236}">
+                <a16:creationId xmlns:a16="http://schemas.microsoft.com/office/drawing/2014/main" id="{334382DA-254B-4CEF-966A-CD9B06B0EE29}"/>
+              </a:ext>
+            </a:extLst>
+          </p:cNvPr>
+          <p:cNvSpPr txBox="1"/>
+          <p:nvPr/>
+        </p:nvSpPr>
+        <p:spPr>
+          <a:xfrm>
+            <a:off x="4132393" y="4236785"/>
+            <a:ext cx="1330672" cy="369332"/>
+          </a:xfrm>
+          <a:prstGeom prst="rect">
+            <a:avLst/>
+          </a:prstGeom>
+          <a:noFill/>
+        </p:spPr>
+        <p:txBody>
+          <a:bodyPr wrap="square" rtlCol="0">
+            <a:spAutoFit/>
+          </a:bodyPr>
+          <a:lstStyle/>
+          <a:p>
+            <a:r>
+              <a:rPr lang="en-US" dirty="0">
+                <a:solidFill>
+                  <a:srgbClr val="FFC000"/>
+                </a:solidFill>
+              </a:rPr>
+              <a:t>Guider</a:t>
+            </a:r>
+          </a:p>
+        </p:txBody>
+      </p:sp>
+      <p:sp>
+        <p:nvSpPr>
+          <p:cNvPr id="30" name="Rectángulo 29">
+            <a:extLst>
+              <a:ext uri="{FF2B5EF4-FFF2-40B4-BE49-F238E27FC236}">
+                <a16:creationId xmlns:a16="http://schemas.microsoft.com/office/drawing/2014/main" id="{3E3D5320-B0D9-47E1-BAFF-6B2D9A31BEA5}"/>
+              </a:ext>
+            </a:extLst>
+          </p:cNvPr>
+          <p:cNvSpPr/>
+          <p:nvPr/>
+        </p:nvSpPr>
+        <p:spPr>
+          <a:xfrm>
+            <a:off x="6406901" y="5855935"/>
+            <a:ext cx="1601731" cy="360000"/>
+          </a:xfrm>
+          <a:prstGeom prst="rect">
+            <a:avLst/>
+          </a:prstGeom>
+          <a:noFill/>
+          <a:ln w="38100">
+            <a:solidFill>
+              <a:srgbClr val="FFC000"/>
+            </a:solidFill>
+          </a:ln>
+        </p:spPr>
+        <p:style>
+          <a:lnRef idx="2">
+            <a:schemeClr val="accent1">
+              <a:shade val="50000"/>
+            </a:schemeClr>
+          </a:lnRef>
+          <a:fillRef idx="1">
+            <a:schemeClr val="accent1"/>
+          </a:fillRef>
+          <a:effectRef idx="0">
+            <a:schemeClr val="accent1"/>
+          </a:effectRef>
+          <a:fontRef idx="minor">
+            <a:schemeClr val="lt1"/>
+          </a:fontRef>
+        </p:style>
+        <p:txBody>
+          <a:bodyPr rtlCol="0" anchor="ctr"/>
+          <a:lstStyle/>
+          <a:p>
+            <a:pPr algn="ctr"/>
+            <a:endParaRPr lang="en-US" dirty="0"/>
+          </a:p>
+        </p:txBody>
+      </p:sp>
+      <p:sp>
+        <p:nvSpPr>
+          <p:cNvPr id="31" name="CuadroTexto 30">
+            <a:extLst>
+              <a:ext uri="{FF2B5EF4-FFF2-40B4-BE49-F238E27FC236}">
+                <a16:creationId xmlns:a16="http://schemas.microsoft.com/office/drawing/2014/main" id="{E9E7CCEE-DB16-4FF9-8467-7ED66E714C58}"/>
+              </a:ext>
+            </a:extLst>
+          </p:cNvPr>
+          <p:cNvSpPr txBox="1"/>
+          <p:nvPr/>
+        </p:nvSpPr>
+        <p:spPr>
+          <a:xfrm>
+            <a:off x="6406901" y="5854594"/>
+            <a:ext cx="1754894" cy="369332"/>
+          </a:xfrm>
+          <a:prstGeom prst="rect">
+            <a:avLst/>
+          </a:prstGeom>
+          <a:noFill/>
+        </p:spPr>
+        <p:txBody>
+          <a:bodyPr wrap="square" rtlCol="0">
+            <a:spAutoFit/>
+          </a:bodyPr>
+          <a:lstStyle/>
+          <a:p>
+            <a:r>
+              <a:rPr lang="en-US" dirty="0">
+                <a:solidFill>
+                  <a:srgbClr val="FFC000"/>
+                </a:solidFill>
+              </a:rPr>
+              <a:t>Unpack &amp; unzip</a:t>
+            </a:r>
+          </a:p>
+        </p:txBody>
+      </p:sp>
+      <p:cxnSp>
+        <p:nvCxnSpPr>
+          <p:cNvPr id="32" name="Conector recto de flecha 31">
+            <a:extLst>
+              <a:ext uri="{FF2B5EF4-FFF2-40B4-BE49-F238E27FC236}">
+                <a16:creationId xmlns:a16="http://schemas.microsoft.com/office/drawing/2014/main" id="{6324CB91-2397-4281-BA69-706B4E72532F}"/>
+              </a:ext>
+            </a:extLst>
+          </p:cNvPr>
+          <p:cNvCxnSpPr>
+            <a:cxnSpLocks/>
+            <a:stCxn id="28" idx="2"/>
+          </p:cNvCxnSpPr>
+          <p:nvPr/>
+        </p:nvCxnSpPr>
+        <p:spPr>
+          <a:xfrm flipH="1">
+            <a:off x="4303134" y="4602110"/>
+            <a:ext cx="250595" cy="534729"/>
+          </a:xfrm>
+          <a:prstGeom prst="straightConnector1">
+            <a:avLst/>
+          </a:prstGeom>
+          <a:noFill/>
+          <a:ln w="38100">
+            <a:solidFill>
+              <a:srgbClr val="FFC000"/>
+            </a:solidFill>
+            <a:headEnd type="none" w="med" len="med"/>
+            <a:tailEnd type="triangle" w="med" len="med"/>
+          </a:ln>
+        </p:spPr>
+        <p:style>
+          <a:lnRef idx="2">
+            <a:schemeClr val="accent1">
+              <a:shade val="50000"/>
+            </a:schemeClr>
+          </a:lnRef>
+          <a:fillRef idx="1">
+            <a:schemeClr val="accent1"/>
+          </a:fillRef>
+          <a:effectRef idx="0">
+            <a:schemeClr val="accent1"/>
+          </a:effectRef>
+          <a:fontRef idx="minor">
+            <a:schemeClr val="lt1"/>
+          </a:fontRef>
+        </p:style>
+      </p:cxnSp>
+      <p:sp>
+        <p:nvSpPr>
+          <p:cNvPr id="33" name="CuadroTexto 32">
+            <a:extLst>
+              <a:ext uri="{FF2B5EF4-FFF2-40B4-BE49-F238E27FC236}">
+                <a16:creationId xmlns:a16="http://schemas.microsoft.com/office/drawing/2014/main" id="{8BB4AA8D-18EB-4870-8F61-B71D9E897DE1}"/>
+              </a:ext>
+            </a:extLst>
+          </p:cNvPr>
+          <p:cNvSpPr txBox="1"/>
+          <p:nvPr/>
+        </p:nvSpPr>
+        <p:spPr>
+          <a:xfrm>
+            <a:off x="4038581" y="5127507"/>
+            <a:ext cx="389850" cy="369332"/>
+          </a:xfrm>
+          <a:prstGeom prst="rect">
+            <a:avLst/>
+          </a:prstGeom>
+          <a:noFill/>
+        </p:spPr>
+        <p:txBody>
+          <a:bodyPr wrap="none" rtlCol="0">
+            <a:spAutoFit/>
+          </a:bodyPr>
+          <a:lstStyle/>
+          <a:p>
+            <a:r>
+              <a:rPr lang="en-US" dirty="0">
+                <a:solidFill>
+                  <a:srgbClr val="FFC000"/>
+                </a:solidFill>
+              </a:rPr>
+              <a:t>UI</a:t>
+            </a:r>
+          </a:p>
+        </p:txBody>
+      </p:sp>
+      <p:sp>
+        <p:nvSpPr>
+          <p:cNvPr id="34" name="Cilindro 33">
+            <a:extLst>
+              <a:ext uri="{FF2B5EF4-FFF2-40B4-BE49-F238E27FC236}">
+                <a16:creationId xmlns:a16="http://schemas.microsoft.com/office/drawing/2014/main" id="{97BEB287-C1AE-46EC-9D5E-A059ABED356F}"/>
+              </a:ext>
+            </a:extLst>
+          </p:cNvPr>
+          <p:cNvSpPr/>
+          <p:nvPr/>
+        </p:nvSpPr>
+        <p:spPr>
+          <a:xfrm>
+            <a:off x="10218615" y="4193576"/>
+            <a:ext cx="845449" cy="933931"/>
+          </a:xfrm>
+          <a:prstGeom prst="can">
+            <a:avLst/>
+          </a:prstGeom>
+          <a:noFill/>
+          <a:ln w="38100">
+            <a:solidFill>
+              <a:srgbClr val="0070C0"/>
+            </a:solidFill>
+          </a:ln>
+        </p:spPr>
+        <p:style>
+          <a:lnRef idx="2">
+            <a:schemeClr val="accent1">
+              <a:shade val="50000"/>
+            </a:schemeClr>
+          </a:lnRef>
+          <a:fillRef idx="1">
+            <a:schemeClr val="accent1"/>
+          </a:fillRef>
+          <a:effectRef idx="0">
+            <a:schemeClr val="accent1"/>
+          </a:effectRef>
+          <a:fontRef idx="minor">
+            <a:schemeClr val="lt1"/>
+          </a:fontRef>
+        </p:style>
+        <p:txBody>
+          <a:bodyPr rtlCol="0" anchor="ctr"/>
+          <a:lstStyle/>
+          <a:p>
+            <a:pPr algn="ctr"/>
+            <a:endParaRPr lang="en-US"/>
+          </a:p>
+        </p:txBody>
+      </p:sp>
+      <p:cxnSp>
+        <p:nvCxnSpPr>
+          <p:cNvPr id="35" name="Conector recto de flecha 34">
+            <a:extLst>
+              <a:ext uri="{FF2B5EF4-FFF2-40B4-BE49-F238E27FC236}">
+                <a16:creationId xmlns:a16="http://schemas.microsoft.com/office/drawing/2014/main" id="{CA7EFDE0-823A-46AD-A7CB-4499E122BDEF}"/>
+              </a:ext>
+            </a:extLst>
+          </p:cNvPr>
+          <p:cNvCxnSpPr>
+            <a:cxnSpLocks/>
+            <a:stCxn id="25" idx="2"/>
+          </p:cNvCxnSpPr>
+          <p:nvPr/>
+        </p:nvCxnSpPr>
+        <p:spPr>
+          <a:xfrm>
+            <a:off x="8956715" y="3719939"/>
+            <a:ext cx="1261900" cy="675919"/>
+          </a:xfrm>
+          <a:prstGeom prst="straightConnector1">
+            <a:avLst/>
+          </a:prstGeom>
+          <a:noFill/>
+          <a:ln w="38100">
+            <a:solidFill>
+              <a:srgbClr val="92D050"/>
+            </a:solidFill>
+            <a:headEnd type="none" w="med" len="med"/>
+            <a:tailEnd type="triangle" w="med" len="med"/>
+          </a:ln>
+        </p:spPr>
+        <p:style>
+          <a:lnRef idx="2">
+            <a:schemeClr val="accent1">
+              <a:shade val="50000"/>
+            </a:schemeClr>
+          </a:lnRef>
+          <a:fillRef idx="1">
+            <a:schemeClr val="accent1"/>
+          </a:fillRef>
+          <a:effectRef idx="0">
+            <a:schemeClr val="accent1"/>
+          </a:effectRef>
+          <a:fontRef idx="minor">
+            <a:schemeClr val="lt1"/>
+          </a:fontRef>
+        </p:style>
+      </p:cxnSp>
+      <p:sp>
+        <p:nvSpPr>
+          <p:cNvPr id="44" name="Forma libre: forma 43">
+            <a:extLst>
+              <a:ext uri="{FF2B5EF4-FFF2-40B4-BE49-F238E27FC236}">
+                <a16:creationId xmlns:a16="http://schemas.microsoft.com/office/drawing/2014/main" id="{7357E52F-3FD5-4F7C-ADD4-CC3D5AC92708}"/>
+              </a:ext>
+            </a:extLst>
+          </p:cNvPr>
+          <p:cNvSpPr/>
+          <p:nvPr/>
+        </p:nvSpPr>
+        <p:spPr>
+          <a:xfrm>
+            <a:off x="8546654" y="1734780"/>
+            <a:ext cx="1230063" cy="405229"/>
+          </a:xfrm>
+          <a:custGeom>
+            <a:avLst/>
+            <a:gdLst>
+              <a:gd name="connsiteX0" fmla="*/ 0 w 1157572"/>
+              <a:gd name="connsiteY0" fmla="*/ 274022 h 2292393"/>
+              <a:gd name="connsiteX1" fmla="*/ 1014761 w 1157572"/>
+              <a:gd name="connsiteY1" fmla="*/ 173661 h 2292393"/>
+              <a:gd name="connsiteX2" fmla="*/ 1126273 w 1157572"/>
+              <a:gd name="connsiteY2" fmla="*/ 2292393 h 2292393"/>
+              <a:gd name="connsiteX0" fmla="*/ 396 w 1157968"/>
+              <a:gd name="connsiteY0" fmla="*/ 418168 h 2436539"/>
+              <a:gd name="connsiteX1" fmla="*/ 1015157 w 1157968"/>
+              <a:gd name="connsiteY1" fmla="*/ 317807 h 2436539"/>
+              <a:gd name="connsiteX2" fmla="*/ 1126669 w 1157968"/>
+              <a:gd name="connsiteY2" fmla="*/ 2436539 h 2436539"/>
+              <a:gd name="connsiteX0" fmla="*/ 386 w 1180260"/>
+              <a:gd name="connsiteY0" fmla="*/ 428624 h 2424692"/>
+              <a:gd name="connsiteX1" fmla="*/ 1037449 w 1180260"/>
+              <a:gd name="connsiteY1" fmla="*/ 305960 h 2424692"/>
+              <a:gd name="connsiteX2" fmla="*/ 1148961 w 1180260"/>
+              <a:gd name="connsiteY2" fmla="*/ 2424692 h 2424692"/>
+              <a:gd name="connsiteX0" fmla="*/ 391 w 1180265"/>
+              <a:gd name="connsiteY0" fmla="*/ 496314 h 2492382"/>
+              <a:gd name="connsiteX1" fmla="*/ 1037454 w 1180265"/>
+              <a:gd name="connsiteY1" fmla="*/ 373650 h 2492382"/>
+              <a:gd name="connsiteX2" fmla="*/ 1148966 w 1180265"/>
+              <a:gd name="connsiteY2" fmla="*/ 2492382 h 2492382"/>
+              <a:gd name="connsiteX0" fmla="*/ 391 w 1161617"/>
+              <a:gd name="connsiteY0" fmla="*/ 496314 h 2492382"/>
+              <a:gd name="connsiteX1" fmla="*/ 1037454 w 1161617"/>
+              <a:gd name="connsiteY1" fmla="*/ 373650 h 2492382"/>
+              <a:gd name="connsiteX2" fmla="*/ 1148966 w 1161617"/>
+              <a:gd name="connsiteY2" fmla="*/ 2492382 h 2492382"/>
+              <a:gd name="connsiteX0" fmla="*/ 391 w 1155609"/>
+              <a:gd name="connsiteY0" fmla="*/ 496314 h 2693104"/>
+              <a:gd name="connsiteX1" fmla="*/ 1037454 w 1155609"/>
+              <a:gd name="connsiteY1" fmla="*/ 373650 h 2693104"/>
+              <a:gd name="connsiteX2" fmla="*/ 1137815 w 1155609"/>
+              <a:gd name="connsiteY2" fmla="*/ 2693104 h 2693104"/>
+              <a:gd name="connsiteX0" fmla="*/ 391 w 2520566"/>
+              <a:gd name="connsiteY0" fmla="*/ 936549 h 936549"/>
+              <a:gd name="connsiteX1" fmla="*/ 1037454 w 2520566"/>
+              <a:gd name="connsiteY1" fmla="*/ 813885 h 936549"/>
+              <a:gd name="connsiteX2" fmla="*/ 2520566 w 2520566"/>
+              <a:gd name="connsiteY2" fmla="*/ 256324 h 936549"/>
+              <a:gd name="connsiteX0" fmla="*/ 387 w 2520562"/>
+              <a:gd name="connsiteY0" fmla="*/ 1053694 h 1053694"/>
+              <a:gd name="connsiteX1" fmla="*/ 1048601 w 2520562"/>
+              <a:gd name="connsiteY1" fmla="*/ 195050 h 1053694"/>
+              <a:gd name="connsiteX2" fmla="*/ 2520562 w 2520562"/>
+              <a:gd name="connsiteY2" fmla="*/ 373469 h 1053694"/>
+              <a:gd name="connsiteX0" fmla="*/ 702 w 2520877"/>
+              <a:gd name="connsiteY0" fmla="*/ 1055645 h 1055645"/>
+              <a:gd name="connsiteX1" fmla="*/ 1048916 w 2520877"/>
+              <a:gd name="connsiteY1" fmla="*/ 197001 h 1055645"/>
+              <a:gd name="connsiteX2" fmla="*/ 2520877 w 2520877"/>
+              <a:gd name="connsiteY2" fmla="*/ 375420 h 1055645"/>
+              <a:gd name="connsiteX0" fmla="*/ 0 w 2520175"/>
+              <a:gd name="connsiteY0" fmla="*/ 680225 h 680225"/>
+              <a:gd name="connsiteX1" fmla="*/ 2520175 w 2520175"/>
+              <a:gd name="connsiteY1" fmla="*/ 0 h 680225"/>
+              <a:gd name="connsiteX0" fmla="*/ 0 w 2520175"/>
+              <a:gd name="connsiteY0" fmla="*/ 680225 h 680225"/>
+              <a:gd name="connsiteX1" fmla="*/ 2520175 w 2520175"/>
+              <a:gd name="connsiteY1" fmla="*/ 0 h 680225"/>
+              <a:gd name="connsiteX0" fmla="*/ 0 w 2520175"/>
+              <a:gd name="connsiteY0" fmla="*/ 734163 h 734163"/>
+              <a:gd name="connsiteX1" fmla="*/ 2520175 w 2520175"/>
+              <a:gd name="connsiteY1" fmla="*/ 53938 h 734163"/>
+              <a:gd name="connsiteX0" fmla="*/ 0 w 2520175"/>
+              <a:gd name="connsiteY0" fmla="*/ 705227 h 705227"/>
+              <a:gd name="connsiteX1" fmla="*/ 2520175 w 2520175"/>
+              <a:gd name="connsiteY1" fmla="*/ 25002 h 705227"/>
+              <a:gd name="connsiteX0" fmla="*/ 0 w 3477105"/>
+              <a:gd name="connsiteY0" fmla="*/ 542308 h 542308"/>
+              <a:gd name="connsiteX1" fmla="*/ 3477105 w 3477105"/>
+              <a:gd name="connsiteY1" fmla="*/ 191693 h 542308"/>
+              <a:gd name="connsiteX0" fmla="*/ 0 w 3477105"/>
+              <a:gd name="connsiteY0" fmla="*/ 350615 h 350615"/>
+              <a:gd name="connsiteX1" fmla="*/ 3477105 w 3477105"/>
+              <a:gd name="connsiteY1" fmla="*/ 0 h 350615"/>
+              <a:gd name="connsiteX0" fmla="*/ 0 w 4838072"/>
+              <a:gd name="connsiteY0" fmla="*/ 2704 h 2747063"/>
+              <a:gd name="connsiteX1" fmla="*/ 4838072 w 4838072"/>
+              <a:gd name="connsiteY1" fmla="*/ 2746163 h 2747063"/>
+              <a:gd name="connsiteX0" fmla="*/ 0 w 5096432"/>
+              <a:gd name="connsiteY0" fmla="*/ 10021 h 2753480"/>
+              <a:gd name="connsiteX1" fmla="*/ 4838072 w 5096432"/>
+              <a:gd name="connsiteY1" fmla="*/ 2753480 h 2753480"/>
+              <a:gd name="connsiteX0" fmla="*/ 0 w 5563143"/>
+              <a:gd name="connsiteY0" fmla="*/ 74548 h 2818007"/>
+              <a:gd name="connsiteX1" fmla="*/ 4838072 w 5563143"/>
+              <a:gd name="connsiteY1" fmla="*/ 2818007 h 2818007"/>
+              <a:gd name="connsiteX0" fmla="*/ 0 w 5415742"/>
+              <a:gd name="connsiteY0" fmla="*/ 68847 h 2929264"/>
+              <a:gd name="connsiteX1" fmla="*/ 4646686 w 5415742"/>
+              <a:gd name="connsiteY1" fmla="*/ 2929264 h 2929264"/>
+              <a:gd name="connsiteX0" fmla="*/ 0 w 3566359"/>
+              <a:gd name="connsiteY0" fmla="*/ 314443 h 1631526"/>
+              <a:gd name="connsiteX1" fmla="*/ 1542587 w 3566359"/>
+              <a:gd name="connsiteY1" fmla="*/ 1631526 h 1631526"/>
+              <a:gd name="connsiteX0" fmla="*/ 0 w 3404421"/>
+              <a:gd name="connsiteY0" fmla="*/ 51319 h 1368402"/>
+              <a:gd name="connsiteX1" fmla="*/ 1542587 w 3404421"/>
+              <a:gd name="connsiteY1" fmla="*/ 1368402 h 1368402"/>
+              <a:gd name="connsiteX0" fmla="*/ 0 w 2386800"/>
+              <a:gd name="connsiteY0" fmla="*/ 31608 h 1348691"/>
+              <a:gd name="connsiteX1" fmla="*/ 1542587 w 2386800"/>
+              <a:gd name="connsiteY1" fmla="*/ 1348691 h 1348691"/>
+              <a:gd name="connsiteX0" fmla="*/ 0 w 2928480"/>
+              <a:gd name="connsiteY0" fmla="*/ 62602 h 519465"/>
+              <a:gd name="connsiteX1" fmla="*/ 2374404 w 2928480"/>
+              <a:gd name="connsiteY1" fmla="*/ 519465 h 519465"/>
+              <a:gd name="connsiteX0" fmla="*/ 0 w 2374404"/>
+              <a:gd name="connsiteY0" fmla="*/ 105308 h 562171"/>
+              <a:gd name="connsiteX1" fmla="*/ 2374404 w 2374404"/>
+              <a:gd name="connsiteY1" fmla="*/ 562171 h 562171"/>
+              <a:gd name="connsiteX0" fmla="*/ 0 w 2374404"/>
+              <a:gd name="connsiteY0" fmla="*/ 30872 h 487735"/>
+              <a:gd name="connsiteX1" fmla="*/ 2374404 w 2374404"/>
+              <a:gd name="connsiteY1" fmla="*/ 487735 h 487735"/>
+            </a:gdLst>
+            <a:ahLst/>
+            <a:cxnLst>
+              <a:cxn ang="0">
+                <a:pos x="connsiteX0" y="connsiteY0"/>
+              </a:cxn>
+              <a:cxn ang="0">
+                <a:pos x="connsiteX1" y="connsiteY1"/>
+              </a:cxn>
+            </a:cxnLst>
+            <a:rect l="l" t="t" r="r" b="b"/>
+            <a:pathLst>
+              <a:path w="2374404" h="487735">
+                <a:moveTo>
+                  <a:pt x="0" y="30872"/>
+                </a:moveTo>
+                <a:cubicBezTo>
+                  <a:pt x="1695985" y="-62211"/>
+                  <a:pt x="2026562" y="45440"/>
+                  <a:pt x="2374404" y="487735"/>
+                </a:cubicBezTo>
+              </a:path>
+            </a:pathLst>
+          </a:custGeom>
+          <a:noFill/>
+          <a:ln w="38100">
+            <a:solidFill>
+              <a:srgbClr val="92D050"/>
+            </a:solidFill>
+            <a:headEnd type="triangle" w="med" len="med"/>
+            <a:tailEnd type="triangle" w="med" len="med"/>
+          </a:ln>
+        </p:spPr>
+        <p:style>
+          <a:lnRef idx="2">
+            <a:schemeClr val="accent1">
+              <a:shade val="50000"/>
+            </a:schemeClr>
+          </a:lnRef>
+          <a:fillRef idx="1">
+            <a:schemeClr val="accent1"/>
+          </a:fillRef>
+          <a:effectRef idx="0">
+            <a:schemeClr val="accent1"/>
+          </a:effectRef>
+          <a:fontRef idx="minor">
+            <a:schemeClr val="lt1"/>
+          </a:fontRef>
+        </p:style>
+        <p:txBody>
+          <a:bodyPr rtlCol="0" anchor="ctr"/>
+          <a:lstStyle/>
+          <a:p>
+            <a:pPr algn="ctr"/>
+            <a:endParaRPr lang="en-US"/>
+          </a:p>
+        </p:txBody>
+      </p:sp>
+      <p:sp>
+        <p:nvSpPr>
+          <p:cNvPr id="45" name="CuadroTexto 44">
+            <a:extLst>
+              <a:ext uri="{FF2B5EF4-FFF2-40B4-BE49-F238E27FC236}">
+                <a16:creationId xmlns:a16="http://schemas.microsoft.com/office/drawing/2014/main" id="{A950D120-9044-413D-8B24-A5B39515FCF5}"/>
+              </a:ext>
+            </a:extLst>
+          </p:cNvPr>
+          <p:cNvSpPr txBox="1"/>
+          <p:nvPr/>
+        </p:nvSpPr>
+        <p:spPr>
+          <a:xfrm>
+            <a:off x="8402108" y="1905467"/>
+            <a:ext cx="1268874" cy="646331"/>
+          </a:xfrm>
+          <a:prstGeom prst="rect">
+            <a:avLst/>
+          </a:prstGeom>
+          <a:noFill/>
+        </p:spPr>
+        <p:txBody>
+          <a:bodyPr wrap="none" rtlCol="0">
+            <a:spAutoFit/>
+          </a:bodyPr>
+          <a:lstStyle/>
+          <a:p>
+            <a:r>
+              <a:rPr lang="en-US" dirty="0">
+                <a:solidFill>
+                  <a:srgbClr val="92D050"/>
+                </a:solidFill>
+              </a:rPr>
+              <a:t>Fetch guide</a:t>
+            </a:r>
+            <a:br>
+              <a:rPr lang="en-US" dirty="0">
+                <a:solidFill>
+                  <a:srgbClr val="92D050"/>
+                </a:solidFill>
+              </a:rPr>
+            </a:br>
+            <a:r>
+              <a:rPr lang="en-US" dirty="0">
+                <a:solidFill>
+                  <a:srgbClr val="92D050"/>
+                </a:solidFill>
+              </a:rPr>
+              <a:t>cache</a:t>
+            </a:r>
+          </a:p>
+        </p:txBody>
+      </p:sp>
+      <p:sp>
+        <p:nvSpPr>
+          <p:cNvPr id="46" name="Cilindro 45">
+            <a:extLst>
+              <a:ext uri="{FF2B5EF4-FFF2-40B4-BE49-F238E27FC236}">
+                <a16:creationId xmlns:a16="http://schemas.microsoft.com/office/drawing/2014/main" id="{9F1108EA-E88F-4FA4-B5DE-8DFE22289737}"/>
+              </a:ext>
+            </a:extLst>
+          </p:cNvPr>
+          <p:cNvSpPr/>
+          <p:nvPr/>
+        </p:nvSpPr>
+        <p:spPr>
+          <a:xfrm>
+            <a:off x="9485069" y="2157567"/>
+            <a:ext cx="845449" cy="933931"/>
+          </a:xfrm>
+          <a:prstGeom prst="can">
+            <a:avLst/>
+          </a:prstGeom>
+          <a:noFill/>
+          <a:ln w="38100">
+            <a:solidFill>
+              <a:srgbClr val="0070C0"/>
+            </a:solidFill>
+          </a:ln>
+        </p:spPr>
+        <p:style>
+          <a:lnRef idx="2">
+            <a:schemeClr val="accent1">
+              <a:shade val="50000"/>
+            </a:schemeClr>
+          </a:lnRef>
+          <a:fillRef idx="1">
+            <a:schemeClr val="accent1"/>
+          </a:fillRef>
+          <a:effectRef idx="0">
+            <a:schemeClr val="accent1"/>
+          </a:effectRef>
+          <a:fontRef idx="minor">
+            <a:schemeClr val="lt1"/>
+          </a:fontRef>
+        </p:style>
+        <p:txBody>
+          <a:bodyPr rtlCol="0" anchor="ctr"/>
+          <a:lstStyle/>
+          <a:p>
+            <a:pPr algn="ctr"/>
+            <a:endParaRPr lang="en-US"/>
           </a:p>
         </p:txBody>
       </p:sp>
@@ -5709,7 +7947,7 @@
           <a:lstStyle/>
           <a:p>
             <a:pPr algn="ctr"/>
-            <a:endParaRPr lang="en-US"/>
+            <a:endParaRPr lang="en-US" dirty="0"/>
           </a:p>
         </p:txBody>
       </p:sp>
@@ -10288,13 +12526,13 @@
               </a:ext>
             </a:extLst>
           </a:blip>
-          <a:srcRect b="9847"/>
+          <a:srcRect t="331" r="-2" b="9338"/>
           <a:stretch/>
         </p:blipFill>
         <p:spPr>
           <a:xfrm>
-            <a:off x="370668" y="5016372"/>
-            <a:ext cx="2164268" cy="2160000"/>
+            <a:off x="334642" y="5016372"/>
+            <a:ext cx="2160000" cy="2159999"/>
           </a:xfrm>
           <a:prstGeom prst="rect">
             <a:avLst/>
@@ -10323,153 +12561,13 @@
               </a:ext>
             </a:extLst>
           </a:blip>
-          <a:srcRect b="9059"/>
+          <a:srcRect l="198" b="9848"/>
           <a:stretch/>
         </p:blipFill>
         <p:spPr>
           <a:xfrm>
-            <a:off x="334641" y="7321533"/>
-            <a:ext cx="2164268" cy="2178891"/>
-          </a:xfrm>
-          <a:prstGeom prst="rect">
-            <a:avLst/>
-          </a:prstGeom>
-        </p:spPr>
-      </p:pic>
-      <p:pic>
-        <p:nvPicPr>
-          <p:cNvPr id="96" name="Imagen 95" descr="Logotipo&#10;&#10;Descripción generada automáticamente">
-            <a:extLst>
-              <a:ext uri="{FF2B5EF4-FFF2-40B4-BE49-F238E27FC236}">
-                <a16:creationId xmlns:a16="http://schemas.microsoft.com/office/drawing/2014/main" id="{02FC1D2D-07B0-4EF6-BDEB-416B12848FCA}"/>
-              </a:ext>
-            </a:extLst>
-          </p:cNvPr>
-          <p:cNvPicPr>
-            <a:picLocks noChangeAspect="1"/>
-          </p:cNvPicPr>
-          <p:nvPr/>
-        </p:nvPicPr>
-        <p:blipFill rotWithShape="1">
-          <a:blip r:embed="rId4">
-            <a:extLst>
-              <a:ext uri="{28A0092B-C50C-407E-A947-70E740481C1C}">
-                <a14:useLocalDpi xmlns:a14="http://schemas.microsoft.com/office/drawing/2010/main" val="0"/>
-              </a:ext>
-            </a:extLst>
-          </a:blip>
-          <a:srcRect l="4736" r="4261" b="9292"/>
-          <a:stretch/>
-        </p:blipFill>
-        <p:spPr>
-          <a:xfrm>
-            <a:off x="9657063" y="5003077"/>
-            <a:ext cx="2158171" cy="2173295"/>
-          </a:xfrm>
-          <a:prstGeom prst="rect">
-            <a:avLst/>
-          </a:prstGeom>
-        </p:spPr>
-      </p:pic>
-      <p:pic>
-        <p:nvPicPr>
-          <p:cNvPr id="98" name="Imagen 97" descr="Logotipo&#10;&#10;Descripción generada automáticamente">
-            <a:extLst>
-              <a:ext uri="{FF2B5EF4-FFF2-40B4-BE49-F238E27FC236}">
-                <a16:creationId xmlns:a16="http://schemas.microsoft.com/office/drawing/2014/main" id="{47089A84-D73C-4E1C-8F29-F83CD304D1D0}"/>
-              </a:ext>
-            </a:extLst>
-          </p:cNvPr>
-          <p:cNvPicPr>
-            <a:picLocks noChangeAspect="1"/>
-          </p:cNvPicPr>
-          <p:nvPr/>
-        </p:nvPicPr>
-        <p:blipFill rotWithShape="1">
-          <a:blip r:embed="rId5">
-            <a:extLst>
-              <a:ext uri="{28A0092B-C50C-407E-A947-70E740481C1C}">
-                <a14:useLocalDpi xmlns:a14="http://schemas.microsoft.com/office/drawing/2010/main" val="0"/>
-              </a:ext>
-            </a:extLst>
-          </a:blip>
-          <a:srcRect l="4459" r="3810" b="9617"/>
-          <a:stretch/>
-        </p:blipFill>
-        <p:spPr>
-          <a:xfrm>
-            <a:off x="9639807" y="7321532"/>
-            <a:ext cx="2175427" cy="2160000"/>
-          </a:xfrm>
-          <a:prstGeom prst="rect">
-            <a:avLst/>
-          </a:prstGeom>
-        </p:spPr>
-      </p:pic>
-      <p:pic>
-        <p:nvPicPr>
-          <p:cNvPr id="100" name="Imagen 99" descr="Logotipo&#10;&#10;Descripción generada automáticamente">
-            <a:extLst>
-              <a:ext uri="{FF2B5EF4-FFF2-40B4-BE49-F238E27FC236}">
-                <a16:creationId xmlns:a16="http://schemas.microsoft.com/office/drawing/2014/main" id="{985B4A1B-1E82-4D51-A7E0-C3A435044251}"/>
-              </a:ext>
-            </a:extLst>
-          </p:cNvPr>
-          <p:cNvPicPr>
-            <a:picLocks noChangeAspect="1"/>
-          </p:cNvPicPr>
-          <p:nvPr/>
-        </p:nvPicPr>
-        <p:blipFill rotWithShape="1">
-          <a:blip r:embed="rId6">
-            <a:extLst>
-              <a:ext uri="{28A0092B-C50C-407E-A947-70E740481C1C}">
-                <a14:useLocalDpi xmlns:a14="http://schemas.microsoft.com/office/drawing/2010/main" val="0"/>
-              </a:ext>
-            </a:extLst>
-          </a:blip>
-          <a:srcRect b="9292"/>
-          <a:stretch/>
-        </p:blipFill>
-        <p:spPr>
-          <a:xfrm>
-            <a:off x="7344609" y="5019077"/>
-            <a:ext cx="2164268" cy="2173295"/>
-          </a:xfrm>
-          <a:prstGeom prst="rect">
-            <a:avLst/>
-          </a:prstGeom>
-        </p:spPr>
-      </p:pic>
-      <p:pic>
-        <p:nvPicPr>
-          <p:cNvPr id="102" name="Imagen 101" descr="Logotipo&#10;&#10;Descripción generada automáticamente con confianza media">
-            <a:extLst>
-              <a:ext uri="{FF2B5EF4-FFF2-40B4-BE49-F238E27FC236}">
-                <a16:creationId xmlns:a16="http://schemas.microsoft.com/office/drawing/2014/main" id="{578A1975-AE69-4922-B605-2E2B4BD9FF69}"/>
-              </a:ext>
-            </a:extLst>
-          </p:cNvPr>
-          <p:cNvPicPr>
-            <a:picLocks noChangeAspect="1"/>
-          </p:cNvPicPr>
-          <p:nvPr/>
-        </p:nvPicPr>
-        <p:blipFill rotWithShape="1">
-          <a:blip r:embed="rId7">
-            <a:extLst>
-              <a:ext uri="{28A0092B-C50C-407E-A947-70E740481C1C}">
-                <a14:useLocalDpi xmlns:a14="http://schemas.microsoft.com/office/drawing/2010/main" val="0"/>
-              </a:ext>
-            </a:extLst>
-          </a:blip>
-          <a:srcRect b="9061"/>
-          <a:stretch/>
-        </p:blipFill>
-        <p:spPr>
-          <a:xfrm>
-            <a:off x="7350681" y="7321531"/>
-            <a:ext cx="2164268" cy="2173295"/>
+            <a:off x="334642" y="7341686"/>
+            <a:ext cx="2160001" cy="2159999"/>
           </a:xfrm>
           <a:prstGeom prst="rect">
             <a:avLst/>
@@ -10491,20 +12589,20 @@
           <p:nvPr/>
         </p:nvPicPr>
         <p:blipFill rotWithShape="1">
-          <a:blip r:embed="rId8">
+          <a:blip r:embed="rId4">
             <a:extLst>
               <a:ext uri="{28A0092B-C50C-407E-A947-70E740481C1C}">
                 <a14:useLocalDpi xmlns:a14="http://schemas.microsoft.com/office/drawing/2010/main" val="0"/>
               </a:ext>
             </a:extLst>
           </a:blip>
-          <a:srcRect b="9292"/>
+          <a:srcRect l="225" t="52" r="-225" b="9796"/>
           <a:stretch/>
         </p:blipFill>
         <p:spPr>
           <a:xfrm>
-            <a:off x="2681732" y="5003077"/>
-            <a:ext cx="2158171" cy="2173295"/>
+            <a:off x="2681732" y="5016372"/>
+            <a:ext cx="2158171" cy="2160000"/>
           </a:xfrm>
           <a:prstGeom prst="rect">
             <a:avLst/>
@@ -10526,7 +12624,7 @@
           <p:nvPr/>
         </p:nvPicPr>
         <p:blipFill rotWithShape="1">
-          <a:blip r:embed="rId9">
+          <a:blip r:embed="rId5">
             <a:extLst>
               <a:ext uri="{28A0092B-C50C-407E-A947-70E740481C1C}">
                 <a14:useLocalDpi xmlns:a14="http://schemas.microsoft.com/office/drawing/2010/main" val="0"/>
@@ -10538,7 +12636,7 @@
         </p:blipFill>
         <p:spPr>
           <a:xfrm>
-            <a:off x="2689220" y="7321534"/>
+            <a:off x="2681732" y="7344804"/>
             <a:ext cx="2158171" cy="2160000"/>
           </a:xfrm>
           <a:prstGeom prst="rect">
@@ -10548,10 +12646,10 @@
       </p:pic>
       <p:pic>
         <p:nvPicPr>
-          <p:cNvPr id="108" name="Imagen 107" descr="Imagen que contiene Logotipo&#10;&#10;Descripción generada automáticamente">
-            <a:extLst>
-              <a:ext uri="{FF2B5EF4-FFF2-40B4-BE49-F238E27FC236}">
-                <a16:creationId xmlns:a16="http://schemas.microsoft.com/office/drawing/2014/main" id="{6A2D053D-FFA7-4354-903F-AFA659C5A24B}"/>
+          <p:cNvPr id="110" name="Imagen 109" descr="Logotipo&#10;&#10;Descripción generada automáticamente">
+            <a:extLst>
+              <a:ext uri="{FF2B5EF4-FFF2-40B4-BE49-F238E27FC236}">
+                <a16:creationId xmlns:a16="http://schemas.microsoft.com/office/drawing/2014/main" id="{A2C31CAF-7D18-4397-801A-28B2D91F2A53}"/>
               </a:ext>
             </a:extLst>
           </p:cNvPr>
@@ -10561,20 +12659,20 @@
           <p:nvPr/>
         </p:nvPicPr>
         <p:blipFill rotWithShape="1">
-          <a:blip r:embed="rId10">
+          <a:blip r:embed="rId6">
             <a:extLst>
               <a:ext uri="{28A0092B-C50C-407E-A947-70E740481C1C}">
                 <a14:useLocalDpi xmlns:a14="http://schemas.microsoft.com/office/drawing/2010/main" val="0"/>
               </a:ext>
             </a:extLst>
           </a:blip>
-          <a:srcRect b="9292"/>
+          <a:srcRect l="2" r="281" b="9617"/>
           <a:stretch/>
         </p:blipFill>
         <p:spPr>
           <a:xfrm>
-            <a:off x="5013866" y="5019077"/>
-            <a:ext cx="2164268" cy="2173295"/>
+            <a:off x="4991258" y="7341686"/>
+            <a:ext cx="2158171" cy="2159999"/>
           </a:xfrm>
           <a:prstGeom prst="rect">
             <a:avLst/>
@@ -10583,10 +12681,150 @@
       </p:pic>
       <p:pic>
         <p:nvPicPr>
-          <p:cNvPr id="110" name="Imagen 109" descr="Logotipo&#10;&#10;Descripción generada automáticamente">
-            <a:extLst>
-              <a:ext uri="{FF2B5EF4-FFF2-40B4-BE49-F238E27FC236}">
-                <a16:creationId xmlns:a16="http://schemas.microsoft.com/office/drawing/2014/main" id="{A2C31CAF-7D18-4397-801A-28B2D91F2A53}"/>
+          <p:cNvPr id="111" name="Imagen 110" descr="Logotipo&#10;&#10;Descripción generada automáticamente">
+            <a:extLst>
+              <a:ext uri="{FF2B5EF4-FFF2-40B4-BE49-F238E27FC236}">
+                <a16:creationId xmlns:a16="http://schemas.microsoft.com/office/drawing/2014/main" id="{9974FB55-8B3F-46B1-8AC9-1426B3A3D989}"/>
+              </a:ext>
+            </a:extLst>
+          </p:cNvPr>
+          <p:cNvPicPr>
+            <a:picLocks noChangeAspect="1"/>
+          </p:cNvPicPr>
+          <p:nvPr/>
+        </p:nvPicPr>
+        <p:blipFill rotWithShape="1">
+          <a:blip r:embed="rId7">
+            <a:extLst>
+              <a:ext uri="{28A0092B-C50C-407E-A947-70E740481C1C}">
+                <a14:useLocalDpi xmlns:a14="http://schemas.microsoft.com/office/drawing/2010/main" val="0"/>
+              </a:ext>
+            </a:extLst>
+          </a:blip>
+          <a:srcRect l="4885" t="118" r="4112" b="9730"/>
+          <a:stretch/>
+        </p:blipFill>
+        <p:spPr>
+          <a:xfrm>
+            <a:off x="9626125" y="5008460"/>
+            <a:ext cx="2158171" cy="2159999"/>
+          </a:xfrm>
+          <a:prstGeom prst="rect">
+            <a:avLst/>
+          </a:prstGeom>
+        </p:spPr>
+      </p:pic>
+      <p:pic>
+        <p:nvPicPr>
+          <p:cNvPr id="112" name="Imagen 111" descr="Logotipo&#10;&#10;Descripción generada automáticamente">
+            <a:extLst>
+              <a:ext uri="{FF2B5EF4-FFF2-40B4-BE49-F238E27FC236}">
+                <a16:creationId xmlns:a16="http://schemas.microsoft.com/office/drawing/2014/main" id="{2B4806C7-596D-4EDC-890D-3364DEB87E1E}"/>
+              </a:ext>
+            </a:extLst>
+          </p:cNvPr>
+          <p:cNvPicPr>
+            <a:picLocks noChangeAspect="1"/>
+          </p:cNvPicPr>
+          <p:nvPr/>
+        </p:nvPicPr>
+        <p:blipFill rotWithShape="1">
+          <a:blip r:embed="rId8">
+            <a:extLst>
+              <a:ext uri="{28A0092B-C50C-407E-A947-70E740481C1C}">
+                <a14:useLocalDpi xmlns:a14="http://schemas.microsoft.com/office/drawing/2010/main" val="0"/>
+              </a:ext>
+            </a:extLst>
+          </a:blip>
+          <a:srcRect l="4886" r="4110" b="9617"/>
+          <a:stretch/>
+        </p:blipFill>
+        <p:spPr>
+          <a:xfrm>
+            <a:off x="9626125" y="7341685"/>
+            <a:ext cx="2158171" cy="2160000"/>
+          </a:xfrm>
+          <a:prstGeom prst="rect">
+            <a:avLst/>
+          </a:prstGeom>
+        </p:spPr>
+      </p:pic>
+      <p:pic>
+        <p:nvPicPr>
+          <p:cNvPr id="113" name="Imagen 112" descr="Logotipo&#10;&#10;Descripción generada automáticamente">
+            <a:extLst>
+              <a:ext uri="{FF2B5EF4-FFF2-40B4-BE49-F238E27FC236}">
+                <a16:creationId xmlns:a16="http://schemas.microsoft.com/office/drawing/2014/main" id="{19830448-1017-4FA8-909B-BA80ADDA13D6}"/>
+              </a:ext>
+            </a:extLst>
+          </p:cNvPr>
+          <p:cNvPicPr>
+            <a:picLocks noChangeAspect="1"/>
+          </p:cNvPicPr>
+          <p:nvPr/>
+        </p:nvPicPr>
+        <p:blipFill rotWithShape="1">
+          <a:blip r:embed="rId9">
+            <a:extLst>
+              <a:ext uri="{28A0092B-C50C-407E-A947-70E740481C1C}">
+                <a14:useLocalDpi xmlns:a14="http://schemas.microsoft.com/office/drawing/2010/main" val="0"/>
+              </a:ext>
+            </a:extLst>
+          </a:blip>
+          <a:srcRect l="301" r="-20" b="9845"/>
+          <a:stretch/>
+        </p:blipFill>
+        <p:spPr>
+          <a:xfrm>
+            <a:off x="7317666" y="5015109"/>
+            <a:ext cx="2158171" cy="2159999"/>
+          </a:xfrm>
+          <a:prstGeom prst="rect">
+            <a:avLst/>
+          </a:prstGeom>
+        </p:spPr>
+      </p:pic>
+      <p:pic>
+        <p:nvPicPr>
+          <p:cNvPr id="114" name="Imagen 113" descr="Logotipo&#10;&#10;Descripción generada automáticamente con confianza media">
+            <a:extLst>
+              <a:ext uri="{FF2B5EF4-FFF2-40B4-BE49-F238E27FC236}">
+                <a16:creationId xmlns:a16="http://schemas.microsoft.com/office/drawing/2014/main" id="{B5C0B1EE-92A9-448F-BDBA-4F5032473744}"/>
+              </a:ext>
+            </a:extLst>
+          </p:cNvPr>
+          <p:cNvPicPr>
+            <a:picLocks noChangeAspect="1"/>
+          </p:cNvPicPr>
+          <p:nvPr/>
+        </p:nvPicPr>
+        <p:blipFill rotWithShape="1">
+          <a:blip r:embed="rId10">
+            <a:extLst>
+              <a:ext uri="{28A0092B-C50C-407E-A947-70E740481C1C}">
+                <a14:useLocalDpi xmlns:a14="http://schemas.microsoft.com/office/drawing/2010/main" val="0"/>
+              </a:ext>
+            </a:extLst>
+          </a:blip>
+          <a:srcRect l="639" r="-356" b="9617"/>
+          <a:stretch/>
+        </p:blipFill>
+        <p:spPr>
+          <a:xfrm>
+            <a:off x="7314617" y="7341686"/>
+            <a:ext cx="2158171" cy="2159999"/>
+          </a:xfrm>
+          <a:prstGeom prst="rect">
+            <a:avLst/>
+          </a:prstGeom>
+        </p:spPr>
+      </p:pic>
+      <p:pic>
+        <p:nvPicPr>
+          <p:cNvPr id="115" name="Imagen 114" descr="Imagen que contiene Logotipo&#10;&#10;Descripción generada automáticamente">
+            <a:extLst>
+              <a:ext uri="{FF2B5EF4-FFF2-40B4-BE49-F238E27FC236}">
+                <a16:creationId xmlns:a16="http://schemas.microsoft.com/office/drawing/2014/main" id="{C007357F-0303-432A-8F87-B6AADD48814F}"/>
               </a:ext>
             </a:extLst>
           </p:cNvPr>
@@ -10603,13 +12841,13 @@
               </a:ext>
             </a:extLst>
           </a:blip>
-          <a:srcRect b="9061"/>
+          <a:srcRect l="343" r="-146" b="9795"/>
           <a:stretch/>
         </p:blipFill>
         <p:spPr>
           <a:xfrm>
-            <a:off x="5016532" y="7321533"/>
-            <a:ext cx="2164268" cy="2173296"/>
+            <a:off x="4995526" y="5015110"/>
+            <a:ext cx="2160000" cy="2161262"/>
           </a:xfrm>
           <a:prstGeom prst="rect">
             <a:avLst/>
@@ -10774,6 +13012,1452 @@
 </file>
 
 <file path=ppt/slides/slide20.xml><?xml version="1.0" encoding="utf-8"?>
+<p:sld xmlns:a="http://schemas.openxmlformats.org/drawingml/2006/main" xmlns:r="http://schemas.openxmlformats.org/officeDocument/2006/relationships" xmlns:p="http://schemas.openxmlformats.org/presentationml/2006/main">
+  <p:cSld>
+    <p:spTree>
+      <p:nvGrpSpPr>
+        <p:cNvPr id="1" name=""/>
+        <p:cNvGrpSpPr/>
+        <p:nvPr/>
+      </p:nvGrpSpPr>
+      <p:grpSpPr>
+        <a:xfrm>
+          <a:off x="0" y="0"/>
+          <a:ext cx="0" cy="0"/>
+          <a:chOff x="0" y="0"/>
+          <a:chExt cx="0" cy="0"/>
+        </a:xfrm>
+      </p:grpSpPr>
+      <p:sp>
+        <p:nvSpPr>
+          <p:cNvPr id="2" name="Rectángulo 1">
+            <a:extLst>
+              <a:ext uri="{FF2B5EF4-FFF2-40B4-BE49-F238E27FC236}">
+                <a16:creationId xmlns:a16="http://schemas.microsoft.com/office/drawing/2014/main" id="{BC46981A-52C1-4F91-8B20-2B97BD900297}"/>
+              </a:ext>
+            </a:extLst>
+          </p:cNvPr>
+          <p:cNvSpPr/>
+          <p:nvPr/>
+        </p:nvSpPr>
+        <p:spPr>
+          <a:xfrm>
+            <a:off x="2175441" y="0"/>
+            <a:ext cx="7173095" cy="6858000"/>
+          </a:xfrm>
+          <a:prstGeom prst="rect">
+            <a:avLst/>
+          </a:prstGeom>
+          <a:noFill/>
+          <a:ln w="3175">
+            <a:solidFill>
+              <a:schemeClr val="bg1">
+                <a:lumMod val="75000"/>
+                <a:lumOff val="25000"/>
+              </a:schemeClr>
+            </a:solidFill>
+          </a:ln>
+        </p:spPr>
+        <p:style>
+          <a:lnRef idx="2">
+            <a:schemeClr val="accent1">
+              <a:shade val="50000"/>
+            </a:schemeClr>
+          </a:lnRef>
+          <a:fillRef idx="1">
+            <a:schemeClr val="accent1"/>
+          </a:fillRef>
+          <a:effectRef idx="0">
+            <a:schemeClr val="accent1"/>
+          </a:effectRef>
+          <a:fontRef idx="minor">
+            <a:schemeClr val="lt1"/>
+          </a:fontRef>
+        </p:style>
+        <p:txBody>
+          <a:bodyPr rtlCol="0" anchor="ctr"/>
+          <a:lstStyle/>
+          <a:p>
+            <a:pPr algn="ctr"/>
+            <a:endParaRPr lang="en-US"/>
+          </a:p>
+        </p:txBody>
+      </p:sp>
+      <p:pic>
+        <p:nvPicPr>
+          <p:cNvPr id="31" name="Imagen 30" descr="Logotipo&#10;&#10;Descripción generada automáticamente">
+            <a:extLst>
+              <a:ext uri="{FF2B5EF4-FFF2-40B4-BE49-F238E27FC236}">
+                <a16:creationId xmlns:a16="http://schemas.microsoft.com/office/drawing/2014/main" id="{9FFA6C65-AEA2-481F-AC67-BCA9A4FC6998}"/>
+              </a:ext>
+            </a:extLst>
+          </p:cNvPr>
+          <p:cNvPicPr>
+            <a:picLocks noChangeAspect="1"/>
+          </p:cNvPicPr>
+          <p:nvPr/>
+        </p:nvPicPr>
+        <p:blipFill rotWithShape="1">
+          <a:blip r:embed="rId2">
+            <a:extLst>
+              <a:ext uri="{28A0092B-C50C-407E-A947-70E740481C1C}">
+                <a14:useLocalDpi xmlns:a14="http://schemas.microsoft.com/office/drawing/2010/main" val="0"/>
+              </a:ext>
+            </a:extLst>
+          </a:blip>
+          <a:srcRect b="9847"/>
+          <a:stretch/>
+        </p:blipFill>
+        <p:spPr>
+          <a:xfrm>
+            <a:off x="2433610" y="2420190"/>
+            <a:ext cx="2046803" cy="2042766"/>
+          </a:xfrm>
+          <a:prstGeom prst="rect">
+            <a:avLst/>
+          </a:prstGeom>
+        </p:spPr>
+      </p:pic>
+      <p:pic>
+        <p:nvPicPr>
+          <p:cNvPr id="32" name="Imagen 31" descr="Logotipo&#10;&#10;Descripción generada automáticamente">
+            <a:extLst>
+              <a:ext uri="{FF2B5EF4-FFF2-40B4-BE49-F238E27FC236}">
+                <a16:creationId xmlns:a16="http://schemas.microsoft.com/office/drawing/2014/main" id="{0AD9A128-79B3-4A85-8EB6-958B1BF81397}"/>
+              </a:ext>
+            </a:extLst>
+          </p:cNvPr>
+          <p:cNvPicPr>
+            <a:picLocks noChangeAspect="1"/>
+          </p:cNvPicPr>
+          <p:nvPr/>
+        </p:nvPicPr>
+        <p:blipFill rotWithShape="1">
+          <a:blip r:embed="rId3">
+            <a:extLst>
+              <a:ext uri="{28A0092B-C50C-407E-A947-70E740481C1C}">
+                <a14:useLocalDpi xmlns:a14="http://schemas.microsoft.com/office/drawing/2010/main" val="0"/>
+              </a:ext>
+            </a:extLst>
+          </a:blip>
+          <a:srcRect l="4736" r="4261" b="9292"/>
+          <a:stretch/>
+        </p:blipFill>
+        <p:spPr>
+          <a:xfrm>
+            <a:off x="4744354" y="176139"/>
+            <a:ext cx="2041035" cy="2055339"/>
+          </a:xfrm>
+          <a:prstGeom prst="rect">
+            <a:avLst/>
+          </a:prstGeom>
+        </p:spPr>
+      </p:pic>
+      <p:pic>
+        <p:nvPicPr>
+          <p:cNvPr id="33" name="Imagen 32" descr="Logotipo&#10;&#10;Descripción generada automáticamente">
+            <a:extLst>
+              <a:ext uri="{FF2B5EF4-FFF2-40B4-BE49-F238E27FC236}">
+                <a16:creationId xmlns:a16="http://schemas.microsoft.com/office/drawing/2014/main" id="{7BFE0890-3D2D-4EB6-8043-46660C020BBE}"/>
+              </a:ext>
+            </a:extLst>
+          </p:cNvPr>
+          <p:cNvPicPr>
+            <a:picLocks noChangeAspect="1"/>
+          </p:cNvPicPr>
+          <p:nvPr/>
+        </p:nvPicPr>
+        <p:blipFill rotWithShape="1">
+          <a:blip r:embed="rId4">
+            <a:extLst>
+              <a:ext uri="{28A0092B-C50C-407E-A947-70E740481C1C}">
+                <a14:useLocalDpi xmlns:a14="http://schemas.microsoft.com/office/drawing/2010/main" val="0"/>
+              </a:ext>
+            </a:extLst>
+          </a:blip>
+          <a:srcRect b="9292"/>
+          <a:stretch/>
+        </p:blipFill>
+        <p:spPr>
+          <a:xfrm>
+            <a:off x="7043561" y="2407617"/>
+            <a:ext cx="2046802" cy="2055339"/>
+          </a:xfrm>
+          <a:prstGeom prst="rect">
+            <a:avLst/>
+          </a:prstGeom>
+        </p:spPr>
+      </p:pic>
+      <p:pic>
+        <p:nvPicPr>
+          <p:cNvPr id="34" name="Imagen 33" descr="Imagen que contiene dibujo&#10;&#10;Descripción generada automáticamente">
+            <a:extLst>
+              <a:ext uri="{FF2B5EF4-FFF2-40B4-BE49-F238E27FC236}">
+                <a16:creationId xmlns:a16="http://schemas.microsoft.com/office/drawing/2014/main" id="{1F842070-70B5-4619-94A4-AE9E6269363E}"/>
+              </a:ext>
+            </a:extLst>
+          </p:cNvPr>
+          <p:cNvPicPr>
+            <a:picLocks noChangeAspect="1"/>
+          </p:cNvPicPr>
+          <p:nvPr/>
+        </p:nvPicPr>
+        <p:blipFill rotWithShape="1">
+          <a:blip r:embed="rId5">
+            <a:extLst>
+              <a:ext uri="{28A0092B-C50C-407E-A947-70E740481C1C}">
+                <a14:useLocalDpi xmlns:a14="http://schemas.microsoft.com/office/drawing/2010/main" val="0"/>
+              </a:ext>
+            </a:extLst>
+          </a:blip>
+          <a:srcRect b="9292"/>
+          <a:stretch/>
+        </p:blipFill>
+        <p:spPr>
+          <a:xfrm>
+            <a:off x="4744353" y="4639095"/>
+            <a:ext cx="2041035" cy="2055339"/>
+          </a:xfrm>
+          <a:prstGeom prst="rect">
+            <a:avLst/>
+          </a:prstGeom>
+        </p:spPr>
+      </p:pic>
+      <p:pic>
+        <p:nvPicPr>
+          <p:cNvPr id="35" name="Imagen 34" descr="Imagen que contiene Logotipo&#10;&#10;Descripción generada automáticamente">
+            <a:extLst>
+              <a:ext uri="{FF2B5EF4-FFF2-40B4-BE49-F238E27FC236}">
+                <a16:creationId xmlns:a16="http://schemas.microsoft.com/office/drawing/2014/main" id="{2127BAFC-C1CE-4499-8F2B-A91293DC352A}"/>
+              </a:ext>
+            </a:extLst>
+          </p:cNvPr>
+          <p:cNvPicPr>
+            <a:picLocks noChangeAspect="1"/>
+          </p:cNvPicPr>
+          <p:nvPr/>
+        </p:nvPicPr>
+        <p:blipFill rotWithShape="1">
+          <a:blip r:embed="rId6">
+            <a:extLst>
+              <a:ext uri="{28A0092B-C50C-407E-A947-70E740481C1C}">
+                <a14:useLocalDpi xmlns:a14="http://schemas.microsoft.com/office/drawing/2010/main" val="0"/>
+              </a:ext>
+            </a:extLst>
+          </a:blip>
+          <a:srcRect b="9292"/>
+          <a:stretch/>
+        </p:blipFill>
+        <p:spPr>
+          <a:xfrm>
+            <a:off x="4738586" y="2407617"/>
+            <a:ext cx="2046802" cy="2055339"/>
+          </a:xfrm>
+          <a:prstGeom prst="rect">
+            <a:avLst/>
+          </a:prstGeom>
+        </p:spPr>
+      </p:pic>
+    </p:spTree>
+    <p:extLst>
+      <p:ext uri="{BB962C8B-B14F-4D97-AF65-F5344CB8AC3E}">
+        <p14:creationId xmlns:p14="http://schemas.microsoft.com/office/powerpoint/2010/main" val="3982017697"/>
+      </p:ext>
+    </p:extLst>
+  </p:cSld>
+  <p:clrMapOvr>
+    <a:masterClrMapping/>
+  </p:clrMapOvr>
+</p:sld>
+</file>
+
+<file path=ppt/slides/slide21.xml><?xml version="1.0" encoding="utf-8"?>
+<p:sld xmlns:a="http://schemas.openxmlformats.org/drawingml/2006/main" xmlns:r="http://schemas.openxmlformats.org/officeDocument/2006/relationships" xmlns:p="http://schemas.openxmlformats.org/presentationml/2006/main">
+  <p:cSld>
+    <p:spTree>
+      <p:nvGrpSpPr>
+        <p:cNvPr id="1" name=""/>
+        <p:cNvGrpSpPr/>
+        <p:nvPr/>
+      </p:nvGrpSpPr>
+      <p:grpSpPr>
+        <a:xfrm>
+          <a:off x="0" y="0"/>
+          <a:ext cx="0" cy="0"/>
+          <a:chOff x="0" y="0"/>
+          <a:chExt cx="0" cy="0"/>
+        </a:xfrm>
+      </p:grpSpPr>
+      <p:grpSp>
+        <p:nvGrpSpPr>
+          <p:cNvPr id="6" name="Grupo 5">
+            <a:extLst>
+              <a:ext uri="{FF2B5EF4-FFF2-40B4-BE49-F238E27FC236}">
+                <a16:creationId xmlns:a16="http://schemas.microsoft.com/office/drawing/2014/main" id="{3B4C5FD9-4B5D-444B-9D8E-E91BA5077AB0}"/>
+              </a:ext>
+            </a:extLst>
+          </p:cNvPr>
+          <p:cNvGrpSpPr/>
+          <p:nvPr/>
+        </p:nvGrpSpPr>
+        <p:grpSpPr>
+          <a:xfrm>
+            <a:off x="232962" y="103997"/>
+            <a:ext cx="2160000" cy="2160000"/>
+            <a:chOff x="2398646" y="296502"/>
+            <a:chExt cx="2160000" cy="2160000"/>
+          </a:xfrm>
+        </p:grpSpPr>
+        <p:sp>
+          <p:nvSpPr>
+            <p:cNvPr id="3" name="Rectángulo 2">
+              <a:extLst>
+                <a:ext uri="{FF2B5EF4-FFF2-40B4-BE49-F238E27FC236}">
+                  <a16:creationId xmlns:a16="http://schemas.microsoft.com/office/drawing/2014/main" id="{43C7F660-FFA8-4E90-8C3A-0686F14D26C2}"/>
+                </a:ext>
+              </a:extLst>
+            </p:cNvPr>
+            <p:cNvSpPr/>
+            <p:nvPr/>
+          </p:nvSpPr>
+          <p:spPr>
+            <a:xfrm>
+              <a:off x="2398646" y="296502"/>
+              <a:ext cx="2160000" cy="2160000"/>
+            </a:xfrm>
+            <a:prstGeom prst="rect">
+              <a:avLst/>
+            </a:prstGeom>
+            <a:solidFill>
+              <a:schemeClr val="bg1">
+                <a:lumMod val="50000"/>
+                <a:lumOff val="50000"/>
+              </a:schemeClr>
+            </a:solidFill>
+            <a:ln>
+              <a:noFill/>
+            </a:ln>
+          </p:spPr>
+          <p:style>
+            <a:lnRef idx="2">
+              <a:schemeClr val="accent1">
+                <a:shade val="50000"/>
+              </a:schemeClr>
+            </a:lnRef>
+            <a:fillRef idx="1">
+              <a:schemeClr val="accent1"/>
+            </a:fillRef>
+            <a:effectRef idx="0">
+              <a:schemeClr val="accent1"/>
+            </a:effectRef>
+            <a:fontRef idx="minor">
+              <a:schemeClr val="lt1"/>
+            </a:fontRef>
+          </p:style>
+          <p:txBody>
+            <a:bodyPr rtlCol="0" anchor="b" anchorCtr="1"/>
+            <a:lstStyle/>
+            <a:p>
+              <a:pPr algn="ctr"/>
+              <a:r>
+                <a:rPr lang="en-US" sz="3600" b="1" dirty="0"/>
+                <a:t>TRUE</a:t>
+              </a:r>
+            </a:p>
+          </p:txBody>
+        </p:sp>
+        <p:sp>
+          <p:nvSpPr>
+            <p:cNvPr id="5" name="Forma libre: forma 4">
+              <a:extLst>
+                <a:ext uri="{FF2B5EF4-FFF2-40B4-BE49-F238E27FC236}">
+                  <a16:creationId xmlns:a16="http://schemas.microsoft.com/office/drawing/2014/main" id="{EF05EB8E-EC33-469D-BA5C-5BEF5DEC2484}"/>
+                </a:ext>
+              </a:extLst>
+            </p:cNvPr>
+            <p:cNvSpPr/>
+            <p:nvPr/>
+          </p:nvSpPr>
+          <p:spPr>
+            <a:xfrm>
+              <a:off x="2803359" y="493295"/>
+              <a:ext cx="1443788" cy="1198869"/>
+            </a:xfrm>
+            <a:custGeom>
+              <a:avLst/>
+              <a:gdLst>
+                <a:gd name="connsiteX0" fmla="*/ 0 w 1684421"/>
+                <a:gd name="connsiteY0" fmla="*/ 818147 h 1479884"/>
+                <a:gd name="connsiteX1" fmla="*/ 709863 w 1684421"/>
+                <a:gd name="connsiteY1" fmla="*/ 1479884 h 1479884"/>
+                <a:gd name="connsiteX2" fmla="*/ 757989 w 1684421"/>
+                <a:gd name="connsiteY2" fmla="*/ 1371600 h 1479884"/>
+                <a:gd name="connsiteX3" fmla="*/ 806115 w 1684421"/>
+                <a:gd name="connsiteY3" fmla="*/ 1275347 h 1479884"/>
+                <a:gd name="connsiteX4" fmla="*/ 1684421 w 1684421"/>
+                <a:gd name="connsiteY4" fmla="*/ 0 h 1479884"/>
+                <a:gd name="connsiteX5" fmla="*/ 637673 w 1684421"/>
+                <a:gd name="connsiteY5" fmla="*/ 866273 h 1479884"/>
+                <a:gd name="connsiteX6" fmla="*/ 96252 w 1684421"/>
+                <a:gd name="connsiteY6" fmla="*/ 830178 h 1479884"/>
+                <a:gd name="connsiteX0" fmla="*/ 0 w 1684421"/>
+                <a:gd name="connsiteY0" fmla="*/ 818147 h 1515928"/>
+                <a:gd name="connsiteX1" fmla="*/ 709863 w 1684421"/>
+                <a:gd name="connsiteY1" fmla="*/ 1479884 h 1515928"/>
+                <a:gd name="connsiteX2" fmla="*/ 806115 w 1684421"/>
+                <a:gd name="connsiteY2" fmla="*/ 1275347 h 1515928"/>
+                <a:gd name="connsiteX3" fmla="*/ 1684421 w 1684421"/>
+                <a:gd name="connsiteY3" fmla="*/ 0 h 1515928"/>
+                <a:gd name="connsiteX4" fmla="*/ 637673 w 1684421"/>
+                <a:gd name="connsiteY4" fmla="*/ 866273 h 1515928"/>
+                <a:gd name="connsiteX5" fmla="*/ 96252 w 1684421"/>
+                <a:gd name="connsiteY5" fmla="*/ 830178 h 1515928"/>
+                <a:gd name="connsiteX0" fmla="*/ 0 w 1684572"/>
+                <a:gd name="connsiteY0" fmla="*/ 818147 h 1479884"/>
+                <a:gd name="connsiteX1" fmla="*/ 709863 w 1684572"/>
+                <a:gd name="connsiteY1" fmla="*/ 1479884 h 1479884"/>
+                <a:gd name="connsiteX2" fmla="*/ 1684421 w 1684572"/>
+                <a:gd name="connsiteY2" fmla="*/ 0 h 1479884"/>
+                <a:gd name="connsiteX3" fmla="*/ 637673 w 1684572"/>
+                <a:gd name="connsiteY3" fmla="*/ 866273 h 1479884"/>
+                <a:gd name="connsiteX4" fmla="*/ 96252 w 1684572"/>
+                <a:gd name="connsiteY4" fmla="*/ 830178 h 1479884"/>
+                <a:gd name="connsiteX0" fmla="*/ 0 w 1684572"/>
+                <a:gd name="connsiteY0" fmla="*/ 818147 h 1479884"/>
+                <a:gd name="connsiteX1" fmla="*/ 709863 w 1684572"/>
+                <a:gd name="connsiteY1" fmla="*/ 1479884 h 1479884"/>
+                <a:gd name="connsiteX2" fmla="*/ 1684421 w 1684572"/>
+                <a:gd name="connsiteY2" fmla="*/ 0 h 1479884"/>
+                <a:gd name="connsiteX3" fmla="*/ 637673 w 1684572"/>
+                <a:gd name="connsiteY3" fmla="*/ 866273 h 1479884"/>
+                <a:gd name="connsiteX4" fmla="*/ 96252 w 1684572"/>
+                <a:gd name="connsiteY4" fmla="*/ 830178 h 1479884"/>
+                <a:gd name="connsiteX5" fmla="*/ 0 w 1684572"/>
+                <a:gd name="connsiteY5" fmla="*/ 818147 h 1479884"/>
+                <a:gd name="connsiteX0" fmla="*/ 0 w 1684572"/>
+                <a:gd name="connsiteY0" fmla="*/ 818147 h 1479884"/>
+                <a:gd name="connsiteX1" fmla="*/ 709863 w 1684572"/>
+                <a:gd name="connsiteY1" fmla="*/ 1479884 h 1479884"/>
+                <a:gd name="connsiteX2" fmla="*/ 1684421 w 1684572"/>
+                <a:gd name="connsiteY2" fmla="*/ 0 h 1479884"/>
+                <a:gd name="connsiteX3" fmla="*/ 637673 w 1684572"/>
+                <a:gd name="connsiteY3" fmla="*/ 866273 h 1479884"/>
+                <a:gd name="connsiteX4" fmla="*/ 0 w 1684572"/>
+                <a:gd name="connsiteY4" fmla="*/ 818147 h 1479884"/>
+                <a:gd name="connsiteX0" fmla="*/ 0 w 1684572"/>
+                <a:gd name="connsiteY0" fmla="*/ 818147 h 1479884"/>
+                <a:gd name="connsiteX1" fmla="*/ 709863 w 1684572"/>
+                <a:gd name="connsiteY1" fmla="*/ 1479884 h 1479884"/>
+                <a:gd name="connsiteX2" fmla="*/ 1684421 w 1684572"/>
+                <a:gd name="connsiteY2" fmla="*/ 0 h 1479884"/>
+                <a:gd name="connsiteX3" fmla="*/ 745957 w 1684572"/>
+                <a:gd name="connsiteY3" fmla="*/ 1010652 h 1479884"/>
+                <a:gd name="connsiteX4" fmla="*/ 0 w 1684572"/>
+                <a:gd name="connsiteY4" fmla="*/ 818147 h 1479884"/>
+                <a:gd name="connsiteX0" fmla="*/ 0 w 1684572"/>
+                <a:gd name="connsiteY0" fmla="*/ 818147 h 1479884"/>
+                <a:gd name="connsiteX1" fmla="*/ 709863 w 1684572"/>
+                <a:gd name="connsiteY1" fmla="*/ 1479884 h 1479884"/>
+                <a:gd name="connsiteX2" fmla="*/ 1684421 w 1684572"/>
+                <a:gd name="connsiteY2" fmla="*/ 0 h 1479884"/>
+                <a:gd name="connsiteX3" fmla="*/ 661736 w 1684572"/>
+                <a:gd name="connsiteY3" fmla="*/ 986589 h 1479884"/>
+                <a:gd name="connsiteX4" fmla="*/ 0 w 1684572"/>
+                <a:gd name="connsiteY4" fmla="*/ 818147 h 1479884"/>
+                <a:gd name="connsiteX0" fmla="*/ 0 w 1684706"/>
+                <a:gd name="connsiteY0" fmla="*/ 818147 h 1479884"/>
+                <a:gd name="connsiteX1" fmla="*/ 709863 w 1684706"/>
+                <a:gd name="connsiteY1" fmla="*/ 1479884 h 1479884"/>
+                <a:gd name="connsiteX2" fmla="*/ 1684421 w 1684706"/>
+                <a:gd name="connsiteY2" fmla="*/ 0 h 1479884"/>
+                <a:gd name="connsiteX3" fmla="*/ 661736 w 1684706"/>
+                <a:gd name="connsiteY3" fmla="*/ 986589 h 1479884"/>
+                <a:gd name="connsiteX4" fmla="*/ 0 w 1684706"/>
+                <a:gd name="connsiteY4" fmla="*/ 818147 h 1479884"/>
+                <a:gd name="connsiteX0" fmla="*/ 0 w 1684706"/>
+                <a:gd name="connsiteY0" fmla="*/ 818147 h 1479884"/>
+                <a:gd name="connsiteX1" fmla="*/ 709863 w 1684706"/>
+                <a:gd name="connsiteY1" fmla="*/ 1479884 h 1479884"/>
+                <a:gd name="connsiteX2" fmla="*/ 1684421 w 1684706"/>
+                <a:gd name="connsiteY2" fmla="*/ 0 h 1479884"/>
+                <a:gd name="connsiteX3" fmla="*/ 661736 w 1684706"/>
+                <a:gd name="connsiteY3" fmla="*/ 986589 h 1479884"/>
+                <a:gd name="connsiteX4" fmla="*/ 0 w 1684706"/>
+                <a:gd name="connsiteY4" fmla="*/ 818147 h 1479884"/>
+                <a:gd name="connsiteX0" fmla="*/ 0 w 1684706"/>
+                <a:gd name="connsiteY0" fmla="*/ 818147 h 1479884"/>
+                <a:gd name="connsiteX1" fmla="*/ 709863 w 1684706"/>
+                <a:gd name="connsiteY1" fmla="*/ 1479884 h 1479884"/>
+                <a:gd name="connsiteX2" fmla="*/ 1684421 w 1684706"/>
+                <a:gd name="connsiteY2" fmla="*/ 0 h 1479884"/>
+                <a:gd name="connsiteX3" fmla="*/ 661736 w 1684706"/>
+                <a:gd name="connsiteY3" fmla="*/ 986589 h 1479884"/>
+                <a:gd name="connsiteX4" fmla="*/ 0 w 1684706"/>
+                <a:gd name="connsiteY4" fmla="*/ 818147 h 1479884"/>
+                <a:gd name="connsiteX0" fmla="*/ 0 w 1684706"/>
+                <a:gd name="connsiteY0" fmla="*/ 818147 h 1479884"/>
+                <a:gd name="connsiteX1" fmla="*/ 709863 w 1684706"/>
+                <a:gd name="connsiteY1" fmla="*/ 1479884 h 1479884"/>
+                <a:gd name="connsiteX2" fmla="*/ 1684421 w 1684706"/>
+                <a:gd name="connsiteY2" fmla="*/ 0 h 1479884"/>
+                <a:gd name="connsiteX3" fmla="*/ 661736 w 1684706"/>
+                <a:gd name="connsiteY3" fmla="*/ 986589 h 1479884"/>
+                <a:gd name="connsiteX4" fmla="*/ 0 w 1684706"/>
+                <a:gd name="connsiteY4" fmla="*/ 818147 h 1479884"/>
+                <a:gd name="connsiteX0" fmla="*/ 0 w 1684706"/>
+                <a:gd name="connsiteY0" fmla="*/ 818147 h 1479884"/>
+                <a:gd name="connsiteX1" fmla="*/ 709863 w 1684706"/>
+                <a:gd name="connsiteY1" fmla="*/ 1479884 h 1479884"/>
+                <a:gd name="connsiteX2" fmla="*/ 1684421 w 1684706"/>
+                <a:gd name="connsiteY2" fmla="*/ 0 h 1479884"/>
+                <a:gd name="connsiteX3" fmla="*/ 661736 w 1684706"/>
+                <a:gd name="connsiteY3" fmla="*/ 1010652 h 1479884"/>
+                <a:gd name="connsiteX4" fmla="*/ 0 w 1684706"/>
+                <a:gd name="connsiteY4" fmla="*/ 818147 h 1479884"/>
+                <a:gd name="connsiteX0" fmla="*/ 0 w 1684706"/>
+                <a:gd name="connsiteY0" fmla="*/ 818147 h 1479884"/>
+                <a:gd name="connsiteX1" fmla="*/ 709863 w 1684706"/>
+                <a:gd name="connsiteY1" fmla="*/ 1479884 h 1479884"/>
+                <a:gd name="connsiteX2" fmla="*/ 1684421 w 1684706"/>
+                <a:gd name="connsiteY2" fmla="*/ 0 h 1479884"/>
+                <a:gd name="connsiteX3" fmla="*/ 661736 w 1684706"/>
+                <a:gd name="connsiteY3" fmla="*/ 1010652 h 1479884"/>
+                <a:gd name="connsiteX4" fmla="*/ 0 w 1684706"/>
+                <a:gd name="connsiteY4" fmla="*/ 818147 h 1479884"/>
+                <a:gd name="connsiteX0" fmla="*/ 0 w 1684706"/>
+                <a:gd name="connsiteY0" fmla="*/ 818147 h 1479884"/>
+                <a:gd name="connsiteX1" fmla="*/ 709863 w 1684706"/>
+                <a:gd name="connsiteY1" fmla="*/ 1479884 h 1479884"/>
+                <a:gd name="connsiteX2" fmla="*/ 1684421 w 1684706"/>
+                <a:gd name="connsiteY2" fmla="*/ 0 h 1479884"/>
+                <a:gd name="connsiteX3" fmla="*/ 661736 w 1684706"/>
+                <a:gd name="connsiteY3" fmla="*/ 1010652 h 1479884"/>
+                <a:gd name="connsiteX4" fmla="*/ 0 w 1684706"/>
+                <a:gd name="connsiteY4" fmla="*/ 818147 h 1479884"/>
+                <a:gd name="connsiteX0" fmla="*/ 0 w 1684786"/>
+                <a:gd name="connsiteY0" fmla="*/ 818147 h 1540042"/>
+                <a:gd name="connsiteX1" fmla="*/ 794084 w 1684786"/>
+                <a:gd name="connsiteY1" fmla="*/ 1540042 h 1540042"/>
+                <a:gd name="connsiteX2" fmla="*/ 1684421 w 1684786"/>
+                <a:gd name="connsiteY2" fmla="*/ 0 h 1540042"/>
+                <a:gd name="connsiteX3" fmla="*/ 661736 w 1684786"/>
+                <a:gd name="connsiteY3" fmla="*/ 1010652 h 1540042"/>
+                <a:gd name="connsiteX4" fmla="*/ 0 w 1684786"/>
+                <a:gd name="connsiteY4" fmla="*/ 818147 h 1540042"/>
+                <a:gd name="connsiteX0" fmla="*/ 0 w 1684583"/>
+                <a:gd name="connsiteY0" fmla="*/ 818147 h 1540042"/>
+                <a:gd name="connsiteX1" fmla="*/ 794084 w 1684583"/>
+                <a:gd name="connsiteY1" fmla="*/ 1540042 h 1540042"/>
+                <a:gd name="connsiteX2" fmla="*/ 1684421 w 1684583"/>
+                <a:gd name="connsiteY2" fmla="*/ 0 h 1540042"/>
+                <a:gd name="connsiteX3" fmla="*/ 661736 w 1684583"/>
+                <a:gd name="connsiteY3" fmla="*/ 1010652 h 1540042"/>
+                <a:gd name="connsiteX4" fmla="*/ 0 w 1684583"/>
+                <a:gd name="connsiteY4" fmla="*/ 818147 h 1540042"/>
+                <a:gd name="connsiteX0" fmla="*/ 0 w 1684421"/>
+                <a:gd name="connsiteY0" fmla="*/ 818147 h 1540042"/>
+                <a:gd name="connsiteX1" fmla="*/ 794084 w 1684421"/>
+                <a:gd name="connsiteY1" fmla="*/ 1540042 h 1540042"/>
+                <a:gd name="connsiteX2" fmla="*/ 1684421 w 1684421"/>
+                <a:gd name="connsiteY2" fmla="*/ 0 h 1540042"/>
+                <a:gd name="connsiteX3" fmla="*/ 661736 w 1684421"/>
+                <a:gd name="connsiteY3" fmla="*/ 1010652 h 1540042"/>
+                <a:gd name="connsiteX4" fmla="*/ 0 w 1684421"/>
+                <a:gd name="connsiteY4" fmla="*/ 818147 h 1540042"/>
+                <a:gd name="connsiteX0" fmla="*/ 0 w 1684421"/>
+                <a:gd name="connsiteY0" fmla="*/ 818147 h 1540042"/>
+                <a:gd name="connsiteX1" fmla="*/ 794084 w 1684421"/>
+                <a:gd name="connsiteY1" fmla="*/ 1540042 h 1540042"/>
+                <a:gd name="connsiteX2" fmla="*/ 1684421 w 1684421"/>
+                <a:gd name="connsiteY2" fmla="*/ 0 h 1540042"/>
+                <a:gd name="connsiteX3" fmla="*/ 661736 w 1684421"/>
+                <a:gd name="connsiteY3" fmla="*/ 1010652 h 1540042"/>
+                <a:gd name="connsiteX4" fmla="*/ 0 w 1684421"/>
+                <a:gd name="connsiteY4" fmla="*/ 818147 h 1540042"/>
+                <a:gd name="connsiteX0" fmla="*/ 0 w 1684421"/>
+                <a:gd name="connsiteY0" fmla="*/ 818147 h 1540042"/>
+                <a:gd name="connsiteX1" fmla="*/ 794084 w 1684421"/>
+                <a:gd name="connsiteY1" fmla="*/ 1540042 h 1540042"/>
+                <a:gd name="connsiteX2" fmla="*/ 1684421 w 1684421"/>
+                <a:gd name="connsiteY2" fmla="*/ 0 h 1540042"/>
+                <a:gd name="connsiteX3" fmla="*/ 661736 w 1684421"/>
+                <a:gd name="connsiteY3" fmla="*/ 1010652 h 1540042"/>
+                <a:gd name="connsiteX4" fmla="*/ 0 w 1684421"/>
+                <a:gd name="connsiteY4" fmla="*/ 818147 h 1540042"/>
+              </a:gdLst>
+              <a:ahLst/>
+              <a:cxnLst>
+                <a:cxn ang="0">
+                  <a:pos x="connsiteX0" y="connsiteY0"/>
+                </a:cxn>
+                <a:cxn ang="0">
+                  <a:pos x="connsiteX1" y="connsiteY1"/>
+                </a:cxn>
+                <a:cxn ang="0">
+                  <a:pos x="connsiteX2" y="connsiteY2"/>
+                </a:cxn>
+                <a:cxn ang="0">
+                  <a:pos x="connsiteX3" y="connsiteY3"/>
+                </a:cxn>
+                <a:cxn ang="0">
+                  <a:pos x="connsiteX4" y="connsiteY4"/>
+                </a:cxn>
+              </a:cxnLst>
+              <a:rect l="l" t="t" r="r" b="b"/>
+              <a:pathLst>
+                <a:path w="1684421" h="1540042">
+                  <a:moveTo>
+                    <a:pt x="0" y="818147"/>
+                  </a:moveTo>
+                  <a:cubicBezTo>
+                    <a:pt x="344905" y="1086852"/>
+                    <a:pt x="533399" y="1211178"/>
+                    <a:pt x="794084" y="1540042"/>
+                  </a:cubicBezTo>
+                  <a:cubicBezTo>
+                    <a:pt x="1038726" y="958515"/>
+                    <a:pt x="1299411" y="535405"/>
+                    <a:pt x="1684421" y="0"/>
+                  </a:cubicBezTo>
+                  <a:cubicBezTo>
+                    <a:pt x="1343526" y="336884"/>
+                    <a:pt x="990600" y="625642"/>
+                    <a:pt x="661736" y="1010652"/>
+                  </a:cubicBezTo>
+                  <a:cubicBezTo>
+                    <a:pt x="441157" y="894347"/>
+                    <a:pt x="256674" y="838199"/>
+                    <a:pt x="0" y="818147"/>
+                  </a:cubicBezTo>
+                  <a:close/>
+                </a:path>
+              </a:pathLst>
+            </a:custGeom>
+            <a:solidFill>
+              <a:schemeClr val="tx1"/>
+            </a:solidFill>
+            <a:ln w="38100">
+              <a:noFill/>
+            </a:ln>
+          </p:spPr>
+          <p:style>
+            <a:lnRef idx="2">
+              <a:schemeClr val="accent1">
+                <a:shade val="50000"/>
+              </a:schemeClr>
+            </a:lnRef>
+            <a:fillRef idx="1">
+              <a:schemeClr val="accent1"/>
+            </a:fillRef>
+            <a:effectRef idx="0">
+              <a:schemeClr val="accent1"/>
+            </a:effectRef>
+            <a:fontRef idx="minor">
+              <a:schemeClr val="lt1"/>
+            </a:fontRef>
+          </p:style>
+          <p:txBody>
+            <a:bodyPr rtlCol="0" anchor="ctr"/>
+            <a:lstStyle/>
+            <a:p>
+              <a:pPr algn="ctr"/>
+              <a:endParaRPr lang="en-US"/>
+            </a:p>
+          </p:txBody>
+        </p:sp>
+      </p:grpSp>
+      <p:grpSp>
+        <p:nvGrpSpPr>
+          <p:cNvPr id="7" name="Grupo 6">
+            <a:extLst>
+              <a:ext uri="{FF2B5EF4-FFF2-40B4-BE49-F238E27FC236}">
+                <a16:creationId xmlns:a16="http://schemas.microsoft.com/office/drawing/2014/main" id="{416F49B2-1904-4725-910C-18057DDAF11A}"/>
+              </a:ext>
+            </a:extLst>
+          </p:cNvPr>
+          <p:cNvGrpSpPr/>
+          <p:nvPr/>
+        </p:nvGrpSpPr>
+        <p:grpSpPr>
+          <a:xfrm>
+            <a:off x="232962" y="2437690"/>
+            <a:ext cx="2160000" cy="2160000"/>
+            <a:chOff x="2398646" y="296502"/>
+            <a:chExt cx="2160000" cy="2160000"/>
+          </a:xfrm>
+        </p:grpSpPr>
+        <p:sp>
+          <p:nvSpPr>
+            <p:cNvPr id="8" name="Rectángulo 7">
+              <a:extLst>
+                <a:ext uri="{FF2B5EF4-FFF2-40B4-BE49-F238E27FC236}">
+                  <a16:creationId xmlns:a16="http://schemas.microsoft.com/office/drawing/2014/main" id="{C9107001-DE1A-4147-B598-AAEDEC5160BE}"/>
+                </a:ext>
+              </a:extLst>
+            </p:cNvPr>
+            <p:cNvSpPr/>
+            <p:nvPr/>
+          </p:nvSpPr>
+          <p:spPr>
+            <a:xfrm>
+              <a:off x="2398646" y="296502"/>
+              <a:ext cx="2160000" cy="2160000"/>
+            </a:xfrm>
+            <a:prstGeom prst="rect">
+              <a:avLst/>
+            </a:prstGeom>
+            <a:solidFill>
+              <a:srgbClr val="FF0000"/>
+            </a:solidFill>
+            <a:ln>
+              <a:noFill/>
+            </a:ln>
+          </p:spPr>
+          <p:style>
+            <a:lnRef idx="2">
+              <a:schemeClr val="accent1">
+                <a:shade val="50000"/>
+              </a:schemeClr>
+            </a:lnRef>
+            <a:fillRef idx="1">
+              <a:schemeClr val="accent1"/>
+            </a:fillRef>
+            <a:effectRef idx="0">
+              <a:schemeClr val="accent1"/>
+            </a:effectRef>
+            <a:fontRef idx="minor">
+              <a:schemeClr val="lt1"/>
+            </a:fontRef>
+          </p:style>
+          <p:txBody>
+            <a:bodyPr rtlCol="0" anchor="b" anchorCtr="1"/>
+            <a:lstStyle/>
+            <a:p>
+              <a:pPr algn="ctr"/>
+              <a:r>
+                <a:rPr lang="en-US" sz="3600" b="1" dirty="0"/>
+                <a:t>TRUE</a:t>
+              </a:r>
+            </a:p>
+          </p:txBody>
+        </p:sp>
+        <p:sp>
+          <p:nvSpPr>
+            <p:cNvPr id="9" name="Forma libre: forma 8">
+              <a:extLst>
+                <a:ext uri="{FF2B5EF4-FFF2-40B4-BE49-F238E27FC236}">
+                  <a16:creationId xmlns:a16="http://schemas.microsoft.com/office/drawing/2014/main" id="{321BBEA3-D867-4EC1-9E89-8C2A6666E223}"/>
+                </a:ext>
+              </a:extLst>
+            </p:cNvPr>
+            <p:cNvSpPr/>
+            <p:nvPr/>
+          </p:nvSpPr>
+          <p:spPr>
+            <a:xfrm>
+              <a:off x="2803359" y="493295"/>
+              <a:ext cx="1443788" cy="1198869"/>
+            </a:xfrm>
+            <a:custGeom>
+              <a:avLst/>
+              <a:gdLst>
+                <a:gd name="connsiteX0" fmla="*/ 0 w 1684421"/>
+                <a:gd name="connsiteY0" fmla="*/ 818147 h 1479884"/>
+                <a:gd name="connsiteX1" fmla="*/ 709863 w 1684421"/>
+                <a:gd name="connsiteY1" fmla="*/ 1479884 h 1479884"/>
+                <a:gd name="connsiteX2" fmla="*/ 757989 w 1684421"/>
+                <a:gd name="connsiteY2" fmla="*/ 1371600 h 1479884"/>
+                <a:gd name="connsiteX3" fmla="*/ 806115 w 1684421"/>
+                <a:gd name="connsiteY3" fmla="*/ 1275347 h 1479884"/>
+                <a:gd name="connsiteX4" fmla="*/ 1684421 w 1684421"/>
+                <a:gd name="connsiteY4" fmla="*/ 0 h 1479884"/>
+                <a:gd name="connsiteX5" fmla="*/ 637673 w 1684421"/>
+                <a:gd name="connsiteY5" fmla="*/ 866273 h 1479884"/>
+                <a:gd name="connsiteX6" fmla="*/ 96252 w 1684421"/>
+                <a:gd name="connsiteY6" fmla="*/ 830178 h 1479884"/>
+                <a:gd name="connsiteX0" fmla="*/ 0 w 1684421"/>
+                <a:gd name="connsiteY0" fmla="*/ 818147 h 1515928"/>
+                <a:gd name="connsiteX1" fmla="*/ 709863 w 1684421"/>
+                <a:gd name="connsiteY1" fmla="*/ 1479884 h 1515928"/>
+                <a:gd name="connsiteX2" fmla="*/ 806115 w 1684421"/>
+                <a:gd name="connsiteY2" fmla="*/ 1275347 h 1515928"/>
+                <a:gd name="connsiteX3" fmla="*/ 1684421 w 1684421"/>
+                <a:gd name="connsiteY3" fmla="*/ 0 h 1515928"/>
+                <a:gd name="connsiteX4" fmla="*/ 637673 w 1684421"/>
+                <a:gd name="connsiteY4" fmla="*/ 866273 h 1515928"/>
+                <a:gd name="connsiteX5" fmla="*/ 96252 w 1684421"/>
+                <a:gd name="connsiteY5" fmla="*/ 830178 h 1515928"/>
+                <a:gd name="connsiteX0" fmla="*/ 0 w 1684572"/>
+                <a:gd name="connsiteY0" fmla="*/ 818147 h 1479884"/>
+                <a:gd name="connsiteX1" fmla="*/ 709863 w 1684572"/>
+                <a:gd name="connsiteY1" fmla="*/ 1479884 h 1479884"/>
+                <a:gd name="connsiteX2" fmla="*/ 1684421 w 1684572"/>
+                <a:gd name="connsiteY2" fmla="*/ 0 h 1479884"/>
+                <a:gd name="connsiteX3" fmla="*/ 637673 w 1684572"/>
+                <a:gd name="connsiteY3" fmla="*/ 866273 h 1479884"/>
+                <a:gd name="connsiteX4" fmla="*/ 96252 w 1684572"/>
+                <a:gd name="connsiteY4" fmla="*/ 830178 h 1479884"/>
+                <a:gd name="connsiteX0" fmla="*/ 0 w 1684572"/>
+                <a:gd name="connsiteY0" fmla="*/ 818147 h 1479884"/>
+                <a:gd name="connsiteX1" fmla="*/ 709863 w 1684572"/>
+                <a:gd name="connsiteY1" fmla="*/ 1479884 h 1479884"/>
+                <a:gd name="connsiteX2" fmla="*/ 1684421 w 1684572"/>
+                <a:gd name="connsiteY2" fmla="*/ 0 h 1479884"/>
+                <a:gd name="connsiteX3" fmla="*/ 637673 w 1684572"/>
+                <a:gd name="connsiteY3" fmla="*/ 866273 h 1479884"/>
+                <a:gd name="connsiteX4" fmla="*/ 96252 w 1684572"/>
+                <a:gd name="connsiteY4" fmla="*/ 830178 h 1479884"/>
+                <a:gd name="connsiteX5" fmla="*/ 0 w 1684572"/>
+                <a:gd name="connsiteY5" fmla="*/ 818147 h 1479884"/>
+                <a:gd name="connsiteX0" fmla="*/ 0 w 1684572"/>
+                <a:gd name="connsiteY0" fmla="*/ 818147 h 1479884"/>
+                <a:gd name="connsiteX1" fmla="*/ 709863 w 1684572"/>
+                <a:gd name="connsiteY1" fmla="*/ 1479884 h 1479884"/>
+                <a:gd name="connsiteX2" fmla="*/ 1684421 w 1684572"/>
+                <a:gd name="connsiteY2" fmla="*/ 0 h 1479884"/>
+                <a:gd name="connsiteX3" fmla="*/ 637673 w 1684572"/>
+                <a:gd name="connsiteY3" fmla="*/ 866273 h 1479884"/>
+                <a:gd name="connsiteX4" fmla="*/ 0 w 1684572"/>
+                <a:gd name="connsiteY4" fmla="*/ 818147 h 1479884"/>
+                <a:gd name="connsiteX0" fmla="*/ 0 w 1684572"/>
+                <a:gd name="connsiteY0" fmla="*/ 818147 h 1479884"/>
+                <a:gd name="connsiteX1" fmla="*/ 709863 w 1684572"/>
+                <a:gd name="connsiteY1" fmla="*/ 1479884 h 1479884"/>
+                <a:gd name="connsiteX2" fmla="*/ 1684421 w 1684572"/>
+                <a:gd name="connsiteY2" fmla="*/ 0 h 1479884"/>
+                <a:gd name="connsiteX3" fmla="*/ 745957 w 1684572"/>
+                <a:gd name="connsiteY3" fmla="*/ 1010652 h 1479884"/>
+                <a:gd name="connsiteX4" fmla="*/ 0 w 1684572"/>
+                <a:gd name="connsiteY4" fmla="*/ 818147 h 1479884"/>
+                <a:gd name="connsiteX0" fmla="*/ 0 w 1684572"/>
+                <a:gd name="connsiteY0" fmla="*/ 818147 h 1479884"/>
+                <a:gd name="connsiteX1" fmla="*/ 709863 w 1684572"/>
+                <a:gd name="connsiteY1" fmla="*/ 1479884 h 1479884"/>
+                <a:gd name="connsiteX2" fmla="*/ 1684421 w 1684572"/>
+                <a:gd name="connsiteY2" fmla="*/ 0 h 1479884"/>
+                <a:gd name="connsiteX3" fmla="*/ 661736 w 1684572"/>
+                <a:gd name="connsiteY3" fmla="*/ 986589 h 1479884"/>
+                <a:gd name="connsiteX4" fmla="*/ 0 w 1684572"/>
+                <a:gd name="connsiteY4" fmla="*/ 818147 h 1479884"/>
+                <a:gd name="connsiteX0" fmla="*/ 0 w 1684706"/>
+                <a:gd name="connsiteY0" fmla="*/ 818147 h 1479884"/>
+                <a:gd name="connsiteX1" fmla="*/ 709863 w 1684706"/>
+                <a:gd name="connsiteY1" fmla="*/ 1479884 h 1479884"/>
+                <a:gd name="connsiteX2" fmla="*/ 1684421 w 1684706"/>
+                <a:gd name="connsiteY2" fmla="*/ 0 h 1479884"/>
+                <a:gd name="connsiteX3" fmla="*/ 661736 w 1684706"/>
+                <a:gd name="connsiteY3" fmla="*/ 986589 h 1479884"/>
+                <a:gd name="connsiteX4" fmla="*/ 0 w 1684706"/>
+                <a:gd name="connsiteY4" fmla="*/ 818147 h 1479884"/>
+                <a:gd name="connsiteX0" fmla="*/ 0 w 1684706"/>
+                <a:gd name="connsiteY0" fmla="*/ 818147 h 1479884"/>
+                <a:gd name="connsiteX1" fmla="*/ 709863 w 1684706"/>
+                <a:gd name="connsiteY1" fmla="*/ 1479884 h 1479884"/>
+                <a:gd name="connsiteX2" fmla="*/ 1684421 w 1684706"/>
+                <a:gd name="connsiteY2" fmla="*/ 0 h 1479884"/>
+                <a:gd name="connsiteX3" fmla="*/ 661736 w 1684706"/>
+                <a:gd name="connsiteY3" fmla="*/ 986589 h 1479884"/>
+                <a:gd name="connsiteX4" fmla="*/ 0 w 1684706"/>
+                <a:gd name="connsiteY4" fmla="*/ 818147 h 1479884"/>
+                <a:gd name="connsiteX0" fmla="*/ 0 w 1684706"/>
+                <a:gd name="connsiteY0" fmla="*/ 818147 h 1479884"/>
+                <a:gd name="connsiteX1" fmla="*/ 709863 w 1684706"/>
+                <a:gd name="connsiteY1" fmla="*/ 1479884 h 1479884"/>
+                <a:gd name="connsiteX2" fmla="*/ 1684421 w 1684706"/>
+                <a:gd name="connsiteY2" fmla="*/ 0 h 1479884"/>
+                <a:gd name="connsiteX3" fmla="*/ 661736 w 1684706"/>
+                <a:gd name="connsiteY3" fmla="*/ 986589 h 1479884"/>
+                <a:gd name="connsiteX4" fmla="*/ 0 w 1684706"/>
+                <a:gd name="connsiteY4" fmla="*/ 818147 h 1479884"/>
+                <a:gd name="connsiteX0" fmla="*/ 0 w 1684706"/>
+                <a:gd name="connsiteY0" fmla="*/ 818147 h 1479884"/>
+                <a:gd name="connsiteX1" fmla="*/ 709863 w 1684706"/>
+                <a:gd name="connsiteY1" fmla="*/ 1479884 h 1479884"/>
+                <a:gd name="connsiteX2" fmla="*/ 1684421 w 1684706"/>
+                <a:gd name="connsiteY2" fmla="*/ 0 h 1479884"/>
+                <a:gd name="connsiteX3" fmla="*/ 661736 w 1684706"/>
+                <a:gd name="connsiteY3" fmla="*/ 986589 h 1479884"/>
+                <a:gd name="connsiteX4" fmla="*/ 0 w 1684706"/>
+                <a:gd name="connsiteY4" fmla="*/ 818147 h 1479884"/>
+                <a:gd name="connsiteX0" fmla="*/ 0 w 1684706"/>
+                <a:gd name="connsiteY0" fmla="*/ 818147 h 1479884"/>
+                <a:gd name="connsiteX1" fmla="*/ 709863 w 1684706"/>
+                <a:gd name="connsiteY1" fmla="*/ 1479884 h 1479884"/>
+                <a:gd name="connsiteX2" fmla="*/ 1684421 w 1684706"/>
+                <a:gd name="connsiteY2" fmla="*/ 0 h 1479884"/>
+                <a:gd name="connsiteX3" fmla="*/ 661736 w 1684706"/>
+                <a:gd name="connsiteY3" fmla="*/ 1010652 h 1479884"/>
+                <a:gd name="connsiteX4" fmla="*/ 0 w 1684706"/>
+                <a:gd name="connsiteY4" fmla="*/ 818147 h 1479884"/>
+                <a:gd name="connsiteX0" fmla="*/ 0 w 1684706"/>
+                <a:gd name="connsiteY0" fmla="*/ 818147 h 1479884"/>
+                <a:gd name="connsiteX1" fmla="*/ 709863 w 1684706"/>
+                <a:gd name="connsiteY1" fmla="*/ 1479884 h 1479884"/>
+                <a:gd name="connsiteX2" fmla="*/ 1684421 w 1684706"/>
+                <a:gd name="connsiteY2" fmla="*/ 0 h 1479884"/>
+                <a:gd name="connsiteX3" fmla="*/ 661736 w 1684706"/>
+                <a:gd name="connsiteY3" fmla="*/ 1010652 h 1479884"/>
+                <a:gd name="connsiteX4" fmla="*/ 0 w 1684706"/>
+                <a:gd name="connsiteY4" fmla="*/ 818147 h 1479884"/>
+                <a:gd name="connsiteX0" fmla="*/ 0 w 1684706"/>
+                <a:gd name="connsiteY0" fmla="*/ 818147 h 1479884"/>
+                <a:gd name="connsiteX1" fmla="*/ 709863 w 1684706"/>
+                <a:gd name="connsiteY1" fmla="*/ 1479884 h 1479884"/>
+                <a:gd name="connsiteX2" fmla="*/ 1684421 w 1684706"/>
+                <a:gd name="connsiteY2" fmla="*/ 0 h 1479884"/>
+                <a:gd name="connsiteX3" fmla="*/ 661736 w 1684706"/>
+                <a:gd name="connsiteY3" fmla="*/ 1010652 h 1479884"/>
+                <a:gd name="connsiteX4" fmla="*/ 0 w 1684706"/>
+                <a:gd name="connsiteY4" fmla="*/ 818147 h 1479884"/>
+                <a:gd name="connsiteX0" fmla="*/ 0 w 1684786"/>
+                <a:gd name="connsiteY0" fmla="*/ 818147 h 1540042"/>
+                <a:gd name="connsiteX1" fmla="*/ 794084 w 1684786"/>
+                <a:gd name="connsiteY1" fmla="*/ 1540042 h 1540042"/>
+                <a:gd name="connsiteX2" fmla="*/ 1684421 w 1684786"/>
+                <a:gd name="connsiteY2" fmla="*/ 0 h 1540042"/>
+                <a:gd name="connsiteX3" fmla="*/ 661736 w 1684786"/>
+                <a:gd name="connsiteY3" fmla="*/ 1010652 h 1540042"/>
+                <a:gd name="connsiteX4" fmla="*/ 0 w 1684786"/>
+                <a:gd name="connsiteY4" fmla="*/ 818147 h 1540042"/>
+                <a:gd name="connsiteX0" fmla="*/ 0 w 1684583"/>
+                <a:gd name="connsiteY0" fmla="*/ 818147 h 1540042"/>
+                <a:gd name="connsiteX1" fmla="*/ 794084 w 1684583"/>
+                <a:gd name="connsiteY1" fmla="*/ 1540042 h 1540042"/>
+                <a:gd name="connsiteX2" fmla="*/ 1684421 w 1684583"/>
+                <a:gd name="connsiteY2" fmla="*/ 0 h 1540042"/>
+                <a:gd name="connsiteX3" fmla="*/ 661736 w 1684583"/>
+                <a:gd name="connsiteY3" fmla="*/ 1010652 h 1540042"/>
+                <a:gd name="connsiteX4" fmla="*/ 0 w 1684583"/>
+                <a:gd name="connsiteY4" fmla="*/ 818147 h 1540042"/>
+                <a:gd name="connsiteX0" fmla="*/ 0 w 1684421"/>
+                <a:gd name="connsiteY0" fmla="*/ 818147 h 1540042"/>
+                <a:gd name="connsiteX1" fmla="*/ 794084 w 1684421"/>
+                <a:gd name="connsiteY1" fmla="*/ 1540042 h 1540042"/>
+                <a:gd name="connsiteX2" fmla="*/ 1684421 w 1684421"/>
+                <a:gd name="connsiteY2" fmla="*/ 0 h 1540042"/>
+                <a:gd name="connsiteX3" fmla="*/ 661736 w 1684421"/>
+                <a:gd name="connsiteY3" fmla="*/ 1010652 h 1540042"/>
+                <a:gd name="connsiteX4" fmla="*/ 0 w 1684421"/>
+                <a:gd name="connsiteY4" fmla="*/ 818147 h 1540042"/>
+                <a:gd name="connsiteX0" fmla="*/ 0 w 1684421"/>
+                <a:gd name="connsiteY0" fmla="*/ 818147 h 1540042"/>
+                <a:gd name="connsiteX1" fmla="*/ 794084 w 1684421"/>
+                <a:gd name="connsiteY1" fmla="*/ 1540042 h 1540042"/>
+                <a:gd name="connsiteX2" fmla="*/ 1684421 w 1684421"/>
+                <a:gd name="connsiteY2" fmla="*/ 0 h 1540042"/>
+                <a:gd name="connsiteX3" fmla="*/ 661736 w 1684421"/>
+                <a:gd name="connsiteY3" fmla="*/ 1010652 h 1540042"/>
+                <a:gd name="connsiteX4" fmla="*/ 0 w 1684421"/>
+                <a:gd name="connsiteY4" fmla="*/ 818147 h 1540042"/>
+                <a:gd name="connsiteX0" fmla="*/ 0 w 1684421"/>
+                <a:gd name="connsiteY0" fmla="*/ 818147 h 1540042"/>
+                <a:gd name="connsiteX1" fmla="*/ 794084 w 1684421"/>
+                <a:gd name="connsiteY1" fmla="*/ 1540042 h 1540042"/>
+                <a:gd name="connsiteX2" fmla="*/ 1684421 w 1684421"/>
+                <a:gd name="connsiteY2" fmla="*/ 0 h 1540042"/>
+                <a:gd name="connsiteX3" fmla="*/ 661736 w 1684421"/>
+                <a:gd name="connsiteY3" fmla="*/ 1010652 h 1540042"/>
+                <a:gd name="connsiteX4" fmla="*/ 0 w 1684421"/>
+                <a:gd name="connsiteY4" fmla="*/ 818147 h 1540042"/>
+              </a:gdLst>
+              <a:ahLst/>
+              <a:cxnLst>
+                <a:cxn ang="0">
+                  <a:pos x="connsiteX0" y="connsiteY0"/>
+                </a:cxn>
+                <a:cxn ang="0">
+                  <a:pos x="connsiteX1" y="connsiteY1"/>
+                </a:cxn>
+                <a:cxn ang="0">
+                  <a:pos x="connsiteX2" y="connsiteY2"/>
+                </a:cxn>
+                <a:cxn ang="0">
+                  <a:pos x="connsiteX3" y="connsiteY3"/>
+                </a:cxn>
+                <a:cxn ang="0">
+                  <a:pos x="connsiteX4" y="connsiteY4"/>
+                </a:cxn>
+              </a:cxnLst>
+              <a:rect l="l" t="t" r="r" b="b"/>
+              <a:pathLst>
+                <a:path w="1684421" h="1540042">
+                  <a:moveTo>
+                    <a:pt x="0" y="818147"/>
+                  </a:moveTo>
+                  <a:cubicBezTo>
+                    <a:pt x="344905" y="1086852"/>
+                    <a:pt x="533399" y="1211178"/>
+                    <a:pt x="794084" y="1540042"/>
+                  </a:cubicBezTo>
+                  <a:cubicBezTo>
+                    <a:pt x="1038726" y="958515"/>
+                    <a:pt x="1299411" y="535405"/>
+                    <a:pt x="1684421" y="0"/>
+                  </a:cubicBezTo>
+                  <a:cubicBezTo>
+                    <a:pt x="1343526" y="336884"/>
+                    <a:pt x="990600" y="625642"/>
+                    <a:pt x="661736" y="1010652"/>
+                  </a:cubicBezTo>
+                  <a:cubicBezTo>
+                    <a:pt x="441157" y="894347"/>
+                    <a:pt x="256674" y="838199"/>
+                    <a:pt x="0" y="818147"/>
+                  </a:cubicBezTo>
+                  <a:close/>
+                </a:path>
+              </a:pathLst>
+            </a:custGeom>
+            <a:solidFill>
+              <a:schemeClr val="tx1"/>
+            </a:solidFill>
+            <a:ln w="38100">
+              <a:noFill/>
+            </a:ln>
+          </p:spPr>
+          <p:style>
+            <a:lnRef idx="2">
+              <a:schemeClr val="accent1">
+                <a:shade val="50000"/>
+              </a:schemeClr>
+            </a:lnRef>
+            <a:fillRef idx="1">
+              <a:schemeClr val="accent1"/>
+            </a:fillRef>
+            <a:effectRef idx="0">
+              <a:schemeClr val="accent1"/>
+            </a:effectRef>
+            <a:fontRef idx="minor">
+              <a:schemeClr val="lt1"/>
+            </a:fontRef>
+          </p:style>
+          <p:txBody>
+            <a:bodyPr rtlCol="0" anchor="ctr"/>
+            <a:lstStyle/>
+            <a:p>
+              <a:pPr algn="ctr"/>
+              <a:endParaRPr lang="en-US"/>
+            </a:p>
+          </p:txBody>
+        </p:sp>
+      </p:grpSp>
+      <p:grpSp>
+        <p:nvGrpSpPr>
+          <p:cNvPr id="22" name="Grupo 21">
+            <a:extLst>
+              <a:ext uri="{FF2B5EF4-FFF2-40B4-BE49-F238E27FC236}">
+                <a16:creationId xmlns:a16="http://schemas.microsoft.com/office/drawing/2014/main" id="{BA967269-E34F-4134-B28D-9E724B565BBC}"/>
+              </a:ext>
+            </a:extLst>
+          </p:cNvPr>
+          <p:cNvGrpSpPr/>
+          <p:nvPr/>
+        </p:nvGrpSpPr>
+        <p:grpSpPr>
+          <a:xfrm>
+            <a:off x="2659330" y="103997"/>
+            <a:ext cx="2160000" cy="2160000"/>
+            <a:chOff x="4825014" y="296502"/>
+            <a:chExt cx="2160000" cy="2160000"/>
+          </a:xfrm>
+        </p:grpSpPr>
+        <p:sp>
+          <p:nvSpPr>
+            <p:cNvPr id="11" name="Rectángulo 10">
+              <a:extLst>
+                <a:ext uri="{FF2B5EF4-FFF2-40B4-BE49-F238E27FC236}">
+                  <a16:creationId xmlns:a16="http://schemas.microsoft.com/office/drawing/2014/main" id="{D6794AB5-F247-4E0F-856B-63A986EB5F60}"/>
+                </a:ext>
+              </a:extLst>
+            </p:cNvPr>
+            <p:cNvSpPr/>
+            <p:nvPr/>
+          </p:nvSpPr>
+          <p:spPr>
+            <a:xfrm>
+              <a:off x="4825014" y="296502"/>
+              <a:ext cx="2160000" cy="2160000"/>
+            </a:xfrm>
+            <a:prstGeom prst="rect">
+              <a:avLst/>
+            </a:prstGeom>
+            <a:solidFill>
+              <a:schemeClr val="bg1">
+                <a:lumMod val="50000"/>
+                <a:lumOff val="50000"/>
+              </a:schemeClr>
+            </a:solidFill>
+            <a:ln>
+              <a:noFill/>
+            </a:ln>
+          </p:spPr>
+          <p:style>
+            <a:lnRef idx="2">
+              <a:schemeClr val="accent1">
+                <a:shade val="50000"/>
+              </a:schemeClr>
+            </a:lnRef>
+            <a:fillRef idx="1">
+              <a:schemeClr val="accent1"/>
+            </a:fillRef>
+            <a:effectRef idx="0">
+              <a:schemeClr val="accent1"/>
+            </a:effectRef>
+            <a:fontRef idx="minor">
+              <a:schemeClr val="lt1"/>
+            </a:fontRef>
+          </p:style>
+          <p:txBody>
+            <a:bodyPr rtlCol="0" anchor="b" anchorCtr="1"/>
+            <a:lstStyle/>
+            <a:p>
+              <a:pPr algn="ctr"/>
+              <a:r>
+                <a:rPr lang="en-US" sz="3600" b="1" dirty="0"/>
+                <a:t>FALSE</a:t>
+              </a:r>
+            </a:p>
+          </p:txBody>
+        </p:sp>
+        <p:sp>
+          <p:nvSpPr>
+            <p:cNvPr id="18" name="Cruz 17">
+              <a:extLst>
+                <a:ext uri="{FF2B5EF4-FFF2-40B4-BE49-F238E27FC236}">
+                  <a16:creationId xmlns:a16="http://schemas.microsoft.com/office/drawing/2014/main" id="{1CCF539F-DDEC-4AF4-931C-F2DD5AE9D75E}"/>
+                </a:ext>
+              </a:extLst>
+            </p:cNvPr>
+            <p:cNvSpPr/>
+            <p:nvPr/>
+          </p:nvSpPr>
+          <p:spPr>
+            <a:xfrm rot="2755975">
+              <a:off x="5326517" y="588977"/>
+              <a:ext cx="1152362" cy="1152913"/>
+            </a:xfrm>
+            <a:prstGeom prst="plus">
+              <a:avLst>
+                <a:gd name="adj" fmla="val 43600"/>
+              </a:avLst>
+            </a:prstGeom>
+            <a:solidFill>
+              <a:schemeClr val="tx1"/>
+            </a:solidFill>
+            <a:ln w="38100">
+              <a:noFill/>
+            </a:ln>
+          </p:spPr>
+          <p:style>
+            <a:lnRef idx="2">
+              <a:schemeClr val="accent1">
+                <a:shade val="50000"/>
+              </a:schemeClr>
+            </a:lnRef>
+            <a:fillRef idx="1">
+              <a:schemeClr val="accent1"/>
+            </a:fillRef>
+            <a:effectRef idx="0">
+              <a:schemeClr val="accent1"/>
+            </a:effectRef>
+            <a:fontRef idx="minor">
+              <a:schemeClr val="lt1"/>
+            </a:fontRef>
+          </p:style>
+          <p:txBody>
+            <a:bodyPr rtlCol="0" anchor="ctr"/>
+            <a:lstStyle/>
+            <a:p>
+              <a:pPr algn="ctr"/>
+              <a:endParaRPr lang="en-US"/>
+            </a:p>
+          </p:txBody>
+        </p:sp>
+      </p:grpSp>
+      <p:grpSp>
+        <p:nvGrpSpPr>
+          <p:cNvPr id="21" name="Grupo 20">
+            <a:extLst>
+              <a:ext uri="{FF2B5EF4-FFF2-40B4-BE49-F238E27FC236}">
+                <a16:creationId xmlns:a16="http://schemas.microsoft.com/office/drawing/2014/main" id="{45EBFDFF-3E6F-4B15-897E-7BF41D901007}"/>
+              </a:ext>
+            </a:extLst>
+          </p:cNvPr>
+          <p:cNvGrpSpPr/>
+          <p:nvPr/>
+        </p:nvGrpSpPr>
+        <p:grpSpPr>
+          <a:xfrm>
+            <a:off x="2659330" y="2437690"/>
+            <a:ext cx="2160000" cy="2160000"/>
+            <a:chOff x="4825014" y="2630195"/>
+            <a:chExt cx="2160000" cy="2160000"/>
+          </a:xfrm>
+        </p:grpSpPr>
+        <p:sp>
+          <p:nvSpPr>
+            <p:cNvPr id="19" name="Rectángulo 18">
+              <a:extLst>
+                <a:ext uri="{FF2B5EF4-FFF2-40B4-BE49-F238E27FC236}">
+                  <a16:creationId xmlns:a16="http://schemas.microsoft.com/office/drawing/2014/main" id="{B4D6DBDB-1CD2-4766-8E44-51233864AEB9}"/>
+                </a:ext>
+              </a:extLst>
+            </p:cNvPr>
+            <p:cNvSpPr/>
+            <p:nvPr/>
+          </p:nvSpPr>
+          <p:spPr>
+            <a:xfrm>
+              <a:off x="4825014" y="2630195"/>
+              <a:ext cx="2160000" cy="2160000"/>
+            </a:xfrm>
+            <a:prstGeom prst="rect">
+              <a:avLst/>
+            </a:prstGeom>
+            <a:solidFill>
+              <a:srgbClr val="FF0000"/>
+            </a:solidFill>
+            <a:ln>
+              <a:noFill/>
+            </a:ln>
+          </p:spPr>
+          <p:style>
+            <a:lnRef idx="2">
+              <a:schemeClr val="accent1">
+                <a:shade val="50000"/>
+              </a:schemeClr>
+            </a:lnRef>
+            <a:fillRef idx="1">
+              <a:schemeClr val="accent1"/>
+            </a:fillRef>
+            <a:effectRef idx="0">
+              <a:schemeClr val="accent1"/>
+            </a:effectRef>
+            <a:fontRef idx="minor">
+              <a:schemeClr val="lt1"/>
+            </a:fontRef>
+          </p:style>
+          <p:txBody>
+            <a:bodyPr rtlCol="0" anchor="b" anchorCtr="1"/>
+            <a:lstStyle/>
+            <a:p>
+              <a:pPr algn="ctr"/>
+              <a:r>
+                <a:rPr lang="en-US" sz="3600" b="1" dirty="0"/>
+                <a:t>FALSE</a:t>
+              </a:r>
+            </a:p>
+          </p:txBody>
+        </p:sp>
+        <p:sp>
+          <p:nvSpPr>
+            <p:cNvPr id="20" name="Cruz 19">
+              <a:extLst>
+                <a:ext uri="{FF2B5EF4-FFF2-40B4-BE49-F238E27FC236}">
+                  <a16:creationId xmlns:a16="http://schemas.microsoft.com/office/drawing/2014/main" id="{6321AD94-8CC3-455A-8E1F-2501E6D3C706}"/>
+                </a:ext>
+              </a:extLst>
+            </p:cNvPr>
+            <p:cNvSpPr/>
+            <p:nvPr/>
+          </p:nvSpPr>
+          <p:spPr>
+            <a:xfrm rot="2755975">
+              <a:off x="5326517" y="2922670"/>
+              <a:ext cx="1152362" cy="1152913"/>
+            </a:xfrm>
+            <a:prstGeom prst="plus">
+              <a:avLst>
+                <a:gd name="adj" fmla="val 43600"/>
+              </a:avLst>
+            </a:prstGeom>
+            <a:solidFill>
+              <a:schemeClr val="tx1"/>
+            </a:solidFill>
+            <a:ln w="38100">
+              <a:noFill/>
+            </a:ln>
+          </p:spPr>
+          <p:style>
+            <a:lnRef idx="2">
+              <a:schemeClr val="accent1">
+                <a:shade val="50000"/>
+              </a:schemeClr>
+            </a:lnRef>
+            <a:fillRef idx="1">
+              <a:schemeClr val="accent1"/>
+            </a:fillRef>
+            <a:effectRef idx="0">
+              <a:schemeClr val="accent1"/>
+            </a:effectRef>
+            <a:fontRef idx="minor">
+              <a:schemeClr val="lt1"/>
+            </a:fontRef>
+          </p:style>
+          <p:txBody>
+            <a:bodyPr rtlCol="0" anchor="ctr"/>
+            <a:lstStyle/>
+            <a:p>
+              <a:pPr algn="ctr"/>
+              <a:endParaRPr lang="en-US"/>
+            </a:p>
+          </p:txBody>
+        </p:sp>
+      </p:grpSp>
+      <p:pic>
+        <p:nvPicPr>
+          <p:cNvPr id="24" name="Imagen 23" descr="Icono&#10;&#10;Descripción generada automáticamente">
+            <a:extLst>
+              <a:ext uri="{FF2B5EF4-FFF2-40B4-BE49-F238E27FC236}">
+                <a16:creationId xmlns:a16="http://schemas.microsoft.com/office/drawing/2014/main" id="{0FD3FAF1-FF67-4BA2-9E33-5C9D854EAA2D}"/>
+              </a:ext>
+            </a:extLst>
+          </p:cNvPr>
+          <p:cNvPicPr>
+            <a:picLocks noChangeAspect="1"/>
+          </p:cNvPicPr>
+          <p:nvPr/>
+        </p:nvPicPr>
+        <p:blipFill rotWithShape="1">
+          <a:blip r:embed="rId2">
+            <a:extLst>
+              <a:ext uri="{28A0092B-C50C-407E-A947-70E740481C1C}">
+                <a14:useLocalDpi xmlns:a14="http://schemas.microsoft.com/office/drawing/2010/main" val="0"/>
+              </a:ext>
+            </a:extLst>
+          </a:blip>
+          <a:srcRect r="198" b="9617"/>
+          <a:stretch/>
+        </p:blipFill>
+        <p:spPr>
+          <a:xfrm>
+            <a:off x="8988156" y="103998"/>
+            <a:ext cx="2160000" cy="2160000"/>
+          </a:xfrm>
+          <a:prstGeom prst="rect">
+            <a:avLst/>
+          </a:prstGeom>
+        </p:spPr>
+      </p:pic>
+      <p:pic>
+        <p:nvPicPr>
+          <p:cNvPr id="26" name="Imagen 25" descr="Icono&#10;&#10;Descripción generada automáticamente">
+            <a:extLst>
+              <a:ext uri="{FF2B5EF4-FFF2-40B4-BE49-F238E27FC236}">
+                <a16:creationId xmlns:a16="http://schemas.microsoft.com/office/drawing/2014/main" id="{E0F1AC03-520C-42BF-8454-6587A8DF5896}"/>
+              </a:ext>
+            </a:extLst>
+          </p:cNvPr>
+          <p:cNvPicPr>
+            <a:picLocks noChangeAspect="1"/>
+          </p:cNvPicPr>
+          <p:nvPr/>
+        </p:nvPicPr>
+        <p:blipFill rotWithShape="1">
+          <a:blip r:embed="rId3">
+            <a:extLst>
+              <a:ext uri="{28A0092B-C50C-407E-A947-70E740481C1C}">
+                <a14:useLocalDpi xmlns:a14="http://schemas.microsoft.com/office/drawing/2010/main" val="0"/>
+              </a:ext>
+            </a:extLst>
+          </a:blip>
+          <a:srcRect t="-154" r="198" b="9772"/>
+          <a:stretch/>
+        </p:blipFill>
+        <p:spPr>
+          <a:xfrm>
+            <a:off x="8988156" y="2434004"/>
+            <a:ext cx="2160000" cy="2159999"/>
+          </a:xfrm>
+          <a:prstGeom prst="rect">
+            <a:avLst/>
+          </a:prstGeom>
+        </p:spPr>
+      </p:pic>
+      <p:pic>
+        <p:nvPicPr>
+          <p:cNvPr id="28" name="Imagen 27" descr="Logotipo&#10;&#10;Descripción generada automáticamente">
+            <a:extLst>
+              <a:ext uri="{FF2B5EF4-FFF2-40B4-BE49-F238E27FC236}">
+                <a16:creationId xmlns:a16="http://schemas.microsoft.com/office/drawing/2014/main" id="{8C8A68E0-F466-4080-897F-705C8F9149A6}"/>
+              </a:ext>
+            </a:extLst>
+          </p:cNvPr>
+          <p:cNvPicPr>
+            <a:picLocks noChangeAspect="1"/>
+          </p:cNvPicPr>
+          <p:nvPr/>
+        </p:nvPicPr>
+        <p:blipFill rotWithShape="1">
+          <a:blip r:embed="rId4">
+            <a:extLst>
+              <a:ext uri="{28A0092B-C50C-407E-A947-70E740481C1C}">
+                <a14:useLocalDpi xmlns:a14="http://schemas.microsoft.com/office/drawing/2010/main" val="0"/>
+              </a:ext>
+            </a:extLst>
+          </a:blip>
+          <a:srcRect r="198" b="9617"/>
+          <a:stretch/>
+        </p:blipFill>
+        <p:spPr>
+          <a:xfrm>
+            <a:off x="6113618" y="103998"/>
+            <a:ext cx="2160000" cy="2160000"/>
+          </a:xfrm>
+          <a:prstGeom prst="rect">
+            <a:avLst/>
+          </a:prstGeom>
+        </p:spPr>
+      </p:pic>
+      <p:pic>
+        <p:nvPicPr>
+          <p:cNvPr id="30" name="Imagen 29" descr="Logotipo, nombre de la empresa&#10;&#10;Descripción generada automáticamente">
+            <a:extLst>
+              <a:ext uri="{FF2B5EF4-FFF2-40B4-BE49-F238E27FC236}">
+                <a16:creationId xmlns:a16="http://schemas.microsoft.com/office/drawing/2014/main" id="{17833EDE-D43E-4EFD-A087-D881E90681CA}"/>
+              </a:ext>
+            </a:extLst>
+          </p:cNvPr>
+          <p:cNvPicPr>
+            <a:picLocks noChangeAspect="1"/>
+          </p:cNvPicPr>
+          <p:nvPr/>
+        </p:nvPicPr>
+        <p:blipFill rotWithShape="1">
+          <a:blip r:embed="rId5">
+            <a:extLst>
+              <a:ext uri="{28A0092B-C50C-407E-A947-70E740481C1C}">
+                <a14:useLocalDpi xmlns:a14="http://schemas.microsoft.com/office/drawing/2010/main" val="0"/>
+              </a:ext>
+            </a:extLst>
+          </a:blip>
+          <a:srcRect t="-154" r="198" b="9772"/>
+          <a:stretch/>
+        </p:blipFill>
+        <p:spPr>
+          <a:xfrm>
+            <a:off x="6113618" y="2434004"/>
+            <a:ext cx="2160000" cy="2160000"/>
+          </a:xfrm>
+          <a:prstGeom prst="rect">
+            <a:avLst/>
+          </a:prstGeom>
+        </p:spPr>
+      </p:pic>
+    </p:spTree>
+    <p:extLst>
+      <p:ext uri="{BB962C8B-B14F-4D97-AF65-F5344CB8AC3E}">
+        <p14:creationId xmlns:p14="http://schemas.microsoft.com/office/powerpoint/2010/main" val="2266981609"/>
+      </p:ext>
+    </p:extLst>
+  </p:cSld>
+  <p:clrMapOvr>
+    <a:masterClrMapping/>
+  </p:clrMapOvr>
+</p:sld>
+</file>
+
+<file path=ppt/slides/slide22.xml><?xml version="1.0" encoding="utf-8"?>
 <p:sld xmlns:a="http://schemas.openxmlformats.org/drawingml/2006/main" xmlns:r="http://schemas.openxmlformats.org/officeDocument/2006/relationships" xmlns:p="http://schemas.openxmlformats.org/presentationml/2006/main">
   <p:cSld>
     <p:spTree>
@@ -12434,7 +16118,7 @@
 </p:sld>
 </file>
 
-<file path=ppt/slides/slide21.xml><?xml version="1.0" encoding="utf-8"?>
+<file path=ppt/slides/slide23.xml><?xml version="1.0" encoding="utf-8"?>
 <p:sld xmlns:a="http://schemas.openxmlformats.org/drawingml/2006/main" xmlns:r="http://schemas.openxmlformats.org/officeDocument/2006/relationships" xmlns:p="http://schemas.openxmlformats.org/presentationml/2006/main">
   <p:cSld>
     <p:spTree>
@@ -13007,7 +16691,7 @@
 </p:sld>
 </file>
 
-<file path=ppt/slides/slide22.xml><?xml version="1.0" encoding="utf-8"?>
+<file path=ppt/slides/slide24.xml><?xml version="1.0" encoding="utf-8"?>
 <p:sld xmlns:a="http://schemas.openxmlformats.org/drawingml/2006/main" xmlns:r="http://schemas.openxmlformats.org/officeDocument/2006/relationships" xmlns:p="http://schemas.openxmlformats.org/presentationml/2006/main">
   <p:cSld>
     <p:spTree>
@@ -13804,7 +17488,257 @@
 </p:sld>
 </file>
 
-<file path=ppt/slides/slide23.xml><?xml version="1.0" encoding="utf-8"?>
+<file path=ppt/slides/slide25.xml><?xml version="1.0" encoding="utf-8"?>
+<p:sld xmlns:a="http://schemas.openxmlformats.org/drawingml/2006/main" xmlns:r="http://schemas.openxmlformats.org/officeDocument/2006/relationships" xmlns:p="http://schemas.openxmlformats.org/presentationml/2006/main">
+  <p:cSld>
+    <p:spTree>
+      <p:nvGrpSpPr>
+        <p:cNvPr id="1" name=""/>
+        <p:cNvGrpSpPr/>
+        <p:nvPr/>
+      </p:nvGrpSpPr>
+      <p:grpSpPr>
+        <a:xfrm>
+          <a:off x="0" y="0"/>
+          <a:ext cx="0" cy="0"/>
+          <a:chOff x="0" y="0"/>
+          <a:chExt cx="0" cy="0"/>
+        </a:xfrm>
+      </p:grpSpPr>
+      <p:sp>
+        <p:nvSpPr>
+          <p:cNvPr id="4" name="Rectángulo 3">
+            <a:extLst>
+              <a:ext uri="{FF2B5EF4-FFF2-40B4-BE49-F238E27FC236}">
+                <a16:creationId xmlns:a16="http://schemas.microsoft.com/office/drawing/2014/main" id="{D85DFB13-485B-4AE7-9400-E79832498591}"/>
+              </a:ext>
+            </a:extLst>
+          </p:cNvPr>
+          <p:cNvSpPr/>
+          <p:nvPr/>
+        </p:nvSpPr>
+        <p:spPr>
+          <a:xfrm>
+            <a:off x="1058779" y="697832"/>
+            <a:ext cx="8686800" cy="5053263"/>
+          </a:xfrm>
+          <a:prstGeom prst="rect">
+            <a:avLst/>
+          </a:prstGeom>
+          <a:solidFill>
+            <a:schemeClr val="bg1">
+              <a:lumMod val="65000"/>
+              <a:lumOff val="35000"/>
+            </a:schemeClr>
+          </a:solidFill>
+          <a:ln w="38100">
+            <a:noFill/>
+          </a:ln>
+        </p:spPr>
+        <p:style>
+          <a:lnRef idx="2">
+            <a:schemeClr val="accent1">
+              <a:shade val="50000"/>
+            </a:schemeClr>
+          </a:lnRef>
+          <a:fillRef idx="1">
+            <a:schemeClr val="accent1"/>
+          </a:fillRef>
+          <a:effectRef idx="0">
+            <a:schemeClr val="accent1"/>
+          </a:effectRef>
+          <a:fontRef idx="minor">
+            <a:schemeClr val="lt1"/>
+          </a:fontRef>
+        </p:style>
+        <p:txBody>
+          <a:bodyPr rtlCol="0" anchor="ctr"/>
+          <a:lstStyle/>
+          <a:p>
+            <a:pPr algn="ctr"/>
+            <a:endParaRPr lang="en-US"/>
+          </a:p>
+        </p:txBody>
+      </p:sp>
+      <p:sp>
+        <p:nvSpPr>
+          <p:cNvPr id="2" name="Rectángulo 1">
+            <a:extLst>
+              <a:ext uri="{FF2B5EF4-FFF2-40B4-BE49-F238E27FC236}">
+                <a16:creationId xmlns:a16="http://schemas.microsoft.com/office/drawing/2014/main" id="{A05A50F8-9651-412B-BF2B-D2A6CADE7C38}"/>
+              </a:ext>
+            </a:extLst>
+          </p:cNvPr>
+          <p:cNvSpPr/>
+          <p:nvPr/>
+        </p:nvSpPr>
+        <p:spPr>
+          <a:xfrm>
+            <a:off x="1636295" y="1323474"/>
+            <a:ext cx="3600000" cy="3600000"/>
+          </a:xfrm>
+          <a:prstGeom prst="rect">
+            <a:avLst/>
+          </a:prstGeom>
+          <a:solidFill>
+            <a:schemeClr val="bg1">
+              <a:lumMod val="95000"/>
+              <a:lumOff val="5000"/>
+            </a:schemeClr>
+          </a:solidFill>
+          <a:ln w="38100">
+            <a:noFill/>
+          </a:ln>
+        </p:spPr>
+        <p:style>
+          <a:lnRef idx="2">
+            <a:schemeClr val="accent1">
+              <a:shade val="50000"/>
+            </a:schemeClr>
+          </a:lnRef>
+          <a:fillRef idx="1">
+            <a:schemeClr val="accent1"/>
+          </a:fillRef>
+          <a:effectRef idx="0">
+            <a:schemeClr val="accent1"/>
+          </a:effectRef>
+          <a:fontRef idx="minor">
+            <a:schemeClr val="lt1"/>
+          </a:fontRef>
+        </p:style>
+        <p:txBody>
+          <a:bodyPr rtlCol="0" anchor="ctr"/>
+          <a:lstStyle/>
+          <a:p>
+            <a:pPr algn="ctr"/>
+            <a:endParaRPr lang="en-US"/>
+          </a:p>
+        </p:txBody>
+      </p:sp>
+      <p:sp>
+        <p:nvSpPr>
+          <p:cNvPr id="5" name="CuadroTexto 4">
+            <a:extLst>
+              <a:ext uri="{FF2B5EF4-FFF2-40B4-BE49-F238E27FC236}">
+                <a16:creationId xmlns:a16="http://schemas.microsoft.com/office/drawing/2014/main" id="{EA59C0B3-482F-4117-AFFB-A1E627ACCFCA}"/>
+              </a:ext>
+            </a:extLst>
+          </p:cNvPr>
+          <p:cNvSpPr txBox="1"/>
+          <p:nvPr/>
+        </p:nvSpPr>
+        <p:spPr>
+          <a:xfrm>
+            <a:off x="1804737" y="1588162"/>
+            <a:ext cx="3260558" cy="2123658"/>
+          </a:xfrm>
+          <a:prstGeom prst="rect">
+            <a:avLst/>
+          </a:prstGeom>
+          <a:noFill/>
+        </p:spPr>
+        <p:txBody>
+          <a:bodyPr wrap="square" rtlCol="0">
+            <a:spAutoFit/>
+          </a:bodyPr>
+          <a:lstStyle/>
+          <a:p>
+            <a:pPr algn="ctr"/>
+            <a:r>
+              <a:rPr lang="en-US" sz="2400" b="1" dirty="0"/>
+              <a:t>Welcome to </a:t>
+            </a:r>
+            <a:r>
+              <a:rPr lang="en-US" sz="2400" b="1" dirty="0" err="1"/>
+              <a:t>VoiceVault</a:t>
+            </a:r>
+            <a:endParaRPr lang="en-US" sz="2400" b="1" dirty="0"/>
+          </a:p>
+          <a:p>
+            <a:pPr algn="ctr"/>
+            <a:endParaRPr lang="en-US" dirty="0"/>
+          </a:p>
+          <a:p>
+            <a:pPr algn="ctr"/>
+            <a:r>
+              <a:rPr lang="en-US" dirty="0"/>
+              <a:t>Clinical voice quality assessment</a:t>
+            </a:r>
+          </a:p>
+          <a:p>
+            <a:pPr algn="ctr"/>
+            <a:endParaRPr lang="en-US" dirty="0"/>
+          </a:p>
+          <a:p>
+            <a:pPr algn="ctr"/>
+            <a:r>
+              <a:rPr lang="en-US" b="1" i="1" dirty="0"/>
+              <a:t>Your test guide is loading…</a:t>
+            </a:r>
+          </a:p>
+          <a:p>
+            <a:pPr algn="ctr"/>
+            <a:endParaRPr lang="en-US" dirty="0"/>
+          </a:p>
+          <a:p>
+            <a:pPr algn="ctr"/>
+            <a:r>
+              <a:rPr lang="en-US" sz="1400" dirty="0"/>
+              <a:t>Built in Scotland by audence</a:t>
+            </a:r>
+          </a:p>
+        </p:txBody>
+      </p:sp>
+      <p:pic>
+        <p:nvPicPr>
+          <p:cNvPr id="16" name="Imagen 15" descr="Icono&#10;&#10;Descripción generada automáticamente">
+            <a:extLst>
+              <a:ext uri="{FF2B5EF4-FFF2-40B4-BE49-F238E27FC236}">
+                <a16:creationId xmlns:a16="http://schemas.microsoft.com/office/drawing/2014/main" id="{64956D90-E251-4843-903A-8F745C03C2E3}"/>
+              </a:ext>
+            </a:extLst>
+          </p:cNvPr>
+          <p:cNvPicPr>
+            <a:picLocks noChangeAspect="1"/>
+          </p:cNvPicPr>
+          <p:nvPr/>
+        </p:nvPicPr>
+        <p:blipFill>
+          <a:blip r:embed="rId2">
+            <a:extLst>
+              <a:ext uri="{28A0092B-C50C-407E-A947-70E740481C1C}">
+                <a14:useLocalDpi xmlns:a14="http://schemas.microsoft.com/office/drawing/2010/main" val="0"/>
+              </a:ext>
+            </a:extLst>
+          </a:blip>
+          <a:stretch>
+            <a:fillRect/>
+          </a:stretch>
+        </p:blipFill>
+        <p:spPr>
+          <a:xfrm>
+            <a:off x="2577874" y="3467154"/>
+            <a:ext cx="1663144" cy="1386976"/>
+          </a:xfrm>
+          <a:prstGeom prst="rect">
+            <a:avLst/>
+          </a:prstGeom>
+        </p:spPr>
+      </p:pic>
+    </p:spTree>
+    <p:extLst>
+      <p:ext uri="{BB962C8B-B14F-4D97-AF65-F5344CB8AC3E}">
+        <p14:creationId xmlns:p14="http://schemas.microsoft.com/office/powerpoint/2010/main" val="2118122674"/>
+      </p:ext>
+    </p:extLst>
+  </p:cSld>
+  <p:clrMapOvr>
+    <a:masterClrMapping/>
+  </p:clrMapOvr>
+</p:sld>
+</file>
+
+<file path=ppt/slides/slide26.xml><?xml version="1.0" encoding="utf-8"?>
 <p:sld xmlns:a="http://schemas.openxmlformats.org/drawingml/2006/main" xmlns:r="http://schemas.openxmlformats.org/officeDocument/2006/relationships" xmlns:p="http://schemas.openxmlformats.org/presentationml/2006/main">
   <p:cSld>
     <p:spTree>

</xml_diff>

<commit_message>
Auth error catching and blocking
</commit_message>
<xml_diff>
--- a/design notes.pptx
+++ b/design notes.pptx
@@ -30,7 +30,13 @@
     <p:sldId id="277" r:id="rId24"/>
     <p:sldId id="270" r:id="rId25"/>
     <p:sldId id="281" r:id="rId26"/>
-    <p:sldId id="273" r:id="rId27"/>
+    <p:sldId id="282" r:id="rId27"/>
+    <p:sldId id="283" r:id="rId28"/>
+    <p:sldId id="273" r:id="rId29"/>
+    <p:sldId id="284" r:id="rId30"/>
+    <p:sldId id="285" r:id="rId31"/>
+    <p:sldId id="286" r:id="rId32"/>
+    <p:sldId id="287" r:id="rId33"/>
   </p:sldIdLst>
   <p:sldSz cx="12192000" cy="6858000"/>
   <p:notesSz cx="6858000" cy="9144000"/>
@@ -268,7 +274,7 @@
           <a:p>
             <a:fld id="{BC0ED75D-8292-496A-995E-908E2AB58EFB}" type="datetimeFigureOut">
               <a:rPr lang="en-US" smtClean="0"/>
-              <a:t>2/19/2021</a:t>
+              <a:t>3/9/2021</a:t>
             </a:fld>
             <a:endParaRPr lang="en-US"/>
           </a:p>
@@ -438,7 +444,7 @@
           <a:p>
             <a:fld id="{BC0ED75D-8292-496A-995E-908E2AB58EFB}" type="datetimeFigureOut">
               <a:rPr lang="en-US" smtClean="0"/>
-              <a:t>2/19/2021</a:t>
+              <a:t>3/9/2021</a:t>
             </a:fld>
             <a:endParaRPr lang="en-US"/>
           </a:p>
@@ -618,7 +624,7 @@
           <a:p>
             <a:fld id="{BC0ED75D-8292-496A-995E-908E2AB58EFB}" type="datetimeFigureOut">
               <a:rPr lang="en-US" smtClean="0"/>
-              <a:t>2/19/2021</a:t>
+              <a:t>3/9/2021</a:t>
             </a:fld>
             <a:endParaRPr lang="en-US"/>
           </a:p>
@@ -788,7 +794,7 @@
           <a:p>
             <a:fld id="{BC0ED75D-8292-496A-995E-908E2AB58EFB}" type="datetimeFigureOut">
               <a:rPr lang="en-US" smtClean="0"/>
-              <a:t>2/19/2021</a:t>
+              <a:t>3/9/2021</a:t>
             </a:fld>
             <a:endParaRPr lang="en-US"/>
           </a:p>
@@ -1034,7 +1040,7 @@
           <a:p>
             <a:fld id="{BC0ED75D-8292-496A-995E-908E2AB58EFB}" type="datetimeFigureOut">
               <a:rPr lang="en-US" smtClean="0"/>
-              <a:t>2/19/2021</a:t>
+              <a:t>3/9/2021</a:t>
             </a:fld>
             <a:endParaRPr lang="en-US"/>
           </a:p>
@@ -1266,7 +1272,7 @@
           <a:p>
             <a:fld id="{BC0ED75D-8292-496A-995E-908E2AB58EFB}" type="datetimeFigureOut">
               <a:rPr lang="en-US" smtClean="0"/>
-              <a:t>2/19/2021</a:t>
+              <a:t>3/9/2021</a:t>
             </a:fld>
             <a:endParaRPr lang="en-US"/>
           </a:p>
@@ -1633,7 +1639,7 @@
           <a:p>
             <a:fld id="{BC0ED75D-8292-496A-995E-908E2AB58EFB}" type="datetimeFigureOut">
               <a:rPr lang="en-US" smtClean="0"/>
-              <a:t>2/19/2021</a:t>
+              <a:t>3/9/2021</a:t>
             </a:fld>
             <a:endParaRPr lang="en-US"/>
           </a:p>
@@ -1751,7 +1757,7 @@
           <a:p>
             <a:fld id="{BC0ED75D-8292-496A-995E-908E2AB58EFB}" type="datetimeFigureOut">
               <a:rPr lang="en-US" smtClean="0"/>
-              <a:t>2/19/2021</a:t>
+              <a:t>3/9/2021</a:t>
             </a:fld>
             <a:endParaRPr lang="en-US"/>
           </a:p>
@@ -1846,7 +1852,7 @@
           <a:p>
             <a:fld id="{BC0ED75D-8292-496A-995E-908E2AB58EFB}" type="datetimeFigureOut">
               <a:rPr lang="en-US" smtClean="0"/>
-              <a:t>2/19/2021</a:t>
+              <a:t>3/9/2021</a:t>
             </a:fld>
             <a:endParaRPr lang="en-US"/>
           </a:p>
@@ -2123,7 +2129,7 @@
           <a:p>
             <a:fld id="{BC0ED75D-8292-496A-995E-908E2AB58EFB}" type="datetimeFigureOut">
               <a:rPr lang="en-US" smtClean="0"/>
-              <a:t>2/19/2021</a:t>
+              <a:t>3/9/2021</a:t>
             </a:fld>
             <a:endParaRPr lang="en-US"/>
           </a:p>
@@ -2380,7 +2386,7 @@
           <a:p>
             <a:fld id="{BC0ED75D-8292-496A-995E-908E2AB58EFB}" type="datetimeFigureOut">
               <a:rPr lang="en-US" smtClean="0"/>
-              <a:t>2/19/2021</a:t>
+              <a:t>3/9/2021</a:t>
             </a:fld>
             <a:endParaRPr lang="en-US"/>
           </a:p>
@@ -2593,7 +2599,7 @@
           <a:p>
             <a:fld id="{BC0ED75D-8292-496A-995E-908E2AB58EFB}" type="datetimeFigureOut">
               <a:rPr lang="en-US" smtClean="0"/>
-              <a:t>2/19/2021</a:t>
+              <a:t>3/9/2021</a:t>
             </a:fld>
             <a:endParaRPr lang="en-US"/>
           </a:p>
@@ -13661,7 +13667,7 @@
             <a:lstStyle/>
             <a:p>
               <a:pPr algn="ctr"/>
-              <a:endParaRPr lang="en-US"/>
+              <a:endParaRPr lang="en-US" dirty="0"/>
             </a:p>
           </p:txBody>
         </p:sp>
@@ -16296,7 +16302,7 @@
           <a:lstStyle/>
           <a:p>
             <a:pPr algn="ctr"/>
-            <a:endParaRPr lang="en-US"/>
+            <a:endParaRPr lang="en-US" dirty="0"/>
           </a:p>
         </p:txBody>
       </p:sp>
@@ -16314,8 +16320,8 @@
         </p:nvSpPr>
         <p:spPr>
           <a:xfrm>
-            <a:off x="1946519" y="1780674"/>
-            <a:ext cx="2962365" cy="1477328"/>
+            <a:off x="1955112" y="1580977"/>
+            <a:ext cx="2962365" cy="2308324"/>
           </a:xfrm>
           <a:prstGeom prst="rect">
             <a:avLst/>
@@ -16329,8 +16335,646 @@
           <a:lstStyle/>
           <a:p>
             <a:r>
+              <a:rPr lang="en-US" sz="1600" dirty="0"/>
+              <a:t>Say “ah” for as long as you can. </a:t>
+            </a:r>
+          </a:p>
+          <a:p>
+            <a:r>
+              <a:rPr lang="en-US" sz="1600" dirty="0"/>
+              <a:t>Repeat this task twice.</a:t>
+            </a:r>
+          </a:p>
+          <a:p>
+            <a:endParaRPr lang="en-US" sz="1600" dirty="0"/>
+          </a:p>
+          <a:p>
+            <a:r>
+              <a:rPr lang="en-US" sz="1600" dirty="0"/>
+              <a:t>Click on the example button to hear an example recording.</a:t>
+            </a:r>
+          </a:p>
+          <a:p>
+            <a:endParaRPr lang="en-US" sz="1600" dirty="0"/>
+          </a:p>
+          <a:p>
+            <a:r>
+              <a:rPr lang="en-US" sz="1600" dirty="0"/>
+              <a:t>When you are ready, press Record. When finished press Stop.</a:t>
+            </a:r>
+          </a:p>
+        </p:txBody>
+      </p:sp>
+      <p:sp>
+        <p:nvSpPr>
+          <p:cNvPr id="6" name="CuadroTexto 5">
+            <a:extLst>
+              <a:ext uri="{FF2B5EF4-FFF2-40B4-BE49-F238E27FC236}">
+                <a16:creationId xmlns:a16="http://schemas.microsoft.com/office/drawing/2014/main" id="{B477A167-8C97-4B42-AA4A-0332FEC394C0}"/>
+              </a:ext>
+            </a:extLst>
+          </p:cNvPr>
+          <p:cNvSpPr txBox="1"/>
+          <p:nvPr/>
+        </p:nvSpPr>
+        <p:spPr>
+          <a:xfrm>
+            <a:off x="5402179" y="1703863"/>
+            <a:ext cx="2962365" cy="830997"/>
+          </a:xfrm>
+          <a:prstGeom prst="rect">
+            <a:avLst/>
+          </a:prstGeom>
+          <a:noFill/>
+        </p:spPr>
+        <p:txBody>
+          <a:bodyPr wrap="square" rtlCol="0">
+            <a:spAutoFit/>
+          </a:bodyPr>
+          <a:lstStyle/>
+          <a:p>
+            <a:r>
+              <a:rPr lang="en-US" sz="1600" dirty="0"/>
+              <a:t>On a scale of 1 to 10 (1 = worst, 10 = best) how fatigued are you at the moment?</a:t>
+            </a:r>
+          </a:p>
+        </p:txBody>
+      </p:sp>
+      <p:sp>
+        <p:nvSpPr>
+          <p:cNvPr id="7" name="Forma libre: forma 6">
+            <a:extLst>
+              <a:ext uri="{FF2B5EF4-FFF2-40B4-BE49-F238E27FC236}">
+                <a16:creationId xmlns:a16="http://schemas.microsoft.com/office/drawing/2014/main" id="{5DAFC7BD-7837-41F3-9226-6D96766CF787}"/>
+              </a:ext>
+            </a:extLst>
+          </p:cNvPr>
+          <p:cNvSpPr/>
+          <p:nvPr/>
+        </p:nvSpPr>
+        <p:spPr>
+          <a:xfrm>
+            <a:off x="3123829" y="3869645"/>
+            <a:ext cx="617266" cy="922297"/>
+          </a:xfrm>
+          <a:custGeom>
+            <a:avLst/>
+            <a:gdLst>
+              <a:gd name="connsiteX0" fmla="*/ 36094 w 589547"/>
+              <a:gd name="connsiteY0" fmla="*/ 0 h 866273"/>
+              <a:gd name="connsiteX1" fmla="*/ 228600 w 589547"/>
+              <a:gd name="connsiteY1" fmla="*/ 601579 h 866273"/>
+              <a:gd name="connsiteX2" fmla="*/ 0 w 589547"/>
+              <a:gd name="connsiteY2" fmla="*/ 745958 h 866273"/>
+              <a:gd name="connsiteX3" fmla="*/ 493294 w 589547"/>
+              <a:gd name="connsiteY3" fmla="*/ 866273 h 866273"/>
+              <a:gd name="connsiteX4" fmla="*/ 180473 w 589547"/>
+              <a:gd name="connsiteY4" fmla="*/ 132347 h 866273"/>
+              <a:gd name="connsiteX5" fmla="*/ 589547 w 589547"/>
+              <a:gd name="connsiteY5" fmla="*/ 216568 h 866273"/>
+              <a:gd name="connsiteX6" fmla="*/ 84221 w 589547"/>
+              <a:gd name="connsiteY6" fmla="*/ 24063 h 866273"/>
+              <a:gd name="connsiteX0" fmla="*/ 41017 w 594470"/>
+              <a:gd name="connsiteY0" fmla="*/ 0 h 897432"/>
+              <a:gd name="connsiteX1" fmla="*/ 233523 w 594470"/>
+              <a:gd name="connsiteY1" fmla="*/ 601579 h 897432"/>
+              <a:gd name="connsiteX2" fmla="*/ 4923 w 594470"/>
+              <a:gd name="connsiteY2" fmla="*/ 745958 h 897432"/>
+              <a:gd name="connsiteX3" fmla="*/ 498217 w 594470"/>
+              <a:gd name="connsiteY3" fmla="*/ 866273 h 897432"/>
+              <a:gd name="connsiteX4" fmla="*/ 185396 w 594470"/>
+              <a:gd name="connsiteY4" fmla="*/ 132347 h 897432"/>
+              <a:gd name="connsiteX5" fmla="*/ 594470 w 594470"/>
+              <a:gd name="connsiteY5" fmla="*/ 216568 h 897432"/>
+              <a:gd name="connsiteX6" fmla="*/ 89144 w 594470"/>
+              <a:gd name="connsiteY6" fmla="*/ 24063 h 897432"/>
+              <a:gd name="connsiteX0" fmla="*/ 52785 w 606238"/>
+              <a:gd name="connsiteY0" fmla="*/ 0 h 922297"/>
+              <a:gd name="connsiteX1" fmla="*/ 245291 w 606238"/>
+              <a:gd name="connsiteY1" fmla="*/ 601579 h 922297"/>
+              <a:gd name="connsiteX2" fmla="*/ 16691 w 606238"/>
+              <a:gd name="connsiteY2" fmla="*/ 745958 h 922297"/>
+              <a:gd name="connsiteX3" fmla="*/ 509985 w 606238"/>
+              <a:gd name="connsiteY3" fmla="*/ 866273 h 922297"/>
+              <a:gd name="connsiteX4" fmla="*/ 197164 w 606238"/>
+              <a:gd name="connsiteY4" fmla="*/ 132347 h 922297"/>
+              <a:gd name="connsiteX5" fmla="*/ 606238 w 606238"/>
+              <a:gd name="connsiteY5" fmla="*/ 216568 h 922297"/>
+              <a:gd name="connsiteX6" fmla="*/ 100912 w 606238"/>
+              <a:gd name="connsiteY6" fmla="*/ 24063 h 922297"/>
+              <a:gd name="connsiteX0" fmla="*/ 63813 w 617266"/>
+              <a:gd name="connsiteY0" fmla="*/ 0 h 922297"/>
+              <a:gd name="connsiteX1" fmla="*/ 256319 w 617266"/>
+              <a:gd name="connsiteY1" fmla="*/ 601579 h 922297"/>
+              <a:gd name="connsiteX2" fmla="*/ 27719 w 617266"/>
+              <a:gd name="connsiteY2" fmla="*/ 745958 h 922297"/>
+              <a:gd name="connsiteX3" fmla="*/ 521013 w 617266"/>
+              <a:gd name="connsiteY3" fmla="*/ 866273 h 922297"/>
+              <a:gd name="connsiteX4" fmla="*/ 208192 w 617266"/>
+              <a:gd name="connsiteY4" fmla="*/ 132347 h 922297"/>
+              <a:gd name="connsiteX5" fmla="*/ 617266 w 617266"/>
+              <a:gd name="connsiteY5" fmla="*/ 216568 h 922297"/>
+              <a:gd name="connsiteX6" fmla="*/ 111940 w 617266"/>
+              <a:gd name="connsiteY6" fmla="*/ 24063 h 922297"/>
+              <a:gd name="connsiteX0" fmla="*/ 63813 w 617266"/>
+              <a:gd name="connsiteY0" fmla="*/ 0 h 922297"/>
+              <a:gd name="connsiteX1" fmla="*/ 256319 w 617266"/>
+              <a:gd name="connsiteY1" fmla="*/ 601579 h 922297"/>
+              <a:gd name="connsiteX2" fmla="*/ 27719 w 617266"/>
+              <a:gd name="connsiteY2" fmla="*/ 745958 h 922297"/>
+              <a:gd name="connsiteX3" fmla="*/ 521013 w 617266"/>
+              <a:gd name="connsiteY3" fmla="*/ 866273 h 922297"/>
+              <a:gd name="connsiteX4" fmla="*/ 208192 w 617266"/>
+              <a:gd name="connsiteY4" fmla="*/ 132347 h 922297"/>
+              <a:gd name="connsiteX5" fmla="*/ 617266 w 617266"/>
+              <a:gd name="connsiteY5" fmla="*/ 216568 h 922297"/>
+              <a:gd name="connsiteX6" fmla="*/ 111940 w 617266"/>
+              <a:gd name="connsiteY6" fmla="*/ 24063 h 922297"/>
+              <a:gd name="connsiteX0" fmla="*/ 63813 w 617266"/>
+              <a:gd name="connsiteY0" fmla="*/ 0 h 922297"/>
+              <a:gd name="connsiteX1" fmla="*/ 256319 w 617266"/>
+              <a:gd name="connsiteY1" fmla="*/ 601579 h 922297"/>
+              <a:gd name="connsiteX2" fmla="*/ 27719 w 617266"/>
+              <a:gd name="connsiteY2" fmla="*/ 745958 h 922297"/>
+              <a:gd name="connsiteX3" fmla="*/ 521013 w 617266"/>
+              <a:gd name="connsiteY3" fmla="*/ 866273 h 922297"/>
+              <a:gd name="connsiteX4" fmla="*/ 208192 w 617266"/>
+              <a:gd name="connsiteY4" fmla="*/ 132347 h 922297"/>
+              <a:gd name="connsiteX5" fmla="*/ 617266 w 617266"/>
+              <a:gd name="connsiteY5" fmla="*/ 216568 h 922297"/>
+              <a:gd name="connsiteX6" fmla="*/ 111940 w 617266"/>
+              <a:gd name="connsiteY6" fmla="*/ 24063 h 922297"/>
+              <a:gd name="connsiteX0" fmla="*/ 63813 w 617266"/>
+              <a:gd name="connsiteY0" fmla="*/ 0 h 922297"/>
+              <a:gd name="connsiteX1" fmla="*/ 256319 w 617266"/>
+              <a:gd name="connsiteY1" fmla="*/ 601579 h 922297"/>
+              <a:gd name="connsiteX2" fmla="*/ 27719 w 617266"/>
+              <a:gd name="connsiteY2" fmla="*/ 745958 h 922297"/>
+              <a:gd name="connsiteX3" fmla="*/ 521013 w 617266"/>
+              <a:gd name="connsiteY3" fmla="*/ 866273 h 922297"/>
+              <a:gd name="connsiteX4" fmla="*/ 208192 w 617266"/>
+              <a:gd name="connsiteY4" fmla="*/ 132347 h 922297"/>
+              <a:gd name="connsiteX5" fmla="*/ 617266 w 617266"/>
+              <a:gd name="connsiteY5" fmla="*/ 216568 h 922297"/>
+              <a:gd name="connsiteX6" fmla="*/ 68224 w 617266"/>
+              <a:gd name="connsiteY6" fmla="*/ 2205 h 922297"/>
+              <a:gd name="connsiteX0" fmla="*/ 63813 w 617266"/>
+              <a:gd name="connsiteY0" fmla="*/ 0 h 922297"/>
+              <a:gd name="connsiteX1" fmla="*/ 256319 w 617266"/>
+              <a:gd name="connsiteY1" fmla="*/ 601579 h 922297"/>
+              <a:gd name="connsiteX2" fmla="*/ 27719 w 617266"/>
+              <a:gd name="connsiteY2" fmla="*/ 745958 h 922297"/>
+              <a:gd name="connsiteX3" fmla="*/ 521013 w 617266"/>
+              <a:gd name="connsiteY3" fmla="*/ 866273 h 922297"/>
+              <a:gd name="connsiteX4" fmla="*/ 208192 w 617266"/>
+              <a:gd name="connsiteY4" fmla="*/ 132347 h 922297"/>
+              <a:gd name="connsiteX5" fmla="*/ 617266 w 617266"/>
+              <a:gd name="connsiteY5" fmla="*/ 216568 h 922297"/>
+              <a:gd name="connsiteX6" fmla="*/ 68224 w 617266"/>
+              <a:gd name="connsiteY6" fmla="*/ 2205 h 922297"/>
+              <a:gd name="connsiteX7" fmla="*/ 63813 w 617266"/>
+              <a:gd name="connsiteY7" fmla="*/ 0 h 922297"/>
+            </a:gdLst>
+            <a:ahLst/>
+            <a:cxnLst>
+              <a:cxn ang="0">
+                <a:pos x="connsiteX0" y="connsiteY0"/>
+              </a:cxn>
+              <a:cxn ang="0">
+                <a:pos x="connsiteX1" y="connsiteY1"/>
+              </a:cxn>
+              <a:cxn ang="0">
+                <a:pos x="connsiteX2" y="connsiteY2"/>
+              </a:cxn>
+              <a:cxn ang="0">
+                <a:pos x="connsiteX3" y="connsiteY3"/>
+              </a:cxn>
+              <a:cxn ang="0">
+                <a:pos x="connsiteX4" y="connsiteY4"/>
+              </a:cxn>
+              <a:cxn ang="0">
+                <a:pos x="connsiteX5" y="connsiteY5"/>
+              </a:cxn>
+              <a:cxn ang="0">
+                <a:pos x="connsiteX6" y="connsiteY6"/>
+              </a:cxn>
+              <a:cxn ang="0">
+                <a:pos x="connsiteX7" y="connsiteY7"/>
+              </a:cxn>
+            </a:cxnLst>
+            <a:rect l="l" t="t" r="r" b="b"/>
+            <a:pathLst>
+              <a:path w="617266" h="922297">
+                <a:moveTo>
+                  <a:pt x="63813" y="0"/>
+                </a:moveTo>
+                <a:lnTo>
+                  <a:pt x="256319" y="601579"/>
+                </a:lnTo>
+                <a:cubicBezTo>
+                  <a:pt x="86367" y="569255"/>
+                  <a:pt x="-63756" y="559764"/>
+                  <a:pt x="27719" y="745958"/>
+                </a:cubicBezTo>
+                <a:cubicBezTo>
+                  <a:pt x="119194" y="932152"/>
+                  <a:pt x="490934" y="968541"/>
+                  <a:pt x="521013" y="866273"/>
+                </a:cubicBezTo>
+                <a:lnTo>
+                  <a:pt x="208192" y="132347"/>
+                </a:lnTo>
+                <a:cubicBezTo>
+                  <a:pt x="344550" y="160421"/>
+                  <a:pt x="473622" y="246783"/>
+                  <a:pt x="617266" y="216568"/>
+                </a:cubicBezTo>
+                <a:cubicBezTo>
+                  <a:pt x="445181" y="177901"/>
+                  <a:pt x="236666" y="66373"/>
+                  <a:pt x="68224" y="2205"/>
+                </a:cubicBezTo>
+                <a:lnTo>
+                  <a:pt x="63813" y="0"/>
+                </a:lnTo>
+                <a:close/>
+              </a:path>
+            </a:pathLst>
+          </a:custGeom>
+          <a:solidFill>
+            <a:srgbClr val="FF0000"/>
+          </a:solidFill>
+          <a:ln w="38100">
+            <a:solidFill>
+              <a:srgbClr val="FFC000"/>
+            </a:solidFill>
+          </a:ln>
+        </p:spPr>
+        <p:style>
+          <a:lnRef idx="2">
+            <a:schemeClr val="accent1">
+              <a:shade val="50000"/>
+            </a:schemeClr>
+          </a:lnRef>
+          <a:fillRef idx="1">
+            <a:schemeClr val="accent1"/>
+          </a:fillRef>
+          <a:effectRef idx="0">
+            <a:schemeClr val="accent1"/>
+          </a:effectRef>
+          <a:fontRef idx="minor">
+            <a:schemeClr val="lt1"/>
+          </a:fontRef>
+        </p:style>
+        <p:txBody>
+          <a:bodyPr rtlCol="0" anchor="ctr"/>
+          <a:lstStyle/>
+          <a:p>
+            <a:pPr algn="ctr"/>
+            <a:endParaRPr lang="en-US"/>
+          </a:p>
+        </p:txBody>
+      </p:sp>
+      <p:sp>
+        <p:nvSpPr>
+          <p:cNvPr id="8" name="Flecha: a la derecha 7">
+            <a:extLst>
+              <a:ext uri="{FF2B5EF4-FFF2-40B4-BE49-F238E27FC236}">
+                <a16:creationId xmlns:a16="http://schemas.microsoft.com/office/drawing/2014/main" id="{CE4C0CDC-9AD9-4892-8E25-AD6AEE7D4406}"/>
+              </a:ext>
+            </a:extLst>
+          </p:cNvPr>
+          <p:cNvSpPr/>
+          <p:nvPr/>
+        </p:nvSpPr>
+        <p:spPr>
+          <a:xfrm rot="4659368">
+            <a:off x="8903089" y="1601128"/>
+            <a:ext cx="1206690" cy="1760651"/>
+          </a:xfrm>
+          <a:prstGeom prst="rightArrow">
+            <a:avLst/>
+          </a:prstGeom>
+          <a:solidFill>
+            <a:srgbClr val="FF0000"/>
+          </a:solidFill>
+          <a:ln w="38100">
+            <a:solidFill>
+              <a:srgbClr val="FFC000"/>
+            </a:solidFill>
+          </a:ln>
+          <a:scene3d>
+            <a:camera prst="perspectiveHeroicExtremeRightFacing"/>
+            <a:lightRig rig="threePt" dir="t"/>
+          </a:scene3d>
+          <a:sp3d>
+            <a:bevelT prst="angle"/>
+          </a:sp3d>
+        </p:spPr>
+        <p:style>
+          <a:lnRef idx="2">
+            <a:schemeClr val="accent1">
+              <a:shade val="50000"/>
+            </a:schemeClr>
+          </a:lnRef>
+          <a:fillRef idx="1">
+            <a:schemeClr val="accent1"/>
+          </a:fillRef>
+          <a:effectRef idx="0">
+            <a:schemeClr val="accent1"/>
+          </a:effectRef>
+          <a:fontRef idx="minor">
+            <a:schemeClr val="lt1"/>
+          </a:fontRef>
+        </p:style>
+        <p:txBody>
+          <a:bodyPr rtlCol="0" anchor="ctr"/>
+          <a:lstStyle/>
+          <a:p>
+            <a:pPr algn="ctr"/>
+            <a:endParaRPr lang="en-US"/>
+          </a:p>
+        </p:txBody>
+      </p:sp>
+      <p:sp>
+        <p:nvSpPr>
+          <p:cNvPr id="9" name="CuadroTexto 8">
+            <a:extLst>
+              <a:ext uri="{FF2B5EF4-FFF2-40B4-BE49-F238E27FC236}">
+                <a16:creationId xmlns:a16="http://schemas.microsoft.com/office/drawing/2014/main" id="{17F775C4-0EC3-4C76-98CA-51BEE741B7BA}"/>
+              </a:ext>
+            </a:extLst>
+          </p:cNvPr>
+          <p:cNvSpPr txBox="1"/>
+          <p:nvPr/>
+        </p:nvSpPr>
+        <p:spPr>
+          <a:xfrm rot="776857">
+            <a:off x="6313536" y="2315994"/>
+            <a:ext cx="2422915" cy="2646878"/>
+          </a:xfrm>
+          <a:prstGeom prst="rect">
+            <a:avLst/>
+          </a:prstGeom>
+          <a:noFill/>
+        </p:spPr>
+        <p:txBody>
+          <a:bodyPr wrap="square" rtlCol="0">
+            <a:spAutoFit/>
+          </a:bodyPr>
+          <a:lstStyle/>
+          <a:p>
+            <a:r>
+              <a:rPr lang="en-US" sz="16600" b="1" dirty="0">
+                <a:ln w="12700">
+                  <a:solidFill>
+                    <a:schemeClr val="accent1"/>
+                  </a:solidFill>
+                  <a:prstDash val="solid"/>
+                </a:ln>
+                <a:solidFill>
+                  <a:schemeClr val="bg1">
+                    <a:lumMod val="95000"/>
+                    <a:lumOff val="5000"/>
+                  </a:schemeClr>
+                </a:solidFill>
+                <a:effectLst>
+                  <a:outerShdw dist="38100" dir="2640000" algn="bl" rotWithShape="0">
+                    <a:schemeClr val="accent1"/>
+                  </a:outerShdw>
+                </a:effectLst>
+              </a:rPr>
+              <a:t>?</a:t>
+            </a:r>
+          </a:p>
+        </p:txBody>
+      </p:sp>
+    </p:spTree>
+    <p:extLst>
+      <p:ext uri="{BB962C8B-B14F-4D97-AF65-F5344CB8AC3E}">
+        <p14:creationId xmlns:p14="http://schemas.microsoft.com/office/powerpoint/2010/main" val="2462424129"/>
+      </p:ext>
+    </p:extLst>
+  </p:cSld>
+  <p:clrMapOvr>
+    <a:masterClrMapping/>
+  </p:clrMapOvr>
+</p:sld>
+</file>
+
+<file path=ppt/slides/slide24.xml><?xml version="1.0" encoding="utf-8"?>
+<p:sld xmlns:a="http://schemas.openxmlformats.org/drawingml/2006/main" xmlns:r="http://schemas.openxmlformats.org/officeDocument/2006/relationships" xmlns:p="http://schemas.openxmlformats.org/presentationml/2006/main">
+  <p:cSld>
+    <p:spTree>
+      <p:nvGrpSpPr>
+        <p:cNvPr id="1" name=""/>
+        <p:cNvGrpSpPr/>
+        <p:nvPr/>
+      </p:nvGrpSpPr>
+      <p:grpSpPr>
+        <a:xfrm>
+          <a:off x="0" y="0"/>
+          <a:ext cx="0" cy="0"/>
+          <a:chOff x="0" y="0"/>
+          <a:chExt cx="0" cy="0"/>
+        </a:xfrm>
+      </p:grpSpPr>
+      <p:sp>
+        <p:nvSpPr>
+          <p:cNvPr id="4" name="Rectángulo 3">
+            <a:extLst>
+              <a:ext uri="{FF2B5EF4-FFF2-40B4-BE49-F238E27FC236}">
+                <a16:creationId xmlns:a16="http://schemas.microsoft.com/office/drawing/2014/main" id="{D85DFB13-485B-4AE7-9400-E79832498591}"/>
+              </a:ext>
+            </a:extLst>
+          </p:cNvPr>
+          <p:cNvSpPr/>
+          <p:nvPr/>
+        </p:nvSpPr>
+        <p:spPr>
+          <a:xfrm>
+            <a:off x="1058779" y="697832"/>
+            <a:ext cx="8686800" cy="5053263"/>
+          </a:xfrm>
+          <a:prstGeom prst="rect">
+            <a:avLst/>
+          </a:prstGeom>
+          <a:solidFill>
+            <a:schemeClr val="bg1">
+              <a:lumMod val="65000"/>
+              <a:lumOff val="35000"/>
+            </a:schemeClr>
+          </a:solidFill>
+          <a:ln w="38100">
+            <a:noFill/>
+          </a:ln>
+        </p:spPr>
+        <p:style>
+          <a:lnRef idx="2">
+            <a:schemeClr val="accent1">
+              <a:shade val="50000"/>
+            </a:schemeClr>
+          </a:lnRef>
+          <a:fillRef idx="1">
+            <a:schemeClr val="accent1"/>
+          </a:fillRef>
+          <a:effectRef idx="0">
+            <a:schemeClr val="accent1"/>
+          </a:effectRef>
+          <a:fontRef idx="minor">
+            <a:schemeClr val="lt1"/>
+          </a:fontRef>
+        </p:style>
+        <p:txBody>
+          <a:bodyPr rtlCol="0" anchor="ctr"/>
+          <a:lstStyle/>
+          <a:p>
+            <a:pPr algn="ctr"/>
+            <a:endParaRPr lang="en-US"/>
+          </a:p>
+        </p:txBody>
+      </p:sp>
+      <p:sp>
+        <p:nvSpPr>
+          <p:cNvPr id="2" name="Rectángulo 1">
+            <a:extLst>
+              <a:ext uri="{FF2B5EF4-FFF2-40B4-BE49-F238E27FC236}">
+                <a16:creationId xmlns:a16="http://schemas.microsoft.com/office/drawing/2014/main" id="{A05A50F8-9651-412B-BF2B-D2A6CADE7C38}"/>
+              </a:ext>
+            </a:extLst>
+          </p:cNvPr>
+          <p:cNvSpPr/>
+          <p:nvPr/>
+        </p:nvSpPr>
+        <p:spPr>
+          <a:xfrm>
+            <a:off x="1636295" y="1323474"/>
+            <a:ext cx="3600000" cy="3600000"/>
+          </a:xfrm>
+          <a:prstGeom prst="rect">
+            <a:avLst/>
+          </a:prstGeom>
+          <a:solidFill>
+            <a:schemeClr val="bg1">
+              <a:lumMod val="95000"/>
+              <a:lumOff val="5000"/>
+            </a:schemeClr>
+          </a:solidFill>
+          <a:ln w="38100">
+            <a:noFill/>
+          </a:ln>
+        </p:spPr>
+        <p:style>
+          <a:lnRef idx="2">
+            <a:schemeClr val="accent1">
+              <a:shade val="50000"/>
+            </a:schemeClr>
+          </a:lnRef>
+          <a:fillRef idx="1">
+            <a:schemeClr val="accent1"/>
+          </a:fillRef>
+          <a:effectRef idx="0">
+            <a:schemeClr val="accent1"/>
+          </a:effectRef>
+          <a:fontRef idx="minor">
+            <a:schemeClr val="lt1"/>
+          </a:fontRef>
+        </p:style>
+        <p:txBody>
+          <a:bodyPr rtlCol="0" anchor="ctr"/>
+          <a:lstStyle/>
+          <a:p>
+            <a:pPr algn="ctr"/>
+            <a:endParaRPr lang="en-US"/>
+          </a:p>
+        </p:txBody>
+      </p:sp>
+      <p:sp>
+        <p:nvSpPr>
+          <p:cNvPr id="3" name="Rectángulo 2">
+            <a:extLst>
+              <a:ext uri="{FF2B5EF4-FFF2-40B4-BE49-F238E27FC236}">
+                <a16:creationId xmlns:a16="http://schemas.microsoft.com/office/drawing/2014/main" id="{BCED2D2F-0122-4397-B326-1F015F256209}"/>
+              </a:ext>
+            </a:extLst>
+          </p:cNvPr>
+          <p:cNvSpPr/>
+          <p:nvPr/>
+        </p:nvSpPr>
+        <p:spPr>
+          <a:xfrm>
+            <a:off x="5236295" y="1323474"/>
+            <a:ext cx="3600000" cy="3600000"/>
+          </a:xfrm>
+          <a:prstGeom prst="rect">
+            <a:avLst/>
+          </a:prstGeom>
+          <a:solidFill>
+            <a:schemeClr val="bg1">
+              <a:lumMod val="95000"/>
+              <a:lumOff val="5000"/>
+            </a:schemeClr>
+          </a:solidFill>
+          <a:ln w="38100">
+            <a:noFill/>
+          </a:ln>
+        </p:spPr>
+        <p:style>
+          <a:lnRef idx="2">
+            <a:schemeClr val="accent1">
+              <a:shade val="50000"/>
+            </a:schemeClr>
+          </a:lnRef>
+          <a:fillRef idx="1">
+            <a:schemeClr val="accent1"/>
+          </a:fillRef>
+          <a:effectRef idx="0">
+            <a:schemeClr val="accent1"/>
+          </a:effectRef>
+          <a:fontRef idx="minor">
+            <a:schemeClr val="lt1"/>
+          </a:fontRef>
+        </p:style>
+        <p:txBody>
+          <a:bodyPr rtlCol="0" anchor="ctr"/>
+          <a:lstStyle/>
+          <a:p>
+            <a:pPr algn="ctr"/>
+            <a:endParaRPr lang="en-US"/>
+          </a:p>
+        </p:txBody>
+      </p:sp>
+      <p:sp>
+        <p:nvSpPr>
+          <p:cNvPr id="5" name="CuadroTexto 4">
+            <a:extLst>
+              <a:ext uri="{FF2B5EF4-FFF2-40B4-BE49-F238E27FC236}">
+                <a16:creationId xmlns:a16="http://schemas.microsoft.com/office/drawing/2014/main" id="{EA59C0B3-482F-4117-AFFB-A1E627ACCFCA}"/>
+              </a:ext>
+            </a:extLst>
+          </p:cNvPr>
+          <p:cNvSpPr txBox="1"/>
+          <p:nvPr/>
+        </p:nvSpPr>
+        <p:spPr>
+          <a:xfrm>
+            <a:off x="1946519" y="1780674"/>
+            <a:ext cx="2962365" cy="1200329"/>
+          </a:xfrm>
+          <a:prstGeom prst="rect">
+            <a:avLst/>
+          </a:prstGeom>
+          <a:noFill/>
+        </p:spPr>
+        <p:txBody>
+          <a:bodyPr wrap="square" rtlCol="0">
+            <a:spAutoFit/>
+          </a:bodyPr>
+          <a:lstStyle/>
+          <a:p>
+            <a:r>
               <a:rPr lang="en-US" dirty="0"/>
-              <a:t>This is some text that I have typed as an example.</a:t>
+              <a:t>More text about things.</a:t>
             </a:r>
           </a:p>
           <a:p>
@@ -16342,7 +16986,7 @@
           <a:p>
             <a:r>
               <a:rPr lang="en-US" dirty="0"/>
-              <a:t>In this test we want to check you can sing. </a:t>
+              <a:t>In this test we want to check you can sing very loudly. </a:t>
             </a:r>
           </a:p>
         </p:txBody>
@@ -16377,7 +17021,7 @@
           <a:p>
             <a:r>
               <a:rPr lang="en-US" dirty="0"/>
-              <a:t>Click on the Record button and then submit the recording</a:t>
+              <a:t>Click on the Record button again and then submit the recording after reviewing it</a:t>
             </a:r>
           </a:p>
         </p:txBody>
@@ -16638,7 +17282,7 @@
             <a:avLst/>
           </a:prstGeom>
           <a:solidFill>
-            <a:srgbClr val="FF0000"/>
+            <a:srgbClr val="7030A0"/>
           </a:solidFill>
           <a:ln w="38100">
             <a:solidFill>
@@ -16678,10 +17322,234 @@
           </a:p>
         </p:txBody>
       </p:sp>
+      <p:sp>
+        <p:nvSpPr>
+          <p:cNvPr id="9" name="Luna 8">
+            <a:extLst>
+              <a:ext uri="{FF2B5EF4-FFF2-40B4-BE49-F238E27FC236}">
+                <a16:creationId xmlns:a16="http://schemas.microsoft.com/office/drawing/2014/main" id="{1F543B4E-0C7C-429C-80DE-A6CEE12F3156}"/>
+              </a:ext>
+            </a:extLst>
+          </p:cNvPr>
+          <p:cNvSpPr/>
+          <p:nvPr/>
+        </p:nvSpPr>
+        <p:spPr>
+          <a:xfrm>
+            <a:off x="2446421" y="3601023"/>
+            <a:ext cx="415438" cy="922297"/>
+          </a:xfrm>
+          <a:prstGeom prst="moon">
+            <a:avLst>
+              <a:gd name="adj" fmla="val 23599"/>
+            </a:avLst>
+          </a:prstGeom>
+          <a:solidFill>
+            <a:srgbClr val="FF0000"/>
+          </a:solidFill>
+          <a:ln w="38100">
+            <a:solidFill>
+              <a:srgbClr val="FFC000"/>
+            </a:solidFill>
+          </a:ln>
+        </p:spPr>
+        <p:style>
+          <a:lnRef idx="2">
+            <a:schemeClr val="accent1">
+              <a:shade val="50000"/>
+            </a:schemeClr>
+          </a:lnRef>
+          <a:fillRef idx="1">
+            <a:schemeClr val="accent1"/>
+          </a:fillRef>
+          <a:effectRef idx="0">
+            <a:schemeClr val="accent1"/>
+          </a:effectRef>
+          <a:fontRef idx="minor">
+            <a:schemeClr val="lt1"/>
+          </a:fontRef>
+        </p:style>
+        <p:txBody>
+          <a:bodyPr rtlCol="0" anchor="ctr"/>
+          <a:lstStyle/>
+          <a:p>
+            <a:pPr algn="ctr"/>
+            <a:endParaRPr lang="en-US"/>
+          </a:p>
+        </p:txBody>
+      </p:sp>
+      <p:sp>
+        <p:nvSpPr>
+          <p:cNvPr id="10" name="Luna 9">
+            <a:extLst>
+              <a:ext uri="{FF2B5EF4-FFF2-40B4-BE49-F238E27FC236}">
+                <a16:creationId xmlns:a16="http://schemas.microsoft.com/office/drawing/2014/main" id="{CF2C0AAE-8177-4A78-AD00-B650C19E045A}"/>
+              </a:ext>
+            </a:extLst>
+          </p:cNvPr>
+          <p:cNvSpPr/>
+          <p:nvPr/>
+        </p:nvSpPr>
+        <p:spPr>
+          <a:xfrm>
+            <a:off x="2048869" y="3525254"/>
+            <a:ext cx="506994" cy="1206374"/>
+          </a:xfrm>
+          <a:prstGeom prst="moon">
+            <a:avLst>
+              <a:gd name="adj" fmla="val 23599"/>
+            </a:avLst>
+          </a:prstGeom>
+          <a:solidFill>
+            <a:srgbClr val="FF0000"/>
+          </a:solidFill>
+          <a:ln w="38100">
+            <a:solidFill>
+              <a:srgbClr val="FFC000"/>
+            </a:solidFill>
+          </a:ln>
+        </p:spPr>
+        <p:style>
+          <a:lnRef idx="2">
+            <a:schemeClr val="accent1">
+              <a:shade val="50000"/>
+            </a:schemeClr>
+          </a:lnRef>
+          <a:fillRef idx="1">
+            <a:schemeClr val="accent1"/>
+          </a:fillRef>
+          <a:effectRef idx="0">
+            <a:schemeClr val="accent1"/>
+          </a:effectRef>
+          <a:fontRef idx="minor">
+            <a:schemeClr val="lt1"/>
+          </a:fontRef>
+        </p:style>
+        <p:txBody>
+          <a:bodyPr rtlCol="0" anchor="ctr"/>
+          <a:lstStyle/>
+          <a:p>
+            <a:pPr algn="ctr"/>
+            <a:endParaRPr lang="en-US"/>
+          </a:p>
+        </p:txBody>
+      </p:sp>
+      <p:sp>
+        <p:nvSpPr>
+          <p:cNvPr id="11" name="Luna 10">
+            <a:extLst>
+              <a:ext uri="{FF2B5EF4-FFF2-40B4-BE49-F238E27FC236}">
+                <a16:creationId xmlns:a16="http://schemas.microsoft.com/office/drawing/2014/main" id="{E2073FF4-0561-4A97-834C-440447C9E036}"/>
+              </a:ext>
+            </a:extLst>
+          </p:cNvPr>
+          <p:cNvSpPr/>
+          <p:nvPr/>
+        </p:nvSpPr>
+        <p:spPr>
+          <a:xfrm rot="10800000">
+            <a:off x="3851320" y="3649164"/>
+            <a:ext cx="415438" cy="922297"/>
+          </a:xfrm>
+          <a:prstGeom prst="moon">
+            <a:avLst>
+              <a:gd name="adj" fmla="val 23599"/>
+            </a:avLst>
+          </a:prstGeom>
+          <a:solidFill>
+            <a:srgbClr val="FF0000"/>
+          </a:solidFill>
+          <a:ln w="38100">
+            <a:solidFill>
+              <a:srgbClr val="FFC000"/>
+            </a:solidFill>
+          </a:ln>
+        </p:spPr>
+        <p:style>
+          <a:lnRef idx="2">
+            <a:schemeClr val="accent1">
+              <a:shade val="50000"/>
+            </a:schemeClr>
+          </a:lnRef>
+          <a:fillRef idx="1">
+            <a:schemeClr val="accent1"/>
+          </a:fillRef>
+          <a:effectRef idx="0">
+            <a:schemeClr val="accent1"/>
+          </a:effectRef>
+          <a:fontRef idx="minor">
+            <a:schemeClr val="lt1"/>
+          </a:fontRef>
+        </p:style>
+        <p:txBody>
+          <a:bodyPr rtlCol="0" anchor="ctr"/>
+          <a:lstStyle/>
+          <a:p>
+            <a:pPr algn="ctr"/>
+            <a:endParaRPr lang="en-US"/>
+          </a:p>
+        </p:txBody>
+      </p:sp>
+      <p:sp>
+        <p:nvSpPr>
+          <p:cNvPr id="12" name="Luna 11">
+            <a:extLst>
+              <a:ext uri="{FF2B5EF4-FFF2-40B4-BE49-F238E27FC236}">
+                <a16:creationId xmlns:a16="http://schemas.microsoft.com/office/drawing/2014/main" id="{1D1C748B-5808-4EC2-97D7-6407112FFBEF}"/>
+              </a:ext>
+            </a:extLst>
+          </p:cNvPr>
+          <p:cNvSpPr/>
+          <p:nvPr/>
+        </p:nvSpPr>
+        <p:spPr>
+          <a:xfrm rot="10800000">
+            <a:off x="4073514" y="3507125"/>
+            <a:ext cx="506994" cy="1206374"/>
+          </a:xfrm>
+          <a:prstGeom prst="moon">
+            <a:avLst>
+              <a:gd name="adj" fmla="val 23599"/>
+            </a:avLst>
+          </a:prstGeom>
+          <a:solidFill>
+            <a:srgbClr val="FF0000"/>
+          </a:solidFill>
+          <a:ln w="38100">
+            <a:solidFill>
+              <a:srgbClr val="FFC000"/>
+            </a:solidFill>
+          </a:ln>
+        </p:spPr>
+        <p:style>
+          <a:lnRef idx="2">
+            <a:schemeClr val="accent1">
+              <a:shade val="50000"/>
+            </a:schemeClr>
+          </a:lnRef>
+          <a:fillRef idx="1">
+            <a:schemeClr val="accent1"/>
+          </a:fillRef>
+          <a:effectRef idx="0">
+            <a:schemeClr val="accent1"/>
+          </a:effectRef>
+          <a:fontRef idx="minor">
+            <a:schemeClr val="lt1"/>
+          </a:fontRef>
+        </p:style>
+        <p:txBody>
+          <a:bodyPr rtlCol="0" anchor="ctr"/>
+          <a:lstStyle/>
+          <a:p>
+            <a:pPr algn="ctr"/>
+            <a:endParaRPr lang="en-US"/>
+          </a:p>
+        </p:txBody>
+      </p:sp>
     </p:spTree>
     <p:extLst>
       <p:ext uri="{BB962C8B-B14F-4D97-AF65-F5344CB8AC3E}">
-        <p14:creationId xmlns:p14="http://schemas.microsoft.com/office/powerpoint/2010/main" val="2462424129"/>
+        <p14:creationId xmlns:p14="http://schemas.microsoft.com/office/powerpoint/2010/main" val="1266122089"/>
       </p:ext>
     </p:extLst>
   </p:cSld>
@@ -16691,7 +17559,7 @@
 </p:sld>
 </file>
 
-<file path=ppt/slides/slide24.xml><?xml version="1.0" encoding="utf-8"?>
+<file path=ppt/slides/slide25.xml><?xml version="1.0" encoding="utf-8"?>
 <p:sld xmlns:a="http://schemas.openxmlformats.org/drawingml/2006/main" xmlns:r="http://schemas.openxmlformats.org/officeDocument/2006/relationships" xmlns:p="http://schemas.openxmlformats.org/presentationml/2006/main">
   <p:cSld>
     <p:spTree>
@@ -16820,10 +17688,263 @@
       </p:sp>
       <p:sp>
         <p:nvSpPr>
-          <p:cNvPr id="3" name="Rectángulo 2">
-            <a:extLst>
-              <a:ext uri="{FF2B5EF4-FFF2-40B4-BE49-F238E27FC236}">
-                <a16:creationId xmlns:a16="http://schemas.microsoft.com/office/drawing/2014/main" id="{BCED2D2F-0122-4397-B326-1F015F256209}"/>
+          <p:cNvPr id="5" name="CuadroTexto 4">
+            <a:extLst>
+              <a:ext uri="{FF2B5EF4-FFF2-40B4-BE49-F238E27FC236}">
+                <a16:creationId xmlns:a16="http://schemas.microsoft.com/office/drawing/2014/main" id="{EA59C0B3-482F-4117-AFFB-A1E627ACCFCA}"/>
+              </a:ext>
+            </a:extLst>
+          </p:cNvPr>
+          <p:cNvSpPr txBox="1"/>
+          <p:nvPr/>
+        </p:nvSpPr>
+        <p:spPr>
+          <a:xfrm>
+            <a:off x="1804737" y="1588162"/>
+            <a:ext cx="3260558" cy="1785104"/>
+          </a:xfrm>
+          <a:prstGeom prst="rect">
+            <a:avLst/>
+          </a:prstGeom>
+          <a:noFill/>
+        </p:spPr>
+        <p:txBody>
+          <a:bodyPr wrap="square" rtlCol="0">
+            <a:spAutoFit/>
+          </a:bodyPr>
+          <a:lstStyle/>
+          <a:p>
+            <a:pPr algn="ctr"/>
+            <a:r>
+              <a:rPr lang="en-US" sz="2400" b="1" dirty="0"/>
+              <a:t>Welcome to </a:t>
+            </a:r>
+            <a:r>
+              <a:rPr lang="en-US" sz="2400" b="1" dirty="0" err="1"/>
+              <a:t>VoiceVault</a:t>
+            </a:r>
+            <a:endParaRPr lang="en-US" sz="2400" b="1" dirty="0"/>
+          </a:p>
+          <a:p>
+            <a:pPr algn="ctr"/>
+            <a:endParaRPr lang="en-US" dirty="0"/>
+          </a:p>
+          <a:p>
+            <a:pPr algn="ctr"/>
+            <a:r>
+              <a:rPr lang="en-US" dirty="0"/>
+              <a:t>Clinical voice quality assessment</a:t>
+            </a:r>
+          </a:p>
+          <a:p>
+            <a:pPr algn="ctr"/>
+            <a:endParaRPr lang="en-US" dirty="0"/>
+          </a:p>
+          <a:p>
+            <a:pPr algn="ctr"/>
+            <a:endParaRPr lang="en-US" dirty="0"/>
+          </a:p>
+          <a:p>
+            <a:pPr algn="ctr"/>
+            <a:r>
+              <a:rPr lang="en-US" sz="1400" dirty="0"/>
+              <a:t>Built in Scotland by audence</a:t>
+            </a:r>
+          </a:p>
+        </p:txBody>
+      </p:sp>
+      <p:pic>
+        <p:nvPicPr>
+          <p:cNvPr id="16" name="Imagen 15" descr="Icono&#10;&#10;Descripción generada automáticamente">
+            <a:extLst>
+              <a:ext uri="{FF2B5EF4-FFF2-40B4-BE49-F238E27FC236}">
+                <a16:creationId xmlns:a16="http://schemas.microsoft.com/office/drawing/2014/main" id="{64956D90-E251-4843-903A-8F745C03C2E3}"/>
+              </a:ext>
+            </a:extLst>
+          </p:cNvPr>
+          <p:cNvPicPr>
+            <a:picLocks noChangeAspect="1"/>
+          </p:cNvPicPr>
+          <p:nvPr/>
+        </p:nvPicPr>
+        <p:blipFill>
+          <a:blip r:embed="rId2">
+            <a:extLst>
+              <a:ext uri="{28A0092B-C50C-407E-A947-70E740481C1C}">
+                <a14:useLocalDpi xmlns:a14="http://schemas.microsoft.com/office/drawing/2010/main" val="0"/>
+              </a:ext>
+            </a:extLst>
+          </a:blip>
+          <a:stretch>
+            <a:fillRect/>
+          </a:stretch>
+        </p:blipFill>
+        <p:spPr>
+          <a:xfrm>
+            <a:off x="2577874" y="3467154"/>
+            <a:ext cx="1663144" cy="1386976"/>
+          </a:xfrm>
+          <a:prstGeom prst="rect">
+            <a:avLst/>
+          </a:prstGeom>
+        </p:spPr>
+      </p:pic>
+    </p:spTree>
+    <p:extLst>
+      <p:ext uri="{BB962C8B-B14F-4D97-AF65-F5344CB8AC3E}">
+        <p14:creationId xmlns:p14="http://schemas.microsoft.com/office/powerpoint/2010/main" val="2118122674"/>
+      </p:ext>
+    </p:extLst>
+  </p:cSld>
+  <p:clrMapOvr>
+    <a:masterClrMapping/>
+  </p:clrMapOvr>
+</p:sld>
+</file>
+
+<file path=ppt/slides/slide26.xml><?xml version="1.0" encoding="utf-8"?>
+<p:sld xmlns:a="http://schemas.openxmlformats.org/drawingml/2006/main" xmlns:r="http://schemas.openxmlformats.org/officeDocument/2006/relationships" xmlns:p="http://schemas.openxmlformats.org/presentationml/2006/main">
+  <p:cSld>
+    <p:spTree>
+      <p:nvGrpSpPr>
+        <p:cNvPr id="1" name=""/>
+        <p:cNvGrpSpPr/>
+        <p:nvPr/>
+      </p:nvGrpSpPr>
+      <p:grpSpPr>
+        <a:xfrm>
+          <a:off x="0" y="0"/>
+          <a:ext cx="0" cy="0"/>
+          <a:chOff x="0" y="0"/>
+          <a:chExt cx="0" cy="0"/>
+        </a:xfrm>
+      </p:grpSpPr>
+      <p:pic>
+        <p:nvPicPr>
+          <p:cNvPr id="6" name="Imagen 5">
+            <a:extLst>
+              <a:ext uri="{FF2B5EF4-FFF2-40B4-BE49-F238E27FC236}">
+                <a16:creationId xmlns:a16="http://schemas.microsoft.com/office/drawing/2014/main" id="{513E70C9-EA36-496F-9C18-04DD65AB6CE1}"/>
+              </a:ext>
+            </a:extLst>
+          </p:cNvPr>
+          <p:cNvPicPr>
+            <a:picLocks noChangeAspect="1"/>
+          </p:cNvPicPr>
+          <p:nvPr/>
+        </p:nvPicPr>
+        <p:blipFill rotWithShape="1">
+          <a:blip r:embed="rId2"/>
+          <a:srcRect l="43717" r="1"/>
+          <a:stretch/>
+        </p:blipFill>
+        <p:spPr>
+          <a:xfrm>
+            <a:off x="2664994" y="0"/>
+            <a:ext cx="6862011" cy="6858000"/>
+          </a:xfrm>
+          <a:prstGeom prst="rect">
+            <a:avLst/>
+          </a:prstGeom>
+        </p:spPr>
+      </p:pic>
+      <p:pic>
+        <p:nvPicPr>
+          <p:cNvPr id="7" name="Picture 4" descr="https://www.strath.ac.uk/media/1newwebsite/documents/brand/strath_main.jpg">
+            <a:extLst>
+              <a:ext uri="{FF2B5EF4-FFF2-40B4-BE49-F238E27FC236}">
+                <a16:creationId xmlns:a16="http://schemas.microsoft.com/office/drawing/2014/main" id="{09DDC4EB-53EE-4856-899D-028F20EE32D2}"/>
+              </a:ext>
+            </a:extLst>
+          </p:cNvPr>
+          <p:cNvPicPr>
+            <a:picLocks noChangeAspect="1" noChangeArrowheads="1"/>
+          </p:cNvPicPr>
+          <p:nvPr/>
+        </p:nvPicPr>
+        <p:blipFill>
+          <a:blip r:embed="rId3" cstate="print">
+            <a:extLst>
+              <a:ext uri="{28A0092B-C50C-407E-A947-70E740481C1C}">
+                <a14:useLocalDpi xmlns:a14="http://schemas.microsoft.com/office/drawing/2010/main" val="0"/>
+              </a:ext>
+            </a:extLst>
+          </a:blip>
+          <a:srcRect/>
+          <a:stretch>
+            <a:fillRect/>
+          </a:stretch>
+        </p:blipFill>
+        <p:spPr bwMode="auto">
+          <a:xfrm>
+            <a:off x="7688374" y="1"/>
+            <a:ext cx="1838632" cy="2068461"/>
+          </a:xfrm>
+          <a:prstGeom prst="rect">
+            <a:avLst/>
+          </a:prstGeom>
+          <a:noFill/>
+          <a:extLst>
+            <a:ext uri="{909E8E84-426E-40DD-AFC4-6F175D3DCCD1}">
+              <a14:hiddenFill xmlns:a14="http://schemas.microsoft.com/office/drawing/2010/main">
+                <a:solidFill>
+                  <a:srgbClr val="FFFFFF"/>
+                </a:solidFill>
+              </a14:hiddenFill>
+            </a:ext>
+          </a:extLst>
+        </p:spPr>
+      </p:pic>
+      <p:sp>
+        <p:nvSpPr>
+          <p:cNvPr id="8" name="CuadroTexto 7">
+            <a:extLst>
+              <a:ext uri="{FF2B5EF4-FFF2-40B4-BE49-F238E27FC236}">
+                <a16:creationId xmlns:a16="http://schemas.microsoft.com/office/drawing/2014/main" id="{8848738D-8359-4DE6-B0B8-B3735517525E}"/>
+              </a:ext>
+            </a:extLst>
+          </p:cNvPr>
+          <p:cNvSpPr txBox="1"/>
+          <p:nvPr/>
+        </p:nvSpPr>
+        <p:spPr>
+          <a:xfrm>
+            <a:off x="3228474" y="2068462"/>
+            <a:ext cx="4199021" cy="1938992"/>
+          </a:xfrm>
+          <a:prstGeom prst="rect">
+            <a:avLst/>
+          </a:prstGeom>
+          <a:noFill/>
+        </p:spPr>
+        <p:txBody>
+          <a:bodyPr wrap="square" rtlCol="0">
+            <a:spAutoFit/>
+          </a:bodyPr>
+          <a:lstStyle/>
+          <a:p>
+            <a:r>
+              <a:rPr lang="en-GB" sz="2400" dirty="0"/>
+              <a:t>On a scale of 1 to 10 how fatigued are you at the moment?</a:t>
+            </a:r>
+          </a:p>
+          <a:p>
+            <a:endParaRPr lang="en-GB" sz="2400" dirty="0"/>
+          </a:p>
+          <a:p>
+            <a:r>
+              <a:rPr lang="en-GB" sz="2400" dirty="0"/>
+              <a:t>(1 = worst, 10 = best)</a:t>
+            </a:r>
+          </a:p>
+        </p:txBody>
+      </p:sp>
+      <p:sp>
+        <p:nvSpPr>
+          <p:cNvPr id="3" name="Forma libre: forma 2">
+            <a:extLst>
+              <a:ext uri="{FF2B5EF4-FFF2-40B4-BE49-F238E27FC236}">
+                <a16:creationId xmlns:a16="http://schemas.microsoft.com/office/drawing/2014/main" id="{11BF7974-4EA1-4308-88BF-3AA5307296D5}"/>
               </a:ext>
             </a:extLst>
           </p:cNvPr>
@@ -16832,20 +17953,352 @@
         </p:nvSpPr>
         <p:spPr>
           <a:xfrm>
-            <a:off x="5236295" y="1323474"/>
-            <a:ext cx="3600000" cy="3600000"/>
+            <a:off x="6679304" y="3514268"/>
+            <a:ext cx="1009070" cy="1737625"/>
           </a:xfrm>
-          <a:prstGeom prst="rect">
+          <a:custGeom>
             <a:avLst/>
-          </a:prstGeom>
+            <a:gdLst>
+              <a:gd name="connsiteX0" fmla="*/ 66453 w 866370"/>
+              <a:gd name="connsiteY0" fmla="*/ 236096 h 1660896"/>
+              <a:gd name="connsiteX1" fmla="*/ 612991 w 866370"/>
+              <a:gd name="connsiteY1" fmla="*/ 194055 h 1660896"/>
+              <a:gd name="connsiteX2" fmla="*/ 297681 w 866370"/>
+              <a:gd name="connsiteY2" fmla="*/ 908758 h 1660896"/>
+              <a:gd name="connsiteX3" fmla="*/ 339722 w 866370"/>
+              <a:gd name="connsiteY3" fmla="*/ 1591931 h 1660896"/>
+              <a:gd name="connsiteX4" fmla="*/ 602481 w 866370"/>
+              <a:gd name="connsiteY4" fmla="*/ 1570910 h 1660896"/>
+              <a:gd name="connsiteX5" fmla="*/ 560439 w 866370"/>
+              <a:gd name="connsiteY5" fmla="*/ 1003352 h 1660896"/>
+              <a:gd name="connsiteX6" fmla="*/ 854729 w 866370"/>
+              <a:gd name="connsiteY6" fmla="*/ 152014 h 1660896"/>
+              <a:gd name="connsiteX7" fmla="*/ 97984 w 866370"/>
+              <a:gd name="connsiteY7" fmla="*/ 4869 h 1660896"/>
+              <a:gd name="connsiteX8" fmla="*/ 66453 w 866370"/>
+              <a:gd name="connsiteY8" fmla="*/ 236096 h 1660896"/>
+              <a:gd name="connsiteX0" fmla="*/ 66453 w 876619"/>
+              <a:gd name="connsiteY0" fmla="*/ 278980 h 1703780"/>
+              <a:gd name="connsiteX1" fmla="*/ 612991 w 876619"/>
+              <a:gd name="connsiteY1" fmla="*/ 236939 h 1703780"/>
+              <a:gd name="connsiteX2" fmla="*/ 297681 w 876619"/>
+              <a:gd name="connsiteY2" fmla="*/ 951642 h 1703780"/>
+              <a:gd name="connsiteX3" fmla="*/ 339722 w 876619"/>
+              <a:gd name="connsiteY3" fmla="*/ 1634815 h 1703780"/>
+              <a:gd name="connsiteX4" fmla="*/ 602481 w 876619"/>
+              <a:gd name="connsiteY4" fmla="*/ 1613794 h 1703780"/>
+              <a:gd name="connsiteX5" fmla="*/ 560439 w 876619"/>
+              <a:gd name="connsiteY5" fmla="*/ 1046236 h 1703780"/>
+              <a:gd name="connsiteX6" fmla="*/ 865239 w 876619"/>
+              <a:gd name="connsiteY6" fmla="*/ 100305 h 1703780"/>
+              <a:gd name="connsiteX7" fmla="*/ 97984 w 876619"/>
+              <a:gd name="connsiteY7" fmla="*/ 47753 h 1703780"/>
+              <a:gd name="connsiteX8" fmla="*/ 66453 w 876619"/>
+              <a:gd name="connsiteY8" fmla="*/ 278980 h 1703780"/>
+              <a:gd name="connsiteX0" fmla="*/ 70951 w 870606"/>
+              <a:gd name="connsiteY0" fmla="*/ 390280 h 1709977"/>
+              <a:gd name="connsiteX1" fmla="*/ 606978 w 870606"/>
+              <a:gd name="connsiteY1" fmla="*/ 243136 h 1709977"/>
+              <a:gd name="connsiteX2" fmla="*/ 291668 w 870606"/>
+              <a:gd name="connsiteY2" fmla="*/ 957839 h 1709977"/>
+              <a:gd name="connsiteX3" fmla="*/ 333709 w 870606"/>
+              <a:gd name="connsiteY3" fmla="*/ 1641012 h 1709977"/>
+              <a:gd name="connsiteX4" fmla="*/ 596468 w 870606"/>
+              <a:gd name="connsiteY4" fmla="*/ 1619991 h 1709977"/>
+              <a:gd name="connsiteX5" fmla="*/ 554426 w 870606"/>
+              <a:gd name="connsiteY5" fmla="*/ 1052433 h 1709977"/>
+              <a:gd name="connsiteX6" fmla="*/ 859226 w 870606"/>
+              <a:gd name="connsiteY6" fmla="*/ 106502 h 1709977"/>
+              <a:gd name="connsiteX7" fmla="*/ 91971 w 870606"/>
+              <a:gd name="connsiteY7" fmla="*/ 53950 h 1709977"/>
+              <a:gd name="connsiteX8" fmla="*/ 70951 w 870606"/>
+              <a:gd name="connsiteY8" fmla="*/ 390280 h 1709977"/>
+              <a:gd name="connsiteX0" fmla="*/ 143682 w 943337"/>
+              <a:gd name="connsiteY0" fmla="*/ 380990 h 1700687"/>
+              <a:gd name="connsiteX1" fmla="*/ 679709 w 943337"/>
+              <a:gd name="connsiteY1" fmla="*/ 233846 h 1700687"/>
+              <a:gd name="connsiteX2" fmla="*/ 364399 w 943337"/>
+              <a:gd name="connsiteY2" fmla="*/ 948549 h 1700687"/>
+              <a:gd name="connsiteX3" fmla="*/ 406440 w 943337"/>
+              <a:gd name="connsiteY3" fmla="*/ 1631722 h 1700687"/>
+              <a:gd name="connsiteX4" fmla="*/ 669199 w 943337"/>
+              <a:gd name="connsiteY4" fmla="*/ 1610701 h 1700687"/>
+              <a:gd name="connsiteX5" fmla="*/ 627157 w 943337"/>
+              <a:gd name="connsiteY5" fmla="*/ 1043143 h 1700687"/>
+              <a:gd name="connsiteX6" fmla="*/ 931957 w 943337"/>
+              <a:gd name="connsiteY6" fmla="*/ 97212 h 1700687"/>
+              <a:gd name="connsiteX7" fmla="*/ 59598 w 943337"/>
+              <a:gd name="connsiteY7" fmla="*/ 65681 h 1700687"/>
+              <a:gd name="connsiteX8" fmla="*/ 143682 w 943337"/>
+              <a:gd name="connsiteY8" fmla="*/ 380990 h 1700687"/>
+              <a:gd name="connsiteX0" fmla="*/ 143682 w 943337"/>
+              <a:gd name="connsiteY0" fmla="*/ 380990 h 1700687"/>
+              <a:gd name="connsiteX1" fmla="*/ 679709 w 943337"/>
+              <a:gd name="connsiteY1" fmla="*/ 233846 h 1700687"/>
+              <a:gd name="connsiteX2" fmla="*/ 364399 w 943337"/>
+              <a:gd name="connsiteY2" fmla="*/ 948549 h 1700687"/>
+              <a:gd name="connsiteX3" fmla="*/ 406440 w 943337"/>
+              <a:gd name="connsiteY3" fmla="*/ 1631722 h 1700687"/>
+              <a:gd name="connsiteX4" fmla="*/ 669199 w 943337"/>
+              <a:gd name="connsiteY4" fmla="*/ 1610701 h 1700687"/>
+              <a:gd name="connsiteX5" fmla="*/ 627157 w 943337"/>
+              <a:gd name="connsiteY5" fmla="*/ 1043143 h 1700687"/>
+              <a:gd name="connsiteX6" fmla="*/ 931957 w 943337"/>
+              <a:gd name="connsiteY6" fmla="*/ 97212 h 1700687"/>
+              <a:gd name="connsiteX7" fmla="*/ 59598 w 943337"/>
+              <a:gd name="connsiteY7" fmla="*/ 65681 h 1700687"/>
+              <a:gd name="connsiteX8" fmla="*/ 143682 w 943337"/>
+              <a:gd name="connsiteY8" fmla="*/ 380990 h 1700687"/>
+              <a:gd name="connsiteX0" fmla="*/ 135475 w 935130"/>
+              <a:gd name="connsiteY0" fmla="*/ 357386 h 1677083"/>
+              <a:gd name="connsiteX1" fmla="*/ 671502 w 935130"/>
+              <a:gd name="connsiteY1" fmla="*/ 210242 h 1677083"/>
+              <a:gd name="connsiteX2" fmla="*/ 356192 w 935130"/>
+              <a:gd name="connsiteY2" fmla="*/ 924945 h 1677083"/>
+              <a:gd name="connsiteX3" fmla="*/ 398233 w 935130"/>
+              <a:gd name="connsiteY3" fmla="*/ 1608118 h 1677083"/>
+              <a:gd name="connsiteX4" fmla="*/ 660992 w 935130"/>
+              <a:gd name="connsiteY4" fmla="*/ 1587097 h 1677083"/>
+              <a:gd name="connsiteX5" fmla="*/ 618950 w 935130"/>
+              <a:gd name="connsiteY5" fmla="*/ 1019539 h 1677083"/>
+              <a:gd name="connsiteX6" fmla="*/ 923750 w 935130"/>
+              <a:gd name="connsiteY6" fmla="*/ 73608 h 1677083"/>
+              <a:gd name="connsiteX7" fmla="*/ 61901 w 935130"/>
+              <a:gd name="connsiteY7" fmla="*/ 115650 h 1677083"/>
+              <a:gd name="connsiteX8" fmla="*/ 135475 w 935130"/>
+              <a:gd name="connsiteY8" fmla="*/ 357386 h 1677083"/>
+              <a:gd name="connsiteX0" fmla="*/ 191526 w 991181"/>
+              <a:gd name="connsiteY0" fmla="*/ 413888 h 1733585"/>
+              <a:gd name="connsiteX1" fmla="*/ 727553 w 991181"/>
+              <a:gd name="connsiteY1" fmla="*/ 266744 h 1733585"/>
+              <a:gd name="connsiteX2" fmla="*/ 412243 w 991181"/>
+              <a:gd name="connsiteY2" fmla="*/ 981447 h 1733585"/>
+              <a:gd name="connsiteX3" fmla="*/ 454284 w 991181"/>
+              <a:gd name="connsiteY3" fmla="*/ 1664620 h 1733585"/>
+              <a:gd name="connsiteX4" fmla="*/ 717043 w 991181"/>
+              <a:gd name="connsiteY4" fmla="*/ 1643599 h 1733585"/>
+              <a:gd name="connsiteX5" fmla="*/ 675001 w 991181"/>
+              <a:gd name="connsiteY5" fmla="*/ 1076041 h 1733585"/>
+              <a:gd name="connsiteX6" fmla="*/ 979801 w 991181"/>
+              <a:gd name="connsiteY6" fmla="*/ 130110 h 1733585"/>
+              <a:gd name="connsiteX7" fmla="*/ 117952 w 991181"/>
+              <a:gd name="connsiteY7" fmla="*/ 172152 h 1733585"/>
+              <a:gd name="connsiteX8" fmla="*/ 191526 w 991181"/>
+              <a:gd name="connsiteY8" fmla="*/ 413888 h 1733585"/>
+              <a:gd name="connsiteX0" fmla="*/ 196373 w 996028"/>
+              <a:gd name="connsiteY0" fmla="*/ 413888 h 1733585"/>
+              <a:gd name="connsiteX1" fmla="*/ 732400 w 996028"/>
+              <a:gd name="connsiteY1" fmla="*/ 266744 h 1733585"/>
+              <a:gd name="connsiteX2" fmla="*/ 417090 w 996028"/>
+              <a:gd name="connsiteY2" fmla="*/ 981447 h 1733585"/>
+              <a:gd name="connsiteX3" fmla="*/ 459131 w 996028"/>
+              <a:gd name="connsiteY3" fmla="*/ 1664620 h 1733585"/>
+              <a:gd name="connsiteX4" fmla="*/ 721890 w 996028"/>
+              <a:gd name="connsiteY4" fmla="*/ 1643599 h 1733585"/>
+              <a:gd name="connsiteX5" fmla="*/ 679848 w 996028"/>
+              <a:gd name="connsiteY5" fmla="*/ 1076041 h 1733585"/>
+              <a:gd name="connsiteX6" fmla="*/ 984648 w 996028"/>
+              <a:gd name="connsiteY6" fmla="*/ 130110 h 1733585"/>
+              <a:gd name="connsiteX7" fmla="*/ 122799 w 996028"/>
+              <a:gd name="connsiteY7" fmla="*/ 172152 h 1733585"/>
+              <a:gd name="connsiteX8" fmla="*/ 196373 w 996028"/>
+              <a:gd name="connsiteY8" fmla="*/ 413888 h 1733585"/>
+              <a:gd name="connsiteX0" fmla="*/ 196373 w 996028"/>
+              <a:gd name="connsiteY0" fmla="*/ 413888 h 1733585"/>
+              <a:gd name="connsiteX1" fmla="*/ 732400 w 996028"/>
+              <a:gd name="connsiteY1" fmla="*/ 266744 h 1733585"/>
+              <a:gd name="connsiteX2" fmla="*/ 417090 w 996028"/>
+              <a:gd name="connsiteY2" fmla="*/ 981447 h 1733585"/>
+              <a:gd name="connsiteX3" fmla="*/ 459131 w 996028"/>
+              <a:gd name="connsiteY3" fmla="*/ 1664620 h 1733585"/>
+              <a:gd name="connsiteX4" fmla="*/ 721890 w 996028"/>
+              <a:gd name="connsiteY4" fmla="*/ 1643599 h 1733585"/>
+              <a:gd name="connsiteX5" fmla="*/ 679848 w 996028"/>
+              <a:gd name="connsiteY5" fmla="*/ 1076041 h 1733585"/>
+              <a:gd name="connsiteX6" fmla="*/ 984648 w 996028"/>
+              <a:gd name="connsiteY6" fmla="*/ 130110 h 1733585"/>
+              <a:gd name="connsiteX7" fmla="*/ 122799 w 996028"/>
+              <a:gd name="connsiteY7" fmla="*/ 172152 h 1733585"/>
+              <a:gd name="connsiteX8" fmla="*/ 196373 w 996028"/>
+              <a:gd name="connsiteY8" fmla="*/ 413888 h 1733585"/>
+              <a:gd name="connsiteX0" fmla="*/ 196373 w 996328"/>
+              <a:gd name="connsiteY0" fmla="*/ 413888 h 1733585"/>
+              <a:gd name="connsiteX1" fmla="*/ 732400 w 996328"/>
+              <a:gd name="connsiteY1" fmla="*/ 266744 h 1733585"/>
+              <a:gd name="connsiteX2" fmla="*/ 417090 w 996328"/>
+              <a:gd name="connsiteY2" fmla="*/ 981447 h 1733585"/>
+              <a:gd name="connsiteX3" fmla="*/ 459131 w 996328"/>
+              <a:gd name="connsiteY3" fmla="*/ 1664620 h 1733585"/>
+              <a:gd name="connsiteX4" fmla="*/ 721890 w 996328"/>
+              <a:gd name="connsiteY4" fmla="*/ 1643599 h 1733585"/>
+              <a:gd name="connsiteX5" fmla="*/ 679848 w 996328"/>
+              <a:gd name="connsiteY5" fmla="*/ 1076041 h 1733585"/>
+              <a:gd name="connsiteX6" fmla="*/ 984648 w 996328"/>
+              <a:gd name="connsiteY6" fmla="*/ 130110 h 1733585"/>
+              <a:gd name="connsiteX7" fmla="*/ 122799 w 996328"/>
+              <a:gd name="connsiteY7" fmla="*/ 172152 h 1733585"/>
+              <a:gd name="connsiteX8" fmla="*/ 196373 w 996328"/>
+              <a:gd name="connsiteY8" fmla="*/ 413888 h 1733585"/>
+              <a:gd name="connsiteX0" fmla="*/ 196373 w 994921"/>
+              <a:gd name="connsiteY0" fmla="*/ 413888 h 1737625"/>
+              <a:gd name="connsiteX1" fmla="*/ 732400 w 994921"/>
+              <a:gd name="connsiteY1" fmla="*/ 266744 h 1737625"/>
+              <a:gd name="connsiteX2" fmla="*/ 417090 w 994921"/>
+              <a:gd name="connsiteY2" fmla="*/ 981447 h 1737625"/>
+              <a:gd name="connsiteX3" fmla="*/ 459131 w 994921"/>
+              <a:gd name="connsiteY3" fmla="*/ 1664620 h 1737625"/>
+              <a:gd name="connsiteX4" fmla="*/ 721890 w 994921"/>
+              <a:gd name="connsiteY4" fmla="*/ 1643599 h 1737625"/>
+              <a:gd name="connsiteX5" fmla="*/ 627296 w 994921"/>
+              <a:gd name="connsiteY5" fmla="*/ 1002468 h 1737625"/>
+              <a:gd name="connsiteX6" fmla="*/ 984648 w 994921"/>
+              <a:gd name="connsiteY6" fmla="*/ 130110 h 1737625"/>
+              <a:gd name="connsiteX7" fmla="*/ 122799 w 994921"/>
+              <a:gd name="connsiteY7" fmla="*/ 172152 h 1737625"/>
+              <a:gd name="connsiteX8" fmla="*/ 196373 w 994921"/>
+              <a:gd name="connsiteY8" fmla="*/ 413888 h 1737625"/>
+              <a:gd name="connsiteX0" fmla="*/ 196373 w 996906"/>
+              <a:gd name="connsiteY0" fmla="*/ 413888 h 1737625"/>
+              <a:gd name="connsiteX1" fmla="*/ 732400 w 996906"/>
+              <a:gd name="connsiteY1" fmla="*/ 266744 h 1737625"/>
+              <a:gd name="connsiteX2" fmla="*/ 417090 w 996906"/>
+              <a:gd name="connsiteY2" fmla="*/ 981447 h 1737625"/>
+              <a:gd name="connsiteX3" fmla="*/ 459131 w 996906"/>
+              <a:gd name="connsiteY3" fmla="*/ 1664620 h 1737625"/>
+              <a:gd name="connsiteX4" fmla="*/ 721890 w 996906"/>
+              <a:gd name="connsiteY4" fmla="*/ 1643599 h 1737625"/>
+              <a:gd name="connsiteX5" fmla="*/ 627296 w 996906"/>
+              <a:gd name="connsiteY5" fmla="*/ 1002468 h 1737625"/>
+              <a:gd name="connsiteX6" fmla="*/ 984648 w 996906"/>
+              <a:gd name="connsiteY6" fmla="*/ 130110 h 1737625"/>
+              <a:gd name="connsiteX7" fmla="*/ 122799 w 996906"/>
+              <a:gd name="connsiteY7" fmla="*/ 172152 h 1737625"/>
+              <a:gd name="connsiteX8" fmla="*/ 196373 w 996906"/>
+              <a:gd name="connsiteY8" fmla="*/ 413888 h 1737625"/>
+              <a:gd name="connsiteX0" fmla="*/ 196373 w 1009070"/>
+              <a:gd name="connsiteY0" fmla="*/ 413888 h 1737625"/>
+              <a:gd name="connsiteX1" fmla="*/ 732400 w 1009070"/>
+              <a:gd name="connsiteY1" fmla="*/ 266744 h 1737625"/>
+              <a:gd name="connsiteX2" fmla="*/ 417090 w 1009070"/>
+              <a:gd name="connsiteY2" fmla="*/ 981447 h 1737625"/>
+              <a:gd name="connsiteX3" fmla="*/ 459131 w 1009070"/>
+              <a:gd name="connsiteY3" fmla="*/ 1664620 h 1737625"/>
+              <a:gd name="connsiteX4" fmla="*/ 721890 w 1009070"/>
+              <a:gd name="connsiteY4" fmla="*/ 1643599 h 1737625"/>
+              <a:gd name="connsiteX5" fmla="*/ 627296 w 1009070"/>
+              <a:gd name="connsiteY5" fmla="*/ 1002468 h 1737625"/>
+              <a:gd name="connsiteX6" fmla="*/ 984648 w 1009070"/>
+              <a:gd name="connsiteY6" fmla="*/ 130110 h 1737625"/>
+              <a:gd name="connsiteX7" fmla="*/ 122799 w 1009070"/>
+              <a:gd name="connsiteY7" fmla="*/ 172152 h 1737625"/>
+              <a:gd name="connsiteX8" fmla="*/ 196373 w 1009070"/>
+              <a:gd name="connsiteY8" fmla="*/ 413888 h 1737625"/>
+              <a:gd name="connsiteX0" fmla="*/ 196373 w 1009070"/>
+              <a:gd name="connsiteY0" fmla="*/ 413888 h 1737625"/>
+              <a:gd name="connsiteX1" fmla="*/ 732400 w 1009070"/>
+              <a:gd name="connsiteY1" fmla="*/ 266744 h 1737625"/>
+              <a:gd name="connsiteX2" fmla="*/ 417090 w 1009070"/>
+              <a:gd name="connsiteY2" fmla="*/ 981447 h 1737625"/>
+              <a:gd name="connsiteX3" fmla="*/ 459131 w 1009070"/>
+              <a:gd name="connsiteY3" fmla="*/ 1664620 h 1737625"/>
+              <a:gd name="connsiteX4" fmla="*/ 721890 w 1009070"/>
+              <a:gd name="connsiteY4" fmla="*/ 1643599 h 1737625"/>
+              <a:gd name="connsiteX5" fmla="*/ 627296 w 1009070"/>
+              <a:gd name="connsiteY5" fmla="*/ 1002468 h 1737625"/>
+              <a:gd name="connsiteX6" fmla="*/ 984648 w 1009070"/>
+              <a:gd name="connsiteY6" fmla="*/ 130110 h 1737625"/>
+              <a:gd name="connsiteX7" fmla="*/ 122799 w 1009070"/>
+              <a:gd name="connsiteY7" fmla="*/ 172152 h 1737625"/>
+              <a:gd name="connsiteX8" fmla="*/ 196373 w 1009070"/>
+              <a:gd name="connsiteY8" fmla="*/ 413888 h 1737625"/>
+            </a:gdLst>
+            <a:ahLst/>
+            <a:cxnLst>
+              <a:cxn ang="0">
+                <a:pos x="connsiteX0" y="connsiteY0"/>
+              </a:cxn>
+              <a:cxn ang="0">
+                <a:pos x="connsiteX1" y="connsiteY1"/>
+              </a:cxn>
+              <a:cxn ang="0">
+                <a:pos x="connsiteX2" y="connsiteY2"/>
+              </a:cxn>
+              <a:cxn ang="0">
+                <a:pos x="connsiteX3" y="connsiteY3"/>
+              </a:cxn>
+              <a:cxn ang="0">
+                <a:pos x="connsiteX4" y="connsiteY4"/>
+              </a:cxn>
+              <a:cxn ang="0">
+                <a:pos x="connsiteX5" y="connsiteY5"/>
+              </a:cxn>
+              <a:cxn ang="0">
+                <a:pos x="connsiteX6" y="connsiteY6"/>
+              </a:cxn>
+              <a:cxn ang="0">
+                <a:pos x="connsiteX7" y="connsiteY7"/>
+              </a:cxn>
+              <a:cxn ang="0">
+                <a:pos x="connsiteX8" y="connsiteY8"/>
+              </a:cxn>
+            </a:cxnLst>
+            <a:rect l="l" t="t" r="r" b="b"/>
+            <a:pathLst>
+              <a:path w="1009070" h="1737625">
+                <a:moveTo>
+                  <a:pt x="196373" y="413888"/>
+                </a:moveTo>
+                <a:cubicBezTo>
+                  <a:pt x="318994" y="356080"/>
+                  <a:pt x="580000" y="46026"/>
+                  <a:pt x="732400" y="266744"/>
+                </a:cubicBezTo>
+                <a:cubicBezTo>
+                  <a:pt x="884800" y="487462"/>
+                  <a:pt x="546718" y="643364"/>
+                  <a:pt x="417090" y="981447"/>
+                </a:cubicBezTo>
+                <a:cubicBezTo>
+                  <a:pt x="287462" y="1319530"/>
+                  <a:pt x="408331" y="1554261"/>
+                  <a:pt x="459131" y="1664620"/>
+                </a:cubicBezTo>
+                <a:cubicBezTo>
+                  <a:pt x="509931" y="1774979"/>
+                  <a:pt x="693863" y="1753958"/>
+                  <a:pt x="721890" y="1643599"/>
+                </a:cubicBezTo>
+                <a:cubicBezTo>
+                  <a:pt x="749917" y="1533240"/>
+                  <a:pt x="499421" y="1338799"/>
+                  <a:pt x="627296" y="1002468"/>
+                </a:cubicBezTo>
+                <a:cubicBezTo>
+                  <a:pt x="755171" y="666137"/>
+                  <a:pt x="1103765" y="443669"/>
+                  <a:pt x="984648" y="130110"/>
+                </a:cubicBezTo>
+                <a:cubicBezTo>
+                  <a:pt x="907572" y="-36304"/>
+                  <a:pt x="380302" y="-64330"/>
+                  <a:pt x="122799" y="172152"/>
+                </a:cubicBezTo>
+                <a:cubicBezTo>
+                  <a:pt x="-134704" y="408634"/>
+                  <a:pt x="73752" y="471696"/>
+                  <a:pt x="196373" y="413888"/>
+                </a:cubicBezTo>
+                <a:close/>
+              </a:path>
+            </a:pathLst>
+          </a:custGeom>
           <a:solidFill>
-            <a:schemeClr val="bg1">
-              <a:lumMod val="95000"/>
-              <a:lumOff val="5000"/>
-            </a:schemeClr>
+            <a:srgbClr val="FF0000"/>
           </a:solidFill>
           <a:ln w="38100">
-            <a:noFill/>
+            <a:solidFill>
+              <a:srgbClr val="FFC000"/>
+            </a:solidFill>
           </a:ln>
         </p:spPr>
         <p:style>
@@ -16869,16 +18322,176 @@
           <a:lstStyle/>
           <a:p>
             <a:pPr algn="ctr"/>
-            <a:endParaRPr lang="en-US"/>
+            <a:endParaRPr lang="en-US" dirty="0"/>
           </a:p>
         </p:txBody>
       </p:sp>
       <p:sp>
         <p:nvSpPr>
-          <p:cNvPr id="5" name="CuadroTexto 4">
-            <a:extLst>
-              <a:ext uri="{FF2B5EF4-FFF2-40B4-BE49-F238E27FC236}">
-                <a16:creationId xmlns:a16="http://schemas.microsoft.com/office/drawing/2014/main" id="{EA59C0B3-482F-4117-AFFB-A1E627ACCFCA}"/>
+          <p:cNvPr id="4" name="Elipse 3">
+            <a:extLst>
+              <a:ext uri="{FF2B5EF4-FFF2-40B4-BE49-F238E27FC236}">
+                <a16:creationId xmlns:a16="http://schemas.microsoft.com/office/drawing/2014/main" id="{336D15BF-CED2-4DF5-8210-3E64E6516EAD}"/>
+              </a:ext>
+            </a:extLst>
+          </p:cNvPr>
+          <p:cNvSpPr/>
+          <p:nvPr/>
+        </p:nvSpPr>
+        <p:spPr>
+          <a:xfrm>
+            <a:off x="7243538" y="5504710"/>
+            <a:ext cx="346842" cy="357351"/>
+          </a:xfrm>
+          <a:prstGeom prst="ellipse">
+            <a:avLst/>
+          </a:prstGeom>
+          <a:solidFill>
+            <a:srgbClr val="FF0000"/>
+          </a:solidFill>
+          <a:ln w="38100">
+            <a:solidFill>
+              <a:srgbClr val="FFC000"/>
+            </a:solidFill>
+          </a:ln>
+        </p:spPr>
+        <p:style>
+          <a:lnRef idx="2">
+            <a:schemeClr val="accent1">
+              <a:shade val="50000"/>
+            </a:schemeClr>
+          </a:lnRef>
+          <a:fillRef idx="1">
+            <a:schemeClr val="accent1"/>
+          </a:fillRef>
+          <a:effectRef idx="0">
+            <a:schemeClr val="accent1"/>
+          </a:effectRef>
+          <a:fontRef idx="minor">
+            <a:schemeClr val="lt1"/>
+          </a:fontRef>
+        </p:style>
+        <p:txBody>
+          <a:bodyPr rtlCol="0" anchor="ctr"/>
+          <a:lstStyle/>
+          <a:p>
+            <a:pPr algn="ctr"/>
+            <a:endParaRPr lang="en-US"/>
+          </a:p>
+        </p:txBody>
+      </p:sp>
+    </p:spTree>
+    <p:extLst>
+      <p:ext uri="{BB962C8B-B14F-4D97-AF65-F5344CB8AC3E}">
+        <p14:creationId xmlns:p14="http://schemas.microsoft.com/office/powerpoint/2010/main" val="3364532562"/>
+      </p:ext>
+    </p:extLst>
+  </p:cSld>
+  <p:clrMapOvr>
+    <a:masterClrMapping/>
+  </p:clrMapOvr>
+</p:sld>
+</file>
+
+<file path=ppt/slides/slide27.xml><?xml version="1.0" encoding="utf-8"?>
+<p:sld xmlns:a="http://schemas.openxmlformats.org/drawingml/2006/main" xmlns:r="http://schemas.openxmlformats.org/officeDocument/2006/relationships" xmlns:p="http://schemas.openxmlformats.org/presentationml/2006/main">
+  <p:cSld>
+    <p:spTree>
+      <p:nvGrpSpPr>
+        <p:cNvPr id="1" name=""/>
+        <p:cNvGrpSpPr/>
+        <p:nvPr/>
+      </p:nvGrpSpPr>
+      <p:grpSpPr>
+        <a:xfrm>
+          <a:off x="0" y="0"/>
+          <a:ext cx="0" cy="0"/>
+          <a:chOff x="0" y="0"/>
+          <a:chExt cx="0" cy="0"/>
+        </a:xfrm>
+      </p:grpSpPr>
+      <p:pic>
+        <p:nvPicPr>
+          <p:cNvPr id="6" name="Imagen 5">
+            <a:extLst>
+              <a:ext uri="{FF2B5EF4-FFF2-40B4-BE49-F238E27FC236}">
+                <a16:creationId xmlns:a16="http://schemas.microsoft.com/office/drawing/2014/main" id="{513E70C9-EA36-496F-9C18-04DD65AB6CE1}"/>
+              </a:ext>
+            </a:extLst>
+          </p:cNvPr>
+          <p:cNvPicPr>
+            <a:picLocks noChangeAspect="1"/>
+          </p:cNvPicPr>
+          <p:nvPr/>
+        </p:nvPicPr>
+        <p:blipFill rotWithShape="1">
+          <a:blip r:embed="rId2"/>
+          <a:srcRect l="43717" r="1"/>
+          <a:stretch/>
+        </p:blipFill>
+        <p:spPr>
+          <a:xfrm>
+            <a:off x="2664994" y="0"/>
+            <a:ext cx="6862011" cy="6858000"/>
+          </a:xfrm>
+          <a:prstGeom prst="rect">
+            <a:avLst/>
+          </a:prstGeom>
+        </p:spPr>
+      </p:pic>
+      <p:pic>
+        <p:nvPicPr>
+          <p:cNvPr id="7" name="Picture 4" descr="https://www.strath.ac.uk/media/1newwebsite/documents/brand/strath_main.jpg">
+            <a:extLst>
+              <a:ext uri="{FF2B5EF4-FFF2-40B4-BE49-F238E27FC236}">
+                <a16:creationId xmlns:a16="http://schemas.microsoft.com/office/drawing/2014/main" id="{09DDC4EB-53EE-4856-899D-028F20EE32D2}"/>
+              </a:ext>
+            </a:extLst>
+          </p:cNvPr>
+          <p:cNvPicPr>
+            <a:picLocks noChangeAspect="1" noChangeArrowheads="1"/>
+          </p:cNvPicPr>
+          <p:nvPr/>
+        </p:nvPicPr>
+        <p:blipFill>
+          <a:blip r:embed="rId3" cstate="print">
+            <a:extLst>
+              <a:ext uri="{28A0092B-C50C-407E-A947-70E740481C1C}">
+                <a14:useLocalDpi xmlns:a14="http://schemas.microsoft.com/office/drawing/2010/main" val="0"/>
+              </a:ext>
+            </a:extLst>
+          </a:blip>
+          <a:srcRect/>
+          <a:stretch>
+            <a:fillRect/>
+          </a:stretch>
+        </p:blipFill>
+        <p:spPr bwMode="auto">
+          <a:xfrm>
+            <a:off x="7688374" y="1"/>
+            <a:ext cx="1838632" cy="2068461"/>
+          </a:xfrm>
+          <a:prstGeom prst="rect">
+            <a:avLst/>
+          </a:prstGeom>
+          <a:noFill/>
+          <a:extLst>
+            <a:ext uri="{909E8E84-426E-40DD-AFC4-6F175D3DCCD1}">
+              <a14:hiddenFill xmlns:a14="http://schemas.microsoft.com/office/drawing/2010/main">
+                <a:solidFill>
+                  <a:srgbClr val="FFFFFF"/>
+                </a:solidFill>
+              </a14:hiddenFill>
+            </a:ext>
+          </a:extLst>
+        </p:spPr>
+      </p:pic>
+      <p:sp>
+        <p:nvSpPr>
+          <p:cNvPr id="8" name="CuadroTexto 7">
+            <a:extLst>
+              <a:ext uri="{FF2B5EF4-FFF2-40B4-BE49-F238E27FC236}">
+                <a16:creationId xmlns:a16="http://schemas.microsoft.com/office/drawing/2014/main" id="{8848738D-8359-4DE6-B0B8-B3735517525E}"/>
               </a:ext>
             </a:extLst>
           </p:cNvPr>
@@ -16887,8 +18500,8 @@
         </p:nvSpPr>
         <p:spPr>
           <a:xfrm>
-            <a:off x="1946519" y="1780674"/>
-            <a:ext cx="2962365" cy="1200329"/>
+            <a:off x="3077174" y="2068462"/>
+            <a:ext cx="4199021" cy="1569660"/>
           </a:xfrm>
           <a:prstGeom prst="rect">
             <a:avLst/>
@@ -16902,30 +18515,595 @@
           <a:lstStyle/>
           <a:p>
             <a:r>
-              <a:rPr lang="en-US" dirty="0"/>
-              <a:t>More text about things.</a:t>
+              <a:rPr lang="en-GB" sz="2400" dirty="0"/>
+              <a:t>On a scale of 1 to 10 how good is your speech at the moment?</a:t>
             </a:r>
           </a:p>
           <a:p>
+            <a:endParaRPr lang="en-GB" sz="2400" dirty="0"/>
+          </a:p>
+          <a:p>
             <a:r>
-              <a:rPr lang="en-US" dirty="0"/>
-              <a:t>This is box A.</a:t>
-            </a:r>
-          </a:p>
-          <a:p>
-            <a:r>
-              <a:rPr lang="en-US" dirty="0"/>
-              <a:t>In this test we want to check you can sing very loudly. </a:t>
+              <a:rPr lang="en-GB" sz="2400" dirty="0"/>
+              <a:t>(1 = worst, 10 = best)</a:t>
             </a:r>
           </a:p>
         </p:txBody>
       </p:sp>
+      <p:grpSp>
+        <p:nvGrpSpPr>
+          <p:cNvPr id="2" name="Grupo 1">
+            <a:extLst>
+              <a:ext uri="{FF2B5EF4-FFF2-40B4-BE49-F238E27FC236}">
+                <a16:creationId xmlns:a16="http://schemas.microsoft.com/office/drawing/2014/main" id="{6B7D9225-F30F-4C24-BEEB-AEA36F8E02AE}"/>
+              </a:ext>
+            </a:extLst>
+          </p:cNvPr>
+          <p:cNvGrpSpPr/>
+          <p:nvPr/>
+        </p:nvGrpSpPr>
+        <p:grpSpPr>
+          <a:xfrm rot="1186615">
+            <a:off x="5631254" y="3787537"/>
+            <a:ext cx="1009070" cy="2347793"/>
+            <a:chOff x="5931159" y="3135896"/>
+            <a:chExt cx="1009070" cy="2347793"/>
+          </a:xfrm>
+        </p:grpSpPr>
+        <p:sp>
+          <p:nvSpPr>
+            <p:cNvPr id="3" name="Forma libre: forma 2">
+              <a:extLst>
+                <a:ext uri="{FF2B5EF4-FFF2-40B4-BE49-F238E27FC236}">
+                  <a16:creationId xmlns:a16="http://schemas.microsoft.com/office/drawing/2014/main" id="{11BF7974-4EA1-4308-88BF-3AA5307296D5}"/>
+                </a:ext>
+              </a:extLst>
+            </p:cNvPr>
+            <p:cNvSpPr/>
+            <p:nvPr/>
+          </p:nvSpPr>
+          <p:spPr>
+            <a:xfrm>
+              <a:off x="5931159" y="3135896"/>
+              <a:ext cx="1009070" cy="1737625"/>
+            </a:xfrm>
+            <a:custGeom>
+              <a:avLst/>
+              <a:gdLst>
+                <a:gd name="connsiteX0" fmla="*/ 66453 w 866370"/>
+                <a:gd name="connsiteY0" fmla="*/ 236096 h 1660896"/>
+                <a:gd name="connsiteX1" fmla="*/ 612991 w 866370"/>
+                <a:gd name="connsiteY1" fmla="*/ 194055 h 1660896"/>
+                <a:gd name="connsiteX2" fmla="*/ 297681 w 866370"/>
+                <a:gd name="connsiteY2" fmla="*/ 908758 h 1660896"/>
+                <a:gd name="connsiteX3" fmla="*/ 339722 w 866370"/>
+                <a:gd name="connsiteY3" fmla="*/ 1591931 h 1660896"/>
+                <a:gd name="connsiteX4" fmla="*/ 602481 w 866370"/>
+                <a:gd name="connsiteY4" fmla="*/ 1570910 h 1660896"/>
+                <a:gd name="connsiteX5" fmla="*/ 560439 w 866370"/>
+                <a:gd name="connsiteY5" fmla="*/ 1003352 h 1660896"/>
+                <a:gd name="connsiteX6" fmla="*/ 854729 w 866370"/>
+                <a:gd name="connsiteY6" fmla="*/ 152014 h 1660896"/>
+                <a:gd name="connsiteX7" fmla="*/ 97984 w 866370"/>
+                <a:gd name="connsiteY7" fmla="*/ 4869 h 1660896"/>
+                <a:gd name="connsiteX8" fmla="*/ 66453 w 866370"/>
+                <a:gd name="connsiteY8" fmla="*/ 236096 h 1660896"/>
+                <a:gd name="connsiteX0" fmla="*/ 66453 w 876619"/>
+                <a:gd name="connsiteY0" fmla="*/ 278980 h 1703780"/>
+                <a:gd name="connsiteX1" fmla="*/ 612991 w 876619"/>
+                <a:gd name="connsiteY1" fmla="*/ 236939 h 1703780"/>
+                <a:gd name="connsiteX2" fmla="*/ 297681 w 876619"/>
+                <a:gd name="connsiteY2" fmla="*/ 951642 h 1703780"/>
+                <a:gd name="connsiteX3" fmla="*/ 339722 w 876619"/>
+                <a:gd name="connsiteY3" fmla="*/ 1634815 h 1703780"/>
+                <a:gd name="connsiteX4" fmla="*/ 602481 w 876619"/>
+                <a:gd name="connsiteY4" fmla="*/ 1613794 h 1703780"/>
+                <a:gd name="connsiteX5" fmla="*/ 560439 w 876619"/>
+                <a:gd name="connsiteY5" fmla="*/ 1046236 h 1703780"/>
+                <a:gd name="connsiteX6" fmla="*/ 865239 w 876619"/>
+                <a:gd name="connsiteY6" fmla="*/ 100305 h 1703780"/>
+                <a:gd name="connsiteX7" fmla="*/ 97984 w 876619"/>
+                <a:gd name="connsiteY7" fmla="*/ 47753 h 1703780"/>
+                <a:gd name="connsiteX8" fmla="*/ 66453 w 876619"/>
+                <a:gd name="connsiteY8" fmla="*/ 278980 h 1703780"/>
+                <a:gd name="connsiteX0" fmla="*/ 70951 w 870606"/>
+                <a:gd name="connsiteY0" fmla="*/ 390280 h 1709977"/>
+                <a:gd name="connsiteX1" fmla="*/ 606978 w 870606"/>
+                <a:gd name="connsiteY1" fmla="*/ 243136 h 1709977"/>
+                <a:gd name="connsiteX2" fmla="*/ 291668 w 870606"/>
+                <a:gd name="connsiteY2" fmla="*/ 957839 h 1709977"/>
+                <a:gd name="connsiteX3" fmla="*/ 333709 w 870606"/>
+                <a:gd name="connsiteY3" fmla="*/ 1641012 h 1709977"/>
+                <a:gd name="connsiteX4" fmla="*/ 596468 w 870606"/>
+                <a:gd name="connsiteY4" fmla="*/ 1619991 h 1709977"/>
+                <a:gd name="connsiteX5" fmla="*/ 554426 w 870606"/>
+                <a:gd name="connsiteY5" fmla="*/ 1052433 h 1709977"/>
+                <a:gd name="connsiteX6" fmla="*/ 859226 w 870606"/>
+                <a:gd name="connsiteY6" fmla="*/ 106502 h 1709977"/>
+                <a:gd name="connsiteX7" fmla="*/ 91971 w 870606"/>
+                <a:gd name="connsiteY7" fmla="*/ 53950 h 1709977"/>
+                <a:gd name="connsiteX8" fmla="*/ 70951 w 870606"/>
+                <a:gd name="connsiteY8" fmla="*/ 390280 h 1709977"/>
+                <a:gd name="connsiteX0" fmla="*/ 143682 w 943337"/>
+                <a:gd name="connsiteY0" fmla="*/ 380990 h 1700687"/>
+                <a:gd name="connsiteX1" fmla="*/ 679709 w 943337"/>
+                <a:gd name="connsiteY1" fmla="*/ 233846 h 1700687"/>
+                <a:gd name="connsiteX2" fmla="*/ 364399 w 943337"/>
+                <a:gd name="connsiteY2" fmla="*/ 948549 h 1700687"/>
+                <a:gd name="connsiteX3" fmla="*/ 406440 w 943337"/>
+                <a:gd name="connsiteY3" fmla="*/ 1631722 h 1700687"/>
+                <a:gd name="connsiteX4" fmla="*/ 669199 w 943337"/>
+                <a:gd name="connsiteY4" fmla="*/ 1610701 h 1700687"/>
+                <a:gd name="connsiteX5" fmla="*/ 627157 w 943337"/>
+                <a:gd name="connsiteY5" fmla="*/ 1043143 h 1700687"/>
+                <a:gd name="connsiteX6" fmla="*/ 931957 w 943337"/>
+                <a:gd name="connsiteY6" fmla="*/ 97212 h 1700687"/>
+                <a:gd name="connsiteX7" fmla="*/ 59598 w 943337"/>
+                <a:gd name="connsiteY7" fmla="*/ 65681 h 1700687"/>
+                <a:gd name="connsiteX8" fmla="*/ 143682 w 943337"/>
+                <a:gd name="connsiteY8" fmla="*/ 380990 h 1700687"/>
+                <a:gd name="connsiteX0" fmla="*/ 143682 w 943337"/>
+                <a:gd name="connsiteY0" fmla="*/ 380990 h 1700687"/>
+                <a:gd name="connsiteX1" fmla="*/ 679709 w 943337"/>
+                <a:gd name="connsiteY1" fmla="*/ 233846 h 1700687"/>
+                <a:gd name="connsiteX2" fmla="*/ 364399 w 943337"/>
+                <a:gd name="connsiteY2" fmla="*/ 948549 h 1700687"/>
+                <a:gd name="connsiteX3" fmla="*/ 406440 w 943337"/>
+                <a:gd name="connsiteY3" fmla="*/ 1631722 h 1700687"/>
+                <a:gd name="connsiteX4" fmla="*/ 669199 w 943337"/>
+                <a:gd name="connsiteY4" fmla="*/ 1610701 h 1700687"/>
+                <a:gd name="connsiteX5" fmla="*/ 627157 w 943337"/>
+                <a:gd name="connsiteY5" fmla="*/ 1043143 h 1700687"/>
+                <a:gd name="connsiteX6" fmla="*/ 931957 w 943337"/>
+                <a:gd name="connsiteY6" fmla="*/ 97212 h 1700687"/>
+                <a:gd name="connsiteX7" fmla="*/ 59598 w 943337"/>
+                <a:gd name="connsiteY7" fmla="*/ 65681 h 1700687"/>
+                <a:gd name="connsiteX8" fmla="*/ 143682 w 943337"/>
+                <a:gd name="connsiteY8" fmla="*/ 380990 h 1700687"/>
+                <a:gd name="connsiteX0" fmla="*/ 135475 w 935130"/>
+                <a:gd name="connsiteY0" fmla="*/ 357386 h 1677083"/>
+                <a:gd name="connsiteX1" fmla="*/ 671502 w 935130"/>
+                <a:gd name="connsiteY1" fmla="*/ 210242 h 1677083"/>
+                <a:gd name="connsiteX2" fmla="*/ 356192 w 935130"/>
+                <a:gd name="connsiteY2" fmla="*/ 924945 h 1677083"/>
+                <a:gd name="connsiteX3" fmla="*/ 398233 w 935130"/>
+                <a:gd name="connsiteY3" fmla="*/ 1608118 h 1677083"/>
+                <a:gd name="connsiteX4" fmla="*/ 660992 w 935130"/>
+                <a:gd name="connsiteY4" fmla="*/ 1587097 h 1677083"/>
+                <a:gd name="connsiteX5" fmla="*/ 618950 w 935130"/>
+                <a:gd name="connsiteY5" fmla="*/ 1019539 h 1677083"/>
+                <a:gd name="connsiteX6" fmla="*/ 923750 w 935130"/>
+                <a:gd name="connsiteY6" fmla="*/ 73608 h 1677083"/>
+                <a:gd name="connsiteX7" fmla="*/ 61901 w 935130"/>
+                <a:gd name="connsiteY7" fmla="*/ 115650 h 1677083"/>
+                <a:gd name="connsiteX8" fmla="*/ 135475 w 935130"/>
+                <a:gd name="connsiteY8" fmla="*/ 357386 h 1677083"/>
+                <a:gd name="connsiteX0" fmla="*/ 191526 w 991181"/>
+                <a:gd name="connsiteY0" fmla="*/ 413888 h 1733585"/>
+                <a:gd name="connsiteX1" fmla="*/ 727553 w 991181"/>
+                <a:gd name="connsiteY1" fmla="*/ 266744 h 1733585"/>
+                <a:gd name="connsiteX2" fmla="*/ 412243 w 991181"/>
+                <a:gd name="connsiteY2" fmla="*/ 981447 h 1733585"/>
+                <a:gd name="connsiteX3" fmla="*/ 454284 w 991181"/>
+                <a:gd name="connsiteY3" fmla="*/ 1664620 h 1733585"/>
+                <a:gd name="connsiteX4" fmla="*/ 717043 w 991181"/>
+                <a:gd name="connsiteY4" fmla="*/ 1643599 h 1733585"/>
+                <a:gd name="connsiteX5" fmla="*/ 675001 w 991181"/>
+                <a:gd name="connsiteY5" fmla="*/ 1076041 h 1733585"/>
+                <a:gd name="connsiteX6" fmla="*/ 979801 w 991181"/>
+                <a:gd name="connsiteY6" fmla="*/ 130110 h 1733585"/>
+                <a:gd name="connsiteX7" fmla="*/ 117952 w 991181"/>
+                <a:gd name="connsiteY7" fmla="*/ 172152 h 1733585"/>
+                <a:gd name="connsiteX8" fmla="*/ 191526 w 991181"/>
+                <a:gd name="connsiteY8" fmla="*/ 413888 h 1733585"/>
+                <a:gd name="connsiteX0" fmla="*/ 196373 w 996028"/>
+                <a:gd name="connsiteY0" fmla="*/ 413888 h 1733585"/>
+                <a:gd name="connsiteX1" fmla="*/ 732400 w 996028"/>
+                <a:gd name="connsiteY1" fmla="*/ 266744 h 1733585"/>
+                <a:gd name="connsiteX2" fmla="*/ 417090 w 996028"/>
+                <a:gd name="connsiteY2" fmla="*/ 981447 h 1733585"/>
+                <a:gd name="connsiteX3" fmla="*/ 459131 w 996028"/>
+                <a:gd name="connsiteY3" fmla="*/ 1664620 h 1733585"/>
+                <a:gd name="connsiteX4" fmla="*/ 721890 w 996028"/>
+                <a:gd name="connsiteY4" fmla="*/ 1643599 h 1733585"/>
+                <a:gd name="connsiteX5" fmla="*/ 679848 w 996028"/>
+                <a:gd name="connsiteY5" fmla="*/ 1076041 h 1733585"/>
+                <a:gd name="connsiteX6" fmla="*/ 984648 w 996028"/>
+                <a:gd name="connsiteY6" fmla="*/ 130110 h 1733585"/>
+                <a:gd name="connsiteX7" fmla="*/ 122799 w 996028"/>
+                <a:gd name="connsiteY7" fmla="*/ 172152 h 1733585"/>
+                <a:gd name="connsiteX8" fmla="*/ 196373 w 996028"/>
+                <a:gd name="connsiteY8" fmla="*/ 413888 h 1733585"/>
+                <a:gd name="connsiteX0" fmla="*/ 196373 w 996028"/>
+                <a:gd name="connsiteY0" fmla="*/ 413888 h 1733585"/>
+                <a:gd name="connsiteX1" fmla="*/ 732400 w 996028"/>
+                <a:gd name="connsiteY1" fmla="*/ 266744 h 1733585"/>
+                <a:gd name="connsiteX2" fmla="*/ 417090 w 996028"/>
+                <a:gd name="connsiteY2" fmla="*/ 981447 h 1733585"/>
+                <a:gd name="connsiteX3" fmla="*/ 459131 w 996028"/>
+                <a:gd name="connsiteY3" fmla="*/ 1664620 h 1733585"/>
+                <a:gd name="connsiteX4" fmla="*/ 721890 w 996028"/>
+                <a:gd name="connsiteY4" fmla="*/ 1643599 h 1733585"/>
+                <a:gd name="connsiteX5" fmla="*/ 679848 w 996028"/>
+                <a:gd name="connsiteY5" fmla="*/ 1076041 h 1733585"/>
+                <a:gd name="connsiteX6" fmla="*/ 984648 w 996028"/>
+                <a:gd name="connsiteY6" fmla="*/ 130110 h 1733585"/>
+                <a:gd name="connsiteX7" fmla="*/ 122799 w 996028"/>
+                <a:gd name="connsiteY7" fmla="*/ 172152 h 1733585"/>
+                <a:gd name="connsiteX8" fmla="*/ 196373 w 996028"/>
+                <a:gd name="connsiteY8" fmla="*/ 413888 h 1733585"/>
+                <a:gd name="connsiteX0" fmla="*/ 196373 w 996328"/>
+                <a:gd name="connsiteY0" fmla="*/ 413888 h 1733585"/>
+                <a:gd name="connsiteX1" fmla="*/ 732400 w 996328"/>
+                <a:gd name="connsiteY1" fmla="*/ 266744 h 1733585"/>
+                <a:gd name="connsiteX2" fmla="*/ 417090 w 996328"/>
+                <a:gd name="connsiteY2" fmla="*/ 981447 h 1733585"/>
+                <a:gd name="connsiteX3" fmla="*/ 459131 w 996328"/>
+                <a:gd name="connsiteY3" fmla="*/ 1664620 h 1733585"/>
+                <a:gd name="connsiteX4" fmla="*/ 721890 w 996328"/>
+                <a:gd name="connsiteY4" fmla="*/ 1643599 h 1733585"/>
+                <a:gd name="connsiteX5" fmla="*/ 679848 w 996328"/>
+                <a:gd name="connsiteY5" fmla="*/ 1076041 h 1733585"/>
+                <a:gd name="connsiteX6" fmla="*/ 984648 w 996328"/>
+                <a:gd name="connsiteY6" fmla="*/ 130110 h 1733585"/>
+                <a:gd name="connsiteX7" fmla="*/ 122799 w 996328"/>
+                <a:gd name="connsiteY7" fmla="*/ 172152 h 1733585"/>
+                <a:gd name="connsiteX8" fmla="*/ 196373 w 996328"/>
+                <a:gd name="connsiteY8" fmla="*/ 413888 h 1733585"/>
+                <a:gd name="connsiteX0" fmla="*/ 196373 w 994921"/>
+                <a:gd name="connsiteY0" fmla="*/ 413888 h 1737625"/>
+                <a:gd name="connsiteX1" fmla="*/ 732400 w 994921"/>
+                <a:gd name="connsiteY1" fmla="*/ 266744 h 1737625"/>
+                <a:gd name="connsiteX2" fmla="*/ 417090 w 994921"/>
+                <a:gd name="connsiteY2" fmla="*/ 981447 h 1737625"/>
+                <a:gd name="connsiteX3" fmla="*/ 459131 w 994921"/>
+                <a:gd name="connsiteY3" fmla="*/ 1664620 h 1737625"/>
+                <a:gd name="connsiteX4" fmla="*/ 721890 w 994921"/>
+                <a:gd name="connsiteY4" fmla="*/ 1643599 h 1737625"/>
+                <a:gd name="connsiteX5" fmla="*/ 627296 w 994921"/>
+                <a:gd name="connsiteY5" fmla="*/ 1002468 h 1737625"/>
+                <a:gd name="connsiteX6" fmla="*/ 984648 w 994921"/>
+                <a:gd name="connsiteY6" fmla="*/ 130110 h 1737625"/>
+                <a:gd name="connsiteX7" fmla="*/ 122799 w 994921"/>
+                <a:gd name="connsiteY7" fmla="*/ 172152 h 1737625"/>
+                <a:gd name="connsiteX8" fmla="*/ 196373 w 994921"/>
+                <a:gd name="connsiteY8" fmla="*/ 413888 h 1737625"/>
+                <a:gd name="connsiteX0" fmla="*/ 196373 w 996906"/>
+                <a:gd name="connsiteY0" fmla="*/ 413888 h 1737625"/>
+                <a:gd name="connsiteX1" fmla="*/ 732400 w 996906"/>
+                <a:gd name="connsiteY1" fmla="*/ 266744 h 1737625"/>
+                <a:gd name="connsiteX2" fmla="*/ 417090 w 996906"/>
+                <a:gd name="connsiteY2" fmla="*/ 981447 h 1737625"/>
+                <a:gd name="connsiteX3" fmla="*/ 459131 w 996906"/>
+                <a:gd name="connsiteY3" fmla="*/ 1664620 h 1737625"/>
+                <a:gd name="connsiteX4" fmla="*/ 721890 w 996906"/>
+                <a:gd name="connsiteY4" fmla="*/ 1643599 h 1737625"/>
+                <a:gd name="connsiteX5" fmla="*/ 627296 w 996906"/>
+                <a:gd name="connsiteY5" fmla="*/ 1002468 h 1737625"/>
+                <a:gd name="connsiteX6" fmla="*/ 984648 w 996906"/>
+                <a:gd name="connsiteY6" fmla="*/ 130110 h 1737625"/>
+                <a:gd name="connsiteX7" fmla="*/ 122799 w 996906"/>
+                <a:gd name="connsiteY7" fmla="*/ 172152 h 1737625"/>
+                <a:gd name="connsiteX8" fmla="*/ 196373 w 996906"/>
+                <a:gd name="connsiteY8" fmla="*/ 413888 h 1737625"/>
+                <a:gd name="connsiteX0" fmla="*/ 196373 w 1009070"/>
+                <a:gd name="connsiteY0" fmla="*/ 413888 h 1737625"/>
+                <a:gd name="connsiteX1" fmla="*/ 732400 w 1009070"/>
+                <a:gd name="connsiteY1" fmla="*/ 266744 h 1737625"/>
+                <a:gd name="connsiteX2" fmla="*/ 417090 w 1009070"/>
+                <a:gd name="connsiteY2" fmla="*/ 981447 h 1737625"/>
+                <a:gd name="connsiteX3" fmla="*/ 459131 w 1009070"/>
+                <a:gd name="connsiteY3" fmla="*/ 1664620 h 1737625"/>
+                <a:gd name="connsiteX4" fmla="*/ 721890 w 1009070"/>
+                <a:gd name="connsiteY4" fmla="*/ 1643599 h 1737625"/>
+                <a:gd name="connsiteX5" fmla="*/ 627296 w 1009070"/>
+                <a:gd name="connsiteY5" fmla="*/ 1002468 h 1737625"/>
+                <a:gd name="connsiteX6" fmla="*/ 984648 w 1009070"/>
+                <a:gd name="connsiteY6" fmla="*/ 130110 h 1737625"/>
+                <a:gd name="connsiteX7" fmla="*/ 122799 w 1009070"/>
+                <a:gd name="connsiteY7" fmla="*/ 172152 h 1737625"/>
+                <a:gd name="connsiteX8" fmla="*/ 196373 w 1009070"/>
+                <a:gd name="connsiteY8" fmla="*/ 413888 h 1737625"/>
+                <a:gd name="connsiteX0" fmla="*/ 196373 w 1009070"/>
+                <a:gd name="connsiteY0" fmla="*/ 413888 h 1737625"/>
+                <a:gd name="connsiteX1" fmla="*/ 732400 w 1009070"/>
+                <a:gd name="connsiteY1" fmla="*/ 266744 h 1737625"/>
+                <a:gd name="connsiteX2" fmla="*/ 417090 w 1009070"/>
+                <a:gd name="connsiteY2" fmla="*/ 981447 h 1737625"/>
+                <a:gd name="connsiteX3" fmla="*/ 459131 w 1009070"/>
+                <a:gd name="connsiteY3" fmla="*/ 1664620 h 1737625"/>
+                <a:gd name="connsiteX4" fmla="*/ 721890 w 1009070"/>
+                <a:gd name="connsiteY4" fmla="*/ 1643599 h 1737625"/>
+                <a:gd name="connsiteX5" fmla="*/ 627296 w 1009070"/>
+                <a:gd name="connsiteY5" fmla="*/ 1002468 h 1737625"/>
+                <a:gd name="connsiteX6" fmla="*/ 984648 w 1009070"/>
+                <a:gd name="connsiteY6" fmla="*/ 130110 h 1737625"/>
+                <a:gd name="connsiteX7" fmla="*/ 122799 w 1009070"/>
+                <a:gd name="connsiteY7" fmla="*/ 172152 h 1737625"/>
+                <a:gd name="connsiteX8" fmla="*/ 196373 w 1009070"/>
+                <a:gd name="connsiteY8" fmla="*/ 413888 h 1737625"/>
+              </a:gdLst>
+              <a:ahLst/>
+              <a:cxnLst>
+                <a:cxn ang="0">
+                  <a:pos x="connsiteX0" y="connsiteY0"/>
+                </a:cxn>
+                <a:cxn ang="0">
+                  <a:pos x="connsiteX1" y="connsiteY1"/>
+                </a:cxn>
+                <a:cxn ang="0">
+                  <a:pos x="connsiteX2" y="connsiteY2"/>
+                </a:cxn>
+                <a:cxn ang="0">
+                  <a:pos x="connsiteX3" y="connsiteY3"/>
+                </a:cxn>
+                <a:cxn ang="0">
+                  <a:pos x="connsiteX4" y="connsiteY4"/>
+                </a:cxn>
+                <a:cxn ang="0">
+                  <a:pos x="connsiteX5" y="connsiteY5"/>
+                </a:cxn>
+                <a:cxn ang="0">
+                  <a:pos x="connsiteX6" y="connsiteY6"/>
+                </a:cxn>
+                <a:cxn ang="0">
+                  <a:pos x="connsiteX7" y="connsiteY7"/>
+                </a:cxn>
+                <a:cxn ang="0">
+                  <a:pos x="connsiteX8" y="connsiteY8"/>
+                </a:cxn>
+              </a:cxnLst>
+              <a:rect l="l" t="t" r="r" b="b"/>
+              <a:pathLst>
+                <a:path w="1009070" h="1737625">
+                  <a:moveTo>
+                    <a:pt x="196373" y="413888"/>
+                  </a:moveTo>
+                  <a:cubicBezTo>
+                    <a:pt x="318994" y="356080"/>
+                    <a:pt x="580000" y="46026"/>
+                    <a:pt x="732400" y="266744"/>
+                  </a:cubicBezTo>
+                  <a:cubicBezTo>
+                    <a:pt x="884800" y="487462"/>
+                    <a:pt x="546718" y="643364"/>
+                    <a:pt x="417090" y="981447"/>
+                  </a:cubicBezTo>
+                  <a:cubicBezTo>
+                    <a:pt x="287462" y="1319530"/>
+                    <a:pt x="408331" y="1554261"/>
+                    <a:pt x="459131" y="1664620"/>
+                  </a:cubicBezTo>
+                  <a:cubicBezTo>
+                    <a:pt x="509931" y="1774979"/>
+                    <a:pt x="693863" y="1753958"/>
+                    <a:pt x="721890" y="1643599"/>
+                  </a:cubicBezTo>
+                  <a:cubicBezTo>
+                    <a:pt x="749917" y="1533240"/>
+                    <a:pt x="499421" y="1338799"/>
+                    <a:pt x="627296" y="1002468"/>
+                  </a:cubicBezTo>
+                  <a:cubicBezTo>
+                    <a:pt x="755171" y="666137"/>
+                    <a:pt x="1103765" y="443669"/>
+                    <a:pt x="984648" y="130110"/>
+                  </a:cubicBezTo>
+                  <a:cubicBezTo>
+                    <a:pt x="907572" y="-36304"/>
+                    <a:pt x="380302" y="-64330"/>
+                    <a:pt x="122799" y="172152"/>
+                  </a:cubicBezTo>
+                  <a:cubicBezTo>
+                    <a:pt x="-134704" y="408634"/>
+                    <a:pt x="73752" y="471696"/>
+                    <a:pt x="196373" y="413888"/>
+                  </a:cubicBezTo>
+                  <a:close/>
+                </a:path>
+              </a:pathLst>
+            </a:custGeom>
+            <a:solidFill>
+              <a:srgbClr val="FF0000"/>
+            </a:solidFill>
+            <a:ln w="38100">
+              <a:solidFill>
+                <a:srgbClr val="FFC000"/>
+              </a:solidFill>
+            </a:ln>
+          </p:spPr>
+          <p:style>
+            <a:lnRef idx="2">
+              <a:schemeClr val="accent1">
+                <a:shade val="50000"/>
+              </a:schemeClr>
+            </a:lnRef>
+            <a:fillRef idx="1">
+              <a:schemeClr val="accent1"/>
+            </a:fillRef>
+            <a:effectRef idx="0">
+              <a:schemeClr val="accent1"/>
+            </a:effectRef>
+            <a:fontRef idx="minor">
+              <a:schemeClr val="lt1"/>
+            </a:fontRef>
+          </p:style>
+          <p:txBody>
+            <a:bodyPr rtlCol="0" anchor="ctr"/>
+            <a:lstStyle/>
+            <a:p>
+              <a:pPr algn="ctr"/>
+              <a:endParaRPr lang="en-US" dirty="0"/>
+            </a:p>
+          </p:txBody>
+        </p:sp>
+        <p:sp>
+          <p:nvSpPr>
+            <p:cNvPr id="4" name="Elipse 3">
+              <a:extLst>
+                <a:ext uri="{FF2B5EF4-FFF2-40B4-BE49-F238E27FC236}">
+                  <a16:creationId xmlns:a16="http://schemas.microsoft.com/office/drawing/2014/main" id="{336D15BF-CED2-4DF5-8210-3E64E6516EAD}"/>
+                </a:ext>
+              </a:extLst>
+            </p:cNvPr>
+            <p:cNvSpPr/>
+            <p:nvPr/>
+          </p:nvSpPr>
+          <p:spPr>
+            <a:xfrm>
+              <a:off x="6495393" y="5126338"/>
+              <a:ext cx="346842" cy="357351"/>
+            </a:xfrm>
+            <a:prstGeom prst="ellipse">
+              <a:avLst/>
+            </a:prstGeom>
+            <a:solidFill>
+              <a:srgbClr val="FF0000"/>
+            </a:solidFill>
+            <a:ln w="38100">
+              <a:solidFill>
+                <a:srgbClr val="FFC000"/>
+              </a:solidFill>
+            </a:ln>
+          </p:spPr>
+          <p:style>
+            <a:lnRef idx="2">
+              <a:schemeClr val="accent1">
+                <a:shade val="50000"/>
+              </a:schemeClr>
+            </a:lnRef>
+            <a:fillRef idx="1">
+              <a:schemeClr val="accent1"/>
+            </a:fillRef>
+            <a:effectRef idx="0">
+              <a:schemeClr val="accent1"/>
+            </a:effectRef>
+            <a:fontRef idx="minor">
+              <a:schemeClr val="lt1"/>
+            </a:fontRef>
+          </p:style>
+          <p:txBody>
+            <a:bodyPr rtlCol="0" anchor="ctr"/>
+            <a:lstStyle/>
+            <a:p>
+              <a:pPr algn="ctr"/>
+              <a:endParaRPr lang="en-US"/>
+            </a:p>
+          </p:txBody>
+        </p:sp>
+      </p:grpSp>
+    </p:spTree>
+    <p:extLst>
+      <p:ext uri="{BB962C8B-B14F-4D97-AF65-F5344CB8AC3E}">
+        <p14:creationId xmlns:p14="http://schemas.microsoft.com/office/powerpoint/2010/main" val="3534194210"/>
+      </p:ext>
+    </p:extLst>
+  </p:cSld>
+  <p:clrMapOvr>
+    <a:masterClrMapping/>
+  </p:clrMapOvr>
+</p:sld>
+</file>
+
+<file path=ppt/slides/slide28.xml><?xml version="1.0" encoding="utf-8"?>
+<p:sld xmlns:a="http://schemas.openxmlformats.org/drawingml/2006/main" xmlns:r="http://schemas.openxmlformats.org/officeDocument/2006/relationships" xmlns:p="http://schemas.openxmlformats.org/presentationml/2006/main">
+  <p:cSld>
+    <p:spTree>
+      <p:nvGrpSpPr>
+        <p:cNvPr id="1" name=""/>
+        <p:cNvGrpSpPr/>
+        <p:nvPr/>
+      </p:nvGrpSpPr>
+      <p:grpSpPr>
+        <a:xfrm>
+          <a:off x="0" y="0"/>
+          <a:ext cx="0" cy="0"/>
+          <a:chOff x="0" y="0"/>
+          <a:chExt cx="0" cy="0"/>
+        </a:xfrm>
+      </p:grpSpPr>
+      <p:pic>
+        <p:nvPicPr>
+          <p:cNvPr id="6" name="Imagen 5">
+            <a:extLst>
+              <a:ext uri="{FF2B5EF4-FFF2-40B4-BE49-F238E27FC236}">
+                <a16:creationId xmlns:a16="http://schemas.microsoft.com/office/drawing/2014/main" id="{513E70C9-EA36-496F-9C18-04DD65AB6CE1}"/>
+              </a:ext>
+            </a:extLst>
+          </p:cNvPr>
+          <p:cNvPicPr>
+            <a:picLocks noChangeAspect="1"/>
+          </p:cNvPicPr>
+          <p:nvPr/>
+        </p:nvPicPr>
+        <p:blipFill rotWithShape="1">
+          <a:blip r:embed="rId2"/>
+          <a:srcRect l="43717" r="1"/>
+          <a:stretch/>
+        </p:blipFill>
+        <p:spPr>
+          <a:xfrm>
+            <a:off x="2664994" y="0"/>
+            <a:ext cx="6862011" cy="6858000"/>
+          </a:xfrm>
+          <a:prstGeom prst="rect">
+            <a:avLst/>
+          </a:prstGeom>
+        </p:spPr>
+      </p:pic>
+      <p:pic>
+        <p:nvPicPr>
+          <p:cNvPr id="7" name="Picture 4" descr="https://www.strath.ac.uk/media/1newwebsite/documents/brand/strath_main.jpg">
+            <a:extLst>
+              <a:ext uri="{FF2B5EF4-FFF2-40B4-BE49-F238E27FC236}">
+                <a16:creationId xmlns:a16="http://schemas.microsoft.com/office/drawing/2014/main" id="{09DDC4EB-53EE-4856-899D-028F20EE32D2}"/>
+              </a:ext>
+            </a:extLst>
+          </p:cNvPr>
+          <p:cNvPicPr>
+            <a:picLocks noChangeAspect="1" noChangeArrowheads="1"/>
+          </p:cNvPicPr>
+          <p:nvPr/>
+        </p:nvPicPr>
+        <p:blipFill>
+          <a:blip r:embed="rId3" cstate="print">
+            <a:extLst>
+              <a:ext uri="{28A0092B-C50C-407E-A947-70E740481C1C}">
+                <a14:useLocalDpi xmlns:a14="http://schemas.microsoft.com/office/drawing/2010/main" val="0"/>
+              </a:ext>
+            </a:extLst>
+          </a:blip>
+          <a:srcRect/>
+          <a:stretch>
+            <a:fillRect/>
+          </a:stretch>
+        </p:blipFill>
+        <p:spPr bwMode="auto">
+          <a:xfrm>
+            <a:off x="7688374" y="1"/>
+            <a:ext cx="1838632" cy="2068461"/>
+          </a:xfrm>
+          <a:prstGeom prst="rect">
+            <a:avLst/>
+          </a:prstGeom>
+          <a:noFill/>
+          <a:extLst>
+            <a:ext uri="{909E8E84-426E-40DD-AFC4-6F175D3DCCD1}">
+              <a14:hiddenFill xmlns:a14="http://schemas.microsoft.com/office/drawing/2010/main">
+                <a:solidFill>
+                  <a:srgbClr val="FFFFFF"/>
+                </a:solidFill>
+              </a14:hiddenFill>
+            </a:ext>
+          </a:extLst>
+        </p:spPr>
+      </p:pic>
       <p:sp>
         <p:nvSpPr>
-          <p:cNvPr id="6" name="CuadroTexto 5">
-            <a:extLst>
-              <a:ext uri="{FF2B5EF4-FFF2-40B4-BE49-F238E27FC236}">
-                <a16:creationId xmlns:a16="http://schemas.microsoft.com/office/drawing/2014/main" id="{B477A167-8C97-4B42-AA4A-0332FEC394C0}"/>
+          <p:cNvPr id="8" name="CuadroTexto 7">
+            <a:extLst>
+              <a:ext uri="{FF2B5EF4-FFF2-40B4-BE49-F238E27FC236}">
+                <a16:creationId xmlns:a16="http://schemas.microsoft.com/office/drawing/2014/main" id="{8848738D-8359-4DE6-B0B8-B3735517525E}"/>
               </a:ext>
             </a:extLst>
           </p:cNvPr>
@@ -16934,8 +19112,8 @@
         </p:nvSpPr>
         <p:spPr>
           <a:xfrm>
-            <a:off x="5402179" y="2527359"/>
-            <a:ext cx="2962365" cy="923330"/>
+            <a:off x="3164305" y="914300"/>
+            <a:ext cx="4199021" cy="3416320"/>
           </a:xfrm>
           <a:prstGeom prst="rect">
             <a:avLst/>
@@ -16949,18 +19127,42 @@
           <a:lstStyle/>
           <a:p>
             <a:r>
-              <a:rPr lang="en-US" dirty="0"/>
-              <a:t>Click on the Record button again and then submit the recording after reviewing it</a:t>
+              <a:rPr lang="en-US" sz="2400" dirty="0"/>
+              <a:t>Say “ah” for as long as you can. </a:t>
+            </a:r>
+          </a:p>
+          <a:p>
+            <a:r>
+              <a:rPr lang="en-US" sz="2400" dirty="0"/>
+              <a:t>Repeat this task twice.</a:t>
+            </a:r>
+          </a:p>
+          <a:p>
+            <a:endParaRPr lang="en-US" sz="2400" dirty="0"/>
+          </a:p>
+          <a:p>
+            <a:r>
+              <a:rPr lang="en-US" sz="2400" dirty="0"/>
+              <a:t>Click on the example button to hear an example recording.</a:t>
+            </a:r>
+          </a:p>
+          <a:p>
+            <a:endParaRPr lang="en-US" sz="2400" dirty="0"/>
+          </a:p>
+          <a:p>
+            <a:r>
+              <a:rPr lang="en-US" sz="2400" dirty="0"/>
+              <a:t>When you are ready, press Record. When finished press Stop.</a:t>
             </a:r>
           </a:p>
         </p:txBody>
       </p:sp>
       <p:sp>
         <p:nvSpPr>
-          <p:cNvPr id="7" name="Forma libre: forma 6">
-            <a:extLst>
-              <a:ext uri="{FF2B5EF4-FFF2-40B4-BE49-F238E27FC236}">
-                <a16:creationId xmlns:a16="http://schemas.microsoft.com/office/drawing/2014/main" id="{5DAFC7BD-7837-41F3-9226-6D96766CF787}"/>
+          <p:cNvPr id="9" name="Forma libre: forma 8">
+            <a:extLst>
+              <a:ext uri="{FF2B5EF4-FFF2-40B4-BE49-F238E27FC236}">
+                <a16:creationId xmlns:a16="http://schemas.microsoft.com/office/drawing/2014/main" id="{B526290D-5C0D-4D77-B820-3429554C80D3}"/>
               </a:ext>
             </a:extLst>
           </p:cNvPr>
@@ -16969,8 +19171,8 @@
         </p:nvSpPr>
         <p:spPr>
           <a:xfrm>
-            <a:off x="3040334" y="3525254"/>
-            <a:ext cx="617266" cy="922297"/>
+            <a:off x="5566238" y="4620126"/>
+            <a:ext cx="1183477" cy="1502381"/>
           </a:xfrm>
           <a:custGeom>
             <a:avLst/>
@@ -17190,12 +19392,183 @@
           </a:p>
         </p:txBody>
       </p:sp>
+    </p:spTree>
+    <p:extLst>
+      <p:ext uri="{BB962C8B-B14F-4D97-AF65-F5344CB8AC3E}">
+        <p14:creationId xmlns:p14="http://schemas.microsoft.com/office/powerpoint/2010/main" val="3514577946"/>
+      </p:ext>
+    </p:extLst>
+  </p:cSld>
+  <p:clrMapOvr>
+    <a:masterClrMapping/>
+  </p:clrMapOvr>
+</p:sld>
+</file>
+
+<file path=ppt/slides/slide29.xml><?xml version="1.0" encoding="utf-8"?>
+<p:sld xmlns:a="http://schemas.openxmlformats.org/drawingml/2006/main" xmlns:r="http://schemas.openxmlformats.org/officeDocument/2006/relationships" xmlns:p="http://schemas.openxmlformats.org/presentationml/2006/main">
+  <p:cSld>
+    <p:spTree>
+      <p:nvGrpSpPr>
+        <p:cNvPr id="1" name=""/>
+        <p:cNvGrpSpPr/>
+        <p:nvPr/>
+      </p:nvGrpSpPr>
+      <p:grpSpPr>
+        <a:xfrm>
+          <a:off x="0" y="0"/>
+          <a:ext cx="0" cy="0"/>
+          <a:chOff x="0" y="0"/>
+          <a:chExt cx="0" cy="0"/>
+        </a:xfrm>
+      </p:grpSpPr>
+      <p:pic>
+        <p:nvPicPr>
+          <p:cNvPr id="6" name="Imagen 5">
+            <a:extLst>
+              <a:ext uri="{FF2B5EF4-FFF2-40B4-BE49-F238E27FC236}">
+                <a16:creationId xmlns:a16="http://schemas.microsoft.com/office/drawing/2014/main" id="{513E70C9-EA36-496F-9C18-04DD65AB6CE1}"/>
+              </a:ext>
+            </a:extLst>
+          </p:cNvPr>
+          <p:cNvPicPr>
+            <a:picLocks noChangeAspect="1"/>
+          </p:cNvPicPr>
+          <p:nvPr/>
+        </p:nvPicPr>
+        <p:blipFill rotWithShape="1">
+          <a:blip r:embed="rId2"/>
+          <a:srcRect l="43717" r="1"/>
+          <a:stretch/>
+        </p:blipFill>
+        <p:spPr>
+          <a:xfrm>
+            <a:off x="2664994" y="0"/>
+            <a:ext cx="6862011" cy="6858000"/>
+          </a:xfrm>
+          <a:prstGeom prst="rect">
+            <a:avLst/>
+          </a:prstGeom>
+        </p:spPr>
+      </p:pic>
+      <p:pic>
+        <p:nvPicPr>
+          <p:cNvPr id="7" name="Picture 4" descr="https://www.strath.ac.uk/media/1newwebsite/documents/brand/strath_main.jpg">
+            <a:extLst>
+              <a:ext uri="{FF2B5EF4-FFF2-40B4-BE49-F238E27FC236}">
+                <a16:creationId xmlns:a16="http://schemas.microsoft.com/office/drawing/2014/main" id="{09DDC4EB-53EE-4856-899D-028F20EE32D2}"/>
+              </a:ext>
+            </a:extLst>
+          </p:cNvPr>
+          <p:cNvPicPr>
+            <a:picLocks noChangeAspect="1" noChangeArrowheads="1"/>
+          </p:cNvPicPr>
+          <p:nvPr/>
+        </p:nvPicPr>
+        <p:blipFill>
+          <a:blip r:embed="rId3" cstate="print">
+            <a:extLst>
+              <a:ext uri="{28A0092B-C50C-407E-A947-70E740481C1C}">
+                <a14:useLocalDpi xmlns:a14="http://schemas.microsoft.com/office/drawing/2010/main" val="0"/>
+              </a:ext>
+            </a:extLst>
+          </a:blip>
+          <a:srcRect/>
+          <a:stretch>
+            <a:fillRect/>
+          </a:stretch>
+        </p:blipFill>
+        <p:spPr bwMode="auto">
+          <a:xfrm>
+            <a:off x="7688374" y="1"/>
+            <a:ext cx="1838632" cy="2068461"/>
+          </a:xfrm>
+          <a:prstGeom prst="rect">
+            <a:avLst/>
+          </a:prstGeom>
+          <a:noFill/>
+          <a:extLst>
+            <a:ext uri="{909E8E84-426E-40DD-AFC4-6F175D3DCCD1}">
+              <a14:hiddenFill xmlns:a14="http://schemas.microsoft.com/office/drawing/2010/main">
+                <a:solidFill>
+                  <a:srgbClr val="FFFFFF"/>
+                </a:solidFill>
+              </a14:hiddenFill>
+            </a:ext>
+          </a:extLst>
+        </p:spPr>
+      </p:pic>
       <p:sp>
         <p:nvSpPr>
-          <p:cNvPr id="8" name="Flecha: a la derecha 7">
-            <a:extLst>
-              <a:ext uri="{FF2B5EF4-FFF2-40B4-BE49-F238E27FC236}">
-                <a16:creationId xmlns:a16="http://schemas.microsoft.com/office/drawing/2014/main" id="{CE4C0CDC-9AD9-4892-8E25-AD6AEE7D4406}"/>
+          <p:cNvPr id="8" name="CuadroTexto 7">
+            <a:extLst>
+              <a:ext uri="{FF2B5EF4-FFF2-40B4-BE49-F238E27FC236}">
+                <a16:creationId xmlns:a16="http://schemas.microsoft.com/office/drawing/2014/main" id="{8848738D-8359-4DE6-B0B8-B3735517525E}"/>
+              </a:ext>
+            </a:extLst>
+          </p:cNvPr>
+          <p:cNvSpPr txBox="1"/>
+          <p:nvPr/>
+        </p:nvSpPr>
+        <p:spPr>
+          <a:xfrm>
+            <a:off x="3164305" y="914300"/>
+            <a:ext cx="4199021" cy="3785652"/>
+          </a:xfrm>
+          <a:prstGeom prst="rect">
+            <a:avLst/>
+          </a:prstGeom>
+          <a:noFill/>
+        </p:spPr>
+        <p:txBody>
+          <a:bodyPr wrap="square" rtlCol="0">
+            <a:spAutoFit/>
+          </a:bodyPr>
+          <a:lstStyle/>
+          <a:p>
+            <a:r>
+              <a:rPr lang="en-GB" sz="2400" dirty="0"/>
+              <a:t>Repeat “</a:t>
+            </a:r>
+            <a:r>
+              <a:rPr lang="en-GB" sz="2400" dirty="0" err="1"/>
+              <a:t>pata</a:t>
+            </a:r>
+            <a:r>
+              <a:rPr lang="en-GB" sz="2400" dirty="0"/>
+              <a:t>” as fast and as clearly as you can for 10 seconds. </a:t>
+            </a:r>
+            <a:r>
+              <a:rPr lang="en-US" sz="2400" dirty="0"/>
+              <a:t>Repeat this task twice.</a:t>
+            </a:r>
+          </a:p>
+          <a:p>
+            <a:endParaRPr lang="en-US" sz="2400" dirty="0"/>
+          </a:p>
+          <a:p>
+            <a:r>
+              <a:rPr lang="en-US" sz="2400" dirty="0"/>
+              <a:t>Click on the example button to hear an example recording.</a:t>
+            </a:r>
+          </a:p>
+          <a:p>
+            <a:endParaRPr lang="en-US" sz="2400" dirty="0"/>
+          </a:p>
+          <a:p>
+            <a:r>
+              <a:rPr lang="en-US" sz="2400" dirty="0"/>
+              <a:t>When you are ready, press Record. When finished press Stop.</a:t>
+            </a:r>
+          </a:p>
+        </p:txBody>
+      </p:sp>
+      <p:sp>
+        <p:nvSpPr>
+          <p:cNvPr id="9" name="Forma libre: forma 8">
+            <a:extLst>
+              <a:ext uri="{FF2B5EF4-FFF2-40B4-BE49-F238E27FC236}">
+                <a16:creationId xmlns:a16="http://schemas.microsoft.com/office/drawing/2014/main" id="{B526290D-5C0D-4D77-B820-3429554C80D3}"/>
               </a:ext>
             </a:extLst>
           </p:cNvPr>
@@ -17203,28 +19576,202 @@
           <p:nvPr/>
         </p:nvSpPr>
         <p:spPr>
-          <a:xfrm rot="4659368">
-            <a:off x="6144742" y="3181847"/>
-            <a:ext cx="1206690" cy="1760651"/>
+          <a:xfrm>
+            <a:off x="7184831" y="4515023"/>
+            <a:ext cx="1183477" cy="1502381"/>
           </a:xfrm>
-          <a:prstGeom prst="rightArrow">
+          <a:custGeom>
             <a:avLst/>
-          </a:prstGeom>
+            <a:gdLst>
+              <a:gd name="connsiteX0" fmla="*/ 36094 w 589547"/>
+              <a:gd name="connsiteY0" fmla="*/ 0 h 866273"/>
+              <a:gd name="connsiteX1" fmla="*/ 228600 w 589547"/>
+              <a:gd name="connsiteY1" fmla="*/ 601579 h 866273"/>
+              <a:gd name="connsiteX2" fmla="*/ 0 w 589547"/>
+              <a:gd name="connsiteY2" fmla="*/ 745958 h 866273"/>
+              <a:gd name="connsiteX3" fmla="*/ 493294 w 589547"/>
+              <a:gd name="connsiteY3" fmla="*/ 866273 h 866273"/>
+              <a:gd name="connsiteX4" fmla="*/ 180473 w 589547"/>
+              <a:gd name="connsiteY4" fmla="*/ 132347 h 866273"/>
+              <a:gd name="connsiteX5" fmla="*/ 589547 w 589547"/>
+              <a:gd name="connsiteY5" fmla="*/ 216568 h 866273"/>
+              <a:gd name="connsiteX6" fmla="*/ 84221 w 589547"/>
+              <a:gd name="connsiteY6" fmla="*/ 24063 h 866273"/>
+              <a:gd name="connsiteX0" fmla="*/ 41017 w 594470"/>
+              <a:gd name="connsiteY0" fmla="*/ 0 h 897432"/>
+              <a:gd name="connsiteX1" fmla="*/ 233523 w 594470"/>
+              <a:gd name="connsiteY1" fmla="*/ 601579 h 897432"/>
+              <a:gd name="connsiteX2" fmla="*/ 4923 w 594470"/>
+              <a:gd name="connsiteY2" fmla="*/ 745958 h 897432"/>
+              <a:gd name="connsiteX3" fmla="*/ 498217 w 594470"/>
+              <a:gd name="connsiteY3" fmla="*/ 866273 h 897432"/>
+              <a:gd name="connsiteX4" fmla="*/ 185396 w 594470"/>
+              <a:gd name="connsiteY4" fmla="*/ 132347 h 897432"/>
+              <a:gd name="connsiteX5" fmla="*/ 594470 w 594470"/>
+              <a:gd name="connsiteY5" fmla="*/ 216568 h 897432"/>
+              <a:gd name="connsiteX6" fmla="*/ 89144 w 594470"/>
+              <a:gd name="connsiteY6" fmla="*/ 24063 h 897432"/>
+              <a:gd name="connsiteX0" fmla="*/ 52785 w 606238"/>
+              <a:gd name="connsiteY0" fmla="*/ 0 h 922297"/>
+              <a:gd name="connsiteX1" fmla="*/ 245291 w 606238"/>
+              <a:gd name="connsiteY1" fmla="*/ 601579 h 922297"/>
+              <a:gd name="connsiteX2" fmla="*/ 16691 w 606238"/>
+              <a:gd name="connsiteY2" fmla="*/ 745958 h 922297"/>
+              <a:gd name="connsiteX3" fmla="*/ 509985 w 606238"/>
+              <a:gd name="connsiteY3" fmla="*/ 866273 h 922297"/>
+              <a:gd name="connsiteX4" fmla="*/ 197164 w 606238"/>
+              <a:gd name="connsiteY4" fmla="*/ 132347 h 922297"/>
+              <a:gd name="connsiteX5" fmla="*/ 606238 w 606238"/>
+              <a:gd name="connsiteY5" fmla="*/ 216568 h 922297"/>
+              <a:gd name="connsiteX6" fmla="*/ 100912 w 606238"/>
+              <a:gd name="connsiteY6" fmla="*/ 24063 h 922297"/>
+              <a:gd name="connsiteX0" fmla="*/ 63813 w 617266"/>
+              <a:gd name="connsiteY0" fmla="*/ 0 h 922297"/>
+              <a:gd name="connsiteX1" fmla="*/ 256319 w 617266"/>
+              <a:gd name="connsiteY1" fmla="*/ 601579 h 922297"/>
+              <a:gd name="connsiteX2" fmla="*/ 27719 w 617266"/>
+              <a:gd name="connsiteY2" fmla="*/ 745958 h 922297"/>
+              <a:gd name="connsiteX3" fmla="*/ 521013 w 617266"/>
+              <a:gd name="connsiteY3" fmla="*/ 866273 h 922297"/>
+              <a:gd name="connsiteX4" fmla="*/ 208192 w 617266"/>
+              <a:gd name="connsiteY4" fmla="*/ 132347 h 922297"/>
+              <a:gd name="connsiteX5" fmla="*/ 617266 w 617266"/>
+              <a:gd name="connsiteY5" fmla="*/ 216568 h 922297"/>
+              <a:gd name="connsiteX6" fmla="*/ 111940 w 617266"/>
+              <a:gd name="connsiteY6" fmla="*/ 24063 h 922297"/>
+              <a:gd name="connsiteX0" fmla="*/ 63813 w 617266"/>
+              <a:gd name="connsiteY0" fmla="*/ 0 h 922297"/>
+              <a:gd name="connsiteX1" fmla="*/ 256319 w 617266"/>
+              <a:gd name="connsiteY1" fmla="*/ 601579 h 922297"/>
+              <a:gd name="connsiteX2" fmla="*/ 27719 w 617266"/>
+              <a:gd name="connsiteY2" fmla="*/ 745958 h 922297"/>
+              <a:gd name="connsiteX3" fmla="*/ 521013 w 617266"/>
+              <a:gd name="connsiteY3" fmla="*/ 866273 h 922297"/>
+              <a:gd name="connsiteX4" fmla="*/ 208192 w 617266"/>
+              <a:gd name="connsiteY4" fmla="*/ 132347 h 922297"/>
+              <a:gd name="connsiteX5" fmla="*/ 617266 w 617266"/>
+              <a:gd name="connsiteY5" fmla="*/ 216568 h 922297"/>
+              <a:gd name="connsiteX6" fmla="*/ 111940 w 617266"/>
+              <a:gd name="connsiteY6" fmla="*/ 24063 h 922297"/>
+              <a:gd name="connsiteX0" fmla="*/ 63813 w 617266"/>
+              <a:gd name="connsiteY0" fmla="*/ 0 h 922297"/>
+              <a:gd name="connsiteX1" fmla="*/ 256319 w 617266"/>
+              <a:gd name="connsiteY1" fmla="*/ 601579 h 922297"/>
+              <a:gd name="connsiteX2" fmla="*/ 27719 w 617266"/>
+              <a:gd name="connsiteY2" fmla="*/ 745958 h 922297"/>
+              <a:gd name="connsiteX3" fmla="*/ 521013 w 617266"/>
+              <a:gd name="connsiteY3" fmla="*/ 866273 h 922297"/>
+              <a:gd name="connsiteX4" fmla="*/ 208192 w 617266"/>
+              <a:gd name="connsiteY4" fmla="*/ 132347 h 922297"/>
+              <a:gd name="connsiteX5" fmla="*/ 617266 w 617266"/>
+              <a:gd name="connsiteY5" fmla="*/ 216568 h 922297"/>
+              <a:gd name="connsiteX6" fmla="*/ 111940 w 617266"/>
+              <a:gd name="connsiteY6" fmla="*/ 24063 h 922297"/>
+              <a:gd name="connsiteX0" fmla="*/ 63813 w 617266"/>
+              <a:gd name="connsiteY0" fmla="*/ 0 h 922297"/>
+              <a:gd name="connsiteX1" fmla="*/ 256319 w 617266"/>
+              <a:gd name="connsiteY1" fmla="*/ 601579 h 922297"/>
+              <a:gd name="connsiteX2" fmla="*/ 27719 w 617266"/>
+              <a:gd name="connsiteY2" fmla="*/ 745958 h 922297"/>
+              <a:gd name="connsiteX3" fmla="*/ 521013 w 617266"/>
+              <a:gd name="connsiteY3" fmla="*/ 866273 h 922297"/>
+              <a:gd name="connsiteX4" fmla="*/ 208192 w 617266"/>
+              <a:gd name="connsiteY4" fmla="*/ 132347 h 922297"/>
+              <a:gd name="connsiteX5" fmla="*/ 617266 w 617266"/>
+              <a:gd name="connsiteY5" fmla="*/ 216568 h 922297"/>
+              <a:gd name="connsiteX6" fmla="*/ 68224 w 617266"/>
+              <a:gd name="connsiteY6" fmla="*/ 2205 h 922297"/>
+              <a:gd name="connsiteX0" fmla="*/ 63813 w 617266"/>
+              <a:gd name="connsiteY0" fmla="*/ 0 h 922297"/>
+              <a:gd name="connsiteX1" fmla="*/ 256319 w 617266"/>
+              <a:gd name="connsiteY1" fmla="*/ 601579 h 922297"/>
+              <a:gd name="connsiteX2" fmla="*/ 27719 w 617266"/>
+              <a:gd name="connsiteY2" fmla="*/ 745958 h 922297"/>
+              <a:gd name="connsiteX3" fmla="*/ 521013 w 617266"/>
+              <a:gd name="connsiteY3" fmla="*/ 866273 h 922297"/>
+              <a:gd name="connsiteX4" fmla="*/ 208192 w 617266"/>
+              <a:gd name="connsiteY4" fmla="*/ 132347 h 922297"/>
+              <a:gd name="connsiteX5" fmla="*/ 617266 w 617266"/>
+              <a:gd name="connsiteY5" fmla="*/ 216568 h 922297"/>
+              <a:gd name="connsiteX6" fmla="*/ 68224 w 617266"/>
+              <a:gd name="connsiteY6" fmla="*/ 2205 h 922297"/>
+              <a:gd name="connsiteX7" fmla="*/ 63813 w 617266"/>
+              <a:gd name="connsiteY7" fmla="*/ 0 h 922297"/>
+            </a:gdLst>
+            <a:ahLst/>
+            <a:cxnLst>
+              <a:cxn ang="0">
+                <a:pos x="connsiteX0" y="connsiteY0"/>
+              </a:cxn>
+              <a:cxn ang="0">
+                <a:pos x="connsiteX1" y="connsiteY1"/>
+              </a:cxn>
+              <a:cxn ang="0">
+                <a:pos x="connsiteX2" y="connsiteY2"/>
+              </a:cxn>
+              <a:cxn ang="0">
+                <a:pos x="connsiteX3" y="connsiteY3"/>
+              </a:cxn>
+              <a:cxn ang="0">
+                <a:pos x="connsiteX4" y="connsiteY4"/>
+              </a:cxn>
+              <a:cxn ang="0">
+                <a:pos x="connsiteX5" y="connsiteY5"/>
+              </a:cxn>
+              <a:cxn ang="0">
+                <a:pos x="connsiteX6" y="connsiteY6"/>
+              </a:cxn>
+              <a:cxn ang="0">
+                <a:pos x="connsiteX7" y="connsiteY7"/>
+              </a:cxn>
+            </a:cxnLst>
+            <a:rect l="l" t="t" r="r" b="b"/>
+            <a:pathLst>
+              <a:path w="617266" h="922297">
+                <a:moveTo>
+                  <a:pt x="63813" y="0"/>
+                </a:moveTo>
+                <a:lnTo>
+                  <a:pt x="256319" y="601579"/>
+                </a:lnTo>
+                <a:cubicBezTo>
+                  <a:pt x="86367" y="569255"/>
+                  <a:pt x="-63756" y="559764"/>
+                  <a:pt x="27719" y="745958"/>
+                </a:cubicBezTo>
+                <a:cubicBezTo>
+                  <a:pt x="119194" y="932152"/>
+                  <a:pt x="490934" y="968541"/>
+                  <a:pt x="521013" y="866273"/>
+                </a:cubicBezTo>
+                <a:lnTo>
+                  <a:pt x="208192" y="132347"/>
+                </a:lnTo>
+                <a:cubicBezTo>
+                  <a:pt x="344550" y="160421"/>
+                  <a:pt x="473622" y="246783"/>
+                  <a:pt x="617266" y="216568"/>
+                </a:cubicBezTo>
+                <a:cubicBezTo>
+                  <a:pt x="445181" y="177901"/>
+                  <a:pt x="236666" y="66373"/>
+                  <a:pt x="68224" y="2205"/>
+                </a:cubicBezTo>
+                <a:lnTo>
+                  <a:pt x="63813" y="0"/>
+                </a:lnTo>
+                <a:close/>
+              </a:path>
+            </a:pathLst>
+          </a:custGeom>
           <a:solidFill>
-            <a:srgbClr val="7030A0"/>
+            <a:srgbClr val="FF0000"/>
           </a:solidFill>
           <a:ln w="38100">
             <a:solidFill>
               <a:srgbClr val="FFC000"/>
             </a:solidFill>
           </a:ln>
-          <a:scene3d>
-            <a:camera prst="perspectiveHeroicExtremeRightFacing"/>
-            <a:lightRig rig="threePt" dir="t"/>
-          </a:scene3d>
-          <a:sp3d>
-            <a:bevelT prst="angle"/>
-          </a:sp3d>
         </p:spPr>
         <p:style>
           <a:lnRef idx="2">
@@ -17251,12 +19798,377 @@
           </a:p>
         </p:txBody>
       </p:sp>
+    </p:spTree>
+    <p:extLst>
+      <p:ext uri="{BB962C8B-B14F-4D97-AF65-F5344CB8AC3E}">
+        <p14:creationId xmlns:p14="http://schemas.microsoft.com/office/powerpoint/2010/main" val="2386913617"/>
+      </p:ext>
+    </p:extLst>
+  </p:cSld>
+  <p:clrMapOvr>
+    <a:masterClrMapping/>
+  </p:clrMapOvr>
+</p:sld>
+</file>
+
+<file path=ppt/slides/slide3.xml><?xml version="1.0" encoding="utf-8"?>
+<p:sld xmlns:a="http://schemas.openxmlformats.org/drawingml/2006/main" xmlns:r="http://schemas.openxmlformats.org/officeDocument/2006/relationships" xmlns:p="http://schemas.openxmlformats.org/presentationml/2006/main">
+  <p:cSld>
+    <p:spTree>
+      <p:nvGrpSpPr>
+        <p:cNvPr id="1" name=""/>
+        <p:cNvGrpSpPr/>
+        <p:nvPr/>
+      </p:nvGrpSpPr>
+      <p:grpSpPr>
+        <a:xfrm>
+          <a:off x="0" y="0"/>
+          <a:ext cx="0" cy="0"/>
+          <a:chOff x="0" y="0"/>
+          <a:chExt cx="0" cy="0"/>
+        </a:xfrm>
+      </p:grpSpPr>
       <p:sp>
         <p:nvSpPr>
-          <p:cNvPr id="9" name="Luna 8">
-            <a:extLst>
-              <a:ext uri="{FF2B5EF4-FFF2-40B4-BE49-F238E27FC236}">
-                <a16:creationId xmlns:a16="http://schemas.microsoft.com/office/drawing/2014/main" id="{1F543B4E-0C7C-429C-80DE-A6CEE12F3156}"/>
+          <p:cNvPr id="2" name="Título 1">
+            <a:extLst>
+              <a:ext uri="{FF2B5EF4-FFF2-40B4-BE49-F238E27FC236}">
+                <a16:creationId xmlns:a16="http://schemas.microsoft.com/office/drawing/2014/main" id="{0EA9CC44-A4DD-401C-BAE3-4BDA1320273B}"/>
+              </a:ext>
+            </a:extLst>
+          </p:cNvPr>
+          <p:cNvSpPr>
+            <a:spLocks noGrp="1"/>
+          </p:cNvSpPr>
+          <p:nvPr>
+            <p:ph type="title"/>
+          </p:nvPr>
+        </p:nvSpPr>
+        <p:spPr/>
+        <p:txBody>
+          <a:bodyPr/>
+          <a:lstStyle/>
+          <a:p>
+            <a:r>
+              <a:rPr lang="en-US" dirty="0">
+                <a:solidFill>
+                  <a:schemeClr val="accent2"/>
+                </a:solidFill>
+              </a:rPr>
+              <a:t>New requirements</a:t>
+            </a:r>
+          </a:p>
+        </p:txBody>
+      </p:sp>
+      <p:sp>
+        <p:nvSpPr>
+          <p:cNvPr id="3" name="Marcador de contenido 2">
+            <a:extLst>
+              <a:ext uri="{FF2B5EF4-FFF2-40B4-BE49-F238E27FC236}">
+                <a16:creationId xmlns:a16="http://schemas.microsoft.com/office/drawing/2014/main" id="{A648EF47-A8AF-4FAD-8E52-85AFC2D1D6A3}"/>
+              </a:ext>
+            </a:extLst>
+          </p:cNvPr>
+          <p:cNvSpPr>
+            <a:spLocks noGrp="1"/>
+          </p:cNvSpPr>
+          <p:nvPr>
+            <p:ph idx="1"/>
+          </p:nvPr>
+        </p:nvSpPr>
+        <p:spPr/>
+        <p:txBody>
+          <a:bodyPr/>
+          <a:lstStyle/>
+          <a:p>
+            <a:r>
+              <a:rPr lang="en-US" dirty="0">
+                <a:solidFill>
+                  <a:schemeClr val="accent2"/>
+                </a:solidFill>
+              </a:rPr>
+              <a:t>Rate things 1-10</a:t>
+            </a:r>
+          </a:p>
+          <a:p>
+            <a:r>
+              <a:rPr lang="en-US" dirty="0">
+                <a:solidFill>
+                  <a:schemeClr val="accent2"/>
+                </a:solidFill>
+              </a:rPr>
+              <a:t>Listen to example audio (html audio link)</a:t>
+            </a:r>
+          </a:p>
+          <a:p>
+            <a:r>
+              <a:rPr lang="en-US" dirty="0">
+                <a:solidFill>
+                  <a:schemeClr val="accent2"/>
+                </a:solidFill>
+              </a:rPr>
+              <a:t>Just one square graphic in div A. </a:t>
+            </a:r>
+            <a:r>
+              <a:rPr lang="en-US" dirty="0" err="1">
+                <a:solidFill>
+                  <a:schemeClr val="accent2"/>
+                </a:solidFill>
+              </a:rPr>
+              <a:t>Div</a:t>
+            </a:r>
+            <a:r>
+              <a:rPr lang="en-US" dirty="0">
+                <a:solidFill>
+                  <a:schemeClr val="accent2"/>
+                </a:solidFill>
+              </a:rPr>
+              <a:t> B is for controls and moves with rotation</a:t>
+            </a:r>
+          </a:p>
+          <a:p>
+            <a:r>
+              <a:rPr lang="en-US" dirty="0">
+                <a:solidFill>
+                  <a:schemeClr val="accent2"/>
+                </a:solidFill>
+              </a:rPr>
+              <a:t>Store question results in separate files</a:t>
+            </a:r>
+          </a:p>
+          <a:p>
+            <a:r>
+              <a:rPr lang="en-US" dirty="0" err="1">
+                <a:solidFill>
+                  <a:schemeClr val="accent2"/>
+                </a:solidFill>
+              </a:rPr>
+              <a:t>GuideID</a:t>
+            </a:r>
+            <a:r>
+              <a:rPr lang="en-US" dirty="0">
+                <a:solidFill>
+                  <a:schemeClr val="accent2"/>
+                </a:solidFill>
+              </a:rPr>
+              <a:t>-N-A/S/B/F (Audio, Scale, Boolean, Final) in the Guides folder</a:t>
+            </a:r>
+          </a:p>
+          <a:p>
+            <a:r>
+              <a:rPr lang="en-US" dirty="0">
+                <a:solidFill>
+                  <a:schemeClr val="accent2"/>
+                </a:solidFill>
+              </a:rPr>
+              <a:t>id is YYYMMDD-XX..X-G Where YYYYMMDD is the year, month and date, XX..X is the patient ID, and G is the </a:t>
+            </a:r>
+            <a:r>
+              <a:rPr lang="en-US" dirty="0" err="1">
+                <a:solidFill>
+                  <a:schemeClr val="accent2"/>
+                </a:solidFill>
+              </a:rPr>
+              <a:t>GuideID</a:t>
+            </a:r>
+            <a:r>
+              <a:rPr lang="en-US" dirty="0">
+                <a:solidFill>
+                  <a:schemeClr val="accent2"/>
+                </a:solidFill>
+              </a:rPr>
+              <a:t> (a single letter)</a:t>
+            </a:r>
+          </a:p>
+          <a:p>
+            <a:r>
+              <a:rPr lang="en-US" dirty="0">
+                <a:solidFill>
+                  <a:schemeClr val="accent2"/>
+                </a:solidFill>
+              </a:rPr>
+              <a:t>The example audio is stored in the Guides folder as G-N-E</a:t>
+            </a:r>
+          </a:p>
+        </p:txBody>
+      </p:sp>
+    </p:spTree>
+    <p:extLst>
+      <p:ext uri="{BB962C8B-B14F-4D97-AF65-F5344CB8AC3E}">
+        <p14:creationId xmlns:p14="http://schemas.microsoft.com/office/powerpoint/2010/main" val="3966279709"/>
+      </p:ext>
+    </p:extLst>
+  </p:cSld>
+  <p:clrMapOvr>
+    <a:masterClrMapping/>
+  </p:clrMapOvr>
+</p:sld>
+</file>
+
+<file path=ppt/slides/slide30.xml><?xml version="1.0" encoding="utf-8"?>
+<p:sld xmlns:a="http://schemas.openxmlformats.org/drawingml/2006/main" xmlns:r="http://schemas.openxmlformats.org/officeDocument/2006/relationships" xmlns:p="http://schemas.openxmlformats.org/presentationml/2006/main">
+  <p:cSld>
+    <p:spTree>
+      <p:nvGrpSpPr>
+        <p:cNvPr id="1" name=""/>
+        <p:cNvGrpSpPr/>
+        <p:nvPr/>
+      </p:nvGrpSpPr>
+      <p:grpSpPr>
+        <a:xfrm>
+          <a:off x="0" y="0"/>
+          <a:ext cx="0" cy="0"/>
+          <a:chOff x="0" y="0"/>
+          <a:chExt cx="0" cy="0"/>
+        </a:xfrm>
+      </p:grpSpPr>
+      <p:pic>
+        <p:nvPicPr>
+          <p:cNvPr id="6" name="Imagen 5">
+            <a:extLst>
+              <a:ext uri="{FF2B5EF4-FFF2-40B4-BE49-F238E27FC236}">
+                <a16:creationId xmlns:a16="http://schemas.microsoft.com/office/drawing/2014/main" id="{513E70C9-EA36-496F-9C18-04DD65AB6CE1}"/>
+              </a:ext>
+            </a:extLst>
+          </p:cNvPr>
+          <p:cNvPicPr>
+            <a:picLocks noChangeAspect="1"/>
+          </p:cNvPicPr>
+          <p:nvPr/>
+        </p:nvPicPr>
+        <p:blipFill rotWithShape="1">
+          <a:blip r:embed="rId2"/>
+          <a:srcRect l="43717" r="1"/>
+          <a:stretch/>
+        </p:blipFill>
+        <p:spPr>
+          <a:xfrm>
+            <a:off x="2664994" y="0"/>
+            <a:ext cx="6862011" cy="6858000"/>
+          </a:xfrm>
+          <a:prstGeom prst="rect">
+            <a:avLst/>
+          </a:prstGeom>
+        </p:spPr>
+      </p:pic>
+      <p:pic>
+        <p:nvPicPr>
+          <p:cNvPr id="7" name="Picture 4" descr="https://www.strath.ac.uk/media/1newwebsite/documents/brand/strath_main.jpg">
+            <a:extLst>
+              <a:ext uri="{FF2B5EF4-FFF2-40B4-BE49-F238E27FC236}">
+                <a16:creationId xmlns:a16="http://schemas.microsoft.com/office/drawing/2014/main" id="{09DDC4EB-53EE-4856-899D-028F20EE32D2}"/>
+              </a:ext>
+            </a:extLst>
+          </p:cNvPr>
+          <p:cNvPicPr>
+            <a:picLocks noChangeAspect="1" noChangeArrowheads="1"/>
+          </p:cNvPicPr>
+          <p:nvPr/>
+        </p:nvPicPr>
+        <p:blipFill>
+          <a:blip r:embed="rId3" cstate="print">
+            <a:extLst>
+              <a:ext uri="{28A0092B-C50C-407E-A947-70E740481C1C}">
+                <a14:useLocalDpi xmlns:a14="http://schemas.microsoft.com/office/drawing/2010/main" val="0"/>
+              </a:ext>
+            </a:extLst>
+          </a:blip>
+          <a:srcRect/>
+          <a:stretch>
+            <a:fillRect/>
+          </a:stretch>
+        </p:blipFill>
+        <p:spPr bwMode="auto">
+          <a:xfrm>
+            <a:off x="7688374" y="1"/>
+            <a:ext cx="1838632" cy="2068461"/>
+          </a:xfrm>
+          <a:prstGeom prst="rect">
+            <a:avLst/>
+          </a:prstGeom>
+          <a:noFill/>
+          <a:extLst>
+            <a:ext uri="{909E8E84-426E-40DD-AFC4-6F175D3DCCD1}">
+              <a14:hiddenFill xmlns:a14="http://schemas.microsoft.com/office/drawing/2010/main">
+                <a:solidFill>
+                  <a:srgbClr val="FFFFFF"/>
+                </a:solidFill>
+              </a14:hiddenFill>
+            </a:ext>
+          </a:extLst>
+        </p:spPr>
+      </p:pic>
+      <p:sp>
+        <p:nvSpPr>
+          <p:cNvPr id="8" name="CuadroTexto 7">
+            <a:extLst>
+              <a:ext uri="{FF2B5EF4-FFF2-40B4-BE49-F238E27FC236}">
+                <a16:creationId xmlns:a16="http://schemas.microsoft.com/office/drawing/2014/main" id="{8848738D-8359-4DE6-B0B8-B3735517525E}"/>
+              </a:ext>
+            </a:extLst>
+          </p:cNvPr>
+          <p:cNvSpPr txBox="1"/>
+          <p:nvPr/>
+        </p:nvSpPr>
+        <p:spPr>
+          <a:xfrm>
+            <a:off x="3164305" y="914300"/>
+            <a:ext cx="4199021" cy="4524315"/>
+          </a:xfrm>
+          <a:prstGeom prst="rect">
+            <a:avLst/>
+          </a:prstGeom>
+          <a:noFill/>
+        </p:spPr>
+        <p:txBody>
+          <a:bodyPr wrap="square" rtlCol="0">
+            <a:spAutoFit/>
+          </a:bodyPr>
+          <a:lstStyle/>
+          <a:p>
+            <a:r>
+              <a:rPr lang="en-GB" sz="2400" dirty="0"/>
+              <a:t>Repeat the sentence </a:t>
+            </a:r>
+            <a:r>
+              <a:rPr lang="en-GB" sz="2400" dirty="0">
+                <a:solidFill>
+                  <a:srgbClr val="FFC000"/>
+                </a:solidFill>
+              </a:rPr>
+              <a:t>“Tony knew you were lying in bed” </a:t>
+            </a:r>
+            <a:r>
+              <a:rPr lang="en-GB" sz="2400" dirty="0"/>
+              <a:t>10 times. Do not pause within the sentence. Pause briefly between each repetition.</a:t>
+            </a:r>
+          </a:p>
+          <a:p>
+            <a:endParaRPr lang="en-US" sz="2400" dirty="0"/>
+          </a:p>
+          <a:p>
+            <a:r>
+              <a:rPr lang="en-US" sz="2400" dirty="0"/>
+              <a:t>Click on the example button to hear an example recording.</a:t>
+            </a:r>
+          </a:p>
+          <a:p>
+            <a:endParaRPr lang="en-US" sz="2400" dirty="0"/>
+          </a:p>
+          <a:p>
+            <a:r>
+              <a:rPr lang="en-US" sz="2400" dirty="0"/>
+              <a:t>When you are ready, press Record. When finished press Stop.</a:t>
+            </a:r>
+          </a:p>
+        </p:txBody>
+      </p:sp>
+      <p:sp>
+        <p:nvSpPr>
+          <p:cNvPr id="9" name="Forma libre: forma 8">
+            <a:extLst>
+              <a:ext uri="{FF2B5EF4-FFF2-40B4-BE49-F238E27FC236}">
+                <a16:creationId xmlns:a16="http://schemas.microsoft.com/office/drawing/2014/main" id="{B526290D-5C0D-4D77-B820-3429554C80D3}"/>
               </a:ext>
             </a:extLst>
           </p:cNvPr>
@@ -17265,7 +20177,392 @@
         </p:nvSpPr>
         <p:spPr>
           <a:xfrm>
-            <a:off x="2446421" y="3601023"/>
+            <a:off x="7184831" y="4515023"/>
+            <a:ext cx="1183477" cy="1502381"/>
+          </a:xfrm>
+          <a:custGeom>
+            <a:avLst/>
+            <a:gdLst>
+              <a:gd name="connsiteX0" fmla="*/ 36094 w 589547"/>
+              <a:gd name="connsiteY0" fmla="*/ 0 h 866273"/>
+              <a:gd name="connsiteX1" fmla="*/ 228600 w 589547"/>
+              <a:gd name="connsiteY1" fmla="*/ 601579 h 866273"/>
+              <a:gd name="connsiteX2" fmla="*/ 0 w 589547"/>
+              <a:gd name="connsiteY2" fmla="*/ 745958 h 866273"/>
+              <a:gd name="connsiteX3" fmla="*/ 493294 w 589547"/>
+              <a:gd name="connsiteY3" fmla="*/ 866273 h 866273"/>
+              <a:gd name="connsiteX4" fmla="*/ 180473 w 589547"/>
+              <a:gd name="connsiteY4" fmla="*/ 132347 h 866273"/>
+              <a:gd name="connsiteX5" fmla="*/ 589547 w 589547"/>
+              <a:gd name="connsiteY5" fmla="*/ 216568 h 866273"/>
+              <a:gd name="connsiteX6" fmla="*/ 84221 w 589547"/>
+              <a:gd name="connsiteY6" fmla="*/ 24063 h 866273"/>
+              <a:gd name="connsiteX0" fmla="*/ 41017 w 594470"/>
+              <a:gd name="connsiteY0" fmla="*/ 0 h 897432"/>
+              <a:gd name="connsiteX1" fmla="*/ 233523 w 594470"/>
+              <a:gd name="connsiteY1" fmla="*/ 601579 h 897432"/>
+              <a:gd name="connsiteX2" fmla="*/ 4923 w 594470"/>
+              <a:gd name="connsiteY2" fmla="*/ 745958 h 897432"/>
+              <a:gd name="connsiteX3" fmla="*/ 498217 w 594470"/>
+              <a:gd name="connsiteY3" fmla="*/ 866273 h 897432"/>
+              <a:gd name="connsiteX4" fmla="*/ 185396 w 594470"/>
+              <a:gd name="connsiteY4" fmla="*/ 132347 h 897432"/>
+              <a:gd name="connsiteX5" fmla="*/ 594470 w 594470"/>
+              <a:gd name="connsiteY5" fmla="*/ 216568 h 897432"/>
+              <a:gd name="connsiteX6" fmla="*/ 89144 w 594470"/>
+              <a:gd name="connsiteY6" fmla="*/ 24063 h 897432"/>
+              <a:gd name="connsiteX0" fmla="*/ 52785 w 606238"/>
+              <a:gd name="connsiteY0" fmla="*/ 0 h 922297"/>
+              <a:gd name="connsiteX1" fmla="*/ 245291 w 606238"/>
+              <a:gd name="connsiteY1" fmla="*/ 601579 h 922297"/>
+              <a:gd name="connsiteX2" fmla="*/ 16691 w 606238"/>
+              <a:gd name="connsiteY2" fmla="*/ 745958 h 922297"/>
+              <a:gd name="connsiteX3" fmla="*/ 509985 w 606238"/>
+              <a:gd name="connsiteY3" fmla="*/ 866273 h 922297"/>
+              <a:gd name="connsiteX4" fmla="*/ 197164 w 606238"/>
+              <a:gd name="connsiteY4" fmla="*/ 132347 h 922297"/>
+              <a:gd name="connsiteX5" fmla="*/ 606238 w 606238"/>
+              <a:gd name="connsiteY5" fmla="*/ 216568 h 922297"/>
+              <a:gd name="connsiteX6" fmla="*/ 100912 w 606238"/>
+              <a:gd name="connsiteY6" fmla="*/ 24063 h 922297"/>
+              <a:gd name="connsiteX0" fmla="*/ 63813 w 617266"/>
+              <a:gd name="connsiteY0" fmla="*/ 0 h 922297"/>
+              <a:gd name="connsiteX1" fmla="*/ 256319 w 617266"/>
+              <a:gd name="connsiteY1" fmla="*/ 601579 h 922297"/>
+              <a:gd name="connsiteX2" fmla="*/ 27719 w 617266"/>
+              <a:gd name="connsiteY2" fmla="*/ 745958 h 922297"/>
+              <a:gd name="connsiteX3" fmla="*/ 521013 w 617266"/>
+              <a:gd name="connsiteY3" fmla="*/ 866273 h 922297"/>
+              <a:gd name="connsiteX4" fmla="*/ 208192 w 617266"/>
+              <a:gd name="connsiteY4" fmla="*/ 132347 h 922297"/>
+              <a:gd name="connsiteX5" fmla="*/ 617266 w 617266"/>
+              <a:gd name="connsiteY5" fmla="*/ 216568 h 922297"/>
+              <a:gd name="connsiteX6" fmla="*/ 111940 w 617266"/>
+              <a:gd name="connsiteY6" fmla="*/ 24063 h 922297"/>
+              <a:gd name="connsiteX0" fmla="*/ 63813 w 617266"/>
+              <a:gd name="connsiteY0" fmla="*/ 0 h 922297"/>
+              <a:gd name="connsiteX1" fmla="*/ 256319 w 617266"/>
+              <a:gd name="connsiteY1" fmla="*/ 601579 h 922297"/>
+              <a:gd name="connsiteX2" fmla="*/ 27719 w 617266"/>
+              <a:gd name="connsiteY2" fmla="*/ 745958 h 922297"/>
+              <a:gd name="connsiteX3" fmla="*/ 521013 w 617266"/>
+              <a:gd name="connsiteY3" fmla="*/ 866273 h 922297"/>
+              <a:gd name="connsiteX4" fmla="*/ 208192 w 617266"/>
+              <a:gd name="connsiteY4" fmla="*/ 132347 h 922297"/>
+              <a:gd name="connsiteX5" fmla="*/ 617266 w 617266"/>
+              <a:gd name="connsiteY5" fmla="*/ 216568 h 922297"/>
+              <a:gd name="connsiteX6" fmla="*/ 111940 w 617266"/>
+              <a:gd name="connsiteY6" fmla="*/ 24063 h 922297"/>
+              <a:gd name="connsiteX0" fmla="*/ 63813 w 617266"/>
+              <a:gd name="connsiteY0" fmla="*/ 0 h 922297"/>
+              <a:gd name="connsiteX1" fmla="*/ 256319 w 617266"/>
+              <a:gd name="connsiteY1" fmla="*/ 601579 h 922297"/>
+              <a:gd name="connsiteX2" fmla="*/ 27719 w 617266"/>
+              <a:gd name="connsiteY2" fmla="*/ 745958 h 922297"/>
+              <a:gd name="connsiteX3" fmla="*/ 521013 w 617266"/>
+              <a:gd name="connsiteY3" fmla="*/ 866273 h 922297"/>
+              <a:gd name="connsiteX4" fmla="*/ 208192 w 617266"/>
+              <a:gd name="connsiteY4" fmla="*/ 132347 h 922297"/>
+              <a:gd name="connsiteX5" fmla="*/ 617266 w 617266"/>
+              <a:gd name="connsiteY5" fmla="*/ 216568 h 922297"/>
+              <a:gd name="connsiteX6" fmla="*/ 111940 w 617266"/>
+              <a:gd name="connsiteY6" fmla="*/ 24063 h 922297"/>
+              <a:gd name="connsiteX0" fmla="*/ 63813 w 617266"/>
+              <a:gd name="connsiteY0" fmla="*/ 0 h 922297"/>
+              <a:gd name="connsiteX1" fmla="*/ 256319 w 617266"/>
+              <a:gd name="connsiteY1" fmla="*/ 601579 h 922297"/>
+              <a:gd name="connsiteX2" fmla="*/ 27719 w 617266"/>
+              <a:gd name="connsiteY2" fmla="*/ 745958 h 922297"/>
+              <a:gd name="connsiteX3" fmla="*/ 521013 w 617266"/>
+              <a:gd name="connsiteY3" fmla="*/ 866273 h 922297"/>
+              <a:gd name="connsiteX4" fmla="*/ 208192 w 617266"/>
+              <a:gd name="connsiteY4" fmla="*/ 132347 h 922297"/>
+              <a:gd name="connsiteX5" fmla="*/ 617266 w 617266"/>
+              <a:gd name="connsiteY5" fmla="*/ 216568 h 922297"/>
+              <a:gd name="connsiteX6" fmla="*/ 68224 w 617266"/>
+              <a:gd name="connsiteY6" fmla="*/ 2205 h 922297"/>
+              <a:gd name="connsiteX0" fmla="*/ 63813 w 617266"/>
+              <a:gd name="connsiteY0" fmla="*/ 0 h 922297"/>
+              <a:gd name="connsiteX1" fmla="*/ 256319 w 617266"/>
+              <a:gd name="connsiteY1" fmla="*/ 601579 h 922297"/>
+              <a:gd name="connsiteX2" fmla="*/ 27719 w 617266"/>
+              <a:gd name="connsiteY2" fmla="*/ 745958 h 922297"/>
+              <a:gd name="connsiteX3" fmla="*/ 521013 w 617266"/>
+              <a:gd name="connsiteY3" fmla="*/ 866273 h 922297"/>
+              <a:gd name="connsiteX4" fmla="*/ 208192 w 617266"/>
+              <a:gd name="connsiteY4" fmla="*/ 132347 h 922297"/>
+              <a:gd name="connsiteX5" fmla="*/ 617266 w 617266"/>
+              <a:gd name="connsiteY5" fmla="*/ 216568 h 922297"/>
+              <a:gd name="connsiteX6" fmla="*/ 68224 w 617266"/>
+              <a:gd name="connsiteY6" fmla="*/ 2205 h 922297"/>
+              <a:gd name="connsiteX7" fmla="*/ 63813 w 617266"/>
+              <a:gd name="connsiteY7" fmla="*/ 0 h 922297"/>
+            </a:gdLst>
+            <a:ahLst/>
+            <a:cxnLst>
+              <a:cxn ang="0">
+                <a:pos x="connsiteX0" y="connsiteY0"/>
+              </a:cxn>
+              <a:cxn ang="0">
+                <a:pos x="connsiteX1" y="connsiteY1"/>
+              </a:cxn>
+              <a:cxn ang="0">
+                <a:pos x="connsiteX2" y="connsiteY2"/>
+              </a:cxn>
+              <a:cxn ang="0">
+                <a:pos x="connsiteX3" y="connsiteY3"/>
+              </a:cxn>
+              <a:cxn ang="0">
+                <a:pos x="connsiteX4" y="connsiteY4"/>
+              </a:cxn>
+              <a:cxn ang="0">
+                <a:pos x="connsiteX5" y="connsiteY5"/>
+              </a:cxn>
+              <a:cxn ang="0">
+                <a:pos x="connsiteX6" y="connsiteY6"/>
+              </a:cxn>
+              <a:cxn ang="0">
+                <a:pos x="connsiteX7" y="connsiteY7"/>
+              </a:cxn>
+            </a:cxnLst>
+            <a:rect l="l" t="t" r="r" b="b"/>
+            <a:pathLst>
+              <a:path w="617266" h="922297">
+                <a:moveTo>
+                  <a:pt x="63813" y="0"/>
+                </a:moveTo>
+                <a:lnTo>
+                  <a:pt x="256319" y="601579"/>
+                </a:lnTo>
+                <a:cubicBezTo>
+                  <a:pt x="86367" y="569255"/>
+                  <a:pt x="-63756" y="559764"/>
+                  <a:pt x="27719" y="745958"/>
+                </a:cubicBezTo>
+                <a:cubicBezTo>
+                  <a:pt x="119194" y="932152"/>
+                  <a:pt x="490934" y="968541"/>
+                  <a:pt x="521013" y="866273"/>
+                </a:cubicBezTo>
+                <a:lnTo>
+                  <a:pt x="208192" y="132347"/>
+                </a:lnTo>
+                <a:cubicBezTo>
+                  <a:pt x="344550" y="160421"/>
+                  <a:pt x="473622" y="246783"/>
+                  <a:pt x="617266" y="216568"/>
+                </a:cubicBezTo>
+                <a:cubicBezTo>
+                  <a:pt x="445181" y="177901"/>
+                  <a:pt x="236666" y="66373"/>
+                  <a:pt x="68224" y="2205"/>
+                </a:cubicBezTo>
+                <a:lnTo>
+                  <a:pt x="63813" y="0"/>
+                </a:lnTo>
+                <a:close/>
+              </a:path>
+            </a:pathLst>
+          </a:custGeom>
+          <a:solidFill>
+            <a:srgbClr val="FF0000"/>
+          </a:solidFill>
+          <a:ln w="38100">
+            <a:solidFill>
+              <a:srgbClr val="FFC000"/>
+            </a:solidFill>
+          </a:ln>
+        </p:spPr>
+        <p:style>
+          <a:lnRef idx="2">
+            <a:schemeClr val="accent1">
+              <a:shade val="50000"/>
+            </a:schemeClr>
+          </a:lnRef>
+          <a:fillRef idx="1">
+            <a:schemeClr val="accent1"/>
+          </a:fillRef>
+          <a:effectRef idx="0">
+            <a:schemeClr val="accent1"/>
+          </a:effectRef>
+          <a:fontRef idx="minor">
+            <a:schemeClr val="lt1"/>
+          </a:fontRef>
+        </p:style>
+        <p:txBody>
+          <a:bodyPr rtlCol="0" anchor="ctr"/>
+          <a:lstStyle/>
+          <a:p>
+            <a:pPr algn="ctr"/>
+            <a:endParaRPr lang="en-US"/>
+          </a:p>
+        </p:txBody>
+      </p:sp>
+    </p:spTree>
+    <p:extLst>
+      <p:ext uri="{BB962C8B-B14F-4D97-AF65-F5344CB8AC3E}">
+        <p14:creationId xmlns:p14="http://schemas.microsoft.com/office/powerpoint/2010/main" val="725726366"/>
+      </p:ext>
+    </p:extLst>
+  </p:cSld>
+  <p:clrMapOvr>
+    <a:masterClrMapping/>
+  </p:clrMapOvr>
+</p:sld>
+</file>
+
+<file path=ppt/slides/slide31.xml><?xml version="1.0" encoding="utf-8"?>
+<p:sld xmlns:a="http://schemas.openxmlformats.org/drawingml/2006/main" xmlns:r="http://schemas.openxmlformats.org/officeDocument/2006/relationships" xmlns:p="http://schemas.openxmlformats.org/presentationml/2006/main">
+  <p:cSld>
+    <p:spTree>
+      <p:nvGrpSpPr>
+        <p:cNvPr id="1" name=""/>
+        <p:cNvGrpSpPr/>
+        <p:nvPr/>
+      </p:nvGrpSpPr>
+      <p:grpSpPr>
+        <a:xfrm>
+          <a:off x="0" y="0"/>
+          <a:ext cx="0" cy="0"/>
+          <a:chOff x="0" y="0"/>
+          <a:chExt cx="0" cy="0"/>
+        </a:xfrm>
+      </p:grpSpPr>
+      <p:pic>
+        <p:nvPicPr>
+          <p:cNvPr id="6" name="Imagen 5">
+            <a:extLst>
+              <a:ext uri="{FF2B5EF4-FFF2-40B4-BE49-F238E27FC236}">
+                <a16:creationId xmlns:a16="http://schemas.microsoft.com/office/drawing/2014/main" id="{513E70C9-EA36-496F-9C18-04DD65AB6CE1}"/>
+              </a:ext>
+            </a:extLst>
+          </p:cNvPr>
+          <p:cNvPicPr>
+            <a:picLocks noChangeAspect="1"/>
+          </p:cNvPicPr>
+          <p:nvPr/>
+        </p:nvPicPr>
+        <p:blipFill rotWithShape="1">
+          <a:blip r:embed="rId2"/>
+          <a:srcRect l="43717" r="1"/>
+          <a:stretch/>
+        </p:blipFill>
+        <p:spPr>
+          <a:xfrm>
+            <a:off x="2664994" y="0"/>
+            <a:ext cx="6862011" cy="6858000"/>
+          </a:xfrm>
+          <a:prstGeom prst="rect">
+            <a:avLst/>
+          </a:prstGeom>
+        </p:spPr>
+      </p:pic>
+      <p:pic>
+        <p:nvPicPr>
+          <p:cNvPr id="7" name="Picture 4" descr="https://www.strath.ac.uk/media/1newwebsite/documents/brand/strath_main.jpg">
+            <a:extLst>
+              <a:ext uri="{FF2B5EF4-FFF2-40B4-BE49-F238E27FC236}">
+                <a16:creationId xmlns:a16="http://schemas.microsoft.com/office/drawing/2014/main" id="{09DDC4EB-53EE-4856-899D-028F20EE32D2}"/>
+              </a:ext>
+            </a:extLst>
+          </p:cNvPr>
+          <p:cNvPicPr>
+            <a:picLocks noChangeAspect="1" noChangeArrowheads="1"/>
+          </p:cNvPicPr>
+          <p:nvPr/>
+        </p:nvPicPr>
+        <p:blipFill>
+          <a:blip r:embed="rId3" cstate="print">
+            <a:extLst>
+              <a:ext uri="{28A0092B-C50C-407E-A947-70E740481C1C}">
+                <a14:useLocalDpi xmlns:a14="http://schemas.microsoft.com/office/drawing/2010/main" val="0"/>
+              </a:ext>
+            </a:extLst>
+          </a:blip>
+          <a:srcRect/>
+          <a:stretch>
+            <a:fillRect/>
+          </a:stretch>
+        </p:blipFill>
+        <p:spPr bwMode="auto">
+          <a:xfrm>
+            <a:off x="7688374" y="1"/>
+            <a:ext cx="1838632" cy="2068461"/>
+          </a:xfrm>
+          <a:prstGeom prst="rect">
+            <a:avLst/>
+          </a:prstGeom>
+          <a:noFill/>
+          <a:extLst>
+            <a:ext uri="{909E8E84-426E-40DD-AFC4-6F175D3DCCD1}">
+              <a14:hiddenFill xmlns:a14="http://schemas.microsoft.com/office/drawing/2010/main">
+                <a:solidFill>
+                  <a:srgbClr val="FFFFFF"/>
+                </a:solidFill>
+              </a14:hiddenFill>
+            </a:ext>
+          </a:extLst>
+        </p:spPr>
+      </p:pic>
+      <p:sp>
+        <p:nvSpPr>
+          <p:cNvPr id="8" name="CuadroTexto 7">
+            <a:extLst>
+              <a:ext uri="{FF2B5EF4-FFF2-40B4-BE49-F238E27FC236}">
+                <a16:creationId xmlns:a16="http://schemas.microsoft.com/office/drawing/2014/main" id="{8848738D-8359-4DE6-B0B8-B3735517525E}"/>
+              </a:ext>
+            </a:extLst>
+          </p:cNvPr>
+          <p:cNvSpPr txBox="1"/>
+          <p:nvPr/>
+        </p:nvSpPr>
+        <p:spPr>
+          <a:xfrm>
+            <a:off x="3228474" y="2068462"/>
+            <a:ext cx="4199021" cy="2308324"/>
+          </a:xfrm>
+          <a:prstGeom prst="rect">
+            <a:avLst/>
+          </a:prstGeom>
+          <a:noFill/>
+        </p:spPr>
+        <p:txBody>
+          <a:bodyPr wrap="square" rtlCol="0">
+            <a:spAutoFit/>
+          </a:bodyPr>
+          <a:lstStyle/>
+          <a:p>
+            <a:r>
+              <a:rPr lang="en-GB" sz="2400" dirty="0"/>
+              <a:t>Please talk for about 1 minute about a topic of your choice.</a:t>
+            </a:r>
+          </a:p>
+          <a:p>
+            <a:endParaRPr lang="en-US" sz="2400" dirty="0"/>
+          </a:p>
+          <a:p>
+            <a:r>
+              <a:rPr lang="en-US" sz="2400" dirty="0"/>
+              <a:t>When you are ready, press Record. When finished press Stop.</a:t>
+            </a:r>
+          </a:p>
+        </p:txBody>
+      </p:sp>
+      <p:sp>
+        <p:nvSpPr>
+          <p:cNvPr id="10" name="Luna 9">
+            <a:extLst>
+              <a:ext uri="{FF2B5EF4-FFF2-40B4-BE49-F238E27FC236}">
+                <a16:creationId xmlns:a16="http://schemas.microsoft.com/office/drawing/2014/main" id="{A61D7487-7438-439C-9EF2-DFC81E690ED9}"/>
+              </a:ext>
+            </a:extLst>
+          </p:cNvPr>
+          <p:cNvSpPr/>
+          <p:nvPr/>
+        </p:nvSpPr>
+        <p:spPr>
+          <a:xfrm rot="10800000">
+            <a:off x="7121244" y="4538394"/>
             <a:ext cx="415438" cy="922297"/>
           </a:xfrm>
           <a:prstGeom prst="moon">
@@ -17309,10 +20606,10 @@
       </p:sp>
       <p:sp>
         <p:nvSpPr>
-          <p:cNvPr id="10" name="Luna 9">
-            <a:extLst>
-              <a:ext uri="{FF2B5EF4-FFF2-40B4-BE49-F238E27FC236}">
-                <a16:creationId xmlns:a16="http://schemas.microsoft.com/office/drawing/2014/main" id="{CF2C0AAE-8177-4A78-AD00-B650C19E045A}"/>
+          <p:cNvPr id="11" name="Luna 10">
+            <a:extLst>
+              <a:ext uri="{FF2B5EF4-FFF2-40B4-BE49-F238E27FC236}">
+                <a16:creationId xmlns:a16="http://schemas.microsoft.com/office/drawing/2014/main" id="{9A0E0BC7-6D20-4E70-B5C3-FDE47BB8A235}"/>
               </a:ext>
             </a:extLst>
           </p:cNvPr>
@@ -17320,8 +20617,8 @@
           <p:nvPr/>
         </p:nvSpPr>
         <p:spPr>
-          <a:xfrm>
-            <a:off x="2048869" y="3525254"/>
+          <a:xfrm rot="10800000">
+            <a:off x="7343438" y="4396355"/>
             <a:ext cx="506994" cy="1206374"/>
           </a:xfrm>
           <a:prstGeom prst="moon">
@@ -17365,10 +20662,10 @@
       </p:sp>
       <p:sp>
         <p:nvSpPr>
-          <p:cNvPr id="11" name="Luna 10">
-            <a:extLst>
-              <a:ext uri="{FF2B5EF4-FFF2-40B4-BE49-F238E27FC236}">
-                <a16:creationId xmlns:a16="http://schemas.microsoft.com/office/drawing/2014/main" id="{E2073FF4-0561-4A97-834C-440447C9E036}"/>
+          <p:cNvPr id="12" name="Luna 11">
+            <a:extLst>
+              <a:ext uri="{FF2B5EF4-FFF2-40B4-BE49-F238E27FC236}">
+                <a16:creationId xmlns:a16="http://schemas.microsoft.com/office/drawing/2014/main" id="{7E839A0C-2E4F-41FA-AD8A-2B3891C89672}"/>
               </a:ext>
             </a:extLst>
           </p:cNvPr>
@@ -17377,8 +20674,8 @@
         </p:nvSpPr>
         <p:spPr>
           <a:xfrm rot="10800000">
-            <a:off x="3851320" y="3649164"/>
-            <a:ext cx="415438" cy="922297"/>
+            <a:off x="7473619" y="4136924"/>
+            <a:ext cx="827443" cy="1713187"/>
           </a:xfrm>
           <a:prstGeom prst="moon">
             <a:avLst>
@@ -17419,12 +20716,164 @@
           </a:p>
         </p:txBody>
       </p:sp>
+    </p:spTree>
+    <p:extLst>
+      <p:ext uri="{BB962C8B-B14F-4D97-AF65-F5344CB8AC3E}">
+        <p14:creationId xmlns:p14="http://schemas.microsoft.com/office/powerpoint/2010/main" val="2806345637"/>
+      </p:ext>
+    </p:extLst>
+  </p:cSld>
+  <p:clrMapOvr>
+    <a:masterClrMapping/>
+  </p:clrMapOvr>
+</p:sld>
+</file>
+
+<file path=ppt/slides/slide32.xml><?xml version="1.0" encoding="utf-8"?>
+<p:sld xmlns:a="http://schemas.openxmlformats.org/drawingml/2006/main" xmlns:r="http://schemas.openxmlformats.org/officeDocument/2006/relationships" xmlns:p="http://schemas.openxmlformats.org/presentationml/2006/main">
+  <p:cSld>
+    <p:spTree>
+      <p:nvGrpSpPr>
+        <p:cNvPr id="1" name=""/>
+        <p:cNvGrpSpPr/>
+        <p:nvPr/>
+      </p:nvGrpSpPr>
+      <p:grpSpPr>
+        <a:xfrm>
+          <a:off x="0" y="0"/>
+          <a:ext cx="0" cy="0"/>
+          <a:chOff x="0" y="0"/>
+          <a:chExt cx="0" cy="0"/>
+        </a:xfrm>
+      </p:grpSpPr>
+      <p:pic>
+        <p:nvPicPr>
+          <p:cNvPr id="6" name="Imagen 5">
+            <a:extLst>
+              <a:ext uri="{FF2B5EF4-FFF2-40B4-BE49-F238E27FC236}">
+                <a16:creationId xmlns:a16="http://schemas.microsoft.com/office/drawing/2014/main" id="{513E70C9-EA36-496F-9C18-04DD65AB6CE1}"/>
+              </a:ext>
+            </a:extLst>
+          </p:cNvPr>
+          <p:cNvPicPr>
+            <a:picLocks noChangeAspect="1"/>
+          </p:cNvPicPr>
+          <p:nvPr/>
+        </p:nvPicPr>
+        <p:blipFill rotWithShape="1">
+          <a:blip r:embed="rId2"/>
+          <a:srcRect l="43717" r="1"/>
+          <a:stretch/>
+        </p:blipFill>
+        <p:spPr>
+          <a:xfrm>
+            <a:off x="2664994" y="0"/>
+            <a:ext cx="6862011" cy="6858000"/>
+          </a:xfrm>
+          <a:prstGeom prst="rect">
+            <a:avLst/>
+          </a:prstGeom>
+        </p:spPr>
+      </p:pic>
+      <p:pic>
+        <p:nvPicPr>
+          <p:cNvPr id="7" name="Picture 4" descr="https://www.strath.ac.uk/media/1newwebsite/documents/brand/strath_main.jpg">
+            <a:extLst>
+              <a:ext uri="{FF2B5EF4-FFF2-40B4-BE49-F238E27FC236}">
+                <a16:creationId xmlns:a16="http://schemas.microsoft.com/office/drawing/2014/main" id="{09DDC4EB-53EE-4856-899D-028F20EE32D2}"/>
+              </a:ext>
+            </a:extLst>
+          </p:cNvPr>
+          <p:cNvPicPr>
+            <a:picLocks noChangeAspect="1" noChangeArrowheads="1"/>
+          </p:cNvPicPr>
+          <p:nvPr/>
+        </p:nvPicPr>
+        <p:blipFill>
+          <a:blip r:embed="rId3" cstate="print">
+            <a:extLst>
+              <a:ext uri="{28A0092B-C50C-407E-A947-70E740481C1C}">
+                <a14:useLocalDpi xmlns:a14="http://schemas.microsoft.com/office/drawing/2010/main" val="0"/>
+              </a:ext>
+            </a:extLst>
+          </a:blip>
+          <a:srcRect/>
+          <a:stretch>
+            <a:fillRect/>
+          </a:stretch>
+        </p:blipFill>
+        <p:spPr bwMode="auto">
+          <a:xfrm>
+            <a:off x="7688374" y="1"/>
+            <a:ext cx="1838632" cy="2068461"/>
+          </a:xfrm>
+          <a:prstGeom prst="rect">
+            <a:avLst/>
+          </a:prstGeom>
+          <a:noFill/>
+          <a:extLst>
+            <a:ext uri="{909E8E84-426E-40DD-AFC4-6F175D3DCCD1}">
+              <a14:hiddenFill xmlns:a14="http://schemas.microsoft.com/office/drawing/2010/main">
+                <a:solidFill>
+                  <a:srgbClr val="FFFFFF"/>
+                </a:solidFill>
+              </a14:hiddenFill>
+            </a:ext>
+          </a:extLst>
+        </p:spPr>
+      </p:pic>
       <p:sp>
         <p:nvSpPr>
-          <p:cNvPr id="12" name="Luna 11">
-            <a:extLst>
-              <a:ext uri="{FF2B5EF4-FFF2-40B4-BE49-F238E27FC236}">
-                <a16:creationId xmlns:a16="http://schemas.microsoft.com/office/drawing/2014/main" id="{1D1C748B-5808-4EC2-97D7-6407112FFBEF}"/>
+          <p:cNvPr id="8" name="CuadroTexto 7">
+            <a:extLst>
+              <a:ext uri="{FF2B5EF4-FFF2-40B4-BE49-F238E27FC236}">
+                <a16:creationId xmlns:a16="http://schemas.microsoft.com/office/drawing/2014/main" id="{8848738D-8359-4DE6-B0B8-B3735517525E}"/>
+              </a:ext>
+            </a:extLst>
+          </p:cNvPr>
+          <p:cNvSpPr txBox="1"/>
+          <p:nvPr/>
+        </p:nvSpPr>
+        <p:spPr>
+          <a:xfrm>
+            <a:off x="3228474" y="2068462"/>
+            <a:ext cx="4199021" cy="1569660"/>
+          </a:xfrm>
+          <a:prstGeom prst="rect">
+            <a:avLst/>
+          </a:prstGeom>
+          <a:noFill/>
+        </p:spPr>
+        <p:txBody>
+          <a:bodyPr wrap="square" rtlCol="0">
+            <a:spAutoFit/>
+          </a:bodyPr>
+          <a:lstStyle/>
+          <a:p>
+            <a:r>
+              <a:rPr lang="en-GB" sz="2400" dirty="0"/>
+              <a:t>You have now completed your recording session. </a:t>
+            </a:r>
+            <a:br>
+              <a:rPr lang="en-GB" sz="2400" dirty="0"/>
+            </a:br>
+            <a:br>
+              <a:rPr lang="en-GB" sz="2400" dirty="0"/>
+            </a:br>
+            <a:r>
+              <a:rPr lang="en-GB" sz="2400" dirty="0"/>
+              <a:t>Thank you!</a:t>
+            </a:r>
+            <a:endParaRPr lang="en-US" sz="2400" dirty="0"/>
+          </a:p>
+        </p:txBody>
+      </p:sp>
+      <p:sp>
+        <p:nvSpPr>
+          <p:cNvPr id="9" name="Forma libre: forma 8">
+            <a:extLst>
+              <a:ext uri="{FF2B5EF4-FFF2-40B4-BE49-F238E27FC236}">
+                <a16:creationId xmlns:a16="http://schemas.microsoft.com/office/drawing/2014/main" id="{D197270B-9603-45CA-BD0D-A8049570F2A6}"/>
               </a:ext>
             </a:extLst>
           </p:cNvPr>
@@ -17432,15 +20881,260 @@
           <p:nvPr/>
         </p:nvSpPr>
         <p:spPr>
-          <a:xfrm rot="10800000">
-            <a:off x="4073514" y="3507125"/>
-            <a:ext cx="506994" cy="1206374"/>
+          <a:xfrm>
+            <a:off x="5619138" y="3762703"/>
+            <a:ext cx="2242599" cy="1943881"/>
           </a:xfrm>
-          <a:prstGeom prst="moon">
-            <a:avLst>
-              <a:gd name="adj" fmla="val 23599"/>
-            </a:avLst>
-          </a:prstGeom>
+          <a:custGeom>
+            <a:avLst/>
+            <a:gdLst>
+              <a:gd name="connsiteX0" fmla="*/ 0 w 1684421"/>
+              <a:gd name="connsiteY0" fmla="*/ 818147 h 1479884"/>
+              <a:gd name="connsiteX1" fmla="*/ 709863 w 1684421"/>
+              <a:gd name="connsiteY1" fmla="*/ 1479884 h 1479884"/>
+              <a:gd name="connsiteX2" fmla="*/ 757989 w 1684421"/>
+              <a:gd name="connsiteY2" fmla="*/ 1371600 h 1479884"/>
+              <a:gd name="connsiteX3" fmla="*/ 806115 w 1684421"/>
+              <a:gd name="connsiteY3" fmla="*/ 1275347 h 1479884"/>
+              <a:gd name="connsiteX4" fmla="*/ 1684421 w 1684421"/>
+              <a:gd name="connsiteY4" fmla="*/ 0 h 1479884"/>
+              <a:gd name="connsiteX5" fmla="*/ 637673 w 1684421"/>
+              <a:gd name="connsiteY5" fmla="*/ 866273 h 1479884"/>
+              <a:gd name="connsiteX6" fmla="*/ 96252 w 1684421"/>
+              <a:gd name="connsiteY6" fmla="*/ 830178 h 1479884"/>
+              <a:gd name="connsiteX0" fmla="*/ 0 w 1684421"/>
+              <a:gd name="connsiteY0" fmla="*/ 818147 h 1515928"/>
+              <a:gd name="connsiteX1" fmla="*/ 709863 w 1684421"/>
+              <a:gd name="connsiteY1" fmla="*/ 1479884 h 1515928"/>
+              <a:gd name="connsiteX2" fmla="*/ 806115 w 1684421"/>
+              <a:gd name="connsiteY2" fmla="*/ 1275347 h 1515928"/>
+              <a:gd name="connsiteX3" fmla="*/ 1684421 w 1684421"/>
+              <a:gd name="connsiteY3" fmla="*/ 0 h 1515928"/>
+              <a:gd name="connsiteX4" fmla="*/ 637673 w 1684421"/>
+              <a:gd name="connsiteY4" fmla="*/ 866273 h 1515928"/>
+              <a:gd name="connsiteX5" fmla="*/ 96252 w 1684421"/>
+              <a:gd name="connsiteY5" fmla="*/ 830178 h 1515928"/>
+              <a:gd name="connsiteX0" fmla="*/ 0 w 1684572"/>
+              <a:gd name="connsiteY0" fmla="*/ 818147 h 1479884"/>
+              <a:gd name="connsiteX1" fmla="*/ 709863 w 1684572"/>
+              <a:gd name="connsiteY1" fmla="*/ 1479884 h 1479884"/>
+              <a:gd name="connsiteX2" fmla="*/ 1684421 w 1684572"/>
+              <a:gd name="connsiteY2" fmla="*/ 0 h 1479884"/>
+              <a:gd name="connsiteX3" fmla="*/ 637673 w 1684572"/>
+              <a:gd name="connsiteY3" fmla="*/ 866273 h 1479884"/>
+              <a:gd name="connsiteX4" fmla="*/ 96252 w 1684572"/>
+              <a:gd name="connsiteY4" fmla="*/ 830178 h 1479884"/>
+              <a:gd name="connsiteX0" fmla="*/ 0 w 1684572"/>
+              <a:gd name="connsiteY0" fmla="*/ 818147 h 1479884"/>
+              <a:gd name="connsiteX1" fmla="*/ 709863 w 1684572"/>
+              <a:gd name="connsiteY1" fmla="*/ 1479884 h 1479884"/>
+              <a:gd name="connsiteX2" fmla="*/ 1684421 w 1684572"/>
+              <a:gd name="connsiteY2" fmla="*/ 0 h 1479884"/>
+              <a:gd name="connsiteX3" fmla="*/ 637673 w 1684572"/>
+              <a:gd name="connsiteY3" fmla="*/ 866273 h 1479884"/>
+              <a:gd name="connsiteX4" fmla="*/ 96252 w 1684572"/>
+              <a:gd name="connsiteY4" fmla="*/ 830178 h 1479884"/>
+              <a:gd name="connsiteX5" fmla="*/ 0 w 1684572"/>
+              <a:gd name="connsiteY5" fmla="*/ 818147 h 1479884"/>
+              <a:gd name="connsiteX0" fmla="*/ 0 w 1684572"/>
+              <a:gd name="connsiteY0" fmla="*/ 818147 h 1479884"/>
+              <a:gd name="connsiteX1" fmla="*/ 709863 w 1684572"/>
+              <a:gd name="connsiteY1" fmla="*/ 1479884 h 1479884"/>
+              <a:gd name="connsiteX2" fmla="*/ 1684421 w 1684572"/>
+              <a:gd name="connsiteY2" fmla="*/ 0 h 1479884"/>
+              <a:gd name="connsiteX3" fmla="*/ 637673 w 1684572"/>
+              <a:gd name="connsiteY3" fmla="*/ 866273 h 1479884"/>
+              <a:gd name="connsiteX4" fmla="*/ 0 w 1684572"/>
+              <a:gd name="connsiteY4" fmla="*/ 818147 h 1479884"/>
+              <a:gd name="connsiteX0" fmla="*/ 0 w 1684572"/>
+              <a:gd name="connsiteY0" fmla="*/ 818147 h 1479884"/>
+              <a:gd name="connsiteX1" fmla="*/ 709863 w 1684572"/>
+              <a:gd name="connsiteY1" fmla="*/ 1479884 h 1479884"/>
+              <a:gd name="connsiteX2" fmla="*/ 1684421 w 1684572"/>
+              <a:gd name="connsiteY2" fmla="*/ 0 h 1479884"/>
+              <a:gd name="connsiteX3" fmla="*/ 745957 w 1684572"/>
+              <a:gd name="connsiteY3" fmla="*/ 1010652 h 1479884"/>
+              <a:gd name="connsiteX4" fmla="*/ 0 w 1684572"/>
+              <a:gd name="connsiteY4" fmla="*/ 818147 h 1479884"/>
+              <a:gd name="connsiteX0" fmla="*/ 0 w 1684572"/>
+              <a:gd name="connsiteY0" fmla="*/ 818147 h 1479884"/>
+              <a:gd name="connsiteX1" fmla="*/ 709863 w 1684572"/>
+              <a:gd name="connsiteY1" fmla="*/ 1479884 h 1479884"/>
+              <a:gd name="connsiteX2" fmla="*/ 1684421 w 1684572"/>
+              <a:gd name="connsiteY2" fmla="*/ 0 h 1479884"/>
+              <a:gd name="connsiteX3" fmla="*/ 661736 w 1684572"/>
+              <a:gd name="connsiteY3" fmla="*/ 986589 h 1479884"/>
+              <a:gd name="connsiteX4" fmla="*/ 0 w 1684572"/>
+              <a:gd name="connsiteY4" fmla="*/ 818147 h 1479884"/>
+              <a:gd name="connsiteX0" fmla="*/ 0 w 1684706"/>
+              <a:gd name="connsiteY0" fmla="*/ 818147 h 1479884"/>
+              <a:gd name="connsiteX1" fmla="*/ 709863 w 1684706"/>
+              <a:gd name="connsiteY1" fmla="*/ 1479884 h 1479884"/>
+              <a:gd name="connsiteX2" fmla="*/ 1684421 w 1684706"/>
+              <a:gd name="connsiteY2" fmla="*/ 0 h 1479884"/>
+              <a:gd name="connsiteX3" fmla="*/ 661736 w 1684706"/>
+              <a:gd name="connsiteY3" fmla="*/ 986589 h 1479884"/>
+              <a:gd name="connsiteX4" fmla="*/ 0 w 1684706"/>
+              <a:gd name="connsiteY4" fmla="*/ 818147 h 1479884"/>
+              <a:gd name="connsiteX0" fmla="*/ 0 w 1684706"/>
+              <a:gd name="connsiteY0" fmla="*/ 818147 h 1479884"/>
+              <a:gd name="connsiteX1" fmla="*/ 709863 w 1684706"/>
+              <a:gd name="connsiteY1" fmla="*/ 1479884 h 1479884"/>
+              <a:gd name="connsiteX2" fmla="*/ 1684421 w 1684706"/>
+              <a:gd name="connsiteY2" fmla="*/ 0 h 1479884"/>
+              <a:gd name="connsiteX3" fmla="*/ 661736 w 1684706"/>
+              <a:gd name="connsiteY3" fmla="*/ 986589 h 1479884"/>
+              <a:gd name="connsiteX4" fmla="*/ 0 w 1684706"/>
+              <a:gd name="connsiteY4" fmla="*/ 818147 h 1479884"/>
+              <a:gd name="connsiteX0" fmla="*/ 0 w 1684706"/>
+              <a:gd name="connsiteY0" fmla="*/ 818147 h 1479884"/>
+              <a:gd name="connsiteX1" fmla="*/ 709863 w 1684706"/>
+              <a:gd name="connsiteY1" fmla="*/ 1479884 h 1479884"/>
+              <a:gd name="connsiteX2" fmla="*/ 1684421 w 1684706"/>
+              <a:gd name="connsiteY2" fmla="*/ 0 h 1479884"/>
+              <a:gd name="connsiteX3" fmla="*/ 661736 w 1684706"/>
+              <a:gd name="connsiteY3" fmla="*/ 986589 h 1479884"/>
+              <a:gd name="connsiteX4" fmla="*/ 0 w 1684706"/>
+              <a:gd name="connsiteY4" fmla="*/ 818147 h 1479884"/>
+              <a:gd name="connsiteX0" fmla="*/ 0 w 1684706"/>
+              <a:gd name="connsiteY0" fmla="*/ 818147 h 1479884"/>
+              <a:gd name="connsiteX1" fmla="*/ 709863 w 1684706"/>
+              <a:gd name="connsiteY1" fmla="*/ 1479884 h 1479884"/>
+              <a:gd name="connsiteX2" fmla="*/ 1684421 w 1684706"/>
+              <a:gd name="connsiteY2" fmla="*/ 0 h 1479884"/>
+              <a:gd name="connsiteX3" fmla="*/ 661736 w 1684706"/>
+              <a:gd name="connsiteY3" fmla="*/ 986589 h 1479884"/>
+              <a:gd name="connsiteX4" fmla="*/ 0 w 1684706"/>
+              <a:gd name="connsiteY4" fmla="*/ 818147 h 1479884"/>
+              <a:gd name="connsiteX0" fmla="*/ 0 w 1684706"/>
+              <a:gd name="connsiteY0" fmla="*/ 818147 h 1479884"/>
+              <a:gd name="connsiteX1" fmla="*/ 709863 w 1684706"/>
+              <a:gd name="connsiteY1" fmla="*/ 1479884 h 1479884"/>
+              <a:gd name="connsiteX2" fmla="*/ 1684421 w 1684706"/>
+              <a:gd name="connsiteY2" fmla="*/ 0 h 1479884"/>
+              <a:gd name="connsiteX3" fmla="*/ 661736 w 1684706"/>
+              <a:gd name="connsiteY3" fmla="*/ 1010652 h 1479884"/>
+              <a:gd name="connsiteX4" fmla="*/ 0 w 1684706"/>
+              <a:gd name="connsiteY4" fmla="*/ 818147 h 1479884"/>
+              <a:gd name="connsiteX0" fmla="*/ 0 w 1684706"/>
+              <a:gd name="connsiteY0" fmla="*/ 818147 h 1479884"/>
+              <a:gd name="connsiteX1" fmla="*/ 709863 w 1684706"/>
+              <a:gd name="connsiteY1" fmla="*/ 1479884 h 1479884"/>
+              <a:gd name="connsiteX2" fmla="*/ 1684421 w 1684706"/>
+              <a:gd name="connsiteY2" fmla="*/ 0 h 1479884"/>
+              <a:gd name="connsiteX3" fmla="*/ 661736 w 1684706"/>
+              <a:gd name="connsiteY3" fmla="*/ 1010652 h 1479884"/>
+              <a:gd name="connsiteX4" fmla="*/ 0 w 1684706"/>
+              <a:gd name="connsiteY4" fmla="*/ 818147 h 1479884"/>
+              <a:gd name="connsiteX0" fmla="*/ 0 w 1684706"/>
+              <a:gd name="connsiteY0" fmla="*/ 818147 h 1479884"/>
+              <a:gd name="connsiteX1" fmla="*/ 709863 w 1684706"/>
+              <a:gd name="connsiteY1" fmla="*/ 1479884 h 1479884"/>
+              <a:gd name="connsiteX2" fmla="*/ 1684421 w 1684706"/>
+              <a:gd name="connsiteY2" fmla="*/ 0 h 1479884"/>
+              <a:gd name="connsiteX3" fmla="*/ 661736 w 1684706"/>
+              <a:gd name="connsiteY3" fmla="*/ 1010652 h 1479884"/>
+              <a:gd name="connsiteX4" fmla="*/ 0 w 1684706"/>
+              <a:gd name="connsiteY4" fmla="*/ 818147 h 1479884"/>
+              <a:gd name="connsiteX0" fmla="*/ 0 w 1684786"/>
+              <a:gd name="connsiteY0" fmla="*/ 818147 h 1540042"/>
+              <a:gd name="connsiteX1" fmla="*/ 794084 w 1684786"/>
+              <a:gd name="connsiteY1" fmla="*/ 1540042 h 1540042"/>
+              <a:gd name="connsiteX2" fmla="*/ 1684421 w 1684786"/>
+              <a:gd name="connsiteY2" fmla="*/ 0 h 1540042"/>
+              <a:gd name="connsiteX3" fmla="*/ 661736 w 1684786"/>
+              <a:gd name="connsiteY3" fmla="*/ 1010652 h 1540042"/>
+              <a:gd name="connsiteX4" fmla="*/ 0 w 1684786"/>
+              <a:gd name="connsiteY4" fmla="*/ 818147 h 1540042"/>
+              <a:gd name="connsiteX0" fmla="*/ 0 w 1684583"/>
+              <a:gd name="connsiteY0" fmla="*/ 818147 h 1540042"/>
+              <a:gd name="connsiteX1" fmla="*/ 794084 w 1684583"/>
+              <a:gd name="connsiteY1" fmla="*/ 1540042 h 1540042"/>
+              <a:gd name="connsiteX2" fmla="*/ 1684421 w 1684583"/>
+              <a:gd name="connsiteY2" fmla="*/ 0 h 1540042"/>
+              <a:gd name="connsiteX3" fmla="*/ 661736 w 1684583"/>
+              <a:gd name="connsiteY3" fmla="*/ 1010652 h 1540042"/>
+              <a:gd name="connsiteX4" fmla="*/ 0 w 1684583"/>
+              <a:gd name="connsiteY4" fmla="*/ 818147 h 1540042"/>
+              <a:gd name="connsiteX0" fmla="*/ 0 w 1684421"/>
+              <a:gd name="connsiteY0" fmla="*/ 818147 h 1540042"/>
+              <a:gd name="connsiteX1" fmla="*/ 794084 w 1684421"/>
+              <a:gd name="connsiteY1" fmla="*/ 1540042 h 1540042"/>
+              <a:gd name="connsiteX2" fmla="*/ 1684421 w 1684421"/>
+              <a:gd name="connsiteY2" fmla="*/ 0 h 1540042"/>
+              <a:gd name="connsiteX3" fmla="*/ 661736 w 1684421"/>
+              <a:gd name="connsiteY3" fmla="*/ 1010652 h 1540042"/>
+              <a:gd name="connsiteX4" fmla="*/ 0 w 1684421"/>
+              <a:gd name="connsiteY4" fmla="*/ 818147 h 1540042"/>
+              <a:gd name="connsiteX0" fmla="*/ 0 w 1684421"/>
+              <a:gd name="connsiteY0" fmla="*/ 818147 h 1540042"/>
+              <a:gd name="connsiteX1" fmla="*/ 794084 w 1684421"/>
+              <a:gd name="connsiteY1" fmla="*/ 1540042 h 1540042"/>
+              <a:gd name="connsiteX2" fmla="*/ 1684421 w 1684421"/>
+              <a:gd name="connsiteY2" fmla="*/ 0 h 1540042"/>
+              <a:gd name="connsiteX3" fmla="*/ 661736 w 1684421"/>
+              <a:gd name="connsiteY3" fmla="*/ 1010652 h 1540042"/>
+              <a:gd name="connsiteX4" fmla="*/ 0 w 1684421"/>
+              <a:gd name="connsiteY4" fmla="*/ 818147 h 1540042"/>
+              <a:gd name="connsiteX0" fmla="*/ 0 w 1684421"/>
+              <a:gd name="connsiteY0" fmla="*/ 818147 h 1540042"/>
+              <a:gd name="connsiteX1" fmla="*/ 794084 w 1684421"/>
+              <a:gd name="connsiteY1" fmla="*/ 1540042 h 1540042"/>
+              <a:gd name="connsiteX2" fmla="*/ 1684421 w 1684421"/>
+              <a:gd name="connsiteY2" fmla="*/ 0 h 1540042"/>
+              <a:gd name="connsiteX3" fmla="*/ 661736 w 1684421"/>
+              <a:gd name="connsiteY3" fmla="*/ 1010652 h 1540042"/>
+              <a:gd name="connsiteX4" fmla="*/ 0 w 1684421"/>
+              <a:gd name="connsiteY4" fmla="*/ 818147 h 1540042"/>
+            </a:gdLst>
+            <a:ahLst/>
+            <a:cxnLst>
+              <a:cxn ang="0">
+                <a:pos x="connsiteX0" y="connsiteY0"/>
+              </a:cxn>
+              <a:cxn ang="0">
+                <a:pos x="connsiteX1" y="connsiteY1"/>
+              </a:cxn>
+              <a:cxn ang="0">
+                <a:pos x="connsiteX2" y="connsiteY2"/>
+              </a:cxn>
+              <a:cxn ang="0">
+                <a:pos x="connsiteX3" y="connsiteY3"/>
+              </a:cxn>
+              <a:cxn ang="0">
+                <a:pos x="connsiteX4" y="connsiteY4"/>
+              </a:cxn>
+            </a:cxnLst>
+            <a:rect l="l" t="t" r="r" b="b"/>
+            <a:pathLst>
+              <a:path w="1684421" h="1540042">
+                <a:moveTo>
+                  <a:pt x="0" y="818147"/>
+                </a:moveTo>
+                <a:cubicBezTo>
+                  <a:pt x="344905" y="1086852"/>
+                  <a:pt x="533399" y="1211178"/>
+                  <a:pt x="794084" y="1540042"/>
+                </a:cubicBezTo>
+                <a:cubicBezTo>
+                  <a:pt x="1038726" y="958515"/>
+                  <a:pt x="1299411" y="535405"/>
+                  <a:pt x="1684421" y="0"/>
+                </a:cubicBezTo>
+                <a:cubicBezTo>
+                  <a:pt x="1343526" y="336884"/>
+                  <a:pt x="990600" y="625642"/>
+                  <a:pt x="661736" y="1010652"/>
+                </a:cubicBezTo>
+                <a:cubicBezTo>
+                  <a:pt x="441157" y="894347"/>
+                  <a:pt x="256674" y="838199"/>
+                  <a:pt x="0" y="818147"/>
+                </a:cubicBezTo>
+                <a:close/>
+              </a:path>
+            </a:pathLst>
+          </a:custGeom>
           <a:solidFill>
             <a:srgbClr val="FF0000"/>
           </a:solidFill>
@@ -17471,488 +21165,14 @@
           <a:lstStyle/>
           <a:p>
             <a:pPr algn="ctr"/>
-            <a:endParaRPr lang="en-US"/>
+            <a:endParaRPr lang="en-US" dirty="0"/>
           </a:p>
         </p:txBody>
       </p:sp>
     </p:spTree>
     <p:extLst>
       <p:ext uri="{BB962C8B-B14F-4D97-AF65-F5344CB8AC3E}">
-        <p14:creationId xmlns:p14="http://schemas.microsoft.com/office/powerpoint/2010/main" val="1266122089"/>
-      </p:ext>
-    </p:extLst>
-  </p:cSld>
-  <p:clrMapOvr>
-    <a:masterClrMapping/>
-  </p:clrMapOvr>
-</p:sld>
-</file>
-
-<file path=ppt/slides/slide25.xml><?xml version="1.0" encoding="utf-8"?>
-<p:sld xmlns:a="http://schemas.openxmlformats.org/drawingml/2006/main" xmlns:r="http://schemas.openxmlformats.org/officeDocument/2006/relationships" xmlns:p="http://schemas.openxmlformats.org/presentationml/2006/main">
-  <p:cSld>
-    <p:spTree>
-      <p:nvGrpSpPr>
-        <p:cNvPr id="1" name=""/>
-        <p:cNvGrpSpPr/>
-        <p:nvPr/>
-      </p:nvGrpSpPr>
-      <p:grpSpPr>
-        <a:xfrm>
-          <a:off x="0" y="0"/>
-          <a:ext cx="0" cy="0"/>
-          <a:chOff x="0" y="0"/>
-          <a:chExt cx="0" cy="0"/>
-        </a:xfrm>
-      </p:grpSpPr>
-      <p:sp>
-        <p:nvSpPr>
-          <p:cNvPr id="4" name="Rectángulo 3">
-            <a:extLst>
-              <a:ext uri="{FF2B5EF4-FFF2-40B4-BE49-F238E27FC236}">
-                <a16:creationId xmlns:a16="http://schemas.microsoft.com/office/drawing/2014/main" id="{D85DFB13-485B-4AE7-9400-E79832498591}"/>
-              </a:ext>
-            </a:extLst>
-          </p:cNvPr>
-          <p:cNvSpPr/>
-          <p:nvPr/>
-        </p:nvSpPr>
-        <p:spPr>
-          <a:xfrm>
-            <a:off x="1058779" y="697832"/>
-            <a:ext cx="8686800" cy="5053263"/>
-          </a:xfrm>
-          <a:prstGeom prst="rect">
-            <a:avLst/>
-          </a:prstGeom>
-          <a:solidFill>
-            <a:schemeClr val="bg1">
-              <a:lumMod val="65000"/>
-              <a:lumOff val="35000"/>
-            </a:schemeClr>
-          </a:solidFill>
-          <a:ln w="38100">
-            <a:noFill/>
-          </a:ln>
-        </p:spPr>
-        <p:style>
-          <a:lnRef idx="2">
-            <a:schemeClr val="accent1">
-              <a:shade val="50000"/>
-            </a:schemeClr>
-          </a:lnRef>
-          <a:fillRef idx="1">
-            <a:schemeClr val="accent1"/>
-          </a:fillRef>
-          <a:effectRef idx="0">
-            <a:schemeClr val="accent1"/>
-          </a:effectRef>
-          <a:fontRef idx="minor">
-            <a:schemeClr val="lt1"/>
-          </a:fontRef>
-        </p:style>
-        <p:txBody>
-          <a:bodyPr rtlCol="0" anchor="ctr"/>
-          <a:lstStyle/>
-          <a:p>
-            <a:pPr algn="ctr"/>
-            <a:endParaRPr lang="en-US"/>
-          </a:p>
-        </p:txBody>
-      </p:sp>
-      <p:sp>
-        <p:nvSpPr>
-          <p:cNvPr id="2" name="Rectángulo 1">
-            <a:extLst>
-              <a:ext uri="{FF2B5EF4-FFF2-40B4-BE49-F238E27FC236}">
-                <a16:creationId xmlns:a16="http://schemas.microsoft.com/office/drawing/2014/main" id="{A05A50F8-9651-412B-BF2B-D2A6CADE7C38}"/>
-              </a:ext>
-            </a:extLst>
-          </p:cNvPr>
-          <p:cNvSpPr/>
-          <p:nvPr/>
-        </p:nvSpPr>
-        <p:spPr>
-          <a:xfrm>
-            <a:off x="1636295" y="1323474"/>
-            <a:ext cx="3600000" cy="3600000"/>
-          </a:xfrm>
-          <a:prstGeom prst="rect">
-            <a:avLst/>
-          </a:prstGeom>
-          <a:solidFill>
-            <a:schemeClr val="bg1">
-              <a:lumMod val="95000"/>
-              <a:lumOff val="5000"/>
-            </a:schemeClr>
-          </a:solidFill>
-          <a:ln w="38100">
-            <a:noFill/>
-          </a:ln>
-        </p:spPr>
-        <p:style>
-          <a:lnRef idx="2">
-            <a:schemeClr val="accent1">
-              <a:shade val="50000"/>
-            </a:schemeClr>
-          </a:lnRef>
-          <a:fillRef idx="1">
-            <a:schemeClr val="accent1"/>
-          </a:fillRef>
-          <a:effectRef idx="0">
-            <a:schemeClr val="accent1"/>
-          </a:effectRef>
-          <a:fontRef idx="minor">
-            <a:schemeClr val="lt1"/>
-          </a:fontRef>
-        </p:style>
-        <p:txBody>
-          <a:bodyPr rtlCol="0" anchor="ctr"/>
-          <a:lstStyle/>
-          <a:p>
-            <a:pPr algn="ctr"/>
-            <a:endParaRPr lang="en-US"/>
-          </a:p>
-        </p:txBody>
-      </p:sp>
-      <p:sp>
-        <p:nvSpPr>
-          <p:cNvPr id="5" name="CuadroTexto 4">
-            <a:extLst>
-              <a:ext uri="{FF2B5EF4-FFF2-40B4-BE49-F238E27FC236}">
-                <a16:creationId xmlns:a16="http://schemas.microsoft.com/office/drawing/2014/main" id="{EA59C0B3-482F-4117-AFFB-A1E627ACCFCA}"/>
-              </a:ext>
-            </a:extLst>
-          </p:cNvPr>
-          <p:cNvSpPr txBox="1"/>
-          <p:nvPr/>
-        </p:nvSpPr>
-        <p:spPr>
-          <a:xfrm>
-            <a:off x="1804737" y="1588162"/>
-            <a:ext cx="3260558" cy="2123658"/>
-          </a:xfrm>
-          <a:prstGeom prst="rect">
-            <a:avLst/>
-          </a:prstGeom>
-          <a:noFill/>
-        </p:spPr>
-        <p:txBody>
-          <a:bodyPr wrap="square" rtlCol="0">
-            <a:spAutoFit/>
-          </a:bodyPr>
-          <a:lstStyle/>
-          <a:p>
-            <a:pPr algn="ctr"/>
-            <a:r>
-              <a:rPr lang="en-US" sz="2400" b="1" dirty="0"/>
-              <a:t>Welcome to </a:t>
-            </a:r>
-            <a:r>
-              <a:rPr lang="en-US" sz="2400" b="1" dirty="0" err="1"/>
-              <a:t>VoiceVault</a:t>
-            </a:r>
-            <a:endParaRPr lang="en-US" sz="2400" b="1" dirty="0"/>
-          </a:p>
-          <a:p>
-            <a:pPr algn="ctr"/>
-            <a:endParaRPr lang="en-US" dirty="0"/>
-          </a:p>
-          <a:p>
-            <a:pPr algn="ctr"/>
-            <a:r>
-              <a:rPr lang="en-US" dirty="0"/>
-              <a:t>Clinical voice quality assessment</a:t>
-            </a:r>
-          </a:p>
-          <a:p>
-            <a:pPr algn="ctr"/>
-            <a:endParaRPr lang="en-US" dirty="0"/>
-          </a:p>
-          <a:p>
-            <a:pPr algn="ctr"/>
-            <a:r>
-              <a:rPr lang="en-US" b="1" i="1" dirty="0"/>
-              <a:t>Your test guide is loading…</a:t>
-            </a:r>
-          </a:p>
-          <a:p>
-            <a:pPr algn="ctr"/>
-            <a:endParaRPr lang="en-US" dirty="0"/>
-          </a:p>
-          <a:p>
-            <a:pPr algn="ctr"/>
-            <a:r>
-              <a:rPr lang="en-US" sz="1400" dirty="0"/>
-              <a:t>Built in Scotland by audence</a:t>
-            </a:r>
-          </a:p>
-        </p:txBody>
-      </p:sp>
-      <p:pic>
-        <p:nvPicPr>
-          <p:cNvPr id="16" name="Imagen 15" descr="Icono&#10;&#10;Descripción generada automáticamente">
-            <a:extLst>
-              <a:ext uri="{FF2B5EF4-FFF2-40B4-BE49-F238E27FC236}">
-                <a16:creationId xmlns:a16="http://schemas.microsoft.com/office/drawing/2014/main" id="{64956D90-E251-4843-903A-8F745C03C2E3}"/>
-              </a:ext>
-            </a:extLst>
-          </p:cNvPr>
-          <p:cNvPicPr>
-            <a:picLocks noChangeAspect="1"/>
-          </p:cNvPicPr>
-          <p:nvPr/>
-        </p:nvPicPr>
-        <p:blipFill>
-          <a:blip r:embed="rId2">
-            <a:extLst>
-              <a:ext uri="{28A0092B-C50C-407E-A947-70E740481C1C}">
-                <a14:useLocalDpi xmlns:a14="http://schemas.microsoft.com/office/drawing/2010/main" val="0"/>
-              </a:ext>
-            </a:extLst>
-          </a:blip>
-          <a:stretch>
-            <a:fillRect/>
-          </a:stretch>
-        </p:blipFill>
-        <p:spPr>
-          <a:xfrm>
-            <a:off x="2577874" y="3467154"/>
-            <a:ext cx="1663144" cy="1386976"/>
-          </a:xfrm>
-          <a:prstGeom prst="rect">
-            <a:avLst/>
-          </a:prstGeom>
-        </p:spPr>
-      </p:pic>
-    </p:spTree>
-    <p:extLst>
-      <p:ext uri="{BB962C8B-B14F-4D97-AF65-F5344CB8AC3E}">
-        <p14:creationId xmlns:p14="http://schemas.microsoft.com/office/powerpoint/2010/main" val="2118122674"/>
-      </p:ext>
-    </p:extLst>
-  </p:cSld>
-  <p:clrMapOvr>
-    <a:masterClrMapping/>
-  </p:clrMapOvr>
-</p:sld>
-</file>
-
-<file path=ppt/slides/slide26.xml><?xml version="1.0" encoding="utf-8"?>
-<p:sld xmlns:a="http://schemas.openxmlformats.org/drawingml/2006/main" xmlns:r="http://schemas.openxmlformats.org/officeDocument/2006/relationships" xmlns:p="http://schemas.openxmlformats.org/presentationml/2006/main">
-  <p:cSld>
-    <p:spTree>
-      <p:nvGrpSpPr>
-        <p:cNvPr id="1" name=""/>
-        <p:cNvGrpSpPr/>
-        <p:nvPr/>
-      </p:nvGrpSpPr>
-      <p:grpSpPr>
-        <a:xfrm>
-          <a:off x="0" y="0"/>
-          <a:ext cx="0" cy="0"/>
-          <a:chOff x="0" y="0"/>
-          <a:chExt cx="0" cy="0"/>
-        </a:xfrm>
-      </p:grpSpPr>
-    </p:spTree>
-    <p:extLst>
-      <p:ext uri="{BB962C8B-B14F-4D97-AF65-F5344CB8AC3E}">
-        <p14:creationId xmlns:p14="http://schemas.microsoft.com/office/powerpoint/2010/main" val="3514577946"/>
-      </p:ext>
-    </p:extLst>
-  </p:cSld>
-  <p:clrMapOvr>
-    <a:masterClrMapping/>
-  </p:clrMapOvr>
-</p:sld>
-</file>
-
-<file path=ppt/slides/slide3.xml><?xml version="1.0" encoding="utf-8"?>
-<p:sld xmlns:a="http://schemas.openxmlformats.org/drawingml/2006/main" xmlns:r="http://schemas.openxmlformats.org/officeDocument/2006/relationships" xmlns:p="http://schemas.openxmlformats.org/presentationml/2006/main">
-  <p:cSld>
-    <p:spTree>
-      <p:nvGrpSpPr>
-        <p:cNvPr id="1" name=""/>
-        <p:cNvGrpSpPr/>
-        <p:nvPr/>
-      </p:nvGrpSpPr>
-      <p:grpSpPr>
-        <a:xfrm>
-          <a:off x="0" y="0"/>
-          <a:ext cx="0" cy="0"/>
-          <a:chOff x="0" y="0"/>
-          <a:chExt cx="0" cy="0"/>
-        </a:xfrm>
-      </p:grpSpPr>
-      <p:sp>
-        <p:nvSpPr>
-          <p:cNvPr id="2" name="Título 1">
-            <a:extLst>
-              <a:ext uri="{FF2B5EF4-FFF2-40B4-BE49-F238E27FC236}">
-                <a16:creationId xmlns:a16="http://schemas.microsoft.com/office/drawing/2014/main" id="{0EA9CC44-A4DD-401C-BAE3-4BDA1320273B}"/>
-              </a:ext>
-            </a:extLst>
-          </p:cNvPr>
-          <p:cNvSpPr>
-            <a:spLocks noGrp="1"/>
-          </p:cNvSpPr>
-          <p:nvPr>
-            <p:ph type="title"/>
-          </p:nvPr>
-        </p:nvSpPr>
-        <p:spPr/>
-        <p:txBody>
-          <a:bodyPr/>
-          <a:lstStyle/>
-          <a:p>
-            <a:r>
-              <a:rPr lang="en-US" dirty="0">
-                <a:solidFill>
-                  <a:schemeClr val="accent2"/>
-                </a:solidFill>
-              </a:rPr>
-              <a:t>New requirements</a:t>
-            </a:r>
-          </a:p>
-        </p:txBody>
-      </p:sp>
-      <p:sp>
-        <p:nvSpPr>
-          <p:cNvPr id="3" name="Marcador de contenido 2">
-            <a:extLst>
-              <a:ext uri="{FF2B5EF4-FFF2-40B4-BE49-F238E27FC236}">
-                <a16:creationId xmlns:a16="http://schemas.microsoft.com/office/drawing/2014/main" id="{A648EF47-A8AF-4FAD-8E52-85AFC2D1D6A3}"/>
-              </a:ext>
-            </a:extLst>
-          </p:cNvPr>
-          <p:cNvSpPr>
-            <a:spLocks noGrp="1"/>
-          </p:cNvSpPr>
-          <p:nvPr>
-            <p:ph idx="1"/>
-          </p:nvPr>
-        </p:nvSpPr>
-        <p:spPr/>
-        <p:txBody>
-          <a:bodyPr/>
-          <a:lstStyle/>
-          <a:p>
-            <a:r>
-              <a:rPr lang="en-US" dirty="0">
-                <a:solidFill>
-                  <a:schemeClr val="accent2"/>
-                </a:solidFill>
-              </a:rPr>
-              <a:t>Rate things 1-10</a:t>
-            </a:r>
-          </a:p>
-          <a:p>
-            <a:r>
-              <a:rPr lang="en-US" dirty="0">
-                <a:solidFill>
-                  <a:schemeClr val="accent2"/>
-                </a:solidFill>
-              </a:rPr>
-              <a:t>Listen to example audio (html audio link)</a:t>
-            </a:r>
-          </a:p>
-          <a:p>
-            <a:r>
-              <a:rPr lang="en-US" dirty="0">
-                <a:solidFill>
-                  <a:schemeClr val="accent2"/>
-                </a:solidFill>
-              </a:rPr>
-              <a:t>Just one square graphic in div A. </a:t>
-            </a:r>
-            <a:r>
-              <a:rPr lang="en-US" dirty="0" err="1">
-                <a:solidFill>
-                  <a:schemeClr val="accent2"/>
-                </a:solidFill>
-              </a:rPr>
-              <a:t>Div</a:t>
-            </a:r>
-            <a:r>
-              <a:rPr lang="en-US" dirty="0">
-                <a:solidFill>
-                  <a:schemeClr val="accent2"/>
-                </a:solidFill>
-              </a:rPr>
-              <a:t> B is for controls and moves with rotation</a:t>
-            </a:r>
-          </a:p>
-          <a:p>
-            <a:r>
-              <a:rPr lang="en-US" dirty="0">
-                <a:solidFill>
-                  <a:schemeClr val="accent2"/>
-                </a:solidFill>
-              </a:rPr>
-              <a:t>Store question results in separate files</a:t>
-            </a:r>
-          </a:p>
-          <a:p>
-            <a:r>
-              <a:rPr lang="en-US" dirty="0" err="1">
-                <a:solidFill>
-                  <a:schemeClr val="accent2"/>
-                </a:solidFill>
-              </a:rPr>
-              <a:t>GuideID</a:t>
-            </a:r>
-            <a:r>
-              <a:rPr lang="en-US" dirty="0">
-                <a:solidFill>
-                  <a:schemeClr val="accent2"/>
-                </a:solidFill>
-              </a:rPr>
-              <a:t>-N-A/S/B/F (Audio, Scale, Boolean, Final) in the Guides folder</a:t>
-            </a:r>
-          </a:p>
-          <a:p>
-            <a:r>
-              <a:rPr lang="en-US" dirty="0">
-                <a:solidFill>
-                  <a:schemeClr val="accent2"/>
-                </a:solidFill>
-              </a:rPr>
-              <a:t>id is YYYMMDD-XX..X-G Where YYYYMMDD is the year, month and date, XX..X is the patient ID, and G is the </a:t>
-            </a:r>
-            <a:r>
-              <a:rPr lang="en-US" dirty="0" err="1">
-                <a:solidFill>
-                  <a:schemeClr val="accent2"/>
-                </a:solidFill>
-              </a:rPr>
-              <a:t>GuideID</a:t>
-            </a:r>
-            <a:r>
-              <a:rPr lang="en-US" dirty="0">
-                <a:solidFill>
-                  <a:schemeClr val="accent2"/>
-                </a:solidFill>
-              </a:rPr>
-              <a:t> (a single letter)</a:t>
-            </a:r>
-          </a:p>
-          <a:p>
-            <a:r>
-              <a:rPr lang="en-US" dirty="0">
-                <a:solidFill>
-                  <a:schemeClr val="accent2"/>
-                </a:solidFill>
-              </a:rPr>
-              <a:t>The example audio is stored in the Guides folder as G-N-E</a:t>
-            </a:r>
-          </a:p>
-        </p:txBody>
-      </p:sp>
-    </p:spTree>
-    <p:extLst>
-      <p:ext uri="{BB962C8B-B14F-4D97-AF65-F5344CB8AC3E}">
-        <p14:creationId xmlns:p14="http://schemas.microsoft.com/office/powerpoint/2010/main" val="3966279709"/>
+        <p14:creationId xmlns:p14="http://schemas.microsoft.com/office/powerpoint/2010/main" val="476139635"/>
       </p:ext>
     </p:extLst>
   </p:cSld>

</xml_diff>